<commit_message>
Finalize InfluxDB presentation and task flux
</commit_message>
<xml_diff>
--- a/presentation/presentation.pptx
+++ b/presentation/presentation.pptx
@@ -19,6 +19,8 @@
     <p:sldId id="267" r:id="rId14"/>
     <p:sldId id="268" r:id="rId15"/>
     <p:sldId id="269" r:id="rId16"/>
+    <p:sldId id="270" r:id="rId17"/>
+    <p:sldId id="271" r:id="rId18"/>
   </p:sldIdLst>
   <p:sldSz cx="10080625" cy="5670550"/>
   <p:notesSz cx="7559675" cy="10691812"/>
@@ -1664,7 +1666,7 @@
         <p:spPr>
           <a:xfrm>
             <a:off x="0" y="360"/>
-            <a:ext cx="10078920" cy="5668560"/>
+            <a:ext cx="10078560" cy="5668200"/>
           </a:xfrm>
           <a:prstGeom prst="rect">
             <a:avLst/>
@@ -1683,7 +1685,7 @@
         <p:spPr>
           <a:xfrm>
             <a:off x="504000" y="226080"/>
-            <a:ext cx="9068400" cy="943200"/>
+            <a:ext cx="9068040" cy="942840"/>
           </a:xfrm>
           <a:prstGeom prst="rect">
             <a:avLst/>
@@ -1740,7 +1742,7 @@
         <p:spPr>
           <a:xfrm>
             <a:off x="504000" y="1326600"/>
-            <a:ext cx="9068400" cy="3285000"/>
+            <a:ext cx="9068040" cy="3284640"/>
           </a:xfrm>
           <a:prstGeom prst="rect">
             <a:avLst/>
@@ -1904,7 +1906,7 @@
         <p:spPr>
           <a:xfrm>
             <a:off x="0" y="0"/>
-            <a:ext cx="10078920" cy="5668560"/>
+            <a:ext cx="10078560" cy="5668200"/>
           </a:xfrm>
           <a:prstGeom prst="rect">
             <a:avLst/>
@@ -1923,7 +1925,7 @@
         <p:spPr>
           <a:xfrm>
             <a:off x="504000" y="226080"/>
-            <a:ext cx="9068400" cy="943200"/>
+            <a:ext cx="9068040" cy="942840"/>
           </a:xfrm>
           <a:prstGeom prst="rect">
             <a:avLst/>
@@ -1949,7 +1951,7 @@
         <p:spPr>
           <a:xfrm>
             <a:off x="504000" y="1326600"/>
-            <a:ext cx="9068400" cy="3285000"/>
+            <a:ext cx="9068040" cy="3284640"/>
           </a:xfrm>
           <a:prstGeom prst="rect">
             <a:avLst/>
@@ -2203,7 +2205,7 @@
         <p:spPr>
           <a:xfrm>
             <a:off x="0" y="720"/>
-            <a:ext cx="10078920" cy="5668560"/>
+            <a:ext cx="10078560" cy="5668200"/>
           </a:xfrm>
           <a:prstGeom prst="rect">
             <a:avLst/>
@@ -2222,7 +2224,7 @@
         <p:spPr>
           <a:xfrm>
             <a:off x="504000" y="226080"/>
-            <a:ext cx="9068400" cy="943200"/>
+            <a:ext cx="9068040" cy="942840"/>
           </a:xfrm>
           <a:prstGeom prst="rect">
             <a:avLst/>
@@ -2248,7 +2250,7 @@
         <p:spPr>
           <a:xfrm>
             <a:off x="504000" y="1326600"/>
-            <a:ext cx="9069120" cy="3285720"/>
+            <a:ext cx="9068760" cy="3285360"/>
           </a:xfrm>
           <a:prstGeom prst="rect">
             <a:avLst/>
@@ -2358,7 +2360,7 @@
         <p:spPr>
           <a:xfrm>
             <a:off x="0" y="720"/>
-            <a:ext cx="10078920" cy="5668560"/>
+            <a:ext cx="10078560" cy="5668200"/>
           </a:xfrm>
           <a:prstGeom prst="rect">
             <a:avLst/>
@@ -2425,7 +2427,7 @@
         <p:spPr>
           <a:xfrm>
             <a:off x="504000" y="1326600"/>
-            <a:ext cx="9069120" cy="3285720"/>
+            <a:ext cx="9068760" cy="3285360"/>
           </a:xfrm>
           <a:prstGeom prst="rect">
             <a:avLst/>
@@ -2674,7 +2676,7 @@
         <p:spPr>
           <a:xfrm>
             <a:off x="0" y="720"/>
-            <a:ext cx="10078920" cy="5668560"/>
+            <a:ext cx="10078560" cy="5668200"/>
           </a:xfrm>
           <a:prstGeom prst="rect">
             <a:avLst/>
@@ -2741,7 +2743,7 @@
         <p:spPr>
           <a:xfrm>
             <a:off x="504000" y="226080"/>
-            <a:ext cx="9068400" cy="943200"/>
+            <a:ext cx="9068040" cy="942840"/>
           </a:xfrm>
           <a:prstGeom prst="rect">
             <a:avLst/>
@@ -2767,7 +2769,7 @@
         <p:spPr>
           <a:xfrm>
             <a:off x="504000" y="1326600"/>
-            <a:ext cx="9069120" cy="3285720"/>
+            <a:ext cx="9068760" cy="3285360"/>
           </a:xfrm>
           <a:prstGeom prst="rect">
             <a:avLst/>
@@ -3016,7 +3018,7 @@
         <p:spPr>
           <a:xfrm>
             <a:off x="0" y="720"/>
-            <a:ext cx="10078920" cy="5668560"/>
+            <a:ext cx="10078560" cy="5668200"/>
           </a:xfrm>
           <a:prstGeom prst="rect">
             <a:avLst/>
@@ -3083,7 +3085,7 @@
         <p:spPr>
           <a:xfrm>
             <a:off x="504000" y="226080"/>
-            <a:ext cx="9068400" cy="943200"/>
+            <a:ext cx="9068040" cy="942840"/>
           </a:xfrm>
           <a:prstGeom prst="rect">
             <a:avLst/>
@@ -3109,7 +3111,7 @@
         <p:spPr>
           <a:xfrm>
             <a:off x="504000" y="1326600"/>
-            <a:ext cx="9069120" cy="3285720"/>
+            <a:ext cx="9068760" cy="3285360"/>
           </a:xfrm>
           <a:prstGeom prst="rect">
             <a:avLst/>
@@ -3345,6 +3347,374 @@
           </a:p>
         </p:txBody>
       </p:sp>
+    </p:spTree>
+  </p:cSld>
+  <mc:AlternateContent>
+    <mc:Choice Requires="p14">
+      <p:transition spd="slow" p14:dur="2000"/>
+    </mc:Choice>
+    <mc:Fallback>
+      <p:transition spd="slow"/>
+    </mc:Fallback>
+  </mc:AlternateContent>
+</p:sld>
+</file>
+
+<file path=ppt/slides/slide15.xml><?xml version="1.0" encoding="utf-8"?>
+<p:sld xmlns:a="http://schemas.openxmlformats.org/drawingml/2006/main" xmlns:p="http://schemas.openxmlformats.org/presentationml/2006/main" xmlns:r="http://schemas.openxmlformats.org/officeDocument/2006/relationships" xmlns:p14="http://schemas.microsoft.com/office/powerpoint/2010/main" xmlns:p15="http://schemas.microsoft.com/office/powerpoint/2012/main" xmlns:mc="http://schemas.openxmlformats.org/markup-compatibility/2006">
+  <p:cSld>
+    <p:spTree>
+      <p:nvGrpSpPr>
+        <p:cNvPr id="1" name=""/>
+        <p:cNvGrpSpPr/>
+        <p:nvPr/>
+      </p:nvGrpSpPr>
+      <p:grpSpPr>
+        <a:xfrm>
+          <a:off x="0" y="0"/>
+          <a:ext cx="0" cy="0"/>
+          <a:chOff x="0" y="0"/>
+          <a:chExt cx="0" cy="0"/>
+        </a:xfrm>
+      </p:grpSpPr>
+      <p:sp>
+        <p:nvSpPr>
+          <p:cNvPr id="84" name=""/>
+          <p:cNvSpPr/>
+          <p:nvPr/>
+        </p:nvSpPr>
+        <p:spPr>
+          <a:xfrm>
+            <a:off x="0" y="720"/>
+            <a:ext cx="10078560" cy="5668200"/>
+          </a:xfrm>
+          <a:prstGeom prst="rect">
+            <a:avLst/>
+          </a:prstGeom>
+          <a:blipFill rotWithShape="0">
+            <a:blip r:embed="rId1"/>
+            <a:srcRect/>
+            <a:stretch/>
+          </a:blipFill>
+          <a:ln w="0">
+            <a:noFill/>
+          </a:ln>
+        </p:spPr>
+        <p:style>
+          <a:lnRef idx="0"/>
+          <a:fillRef idx="0"/>
+          <a:effectRef idx="0"/>
+          <a:fontRef idx="minor"/>
+        </p:style>
+        <p:txBody>
+          <a:bodyPr lIns="90000" rIns="90000" tIns="45000" bIns="45000" anchorCtr="1">
+            <a:noAutofit/>
+          </a:bodyPr>
+          <a:p>
+            <a:pPr algn="ctr">
+              <a:lnSpc>
+                <a:spcPct val="100000"/>
+              </a:lnSpc>
+              <a:spcBef>
+                <a:spcPts val="850"/>
+              </a:spcBef>
+              <a:tabLst>
+                <a:tab algn="l" pos="408240"/>
+              </a:tabLst>
+            </a:pPr>
+            <a:endParaRPr b="0" lang="en-US" sz="1800" spc="-1" strike="noStrike">
+              <a:latin typeface="Arial"/>
+            </a:endParaRPr>
+          </a:p>
+          <a:p>
+            <a:pPr algn="ctr">
+              <a:lnSpc>
+                <a:spcPct val="100000"/>
+              </a:lnSpc>
+              <a:spcBef>
+                <a:spcPts val="850"/>
+              </a:spcBef>
+              <a:tabLst>
+                <a:tab algn="l" pos="408240"/>
+              </a:tabLst>
+            </a:pPr>
+            <a:endParaRPr b="0" lang="en-US" sz="1800" spc="-1" strike="noStrike">
+              <a:latin typeface="Arial"/>
+            </a:endParaRPr>
+          </a:p>
+        </p:txBody>
+      </p:sp>
+      <p:sp>
+        <p:nvSpPr>
+          <p:cNvPr id="85" name=""/>
+          <p:cNvSpPr/>
+          <p:nvPr/>
+        </p:nvSpPr>
+        <p:spPr>
+          <a:xfrm>
+            <a:off x="504000" y="226080"/>
+            <a:ext cx="9068040" cy="942840"/>
+          </a:xfrm>
+          <a:prstGeom prst="rect">
+            <a:avLst/>
+          </a:prstGeom>
+          <a:noFill/>
+          <a:ln w="0">
+            <a:noFill/>
+          </a:ln>
+        </p:spPr>
+        <p:style>
+          <a:lnRef idx="0"/>
+          <a:fillRef idx="0"/>
+          <a:effectRef idx="0"/>
+          <a:fontRef idx="minor"/>
+        </p:style>
+      </p:sp>
+      <p:sp>
+        <p:nvSpPr>
+          <p:cNvPr id="86" name=""/>
+          <p:cNvSpPr/>
+          <p:nvPr/>
+        </p:nvSpPr>
+        <p:spPr>
+          <a:xfrm>
+            <a:off x="504000" y="1326600"/>
+            <a:ext cx="9068760" cy="3285360"/>
+          </a:xfrm>
+          <a:prstGeom prst="rect">
+            <a:avLst/>
+          </a:prstGeom>
+          <a:noFill/>
+          <a:ln w="0">
+            <a:noFill/>
+          </a:ln>
+        </p:spPr>
+        <p:style>
+          <a:lnRef idx="0"/>
+          <a:fillRef idx="0"/>
+          <a:effectRef idx="0"/>
+          <a:fontRef idx="minor"/>
+        </p:style>
+        <p:txBody>
+          <a:bodyPr lIns="0" rIns="0" tIns="0" bIns="0">
+            <a:normAutofit/>
+          </a:bodyPr>
+          <a:p>
+            <a:pPr>
+              <a:lnSpc>
+                <a:spcPct val="100000"/>
+              </a:lnSpc>
+              <a:spcBef>
+                <a:spcPts val="1417"/>
+              </a:spcBef>
+              <a:tabLst>
+                <a:tab algn="l" pos="408240"/>
+              </a:tabLst>
+            </a:pPr>
+            <a:endParaRPr b="0" lang="en-US" sz="1800" spc="-1" strike="noStrike">
+              <a:latin typeface="Arial"/>
+            </a:endParaRPr>
+          </a:p>
+          <a:p>
+            <a:pPr algn="ctr">
+              <a:lnSpc>
+                <a:spcPct val="100000"/>
+              </a:lnSpc>
+              <a:spcBef>
+                <a:spcPts val="1417"/>
+              </a:spcBef>
+              <a:tabLst>
+                <a:tab algn="l" pos="408240"/>
+              </a:tabLst>
+            </a:pPr>
+            <a:r>
+              <a:rPr b="0" lang="en-US" sz="3200" spc="-1" strike="noStrike">
+                <a:solidFill>
+                  <a:srgbClr val="000000"/>
+                </a:solidFill>
+                <a:latin typeface="Arial"/>
+                <a:ea typeface="DejaVu Sans"/>
+              </a:rPr>
+              <a:t>Retention policies</a:t>
+            </a:r>
+            <a:endParaRPr b="0" lang="en-US" sz="3200" spc="-1" strike="noStrike">
+              <a:latin typeface="Arial"/>
+            </a:endParaRPr>
+          </a:p>
+          <a:p>
+            <a:pPr algn="ctr">
+              <a:lnSpc>
+                <a:spcPct val="100000"/>
+              </a:lnSpc>
+              <a:spcBef>
+                <a:spcPts val="850"/>
+              </a:spcBef>
+              <a:tabLst>
+                <a:tab algn="l" pos="408240"/>
+              </a:tabLst>
+            </a:pPr>
+            <a:r>
+              <a:rPr b="0" lang="en-US" sz="2000" spc="-1" strike="noStrike">
+                <a:solidFill>
+                  <a:srgbClr val="000000"/>
+                </a:solidFill>
+                <a:latin typeface="Arial"/>
+                <a:ea typeface="DejaVu Sans"/>
+              </a:rPr>
+              <a:t>Retain data only for a specific period of time.</a:t>
+            </a:r>
+            <a:endParaRPr b="0" lang="en-US" sz="2000" spc="-1" strike="noStrike">
+              <a:latin typeface="Arial"/>
+            </a:endParaRPr>
+          </a:p>
+        </p:txBody>
+      </p:sp>
+    </p:spTree>
+  </p:cSld>
+  <mc:AlternateContent>
+    <mc:Choice Requires="p14">
+      <p:transition spd="slow" p14:dur="2000"/>
+    </mc:Choice>
+    <mc:Fallback>
+      <p:transition spd="slow"/>
+    </mc:Fallback>
+  </mc:AlternateContent>
+</p:sld>
+</file>
+
+<file path=ppt/slides/slide16.xml><?xml version="1.0" encoding="utf-8"?>
+<p:sld xmlns:a="http://schemas.openxmlformats.org/drawingml/2006/main" xmlns:p="http://schemas.openxmlformats.org/presentationml/2006/main" xmlns:r="http://schemas.openxmlformats.org/officeDocument/2006/relationships" xmlns:p14="http://schemas.microsoft.com/office/powerpoint/2010/main" xmlns:p15="http://schemas.microsoft.com/office/powerpoint/2012/main" xmlns:mc="http://schemas.openxmlformats.org/markup-compatibility/2006">
+  <p:cSld>
+    <p:spTree>
+      <p:nvGrpSpPr>
+        <p:cNvPr id="1" name=""/>
+        <p:cNvGrpSpPr/>
+        <p:nvPr/>
+      </p:nvGrpSpPr>
+      <p:grpSpPr>
+        <a:xfrm>
+          <a:off x="0" y="0"/>
+          <a:ext cx="0" cy="0"/>
+          <a:chOff x="0" y="0"/>
+          <a:chExt cx="0" cy="0"/>
+        </a:xfrm>
+      </p:grpSpPr>
+      <p:sp>
+        <p:nvSpPr>
+          <p:cNvPr id="87" name=""/>
+          <p:cNvSpPr/>
+          <p:nvPr/>
+        </p:nvSpPr>
+        <p:spPr>
+          <a:xfrm>
+            <a:off x="0" y="720"/>
+            <a:ext cx="10078560" cy="5668200"/>
+          </a:xfrm>
+          <a:prstGeom prst="rect">
+            <a:avLst/>
+          </a:prstGeom>
+          <a:blipFill rotWithShape="0">
+            <a:blip r:embed="rId1"/>
+            <a:srcRect/>
+            <a:stretch/>
+          </a:blipFill>
+          <a:ln w="0">
+            <a:noFill/>
+          </a:ln>
+        </p:spPr>
+        <p:style>
+          <a:lnRef idx="0"/>
+          <a:fillRef idx="0"/>
+          <a:effectRef idx="0"/>
+          <a:fontRef idx="minor"/>
+        </p:style>
+        <p:txBody>
+          <a:bodyPr lIns="90000" rIns="90000" tIns="45000" bIns="45000" anchorCtr="1">
+            <a:noAutofit/>
+          </a:bodyPr>
+          <a:p>
+            <a:pPr algn="ctr">
+              <a:lnSpc>
+                <a:spcPct val="100000"/>
+              </a:lnSpc>
+              <a:spcBef>
+                <a:spcPts val="850"/>
+              </a:spcBef>
+              <a:tabLst>
+                <a:tab algn="l" pos="408240"/>
+              </a:tabLst>
+            </a:pPr>
+            <a:endParaRPr b="0" lang="en-US" sz="1800" spc="-1" strike="noStrike">
+              <a:latin typeface="Arial"/>
+            </a:endParaRPr>
+          </a:p>
+          <a:p>
+            <a:pPr algn="ctr">
+              <a:lnSpc>
+                <a:spcPct val="100000"/>
+              </a:lnSpc>
+              <a:spcBef>
+                <a:spcPts val="850"/>
+              </a:spcBef>
+              <a:tabLst>
+                <a:tab algn="l" pos="408240"/>
+              </a:tabLst>
+            </a:pPr>
+            <a:endParaRPr b="0" lang="en-US" sz="1800" spc="-1" strike="noStrike">
+              <a:latin typeface="Arial"/>
+            </a:endParaRPr>
+          </a:p>
+        </p:txBody>
+      </p:sp>
+      <p:sp>
+        <p:nvSpPr>
+          <p:cNvPr id="88" name=""/>
+          <p:cNvSpPr/>
+          <p:nvPr/>
+        </p:nvSpPr>
+        <p:spPr>
+          <a:xfrm>
+            <a:off x="504000" y="226080"/>
+            <a:ext cx="9068040" cy="942840"/>
+          </a:xfrm>
+          <a:prstGeom prst="rect">
+            <a:avLst/>
+          </a:prstGeom>
+          <a:noFill/>
+          <a:ln w="0">
+            <a:noFill/>
+          </a:ln>
+        </p:spPr>
+        <p:style>
+          <a:lnRef idx="0"/>
+          <a:fillRef idx="0"/>
+          <a:effectRef idx="0"/>
+          <a:fontRef idx="minor"/>
+        </p:style>
+      </p:sp>
+      <p:pic>
+        <p:nvPicPr>
+          <p:cNvPr id="89" name="" descr=""/>
+          <p:cNvPicPr/>
+          <p:nvPr/>
+        </p:nvPicPr>
+        <p:blipFill>
+          <a:blip r:embed="rId2"/>
+          <a:stretch/>
+        </p:blipFill>
+        <p:spPr>
+          <a:xfrm rot="6000">
+            <a:off x="914400" y="947520"/>
+            <a:ext cx="8454600" cy="4074120"/>
+          </a:xfrm>
+          <a:prstGeom prst="rect">
+            <a:avLst/>
+          </a:prstGeom>
+          <a:ln w="0">
+            <a:noFill/>
+          </a:ln>
+        </p:spPr>
+      </p:pic>
     </p:spTree>
   </p:cSld>
   <mc:AlternateContent>
@@ -3388,7 +3758,7 @@
         <p:spPr>
           <a:xfrm>
             <a:off x="0" y="360"/>
-            <a:ext cx="10078920" cy="5668560"/>
+            <a:ext cx="10078560" cy="5668200"/>
           </a:xfrm>
           <a:prstGeom prst="rect">
             <a:avLst/>
@@ -3407,7 +3777,7 @@
         <p:spPr>
           <a:xfrm>
             <a:off x="504000" y="226080"/>
-            <a:ext cx="9068400" cy="943200"/>
+            <a:ext cx="9068040" cy="942840"/>
           </a:xfrm>
           <a:prstGeom prst="rect">
             <a:avLst/>
@@ -3433,7 +3803,7 @@
         <p:spPr>
           <a:xfrm>
             <a:off x="504000" y="1326600"/>
-            <a:ext cx="9068400" cy="3285000"/>
+            <a:ext cx="9068040" cy="3284640"/>
           </a:xfrm>
           <a:prstGeom prst="rect">
             <a:avLst/>
@@ -3599,7 +3969,7 @@
         <p:spPr>
           <a:xfrm>
             <a:off x="0" y="0"/>
-            <a:ext cx="10078920" cy="5668560"/>
+            <a:ext cx="10078560" cy="5668200"/>
           </a:xfrm>
           <a:prstGeom prst="rect">
             <a:avLst/>
@@ -3618,7 +3988,7 @@
         <p:spPr>
           <a:xfrm>
             <a:off x="504000" y="226080"/>
-            <a:ext cx="9068400" cy="943200"/>
+            <a:ext cx="9068040" cy="942840"/>
           </a:xfrm>
           <a:prstGeom prst="rect">
             <a:avLst/>
@@ -3644,7 +4014,7 @@
         <p:spPr>
           <a:xfrm>
             <a:off x="504000" y="1326600"/>
-            <a:ext cx="9068400" cy="3285000"/>
+            <a:ext cx="9068040" cy="3284640"/>
           </a:xfrm>
           <a:prstGeom prst="rect">
             <a:avLst/>
@@ -3770,7 +4140,7 @@
         <p:spPr>
           <a:xfrm>
             <a:off x="2932560" y="920520"/>
-            <a:ext cx="4198680" cy="3817800"/>
+            <a:ext cx="4198320" cy="3817440"/>
           </a:xfrm>
           <a:prstGeom prst="rect">
             <a:avLst/>
@@ -3823,7 +4193,7 @@
         <p:spPr>
           <a:xfrm>
             <a:off x="0" y="720"/>
-            <a:ext cx="10078920" cy="5668560"/>
+            <a:ext cx="10078560" cy="5668200"/>
           </a:xfrm>
           <a:prstGeom prst="rect">
             <a:avLst/>
@@ -3842,7 +4212,7 @@
         <p:spPr>
           <a:xfrm>
             <a:off x="504000" y="226080"/>
-            <a:ext cx="9068400" cy="943200"/>
+            <a:ext cx="9068040" cy="942840"/>
           </a:xfrm>
           <a:prstGeom prst="rect">
             <a:avLst/>
@@ -3868,7 +4238,7 @@
         <p:spPr>
           <a:xfrm>
             <a:off x="504000" y="1326600"/>
-            <a:ext cx="9069120" cy="3285720"/>
+            <a:ext cx="9068760" cy="3285360"/>
           </a:xfrm>
           <a:prstGeom prst="rect">
             <a:avLst/>
@@ -3991,7 +4361,7 @@
         <p:spPr>
           <a:xfrm>
             <a:off x="1440" y="0"/>
-            <a:ext cx="10078920" cy="5668560"/>
+            <a:ext cx="10078560" cy="5668200"/>
           </a:xfrm>
           <a:prstGeom prst="rect">
             <a:avLst/>
@@ -4010,7 +4380,7 @@
         <p:spPr>
           <a:xfrm>
             <a:off x="504000" y="226080"/>
-            <a:ext cx="9068400" cy="943200"/>
+            <a:ext cx="9068040" cy="942840"/>
           </a:xfrm>
           <a:prstGeom prst="rect">
             <a:avLst/>
@@ -4036,7 +4406,7 @@
         <p:spPr>
           <a:xfrm>
             <a:off x="504000" y="1326600"/>
-            <a:ext cx="9069120" cy="3285720"/>
+            <a:ext cx="9068760" cy="3285360"/>
           </a:xfrm>
           <a:prstGeom prst="rect">
             <a:avLst/>
@@ -4119,7 +4489,7 @@
         <p:spPr>
           <a:xfrm>
             <a:off x="3657600" y="1143000"/>
-            <a:ext cx="2436480" cy="2057040"/>
+            <a:ext cx="2436120" cy="2056680"/>
           </a:xfrm>
           <a:prstGeom prst="rect">
             <a:avLst/>
@@ -4142,7 +4512,7 @@
         <p:spPr>
           <a:xfrm>
             <a:off x="228600" y="3629160"/>
-            <a:ext cx="9705600" cy="1628280"/>
+            <a:ext cx="9705240" cy="1627920"/>
           </a:xfrm>
           <a:prstGeom prst="rect">
             <a:avLst/>
@@ -4195,7 +4565,7 @@
         <p:spPr>
           <a:xfrm>
             <a:off x="0" y="360"/>
-            <a:ext cx="10078920" cy="5668560"/>
+            <a:ext cx="10078560" cy="5668200"/>
           </a:xfrm>
           <a:prstGeom prst="rect">
             <a:avLst/>
@@ -4214,7 +4584,7 @@
         <p:spPr>
           <a:xfrm>
             <a:off x="504000" y="226080"/>
-            <a:ext cx="9068400" cy="943200"/>
+            <a:ext cx="9068040" cy="942840"/>
           </a:xfrm>
           <a:prstGeom prst="rect">
             <a:avLst/>
@@ -4240,7 +4610,7 @@
         <p:spPr>
           <a:xfrm>
             <a:off x="504000" y="1326600"/>
-            <a:ext cx="9068400" cy="3285000"/>
+            <a:ext cx="9068040" cy="3284640"/>
           </a:xfrm>
           <a:prstGeom prst="rect">
             <a:avLst/>
@@ -4393,7 +4763,7 @@
         <p:spPr>
           <a:xfrm>
             <a:off x="0" y="0"/>
-            <a:ext cx="10078920" cy="5668560"/>
+            <a:ext cx="10078560" cy="5668200"/>
           </a:xfrm>
           <a:prstGeom prst="rect">
             <a:avLst/>
@@ -4412,7 +4782,7 @@
         <p:spPr>
           <a:xfrm>
             <a:off x="504000" y="226080"/>
-            <a:ext cx="9068400" cy="943200"/>
+            <a:ext cx="9068040" cy="942840"/>
           </a:xfrm>
           <a:prstGeom prst="rect">
             <a:avLst/>
@@ -4438,7 +4808,7 @@
         <p:spPr>
           <a:xfrm>
             <a:off x="504000" y="1326600"/>
-            <a:ext cx="9068400" cy="3285000"/>
+            <a:ext cx="9068040" cy="3284640"/>
           </a:xfrm>
           <a:prstGeom prst="rect">
             <a:avLst/>
@@ -4515,7 +4885,7 @@
         <p:spPr>
           <a:xfrm>
             <a:off x="504000" y="4343400"/>
-            <a:ext cx="9325440" cy="318960"/>
+            <a:ext cx="9325080" cy="318600"/>
           </a:xfrm>
           <a:prstGeom prst="rect">
             <a:avLst/>
@@ -4600,7 +4970,7 @@
         <p:spPr>
           <a:xfrm>
             <a:off x="0" y="0"/>
-            <a:ext cx="10078920" cy="5668560"/>
+            <a:ext cx="10078560" cy="5668200"/>
           </a:xfrm>
           <a:prstGeom prst="rect">
             <a:avLst/>
@@ -4619,7 +4989,7 @@
         <p:spPr>
           <a:xfrm>
             <a:off x="504000" y="226080"/>
-            <a:ext cx="9068400" cy="943200"/>
+            <a:ext cx="9068040" cy="942840"/>
           </a:xfrm>
           <a:prstGeom prst="rect">
             <a:avLst/>
@@ -4645,7 +5015,7 @@
         <p:spPr>
           <a:xfrm>
             <a:off x="504000" y="1326600"/>
-            <a:ext cx="9068400" cy="3285000"/>
+            <a:ext cx="9068040" cy="3284640"/>
           </a:xfrm>
           <a:prstGeom prst="rect">
             <a:avLst/>
@@ -4876,7 +5246,7 @@
         <p:spPr>
           <a:xfrm>
             <a:off x="0" y="360"/>
-            <a:ext cx="10078920" cy="5668560"/>
+            <a:ext cx="10078560" cy="5668200"/>
           </a:xfrm>
           <a:prstGeom prst="rect">
             <a:avLst/>
@@ -4895,7 +5265,7 @@
         <p:spPr>
           <a:xfrm>
             <a:off x="504000" y="226080"/>
-            <a:ext cx="9068400" cy="943200"/>
+            <a:ext cx="9068040" cy="942840"/>
           </a:xfrm>
           <a:prstGeom prst="rect">
             <a:avLst/>
@@ -4921,7 +5291,7 @@
         <p:spPr>
           <a:xfrm>
             <a:off x="504000" y="1326600"/>
-            <a:ext cx="9068400" cy="3285000"/>
+            <a:ext cx="9068040" cy="3284640"/>
           </a:xfrm>
           <a:prstGeom prst="rect">
             <a:avLst/>
@@ -5011,7 +5381,7 @@
         <p:spPr>
           <a:xfrm>
             <a:off x="2057400" y="4021920"/>
-            <a:ext cx="5942160" cy="548640"/>
+            <a:ext cx="5941800" cy="548280"/>
           </a:xfrm>
           <a:prstGeom prst="rect">
             <a:avLst/>

</xml_diff>

<commit_message>
Add first neo4j slide
</commit_message>
<xml_diff>
--- a/presentation/presentation.pptx
+++ b/presentation/presentation.pptx
@@ -21,6 +21,7 @@
     <p:sldId id="269" r:id="rId16"/>
     <p:sldId id="270" r:id="rId17"/>
     <p:sldId id="271" r:id="rId18"/>
+    <p:sldId id="272" r:id="rId19"/>
   </p:sldIdLst>
   <p:sldSz cx="10080625" cy="5670550"/>
   <p:notesSz cx="7559675" cy="10691812"/>
@@ -1666,7 +1667,7 @@
         <p:spPr>
           <a:xfrm>
             <a:off x="0" y="360"/>
-            <a:ext cx="10078560" cy="5668200"/>
+            <a:ext cx="10077840" cy="5667480"/>
           </a:xfrm>
           <a:prstGeom prst="rect">
             <a:avLst/>
@@ -1685,7 +1686,7 @@
         <p:spPr>
           <a:xfrm>
             <a:off x="504000" y="226080"/>
-            <a:ext cx="9068040" cy="942840"/>
+            <a:ext cx="9067320" cy="942120"/>
           </a:xfrm>
           <a:prstGeom prst="rect">
             <a:avLst/>
@@ -1742,7 +1743,7 @@
         <p:spPr>
           <a:xfrm>
             <a:off x="504000" y="1326600"/>
-            <a:ext cx="9068040" cy="3284640"/>
+            <a:ext cx="9067320" cy="3283920"/>
           </a:xfrm>
           <a:prstGeom prst="rect">
             <a:avLst/>
@@ -1906,7 +1907,7 @@
         <p:spPr>
           <a:xfrm>
             <a:off x="0" y="0"/>
-            <a:ext cx="10078560" cy="5668200"/>
+            <a:ext cx="10077840" cy="5667480"/>
           </a:xfrm>
           <a:prstGeom prst="rect">
             <a:avLst/>
@@ -1925,7 +1926,7 @@
         <p:spPr>
           <a:xfrm>
             <a:off x="504000" y="226080"/>
-            <a:ext cx="9068040" cy="942840"/>
+            <a:ext cx="9067320" cy="942120"/>
           </a:xfrm>
           <a:prstGeom prst="rect">
             <a:avLst/>
@@ -1951,7 +1952,7 @@
         <p:spPr>
           <a:xfrm>
             <a:off x="504000" y="1326600"/>
-            <a:ext cx="9068040" cy="3284640"/>
+            <a:ext cx="9067320" cy="3283920"/>
           </a:xfrm>
           <a:prstGeom prst="rect">
             <a:avLst/>
@@ -2205,7 +2206,7 @@
         <p:spPr>
           <a:xfrm>
             <a:off x="0" y="720"/>
-            <a:ext cx="10078560" cy="5668200"/>
+            <a:ext cx="10077840" cy="5667480"/>
           </a:xfrm>
           <a:prstGeom prst="rect">
             <a:avLst/>
@@ -2224,7 +2225,7 @@
         <p:spPr>
           <a:xfrm>
             <a:off x="504000" y="226080"/>
-            <a:ext cx="9068040" cy="942840"/>
+            <a:ext cx="9067320" cy="942120"/>
           </a:xfrm>
           <a:prstGeom prst="rect">
             <a:avLst/>
@@ -2250,7 +2251,7 @@
         <p:spPr>
           <a:xfrm>
             <a:off x="504000" y="1326600"/>
-            <a:ext cx="9068760" cy="3285360"/>
+            <a:ext cx="9068040" cy="3284640"/>
           </a:xfrm>
           <a:prstGeom prst="rect">
             <a:avLst/>
@@ -2360,7 +2361,7 @@
         <p:spPr>
           <a:xfrm>
             <a:off x="0" y="720"/>
-            <a:ext cx="10078560" cy="5668200"/>
+            <a:ext cx="10077840" cy="5667480"/>
           </a:xfrm>
           <a:prstGeom prst="rect">
             <a:avLst/>
@@ -2427,7 +2428,7 @@
         <p:spPr>
           <a:xfrm>
             <a:off x="504000" y="1326600"/>
-            <a:ext cx="9068760" cy="3285360"/>
+            <a:ext cx="9068040" cy="3284640"/>
           </a:xfrm>
           <a:prstGeom prst="rect">
             <a:avLst/>
@@ -2676,7 +2677,7 @@
         <p:spPr>
           <a:xfrm>
             <a:off x="0" y="720"/>
-            <a:ext cx="10078560" cy="5668200"/>
+            <a:ext cx="10077840" cy="5667480"/>
           </a:xfrm>
           <a:prstGeom prst="rect">
             <a:avLst/>
@@ -2743,7 +2744,7 @@
         <p:spPr>
           <a:xfrm>
             <a:off x="504000" y="226080"/>
-            <a:ext cx="9068040" cy="942840"/>
+            <a:ext cx="9067320" cy="942120"/>
           </a:xfrm>
           <a:prstGeom prst="rect">
             <a:avLst/>
@@ -2769,7 +2770,7 @@
         <p:spPr>
           <a:xfrm>
             <a:off x="504000" y="1326600"/>
-            <a:ext cx="9068760" cy="3285360"/>
+            <a:ext cx="9068040" cy="3284640"/>
           </a:xfrm>
           <a:prstGeom prst="rect">
             <a:avLst/>
@@ -3018,7 +3019,7 @@
         <p:spPr>
           <a:xfrm>
             <a:off x="0" y="720"/>
-            <a:ext cx="10078560" cy="5668200"/>
+            <a:ext cx="10077840" cy="5667480"/>
           </a:xfrm>
           <a:prstGeom prst="rect">
             <a:avLst/>
@@ -3085,7 +3086,7 @@
         <p:spPr>
           <a:xfrm>
             <a:off x="504000" y="226080"/>
-            <a:ext cx="9068040" cy="942840"/>
+            <a:ext cx="9067320" cy="942120"/>
           </a:xfrm>
           <a:prstGeom prst="rect">
             <a:avLst/>
@@ -3111,7 +3112,7 @@
         <p:spPr>
           <a:xfrm>
             <a:off x="504000" y="1326600"/>
-            <a:ext cx="9068760" cy="3285360"/>
+            <a:ext cx="9068040" cy="3284640"/>
           </a:xfrm>
           <a:prstGeom prst="rect">
             <a:avLst/>
@@ -3386,7 +3387,7 @@
         <p:spPr>
           <a:xfrm>
             <a:off x="0" y="720"/>
-            <a:ext cx="10078560" cy="5668200"/>
+            <a:ext cx="10077840" cy="5667480"/>
           </a:xfrm>
           <a:prstGeom prst="rect">
             <a:avLst/>
@@ -3453,7 +3454,7 @@
         <p:spPr>
           <a:xfrm>
             <a:off x="504000" y="226080"/>
-            <a:ext cx="9068040" cy="942840"/>
+            <a:ext cx="9067320" cy="942120"/>
           </a:xfrm>
           <a:prstGeom prst="rect">
             <a:avLst/>
@@ -3479,7 +3480,7 @@
         <p:spPr>
           <a:xfrm>
             <a:off x="504000" y="1326600"/>
-            <a:ext cx="9068760" cy="3285360"/>
+            <a:ext cx="9068040" cy="3284640"/>
           </a:xfrm>
           <a:prstGeom prst="rect">
             <a:avLst/>
@@ -3608,7 +3609,7 @@
         <p:spPr>
           <a:xfrm>
             <a:off x="0" y="720"/>
-            <a:ext cx="10078560" cy="5668200"/>
+            <a:ext cx="10077840" cy="5667480"/>
           </a:xfrm>
           <a:prstGeom prst="rect">
             <a:avLst/>
@@ -3675,7 +3676,7 @@
         <p:spPr>
           <a:xfrm>
             <a:off x="504000" y="226080"/>
-            <a:ext cx="9068040" cy="942840"/>
+            <a:ext cx="9067320" cy="942120"/>
           </a:xfrm>
           <a:prstGeom prst="rect">
             <a:avLst/>
@@ -3705,7 +3706,7 @@
         <p:spPr>
           <a:xfrm rot="6000">
             <a:off x="914400" y="947520"/>
-            <a:ext cx="8454600" cy="4074120"/>
+            <a:ext cx="8453880" cy="4073400"/>
           </a:xfrm>
           <a:prstGeom prst="rect">
             <a:avLst/>
@@ -3715,6 +3716,246 @@
           </a:ln>
         </p:spPr>
       </p:pic>
+    </p:spTree>
+  </p:cSld>
+  <mc:AlternateContent>
+    <mc:Choice Requires="p14">
+      <p:transition spd="slow" p14:dur="2000"/>
+    </mc:Choice>
+    <mc:Fallback>
+      <p:transition spd="slow"/>
+    </mc:Fallback>
+  </mc:AlternateContent>
+</p:sld>
+</file>
+
+<file path=ppt/slides/slide17.xml><?xml version="1.0" encoding="utf-8"?>
+<p:sld xmlns:a="http://schemas.openxmlformats.org/drawingml/2006/main" xmlns:p="http://schemas.openxmlformats.org/presentationml/2006/main" xmlns:r="http://schemas.openxmlformats.org/officeDocument/2006/relationships" xmlns:p14="http://schemas.microsoft.com/office/powerpoint/2010/main" xmlns:p15="http://schemas.microsoft.com/office/powerpoint/2012/main" xmlns:mc="http://schemas.openxmlformats.org/markup-compatibility/2006">
+  <p:cSld>
+    <p:spTree>
+      <p:nvGrpSpPr>
+        <p:cNvPr id="1" name=""/>
+        <p:cNvGrpSpPr/>
+        <p:nvPr/>
+      </p:nvGrpSpPr>
+      <p:grpSpPr>
+        <a:xfrm>
+          <a:off x="0" y="0"/>
+          <a:ext cx="0" cy="0"/>
+          <a:chOff x="0" y="0"/>
+          <a:chExt cx="0" cy="0"/>
+        </a:xfrm>
+      </p:grpSpPr>
+      <p:pic>
+        <p:nvPicPr>
+          <p:cNvPr id="90" name="" descr=""/>
+          <p:cNvPicPr/>
+          <p:nvPr/>
+        </p:nvPicPr>
+        <p:blipFill>
+          <a:blip r:embed="rId1"/>
+          <a:stretch/>
+        </p:blipFill>
+        <p:spPr>
+          <a:xfrm>
+            <a:off x="0" y="0"/>
+            <a:ext cx="10080720" cy="5670000"/>
+          </a:xfrm>
+          <a:prstGeom prst="rect">
+            <a:avLst/>
+          </a:prstGeom>
+          <a:ln w="0">
+            <a:noFill/>
+          </a:ln>
+        </p:spPr>
+      </p:pic>
+      <p:sp>
+        <p:nvSpPr>
+          <p:cNvPr id="91" name=""/>
+          <p:cNvSpPr/>
+          <p:nvPr/>
+        </p:nvSpPr>
+        <p:spPr>
+          <a:xfrm>
+            <a:off x="504000" y="226080"/>
+            <a:ext cx="9067320" cy="942120"/>
+          </a:xfrm>
+          <a:prstGeom prst="rect">
+            <a:avLst/>
+          </a:prstGeom>
+          <a:noFill/>
+          <a:ln w="0">
+            <a:noFill/>
+          </a:ln>
+        </p:spPr>
+        <p:style>
+          <a:lnRef idx="0"/>
+          <a:fillRef idx="0"/>
+          <a:effectRef idx="0"/>
+          <a:fontRef idx="minor"/>
+        </p:style>
+        <p:txBody>
+          <a:bodyPr lIns="0" rIns="0" tIns="0" bIns="0" anchor="ctr">
+            <a:noAutofit/>
+          </a:bodyPr>
+          <a:p>
+            <a:pPr algn="ctr">
+              <a:lnSpc>
+                <a:spcPct val="100000"/>
+              </a:lnSpc>
+              <a:tabLst>
+                <a:tab algn="l" pos="408240"/>
+              </a:tabLst>
+            </a:pPr>
+            <a:endParaRPr b="0" lang="en-US" sz="1800" spc="-1" strike="noStrike">
+              <a:latin typeface="Arial"/>
+            </a:endParaRPr>
+          </a:p>
+          <a:p>
+            <a:pPr algn="ctr">
+              <a:lnSpc>
+                <a:spcPct val="100000"/>
+              </a:lnSpc>
+              <a:tabLst>
+                <a:tab algn="l" pos="408240"/>
+              </a:tabLst>
+            </a:pPr>
+            <a:endParaRPr b="0" lang="en-US" sz="1800" spc="-1" strike="noStrike">
+              <a:latin typeface="Arial"/>
+            </a:endParaRPr>
+          </a:p>
+        </p:txBody>
+      </p:sp>
+      <p:sp>
+        <p:nvSpPr>
+          <p:cNvPr id="92" name=""/>
+          <p:cNvSpPr/>
+          <p:nvPr/>
+        </p:nvSpPr>
+        <p:spPr>
+          <a:xfrm>
+            <a:off x="504000" y="1326600"/>
+            <a:ext cx="9067320" cy="3283920"/>
+          </a:xfrm>
+          <a:prstGeom prst="rect">
+            <a:avLst/>
+          </a:prstGeom>
+          <a:noFill/>
+          <a:ln w="0">
+            <a:noFill/>
+          </a:ln>
+        </p:spPr>
+        <p:style>
+          <a:lnRef idx="0"/>
+          <a:fillRef idx="0"/>
+          <a:effectRef idx="0"/>
+          <a:fontRef idx="minor"/>
+        </p:style>
+        <p:txBody>
+          <a:bodyPr lIns="0" rIns="0" tIns="0" bIns="0" anchor="ctr">
+            <a:noAutofit/>
+          </a:bodyPr>
+          <a:p>
+            <a:pPr algn="ctr">
+              <a:lnSpc>
+                <a:spcPct val="100000"/>
+              </a:lnSpc>
+              <a:tabLst>
+                <a:tab algn="l" pos="408240"/>
+              </a:tabLst>
+            </a:pPr>
+            <a:endParaRPr b="0" lang="en-US" sz="1800" spc="-1" strike="noStrike">
+              <a:latin typeface="Arial"/>
+            </a:endParaRPr>
+          </a:p>
+          <a:p>
+            <a:pPr algn="ctr">
+              <a:lnSpc>
+                <a:spcPct val="100000"/>
+              </a:lnSpc>
+              <a:tabLst>
+                <a:tab algn="l" pos="408240"/>
+              </a:tabLst>
+            </a:pPr>
+            <a:endParaRPr b="0" lang="en-US" sz="1800" spc="-1" strike="noStrike">
+              <a:latin typeface="Arial"/>
+            </a:endParaRPr>
+          </a:p>
+          <a:p>
+            <a:pPr algn="ctr">
+              <a:lnSpc>
+                <a:spcPct val="100000"/>
+              </a:lnSpc>
+              <a:tabLst>
+                <a:tab algn="l" pos="408240"/>
+              </a:tabLst>
+            </a:pPr>
+            <a:r>
+              <a:rPr b="1" lang="en-US" sz="3200" spc="-1" strike="noStrike">
+                <a:solidFill>
+                  <a:srgbClr val="000000"/>
+                </a:solidFill>
+                <a:latin typeface="Arial"/>
+                <a:ea typeface="Microsoft YaHei"/>
+              </a:rPr>
+              <a:t>Neo4j</a:t>
+            </a:r>
+            <a:br/>
+            <a:r>
+              <a:rPr b="0" lang="en-US" sz="2400" spc="-1" strike="noStrike">
+                <a:solidFill>
+                  <a:srgbClr val="000000"/>
+                </a:solidFill>
+                <a:latin typeface="Arial"/>
+                <a:ea typeface="Microsoft YaHei"/>
+              </a:rPr>
+              <a:t>Graph database</a:t>
+            </a:r>
+            <a:endParaRPr b="0" lang="en-US" sz="2400" spc="-1" strike="noStrike">
+              <a:latin typeface="Arial"/>
+            </a:endParaRPr>
+          </a:p>
+          <a:p>
+            <a:pPr algn="ctr">
+              <a:lnSpc>
+                <a:spcPct val="100000"/>
+              </a:lnSpc>
+              <a:tabLst>
+                <a:tab algn="l" pos="408240"/>
+              </a:tabLst>
+            </a:pPr>
+            <a:endParaRPr b="0" lang="en-US" sz="2400" spc="-1" strike="noStrike">
+              <a:latin typeface="Arial"/>
+            </a:endParaRPr>
+          </a:p>
+          <a:p>
+            <a:pPr algn="ctr">
+              <a:lnSpc>
+                <a:spcPct val="100000"/>
+              </a:lnSpc>
+              <a:tabLst>
+                <a:tab algn="l" pos="408240"/>
+              </a:tabLst>
+            </a:pPr>
+            <a:endParaRPr b="0" lang="en-US" sz="2400" spc="-1" strike="noStrike">
+              <a:latin typeface="Arial"/>
+            </a:endParaRPr>
+          </a:p>
+          <a:p>
+            <a:pPr algn="ctr">
+              <a:lnSpc>
+                <a:spcPct val="100000"/>
+              </a:lnSpc>
+              <a:tabLst>
+                <a:tab algn="l" pos="408240"/>
+              </a:tabLst>
+            </a:pPr>
+            <a:endParaRPr b="0" lang="en-US" sz="2400" spc="-1" strike="noStrike">
+              <a:latin typeface="Arial"/>
+            </a:endParaRPr>
+          </a:p>
+        </p:txBody>
+      </p:sp>
     </p:spTree>
   </p:cSld>
   <mc:AlternateContent>
@@ -3758,7 +3999,7 @@
         <p:spPr>
           <a:xfrm>
             <a:off x="0" y="360"/>
-            <a:ext cx="10078560" cy="5668200"/>
+            <a:ext cx="10077840" cy="5667480"/>
           </a:xfrm>
           <a:prstGeom prst="rect">
             <a:avLst/>
@@ -3777,7 +4018,7 @@
         <p:spPr>
           <a:xfrm>
             <a:off x="504000" y="226080"/>
-            <a:ext cx="9068040" cy="942840"/>
+            <a:ext cx="9067320" cy="942120"/>
           </a:xfrm>
           <a:prstGeom prst="rect">
             <a:avLst/>
@@ -3803,7 +4044,7 @@
         <p:spPr>
           <a:xfrm>
             <a:off x="504000" y="1326600"/>
-            <a:ext cx="9068040" cy="3284640"/>
+            <a:ext cx="9067320" cy="3283920"/>
           </a:xfrm>
           <a:prstGeom prst="rect">
             <a:avLst/>
@@ -3969,7 +4210,7 @@
         <p:spPr>
           <a:xfrm>
             <a:off x="0" y="0"/>
-            <a:ext cx="10078560" cy="5668200"/>
+            <a:ext cx="10077840" cy="5667480"/>
           </a:xfrm>
           <a:prstGeom prst="rect">
             <a:avLst/>
@@ -3988,7 +4229,7 @@
         <p:spPr>
           <a:xfrm>
             <a:off x="504000" y="226080"/>
-            <a:ext cx="9068040" cy="942840"/>
+            <a:ext cx="9067320" cy="942120"/>
           </a:xfrm>
           <a:prstGeom prst="rect">
             <a:avLst/>
@@ -4014,7 +4255,7 @@
         <p:spPr>
           <a:xfrm>
             <a:off x="504000" y="1326600"/>
-            <a:ext cx="9068040" cy="3284640"/>
+            <a:ext cx="9067320" cy="3283920"/>
           </a:xfrm>
           <a:prstGeom prst="rect">
             <a:avLst/>
@@ -4140,7 +4381,7 @@
         <p:spPr>
           <a:xfrm>
             <a:off x="2932560" y="920520"/>
-            <a:ext cx="4198320" cy="3817440"/>
+            <a:ext cx="4197600" cy="3816720"/>
           </a:xfrm>
           <a:prstGeom prst="rect">
             <a:avLst/>
@@ -4193,7 +4434,7 @@
         <p:spPr>
           <a:xfrm>
             <a:off x="0" y="720"/>
-            <a:ext cx="10078560" cy="5668200"/>
+            <a:ext cx="10077840" cy="5667480"/>
           </a:xfrm>
           <a:prstGeom prst="rect">
             <a:avLst/>
@@ -4212,7 +4453,7 @@
         <p:spPr>
           <a:xfrm>
             <a:off x="504000" y="226080"/>
-            <a:ext cx="9068040" cy="942840"/>
+            <a:ext cx="9067320" cy="942120"/>
           </a:xfrm>
           <a:prstGeom prst="rect">
             <a:avLst/>
@@ -4238,7 +4479,7 @@
         <p:spPr>
           <a:xfrm>
             <a:off x="504000" y="1326600"/>
-            <a:ext cx="9068760" cy="3285360"/>
+            <a:ext cx="9068040" cy="3284640"/>
           </a:xfrm>
           <a:prstGeom prst="rect">
             <a:avLst/>
@@ -4361,7 +4602,7 @@
         <p:spPr>
           <a:xfrm>
             <a:off x="1440" y="0"/>
-            <a:ext cx="10078560" cy="5668200"/>
+            <a:ext cx="10077840" cy="5667480"/>
           </a:xfrm>
           <a:prstGeom prst="rect">
             <a:avLst/>
@@ -4380,7 +4621,7 @@
         <p:spPr>
           <a:xfrm>
             <a:off x="504000" y="226080"/>
-            <a:ext cx="9068040" cy="942840"/>
+            <a:ext cx="9067320" cy="942120"/>
           </a:xfrm>
           <a:prstGeom prst="rect">
             <a:avLst/>
@@ -4406,7 +4647,7 @@
         <p:spPr>
           <a:xfrm>
             <a:off x="504000" y="1326600"/>
-            <a:ext cx="9068760" cy="3285360"/>
+            <a:ext cx="9068040" cy="3284640"/>
           </a:xfrm>
           <a:prstGeom prst="rect">
             <a:avLst/>
@@ -4489,7 +4730,7 @@
         <p:spPr>
           <a:xfrm>
             <a:off x="3657600" y="1143000"/>
-            <a:ext cx="2436120" cy="2056680"/>
+            <a:ext cx="2435400" cy="2055960"/>
           </a:xfrm>
           <a:prstGeom prst="rect">
             <a:avLst/>
@@ -4512,7 +4753,7 @@
         <p:spPr>
           <a:xfrm>
             <a:off x="228600" y="3629160"/>
-            <a:ext cx="9705240" cy="1627920"/>
+            <a:ext cx="9704520" cy="1627200"/>
           </a:xfrm>
           <a:prstGeom prst="rect">
             <a:avLst/>
@@ -4565,7 +4806,7 @@
         <p:spPr>
           <a:xfrm>
             <a:off x="0" y="360"/>
-            <a:ext cx="10078560" cy="5668200"/>
+            <a:ext cx="10077840" cy="5667480"/>
           </a:xfrm>
           <a:prstGeom prst="rect">
             <a:avLst/>
@@ -4584,7 +4825,7 @@
         <p:spPr>
           <a:xfrm>
             <a:off x="504000" y="226080"/>
-            <a:ext cx="9068040" cy="942840"/>
+            <a:ext cx="9067320" cy="942120"/>
           </a:xfrm>
           <a:prstGeom prst="rect">
             <a:avLst/>
@@ -4610,7 +4851,7 @@
         <p:spPr>
           <a:xfrm>
             <a:off x="504000" y="1326600"/>
-            <a:ext cx="9068040" cy="3284640"/>
+            <a:ext cx="9067320" cy="3283920"/>
           </a:xfrm>
           <a:prstGeom prst="rect">
             <a:avLst/>
@@ -4763,7 +5004,7 @@
         <p:spPr>
           <a:xfrm>
             <a:off x="0" y="0"/>
-            <a:ext cx="10078560" cy="5668200"/>
+            <a:ext cx="10077840" cy="5667480"/>
           </a:xfrm>
           <a:prstGeom prst="rect">
             <a:avLst/>
@@ -4782,7 +5023,7 @@
         <p:spPr>
           <a:xfrm>
             <a:off x="504000" y="226080"/>
-            <a:ext cx="9068040" cy="942840"/>
+            <a:ext cx="9067320" cy="942120"/>
           </a:xfrm>
           <a:prstGeom prst="rect">
             <a:avLst/>
@@ -4808,7 +5049,7 @@
         <p:spPr>
           <a:xfrm>
             <a:off x="504000" y="1326600"/>
-            <a:ext cx="9068040" cy="3284640"/>
+            <a:ext cx="9067320" cy="3283920"/>
           </a:xfrm>
           <a:prstGeom prst="rect">
             <a:avLst/>
@@ -4885,7 +5126,7 @@
         <p:spPr>
           <a:xfrm>
             <a:off x="504000" y="4343400"/>
-            <a:ext cx="9325080" cy="318600"/>
+            <a:ext cx="9324360" cy="317880"/>
           </a:xfrm>
           <a:prstGeom prst="rect">
             <a:avLst/>
@@ -4970,7 +5211,7 @@
         <p:spPr>
           <a:xfrm>
             <a:off x="0" y="0"/>
-            <a:ext cx="10078560" cy="5668200"/>
+            <a:ext cx="10077840" cy="5667480"/>
           </a:xfrm>
           <a:prstGeom prst="rect">
             <a:avLst/>
@@ -4989,7 +5230,7 @@
         <p:spPr>
           <a:xfrm>
             <a:off x="504000" y="226080"/>
-            <a:ext cx="9068040" cy="942840"/>
+            <a:ext cx="9067320" cy="942120"/>
           </a:xfrm>
           <a:prstGeom prst="rect">
             <a:avLst/>
@@ -5015,7 +5256,7 @@
         <p:spPr>
           <a:xfrm>
             <a:off x="504000" y="1326600"/>
-            <a:ext cx="9068040" cy="3284640"/>
+            <a:ext cx="9067320" cy="3283920"/>
           </a:xfrm>
           <a:prstGeom prst="rect">
             <a:avLst/>
@@ -5246,7 +5487,7 @@
         <p:spPr>
           <a:xfrm>
             <a:off x="0" y="360"/>
-            <a:ext cx="10078560" cy="5668200"/>
+            <a:ext cx="10077840" cy="5667480"/>
           </a:xfrm>
           <a:prstGeom prst="rect">
             <a:avLst/>
@@ -5265,7 +5506,7 @@
         <p:spPr>
           <a:xfrm>
             <a:off x="504000" y="226080"/>
-            <a:ext cx="9068040" cy="942840"/>
+            <a:ext cx="9067320" cy="942120"/>
           </a:xfrm>
           <a:prstGeom prst="rect">
             <a:avLst/>
@@ -5291,7 +5532,7 @@
         <p:spPr>
           <a:xfrm>
             <a:off x="504000" y="1326600"/>
-            <a:ext cx="9068040" cy="3284640"/>
+            <a:ext cx="9067320" cy="3283920"/>
           </a:xfrm>
           <a:prstGeom prst="rect">
             <a:avLst/>
@@ -5381,7 +5622,7 @@
         <p:spPr>
           <a:xfrm>
             <a:off x="2057400" y="4021920"/>
-            <a:ext cx="5941800" cy="548280"/>
+            <a:ext cx="5941080" cy="547560"/>
           </a:xfrm>
           <a:prstGeom prst="rect">
             <a:avLst/>

</xml_diff>

<commit_message>
Finalize Influxdb, neo4j and mongodb presentation outlines
</commit_message>
<xml_diff>
--- a/presentation/presentation.pptx
+++ b/presentation/presentation.pptx
@@ -1623,7 +1623,13 @@
               <a:rPr b="0" lang="en-US" sz="4400" spc="-1" strike="noStrike">
                 <a:latin typeface="Arial"/>
               </a:rPr>
-              <a:t>Click to edit the title text format</a:t>
+              <a:t>Click to edit the title text </a:t>
+            </a:r>
+            <a:r>
+              <a:rPr b="0" lang="en-US" sz="4400" spc="-1" strike="noStrike">
+                <a:latin typeface="Arial"/>
+              </a:rPr>
+              <a:t>format</a:t>
             </a:r>
             <a:endParaRPr b="0" lang="en-US" sz="4400" spc="-1" strike="noStrike">
               <a:latin typeface="Arial"/>
@@ -1864,7 +1870,7 @@
         <p:spPr>
           <a:xfrm>
             <a:off x="0" y="360"/>
-            <a:ext cx="10077120" cy="5666760"/>
+            <a:ext cx="10076760" cy="5666400"/>
           </a:xfrm>
           <a:prstGeom prst="rect">
             <a:avLst/>
@@ -1883,7 +1889,7 @@
         <p:spPr>
           <a:xfrm>
             <a:off x="504000" y="226080"/>
-            <a:ext cx="9066600" cy="941400"/>
+            <a:ext cx="9066240" cy="941040"/>
           </a:xfrm>
           <a:prstGeom prst="rect">
             <a:avLst/>
@@ -1942,7 +1948,7 @@
         <p:spPr>
           <a:xfrm>
             <a:off x="504000" y="1326600"/>
-            <a:ext cx="9066600" cy="3283200"/>
+            <a:ext cx="9066240" cy="3282840"/>
           </a:xfrm>
           <a:prstGeom prst="rect">
             <a:avLst/>
@@ -2103,7 +2109,7 @@
       </p:grpSpPr>
       <p:pic>
         <p:nvPicPr>
-          <p:cNvPr id="69" name="" descr=""/>
+          <p:cNvPr id="70" name="" descr=""/>
           <p:cNvPicPr/>
           <p:nvPr/>
         </p:nvPicPr>
@@ -2114,7 +2120,7 @@
         <p:spPr>
           <a:xfrm>
             <a:off x="0" y="0"/>
-            <a:ext cx="10077120" cy="5666760"/>
+            <a:ext cx="10076760" cy="5666400"/>
           </a:xfrm>
           <a:prstGeom prst="rect">
             <a:avLst/>
@@ -2126,14 +2132,14 @@
       </p:pic>
       <p:sp>
         <p:nvSpPr>
-          <p:cNvPr id="70" name=""/>
+          <p:cNvPr id="71" name=""/>
           <p:cNvSpPr/>
           <p:nvPr/>
         </p:nvSpPr>
         <p:spPr>
           <a:xfrm>
             <a:off x="504000" y="226080"/>
-            <a:ext cx="9066600" cy="941400"/>
+            <a:ext cx="9066240" cy="941040"/>
           </a:xfrm>
           <a:prstGeom prst="rect">
             <a:avLst/>
@@ -2152,14 +2158,14 @@
       </p:sp>
       <p:sp>
         <p:nvSpPr>
-          <p:cNvPr id="71" name=""/>
+          <p:cNvPr id="72" name=""/>
           <p:cNvSpPr/>
           <p:nvPr/>
         </p:nvSpPr>
         <p:spPr>
           <a:xfrm>
             <a:off x="504000" y="1326600"/>
-            <a:ext cx="9066600" cy="3283200"/>
+            <a:ext cx="9066240" cy="3282840"/>
           </a:xfrm>
           <a:prstGeom prst="rect">
             <a:avLst/>
@@ -2411,7 +2417,7 @@
       </p:grpSpPr>
       <p:pic>
         <p:nvPicPr>
-          <p:cNvPr id="72" name="" descr=""/>
+          <p:cNvPr id="73" name="" descr=""/>
           <p:cNvPicPr/>
           <p:nvPr/>
         </p:nvPicPr>
@@ -2422,7 +2428,7 @@
         <p:spPr>
           <a:xfrm>
             <a:off x="0" y="720"/>
-            <a:ext cx="10077120" cy="5666760"/>
+            <a:ext cx="10076760" cy="5666400"/>
           </a:xfrm>
           <a:prstGeom prst="rect">
             <a:avLst/>
@@ -2434,14 +2440,14 @@
       </p:pic>
       <p:sp>
         <p:nvSpPr>
-          <p:cNvPr id="73" name=""/>
+          <p:cNvPr id="74" name=""/>
           <p:cNvSpPr/>
           <p:nvPr/>
         </p:nvSpPr>
         <p:spPr>
           <a:xfrm>
             <a:off x="504000" y="226080"/>
-            <a:ext cx="9066600" cy="941400"/>
+            <a:ext cx="9066240" cy="941040"/>
           </a:xfrm>
           <a:prstGeom prst="rect">
             <a:avLst/>
@@ -2460,14 +2466,14 @@
       </p:sp>
       <p:sp>
         <p:nvSpPr>
-          <p:cNvPr id="74" name=""/>
+          <p:cNvPr id="75" name=""/>
           <p:cNvSpPr/>
           <p:nvPr/>
         </p:nvSpPr>
         <p:spPr>
           <a:xfrm>
             <a:off x="504000" y="1326600"/>
-            <a:ext cx="9067320" cy="3283920"/>
+            <a:ext cx="9066960" cy="3283560"/>
           </a:xfrm>
           <a:prstGeom prst="rect">
             <a:avLst/>
@@ -2573,14 +2579,14 @@
       </p:grpSpPr>
       <p:sp>
         <p:nvSpPr>
-          <p:cNvPr id="75" name=""/>
+          <p:cNvPr id="76" name=""/>
           <p:cNvSpPr/>
           <p:nvPr/>
         </p:nvSpPr>
         <p:spPr>
           <a:xfrm>
             <a:off x="0" y="720"/>
-            <a:ext cx="10077120" cy="5666760"/>
+            <a:ext cx="10076760" cy="5666400"/>
           </a:xfrm>
           <a:prstGeom prst="rect">
             <a:avLst/>
@@ -2642,14 +2648,14 @@
       </p:sp>
       <p:sp>
         <p:nvSpPr>
-          <p:cNvPr id="76" name=""/>
+          <p:cNvPr id="77" name=""/>
           <p:cNvSpPr/>
           <p:nvPr/>
         </p:nvSpPr>
         <p:spPr>
           <a:xfrm>
             <a:off x="504000" y="1326600"/>
-            <a:ext cx="9067320" cy="3283920"/>
+            <a:ext cx="9066960" cy="3283560"/>
           </a:xfrm>
           <a:prstGeom prst="rect">
             <a:avLst/>
@@ -2899,14 +2905,14 @@
       </p:grpSpPr>
       <p:sp>
         <p:nvSpPr>
-          <p:cNvPr id="77" name=""/>
+          <p:cNvPr id="78" name=""/>
           <p:cNvSpPr/>
           <p:nvPr/>
         </p:nvSpPr>
         <p:spPr>
           <a:xfrm>
             <a:off x="0" y="720"/>
-            <a:ext cx="10077120" cy="5666760"/>
+            <a:ext cx="10076760" cy="5666400"/>
           </a:xfrm>
           <a:prstGeom prst="rect">
             <a:avLst/>
@@ -2968,14 +2974,14 @@
       </p:sp>
       <p:sp>
         <p:nvSpPr>
-          <p:cNvPr id="78" name=""/>
+          <p:cNvPr id="79" name=""/>
           <p:cNvSpPr/>
           <p:nvPr/>
         </p:nvSpPr>
         <p:spPr>
           <a:xfrm>
             <a:off x="504000" y="226080"/>
-            <a:ext cx="9066600" cy="941400"/>
+            <a:ext cx="9066240" cy="941040"/>
           </a:xfrm>
           <a:prstGeom prst="rect">
             <a:avLst/>
@@ -2994,14 +3000,14 @@
       </p:sp>
       <p:sp>
         <p:nvSpPr>
-          <p:cNvPr id="79" name=""/>
+          <p:cNvPr id="80" name=""/>
           <p:cNvSpPr/>
           <p:nvPr/>
         </p:nvSpPr>
         <p:spPr>
           <a:xfrm>
             <a:off x="504000" y="1326600"/>
-            <a:ext cx="9067320" cy="3283920"/>
+            <a:ext cx="9066960" cy="3283560"/>
           </a:xfrm>
           <a:prstGeom prst="rect">
             <a:avLst/>
@@ -3251,14 +3257,14 @@
       </p:grpSpPr>
       <p:sp>
         <p:nvSpPr>
-          <p:cNvPr id="80" name=""/>
+          <p:cNvPr id="81" name=""/>
           <p:cNvSpPr/>
           <p:nvPr/>
         </p:nvSpPr>
         <p:spPr>
           <a:xfrm>
             <a:off x="0" y="720"/>
-            <a:ext cx="10077120" cy="5666760"/>
+            <a:ext cx="10076760" cy="5666400"/>
           </a:xfrm>
           <a:prstGeom prst="rect">
             <a:avLst/>
@@ -3320,14 +3326,14 @@
       </p:sp>
       <p:sp>
         <p:nvSpPr>
-          <p:cNvPr id="81" name=""/>
+          <p:cNvPr id="82" name=""/>
           <p:cNvSpPr/>
           <p:nvPr/>
         </p:nvSpPr>
         <p:spPr>
           <a:xfrm>
             <a:off x="504000" y="226080"/>
-            <a:ext cx="9066600" cy="941400"/>
+            <a:ext cx="9066240" cy="941040"/>
           </a:xfrm>
           <a:prstGeom prst="rect">
             <a:avLst/>
@@ -3346,14 +3352,14 @@
       </p:sp>
       <p:sp>
         <p:nvSpPr>
-          <p:cNvPr id="82" name=""/>
+          <p:cNvPr id="83" name=""/>
           <p:cNvSpPr/>
           <p:nvPr/>
         </p:nvSpPr>
         <p:spPr>
           <a:xfrm>
             <a:off x="504000" y="1326600"/>
-            <a:ext cx="9067320" cy="3283920"/>
+            <a:ext cx="9066960" cy="3283560"/>
           </a:xfrm>
           <a:prstGeom prst="rect">
             <a:avLst/>
@@ -3630,14 +3636,14 @@
       </p:grpSpPr>
       <p:sp>
         <p:nvSpPr>
-          <p:cNvPr id="83" name=""/>
+          <p:cNvPr id="84" name=""/>
           <p:cNvSpPr/>
           <p:nvPr/>
         </p:nvSpPr>
         <p:spPr>
           <a:xfrm>
             <a:off x="0" y="720"/>
-            <a:ext cx="10077120" cy="5666760"/>
+            <a:ext cx="10076760" cy="5666400"/>
           </a:xfrm>
           <a:prstGeom prst="rect">
             <a:avLst/>
@@ -3699,14 +3705,14 @@
       </p:sp>
       <p:sp>
         <p:nvSpPr>
-          <p:cNvPr id="84" name=""/>
+          <p:cNvPr id="85" name=""/>
           <p:cNvSpPr/>
           <p:nvPr/>
         </p:nvSpPr>
         <p:spPr>
           <a:xfrm>
             <a:off x="504000" y="226080"/>
-            <a:ext cx="9066600" cy="941400"/>
+            <a:ext cx="9066240" cy="941040"/>
           </a:xfrm>
           <a:prstGeom prst="rect">
             <a:avLst/>
@@ -3725,14 +3731,14 @@
       </p:sp>
       <p:sp>
         <p:nvSpPr>
-          <p:cNvPr id="85" name=""/>
+          <p:cNvPr id="86" name=""/>
           <p:cNvSpPr/>
           <p:nvPr/>
         </p:nvSpPr>
         <p:spPr>
           <a:xfrm>
             <a:off x="504000" y="1326600"/>
-            <a:ext cx="9067320" cy="3283920"/>
+            <a:ext cx="9066960" cy="3283560"/>
           </a:xfrm>
           <a:prstGeom prst="rect">
             <a:avLst/>
@@ -3857,14 +3863,14 @@
       </p:grpSpPr>
       <p:sp>
         <p:nvSpPr>
-          <p:cNvPr id="86" name=""/>
+          <p:cNvPr id="87" name=""/>
           <p:cNvSpPr/>
           <p:nvPr/>
         </p:nvSpPr>
         <p:spPr>
           <a:xfrm>
             <a:off x="0" y="720"/>
-            <a:ext cx="10077120" cy="5666760"/>
+            <a:ext cx="10076760" cy="5666400"/>
           </a:xfrm>
           <a:prstGeom prst="rect">
             <a:avLst/>
@@ -3926,14 +3932,14 @@
       </p:sp>
       <p:sp>
         <p:nvSpPr>
-          <p:cNvPr id="87" name=""/>
+          <p:cNvPr id="88" name=""/>
           <p:cNvSpPr/>
           <p:nvPr/>
         </p:nvSpPr>
         <p:spPr>
           <a:xfrm>
             <a:off x="504000" y="226080"/>
-            <a:ext cx="9066600" cy="941400"/>
+            <a:ext cx="9066240" cy="941040"/>
           </a:xfrm>
           <a:prstGeom prst="rect">
             <a:avLst/>
@@ -3952,7 +3958,7 @@
       </p:sp>
       <p:pic>
         <p:nvPicPr>
-          <p:cNvPr id="88" name="" descr=""/>
+          <p:cNvPr id="89" name="" descr=""/>
           <p:cNvPicPr/>
           <p:nvPr/>
         </p:nvPicPr>
@@ -3963,7 +3969,7 @@
         <p:spPr>
           <a:xfrm rot="6000">
             <a:off x="914400" y="947520"/>
-            <a:ext cx="8453160" cy="4072680"/>
+            <a:ext cx="8452800" cy="4072320"/>
           </a:xfrm>
           <a:prstGeom prst="rect">
             <a:avLst/>
@@ -4005,7 +4011,7 @@
       </p:grpSpPr>
       <p:pic>
         <p:nvPicPr>
-          <p:cNvPr id="89" name="" descr=""/>
+          <p:cNvPr id="90" name="" descr=""/>
           <p:cNvPicPr/>
           <p:nvPr/>
         </p:nvPicPr>
@@ -4016,7 +4022,7 @@
         <p:spPr>
           <a:xfrm>
             <a:off x="720" y="0"/>
-            <a:ext cx="10080000" cy="5670360"/>
+            <a:ext cx="10079640" cy="5670000"/>
           </a:xfrm>
           <a:prstGeom prst="rect">
             <a:avLst/>
@@ -4028,14 +4034,14 @@
       </p:pic>
       <p:sp>
         <p:nvSpPr>
-          <p:cNvPr id="90" name=""/>
+          <p:cNvPr id="91" name=""/>
           <p:cNvSpPr/>
           <p:nvPr/>
         </p:nvSpPr>
         <p:spPr>
           <a:xfrm>
             <a:off x="504000" y="226080"/>
-            <a:ext cx="9066600" cy="941400"/>
+            <a:ext cx="9066240" cy="941040"/>
           </a:xfrm>
           <a:prstGeom prst="rect">
             <a:avLst/>
@@ -4087,14 +4093,14 @@
       </p:sp>
       <p:sp>
         <p:nvSpPr>
-          <p:cNvPr id="91" name=""/>
+          <p:cNvPr id="92" name=""/>
           <p:cNvSpPr/>
           <p:nvPr/>
         </p:nvSpPr>
         <p:spPr>
           <a:xfrm>
             <a:off x="504000" y="1326600"/>
-            <a:ext cx="9066600" cy="3283200"/>
+            <a:ext cx="9066240" cy="3282840"/>
           </a:xfrm>
           <a:prstGeom prst="rect">
             <a:avLst/>
@@ -4255,7 +4261,7 @@
       </p:grpSpPr>
       <p:pic>
         <p:nvPicPr>
-          <p:cNvPr id="92" name="" descr=""/>
+          <p:cNvPr id="93" name="" descr=""/>
           <p:cNvPicPr/>
           <p:nvPr/>
         </p:nvPicPr>
@@ -4266,7 +4272,7 @@
         <p:spPr>
           <a:xfrm>
             <a:off x="720" y="0"/>
-            <a:ext cx="10080000" cy="5670360"/>
+            <a:ext cx="10079640" cy="5670000"/>
           </a:xfrm>
           <a:prstGeom prst="rect">
             <a:avLst/>
@@ -4278,14 +4284,14 @@
       </p:pic>
       <p:sp>
         <p:nvSpPr>
-          <p:cNvPr id="93" name=""/>
+          <p:cNvPr id="94" name=""/>
           <p:cNvSpPr/>
           <p:nvPr/>
         </p:nvSpPr>
         <p:spPr>
           <a:xfrm>
             <a:off x="504000" y="226080"/>
-            <a:ext cx="9066600" cy="941400"/>
+            <a:ext cx="9066240" cy="941040"/>
           </a:xfrm>
           <a:prstGeom prst="rect">
             <a:avLst/>
@@ -4304,14 +4310,14 @@
       </p:sp>
       <p:sp>
         <p:nvSpPr>
-          <p:cNvPr id="94" name=""/>
+          <p:cNvPr id="95" name=""/>
           <p:cNvSpPr/>
           <p:nvPr/>
         </p:nvSpPr>
         <p:spPr>
           <a:xfrm>
             <a:off x="504000" y="1326600"/>
-            <a:ext cx="9066600" cy="3283200"/>
+            <a:ext cx="9066240" cy="3282840"/>
           </a:xfrm>
           <a:prstGeom prst="rect">
             <a:avLst/>
@@ -4473,14 +4479,14 @@
       </p:grpSpPr>
       <p:sp>
         <p:nvSpPr>
-          <p:cNvPr id="95" name=""/>
+          <p:cNvPr id="96" name=""/>
           <p:cNvSpPr/>
           <p:nvPr/>
         </p:nvSpPr>
         <p:spPr>
           <a:xfrm>
             <a:off x="504000" y="226080"/>
-            <a:ext cx="9066600" cy="941400"/>
+            <a:ext cx="9066240" cy="941040"/>
           </a:xfrm>
           <a:prstGeom prst="rect">
             <a:avLst/>
@@ -4499,14 +4505,14 @@
       </p:sp>
       <p:sp>
         <p:nvSpPr>
-          <p:cNvPr id="96" name=""/>
+          <p:cNvPr id="97" name=""/>
           <p:cNvSpPr/>
           <p:nvPr/>
         </p:nvSpPr>
         <p:spPr>
           <a:xfrm>
             <a:off x="504000" y="1326600"/>
-            <a:ext cx="9066600" cy="3283200"/>
+            <a:ext cx="9066240" cy="3282840"/>
           </a:xfrm>
           <a:prstGeom prst="rect">
             <a:avLst/>
@@ -4628,7 +4634,7 @@
       </p:sp>
       <p:pic>
         <p:nvPicPr>
-          <p:cNvPr id="97" name="" descr=""/>
+          <p:cNvPr id="98" name="" descr=""/>
           <p:cNvPicPr/>
           <p:nvPr/>
         </p:nvPicPr>
@@ -4639,7 +4645,7 @@
         <p:spPr>
           <a:xfrm>
             <a:off x="360" y="0"/>
-            <a:ext cx="10080000" cy="5670360"/>
+            <a:ext cx="10079640" cy="5670000"/>
           </a:xfrm>
           <a:prstGeom prst="rect">
             <a:avLst/>
@@ -4651,7 +4657,7 @@
       </p:pic>
       <p:pic>
         <p:nvPicPr>
-          <p:cNvPr id="98" name="" descr=""/>
+          <p:cNvPr id="99" name="" descr=""/>
           <p:cNvPicPr/>
           <p:nvPr/>
         </p:nvPicPr>
@@ -4662,7 +4668,7 @@
         <p:spPr>
           <a:xfrm>
             <a:off x="2286000" y="2057400"/>
-            <a:ext cx="2390400" cy="2057400"/>
+            <a:ext cx="2390040" cy="2057040"/>
           </a:xfrm>
           <a:prstGeom prst="rect">
             <a:avLst/>
@@ -4674,7 +4680,7 @@
       </p:pic>
       <p:pic>
         <p:nvPicPr>
-          <p:cNvPr id="99" name="" descr=""/>
+          <p:cNvPr id="100" name="" descr=""/>
           <p:cNvPicPr/>
           <p:nvPr/>
         </p:nvPicPr>
@@ -4685,7 +4691,7 @@
         <p:spPr>
           <a:xfrm>
             <a:off x="5382000" y="2057400"/>
-            <a:ext cx="2390400" cy="2057400"/>
+            <a:ext cx="2390040" cy="2057040"/>
           </a:xfrm>
           <a:prstGeom prst="rect">
             <a:avLst/>
@@ -4738,7 +4744,7 @@
         <p:spPr>
           <a:xfrm>
             <a:off x="0" y="360"/>
-            <a:ext cx="10077120" cy="5666760"/>
+            <a:ext cx="10076760" cy="5666400"/>
           </a:xfrm>
           <a:prstGeom prst="rect">
             <a:avLst/>
@@ -4757,7 +4763,7 @@
         <p:spPr>
           <a:xfrm>
             <a:off x="504000" y="226080"/>
-            <a:ext cx="9066600" cy="941400"/>
+            <a:ext cx="9066240" cy="941040"/>
           </a:xfrm>
           <a:prstGeom prst="rect">
             <a:avLst/>
@@ -4783,7 +4789,7 @@
         <p:spPr>
           <a:xfrm>
             <a:off x="504000" y="1326600"/>
-            <a:ext cx="9066600" cy="3283200"/>
+            <a:ext cx="9066240" cy="3282840"/>
           </a:xfrm>
           <a:prstGeom prst="rect">
             <a:avLst/>
@@ -4945,14 +4951,14 @@
       </p:grpSpPr>
       <p:sp>
         <p:nvSpPr>
-          <p:cNvPr id="100" name=""/>
+          <p:cNvPr id="101" name=""/>
           <p:cNvSpPr/>
           <p:nvPr/>
         </p:nvSpPr>
         <p:spPr>
           <a:xfrm>
             <a:off x="504000" y="226080"/>
-            <a:ext cx="9066600" cy="941400"/>
+            <a:ext cx="9066240" cy="941040"/>
           </a:xfrm>
           <a:prstGeom prst="rect">
             <a:avLst/>
@@ -4971,14 +4977,14 @@
       </p:sp>
       <p:sp>
         <p:nvSpPr>
-          <p:cNvPr id="101" name=""/>
+          <p:cNvPr id="102" name=""/>
           <p:cNvSpPr/>
           <p:nvPr/>
         </p:nvSpPr>
         <p:spPr>
           <a:xfrm>
             <a:off x="504000" y="1326600"/>
-            <a:ext cx="9066600" cy="3283200"/>
+            <a:ext cx="9066240" cy="3282840"/>
           </a:xfrm>
           <a:prstGeom prst="rect">
             <a:avLst/>
@@ -5100,7 +5106,7 @@
       </p:sp>
       <p:pic>
         <p:nvPicPr>
-          <p:cNvPr id="102" name="" descr=""/>
+          <p:cNvPr id="103" name="" descr=""/>
           <p:cNvPicPr/>
           <p:nvPr/>
         </p:nvPicPr>
@@ -5111,7 +5117,7 @@
         <p:spPr>
           <a:xfrm>
             <a:off x="360" y="0"/>
-            <a:ext cx="10080000" cy="5670360"/>
+            <a:ext cx="10079640" cy="5670000"/>
           </a:xfrm>
           <a:prstGeom prst="rect">
             <a:avLst/>
@@ -5123,7 +5129,7 @@
       </p:pic>
       <p:pic>
         <p:nvPicPr>
-          <p:cNvPr id="103" name="" descr=""/>
+          <p:cNvPr id="104" name="" descr=""/>
           <p:cNvPicPr/>
           <p:nvPr/>
         </p:nvPicPr>
@@ -5134,7 +5140,7 @@
         <p:spPr>
           <a:xfrm>
             <a:off x="1828800" y="1888920"/>
-            <a:ext cx="6381360" cy="2142720"/>
+            <a:ext cx="6381000" cy="2142360"/>
           </a:xfrm>
           <a:prstGeom prst="rect">
             <a:avLst/>
@@ -5176,14 +5182,14 @@
       </p:grpSpPr>
       <p:sp>
         <p:nvSpPr>
-          <p:cNvPr id="104" name=""/>
+          <p:cNvPr id="105" name=""/>
           <p:cNvSpPr/>
           <p:nvPr/>
         </p:nvSpPr>
         <p:spPr>
           <a:xfrm>
             <a:off x="504000" y="226080"/>
-            <a:ext cx="9066600" cy="941400"/>
+            <a:ext cx="9066240" cy="941040"/>
           </a:xfrm>
           <a:prstGeom prst="rect">
             <a:avLst/>
@@ -5202,7 +5208,7 @@
       </p:sp>
       <p:pic>
         <p:nvPicPr>
-          <p:cNvPr id="105" name="" descr=""/>
+          <p:cNvPr id="106" name="" descr=""/>
           <p:cNvPicPr/>
           <p:nvPr/>
         </p:nvPicPr>
@@ -5213,7 +5219,7 @@
         <p:spPr>
           <a:xfrm>
             <a:off x="720" y="0"/>
-            <a:ext cx="10080000" cy="5670360"/>
+            <a:ext cx="10079640" cy="5670000"/>
           </a:xfrm>
           <a:prstGeom prst="rect">
             <a:avLst/>
@@ -5225,14 +5231,14 @@
       </p:pic>
       <p:sp>
         <p:nvSpPr>
-          <p:cNvPr id="106" name=""/>
+          <p:cNvPr id="107" name=""/>
           <p:cNvSpPr/>
           <p:nvPr/>
         </p:nvSpPr>
         <p:spPr>
           <a:xfrm>
             <a:off x="504000" y="1326600"/>
-            <a:ext cx="9067320" cy="3283920"/>
+            <a:ext cx="9066960" cy="3283560"/>
           </a:xfrm>
           <a:prstGeom prst="rect">
             <a:avLst/>
@@ -5307,7 +5313,7 @@
       </p:sp>
       <p:pic>
         <p:nvPicPr>
-          <p:cNvPr id="107" name="" descr=""/>
+          <p:cNvPr id="108" name="" descr=""/>
           <p:cNvPicPr/>
           <p:nvPr/>
         </p:nvPicPr>
@@ -5318,7 +5324,7 @@
         <p:spPr>
           <a:xfrm>
             <a:off x="5380920" y="1568880"/>
-            <a:ext cx="3305880" cy="3041640"/>
+            <a:ext cx="3305520" cy="3041280"/>
           </a:xfrm>
           <a:prstGeom prst="rect">
             <a:avLst/>
@@ -5330,7 +5336,7 @@
       </p:pic>
       <p:pic>
         <p:nvPicPr>
-          <p:cNvPr id="108" name="" descr=""/>
+          <p:cNvPr id="109" name="" descr=""/>
           <p:cNvPicPr/>
           <p:nvPr/>
         </p:nvPicPr>
@@ -5341,7 +5347,7 @@
         <p:spPr>
           <a:xfrm>
             <a:off x="1371600" y="1600200"/>
-            <a:ext cx="3444840" cy="2993040"/>
+            <a:ext cx="3444480" cy="2992680"/>
           </a:xfrm>
           <a:prstGeom prst="rect">
             <a:avLst/>
@@ -5383,14 +5389,14 @@
       </p:grpSpPr>
       <p:sp>
         <p:nvSpPr>
-          <p:cNvPr id="109" name=""/>
+          <p:cNvPr id="110" name=""/>
           <p:cNvSpPr/>
           <p:nvPr/>
         </p:nvSpPr>
         <p:spPr>
           <a:xfrm>
             <a:off x="504000" y="226080"/>
-            <a:ext cx="9066600" cy="941400"/>
+            <a:ext cx="9066240" cy="941040"/>
           </a:xfrm>
           <a:prstGeom prst="rect">
             <a:avLst/>
@@ -5409,7 +5415,7 @@
       </p:sp>
       <p:pic>
         <p:nvPicPr>
-          <p:cNvPr id="110" name="" descr=""/>
+          <p:cNvPr id="111" name="" descr=""/>
           <p:cNvPicPr/>
           <p:nvPr/>
         </p:nvPicPr>
@@ -5420,7 +5426,7 @@
         <p:spPr>
           <a:xfrm>
             <a:off x="720" y="0"/>
-            <a:ext cx="10080000" cy="5670360"/>
+            <a:ext cx="10079640" cy="5670000"/>
           </a:xfrm>
           <a:prstGeom prst="rect">
             <a:avLst/>
@@ -5432,14 +5438,14 @@
       </p:pic>
       <p:sp>
         <p:nvSpPr>
-          <p:cNvPr id="111" name=""/>
+          <p:cNvPr id="112" name=""/>
           <p:cNvSpPr/>
           <p:nvPr/>
         </p:nvSpPr>
         <p:spPr>
           <a:xfrm>
             <a:off x="504000" y="1326600"/>
-            <a:ext cx="9066600" cy="3283200"/>
+            <a:ext cx="9066240" cy="3282840"/>
           </a:xfrm>
           <a:prstGeom prst="rect">
             <a:avLst/>
@@ -5505,7 +5511,7 @@
                 <a:latin typeface="Arial"/>
                 <a:ea typeface="Microsoft YaHei"/>
               </a:rPr>
-              <a:t>Query Languages</a:t>
+              <a:t>Query Language</a:t>
             </a:r>
             <a:endParaRPr b="0" lang="en-US" sz="3200" spc="-1" strike="noStrike">
               <a:latin typeface="Arial"/>
@@ -5587,7 +5593,7 @@
       </p:grpSpPr>
       <p:pic>
         <p:nvPicPr>
-          <p:cNvPr id="112" name="" descr=""/>
+          <p:cNvPr id="113" name="" descr=""/>
           <p:cNvPicPr/>
           <p:nvPr/>
         </p:nvPicPr>
@@ -5597,8 +5603,8 @@
         </p:blipFill>
         <p:spPr>
           <a:xfrm>
-            <a:off x="720" y="0"/>
-            <a:ext cx="10080000" cy="5670360"/>
+            <a:off x="0" y="0"/>
+            <a:ext cx="10079640" cy="5670000"/>
           </a:xfrm>
           <a:prstGeom prst="rect">
             <a:avLst/>
@@ -5610,14 +5616,14 @@
       </p:pic>
       <p:sp>
         <p:nvSpPr>
-          <p:cNvPr id="113" name=""/>
+          <p:cNvPr id="114" name=""/>
           <p:cNvSpPr/>
           <p:nvPr/>
         </p:nvSpPr>
         <p:spPr>
           <a:xfrm>
             <a:off x="504000" y="226080"/>
-            <a:ext cx="9066600" cy="941400"/>
+            <a:ext cx="9066240" cy="941040"/>
           </a:xfrm>
           <a:prstGeom prst="rect">
             <a:avLst/>
@@ -5636,14 +5642,14 @@
       </p:sp>
       <p:sp>
         <p:nvSpPr>
-          <p:cNvPr id="114" name=""/>
+          <p:cNvPr id="115" name=""/>
           <p:cNvSpPr/>
           <p:nvPr/>
         </p:nvSpPr>
         <p:spPr>
           <a:xfrm>
             <a:off x="504000" y="1326600"/>
-            <a:ext cx="9066600" cy="3283200"/>
+            <a:ext cx="9066240" cy="3282840"/>
           </a:xfrm>
           <a:prstGeom prst="rect">
             <a:avLst/>
@@ -5691,14 +5697,14 @@
       </p:sp>
       <p:sp>
         <p:nvSpPr>
-          <p:cNvPr id="115" name=""/>
+          <p:cNvPr id="116" name=""/>
           <p:cNvSpPr/>
           <p:nvPr/>
         </p:nvSpPr>
         <p:spPr>
           <a:xfrm>
-            <a:off x="1647000" y="4343400"/>
-            <a:ext cx="7268040" cy="317160"/>
+            <a:off x="1647720" y="4343400"/>
+            <a:ext cx="7267680" cy="316800"/>
           </a:xfrm>
           <a:prstGeom prst="rect">
             <a:avLst/>
@@ -5749,6 +5755,55 @@
               <a:t>RETURN movie</a:t>
             </a:r>
             <a:endParaRPr b="0" lang="en-US" sz="1600" spc="-1" strike="noStrike">
+              <a:latin typeface="Arial"/>
+            </a:endParaRPr>
+          </a:p>
+        </p:txBody>
+      </p:sp>
+      <p:sp>
+        <p:nvSpPr>
+          <p:cNvPr id="117" name=""/>
+          <p:cNvSpPr txBox="1"/>
+          <p:nvPr/>
+        </p:nvSpPr>
+        <p:spPr>
+          <a:xfrm>
+            <a:off x="4069800" y="2689920"/>
+            <a:ext cx="1873800" cy="546480"/>
+          </a:xfrm>
+          <a:prstGeom prst="rect">
+            <a:avLst/>
+          </a:prstGeom>
+          <a:noFill/>
+          <a:ln w="0">
+            <a:noFill/>
+          </a:ln>
+        </p:spPr>
+        <p:txBody>
+          <a:bodyPr lIns="90000" rIns="90000" tIns="45000" bIns="45000" anchor="t">
+            <a:noAutofit/>
+          </a:bodyPr>
+          <a:p>
+            <a:pPr algn="ctr">
+              <a:lnSpc>
+                <a:spcPct val="100000"/>
+              </a:lnSpc>
+              <a:buNone/>
+              <a:tabLst>
+                <a:tab algn="l" pos="408240"/>
+              </a:tabLst>
+            </a:pPr>
+            <a:r>
+              <a:rPr b="1" lang="en-US" sz="3200" spc="-1" strike="noStrike">
+                <a:solidFill>
+                  <a:srgbClr val="000000"/>
+                </a:solidFill>
+                <a:latin typeface="Arial"/>
+                <a:ea typeface="Microsoft YaHei"/>
+              </a:rPr>
+              <a:t>Cypher </a:t>
+            </a:r>
+            <a:endParaRPr b="0" lang="en-US" sz="3200" spc="-1" strike="noStrike">
               <a:latin typeface="Arial"/>
             </a:endParaRPr>
           </a:p>
@@ -5786,7 +5841,7 @@
       </p:grpSpPr>
       <p:pic>
         <p:nvPicPr>
-          <p:cNvPr id="116" name="" descr=""/>
+          <p:cNvPr id="118" name="" descr=""/>
           <p:cNvPicPr/>
           <p:nvPr/>
         </p:nvPicPr>
@@ -5797,7 +5852,7 @@
         <p:spPr>
           <a:xfrm>
             <a:off x="720" y="0"/>
-            <a:ext cx="10080000" cy="5670360"/>
+            <a:ext cx="10079640" cy="5670000"/>
           </a:xfrm>
           <a:prstGeom prst="rect">
             <a:avLst/>
@@ -5809,14 +5864,14 @@
       </p:pic>
       <p:sp>
         <p:nvSpPr>
-          <p:cNvPr id="117" name=""/>
+          <p:cNvPr id="119" name=""/>
           <p:cNvSpPr/>
           <p:nvPr/>
         </p:nvSpPr>
         <p:spPr>
           <a:xfrm>
             <a:off x="504000" y="226080"/>
-            <a:ext cx="9066600" cy="941400"/>
+            <a:ext cx="9066240" cy="941040"/>
           </a:xfrm>
           <a:prstGeom prst="rect">
             <a:avLst/>
@@ -5835,14 +5890,14 @@
       </p:sp>
       <p:sp>
         <p:nvSpPr>
-          <p:cNvPr id="118" name=""/>
+          <p:cNvPr id="120" name=""/>
           <p:cNvSpPr/>
           <p:nvPr/>
         </p:nvSpPr>
         <p:spPr>
           <a:xfrm>
             <a:off x="504000" y="1326600"/>
-            <a:ext cx="9067320" cy="3283920"/>
+            <a:ext cx="9066960" cy="3283560"/>
           </a:xfrm>
           <a:prstGeom prst="rect">
             <a:avLst/>
@@ -5900,6 +5955,36 @@
                 <a:tab algn="l" pos="408240"/>
               </a:tabLst>
             </a:pPr>
+            <a:endParaRPr b="0" lang="en-US" sz="3200" spc="-1" strike="noStrike">
+              <a:latin typeface="Arial"/>
+            </a:endParaRPr>
+          </a:p>
+        </p:txBody>
+      </p:sp>
+      <p:sp>
+        <p:nvSpPr>
+          <p:cNvPr id="121" name=""/>
+          <p:cNvSpPr txBox="1"/>
+          <p:nvPr/>
+        </p:nvSpPr>
+        <p:spPr>
+          <a:xfrm>
+            <a:off x="4069800" y="2286000"/>
+            <a:ext cx="1873800" cy="546480"/>
+          </a:xfrm>
+          <a:prstGeom prst="rect">
+            <a:avLst/>
+          </a:prstGeom>
+          <a:noFill/>
+          <a:ln w="0">
+            <a:noFill/>
+          </a:ln>
+        </p:spPr>
+        <p:txBody>
+          <a:bodyPr lIns="90000" rIns="90000" tIns="45000" bIns="45000" anchor="t">
+            <a:noAutofit/>
+          </a:bodyPr>
+          <a:p>
             <a:r>
               <a:rPr b="1" lang="en-US" sz="3200" spc="-1" strike="noStrike">
                 <a:solidFill>
@@ -5948,7 +6033,7 @@
       </p:grpSpPr>
       <p:pic>
         <p:nvPicPr>
-          <p:cNvPr id="119" name="" descr=""/>
+          <p:cNvPr id="122" name="" descr=""/>
           <p:cNvPicPr/>
           <p:nvPr/>
         </p:nvPicPr>
@@ -5959,7 +6044,7 @@
         <p:spPr>
           <a:xfrm>
             <a:off x="720" y="0"/>
-            <a:ext cx="10080000" cy="5670360"/>
+            <a:ext cx="10079640" cy="5670000"/>
           </a:xfrm>
           <a:prstGeom prst="rect">
             <a:avLst/>
@@ -5971,14 +6056,14 @@
       </p:pic>
       <p:sp>
         <p:nvSpPr>
-          <p:cNvPr id="120" name=""/>
+          <p:cNvPr id="123" name=""/>
           <p:cNvSpPr/>
           <p:nvPr/>
         </p:nvSpPr>
         <p:spPr>
           <a:xfrm>
             <a:off x="504000" y="1326600"/>
-            <a:ext cx="9067320" cy="3283920"/>
+            <a:ext cx="9066960" cy="3283560"/>
           </a:xfrm>
           <a:prstGeom prst="rect">
             <a:avLst/>
@@ -6036,7 +6121,7 @@
                 <a:latin typeface="Arial"/>
                 <a:ea typeface="DejaVu Sans"/>
               </a:rPr>
-              <a:t>Todo</a:t>
+              <a:t>Visualize</a:t>
             </a:r>
             <a:endParaRPr b="0" lang="en-US" sz="3200" spc="-1" strike="noStrike">
               <a:latin typeface="Arial"/>
@@ -6063,53 +6148,9 @@
                 <a:latin typeface="Arial"/>
                 <a:ea typeface="DejaVu Sans"/>
               </a:rPr>
-              <a:t>Todo</a:t>
+              <a:t>Visualize nodes and relations</a:t>
             </a:r>
             <a:endParaRPr b="0" lang="en-US" sz="2000" spc="-1" strike="noStrike">
-              <a:latin typeface="Arial"/>
-            </a:endParaRPr>
-          </a:p>
-          <a:p>
-            <a:pPr algn="ctr">
-              <a:lnSpc>
-                <a:spcPct val="100000"/>
-              </a:lnSpc>
-              <a:spcBef>
-                <a:spcPts val="850"/>
-              </a:spcBef>
-              <a:buNone/>
-              <a:tabLst>
-                <a:tab algn="l" pos="408240"/>
-              </a:tabLst>
-            </a:pPr>
-            <a:endParaRPr b="0" lang="en-US" sz="2000" spc="-1" strike="noStrike">
-              <a:latin typeface="Arial"/>
-            </a:endParaRPr>
-          </a:p>
-          <a:p>
-            <a:pPr algn="ctr">
-              <a:lnSpc>
-                <a:spcPct val="100000"/>
-              </a:lnSpc>
-              <a:spcBef>
-                <a:spcPts val="850"/>
-              </a:spcBef>
-              <a:buNone/>
-              <a:tabLst>
-                <a:tab algn="l" pos="408240"/>
-              </a:tabLst>
-            </a:pPr>
-            <a:r>
-              <a:rPr b="0" lang="en-US" sz="1800" spc="-1" strike="noStrike">
-                <a:solidFill>
-                  <a:srgbClr val="000000"/>
-                </a:solidFill>
-                <a:latin typeface="Arial"/>
-                <a:ea typeface="DejaVu Sans"/>
-              </a:rPr>
-              <a:t>- TODO</a:t>
-            </a:r>
-            <a:endParaRPr b="0" lang="en-US" sz="1800" spc="-1" strike="noStrike">
               <a:latin typeface="Arial"/>
             </a:endParaRPr>
           </a:p>
@@ -6147,7 +6188,7 @@
       </p:grpSpPr>
       <p:pic>
         <p:nvPicPr>
-          <p:cNvPr id="121" name="" descr=""/>
+          <p:cNvPr id="124" name="" descr=""/>
           <p:cNvPicPr/>
           <p:nvPr/>
         </p:nvPicPr>
@@ -6158,7 +6199,7 @@
         <p:spPr>
           <a:xfrm>
             <a:off x="720" y="0"/>
-            <a:ext cx="10080000" cy="5670360"/>
+            <a:ext cx="10079640" cy="5670000"/>
           </a:xfrm>
           <a:prstGeom prst="rect">
             <a:avLst/>
@@ -6170,14 +6211,14 @@
       </p:pic>
       <p:sp>
         <p:nvSpPr>
-          <p:cNvPr id="122" name=""/>
+          <p:cNvPr id="125" name=""/>
           <p:cNvSpPr/>
           <p:nvPr/>
         </p:nvSpPr>
         <p:spPr>
           <a:xfrm>
             <a:off x="504000" y="226080"/>
-            <a:ext cx="9066600" cy="941400"/>
+            <a:ext cx="9066240" cy="941040"/>
           </a:xfrm>
           <a:prstGeom prst="rect">
             <a:avLst/>
@@ -6196,7 +6237,7 @@
       </p:sp>
       <p:pic>
         <p:nvPicPr>
-          <p:cNvPr id="123" name="" descr=""/>
+          <p:cNvPr id="126" name="" descr=""/>
           <p:cNvPicPr/>
           <p:nvPr/>
         </p:nvPicPr>
@@ -6206,8 +6247,8 @@
         </p:blipFill>
         <p:spPr>
           <a:xfrm>
-            <a:off x="2514960" y="685800"/>
-            <a:ext cx="6857640" cy="4518000"/>
+            <a:off x="3220560" y="454320"/>
+            <a:ext cx="5694840" cy="5032080"/>
           </a:xfrm>
           <a:prstGeom prst="rect">
             <a:avLst/>
@@ -6249,7 +6290,7 @@
       </p:grpSpPr>
       <p:pic>
         <p:nvPicPr>
-          <p:cNvPr id="124" name="" descr=""/>
+          <p:cNvPr id="127" name="" descr=""/>
           <p:cNvPicPr/>
           <p:nvPr/>
         </p:nvPicPr>
@@ -6260,7 +6301,7 @@
         <p:spPr>
           <a:xfrm>
             <a:off x="0" y="0"/>
-            <a:ext cx="10080720" cy="5670360"/>
+            <a:ext cx="10080360" cy="5670000"/>
           </a:xfrm>
           <a:prstGeom prst="rect">
             <a:avLst/>
@@ -6272,14 +6313,14 @@
       </p:pic>
       <p:sp>
         <p:nvSpPr>
-          <p:cNvPr id="125" name=""/>
+          <p:cNvPr id="128" name=""/>
           <p:cNvSpPr/>
           <p:nvPr/>
         </p:nvSpPr>
         <p:spPr>
           <a:xfrm>
             <a:off x="504000" y="226080"/>
-            <a:ext cx="9066600" cy="941400"/>
+            <a:ext cx="9066240" cy="941040"/>
           </a:xfrm>
           <a:prstGeom prst="rect">
             <a:avLst/>
@@ -6331,14 +6372,14 @@
       </p:sp>
       <p:sp>
         <p:nvSpPr>
-          <p:cNvPr id="126" name=""/>
+          <p:cNvPr id="129" name=""/>
           <p:cNvSpPr/>
           <p:nvPr/>
         </p:nvSpPr>
         <p:spPr>
           <a:xfrm>
             <a:off x="504000" y="1326600"/>
-            <a:ext cx="9066600" cy="3283200"/>
+            <a:ext cx="9066240" cy="3282840"/>
           </a:xfrm>
           <a:prstGeom prst="rect">
             <a:avLst/>
@@ -6499,7 +6540,7 @@
       </p:grpSpPr>
       <p:pic>
         <p:nvPicPr>
-          <p:cNvPr id="127" name="" descr=""/>
+          <p:cNvPr id="130" name="" descr=""/>
           <p:cNvPicPr/>
           <p:nvPr/>
         </p:nvPicPr>
@@ -6510,7 +6551,7 @@
         <p:spPr>
           <a:xfrm>
             <a:off x="0" y="720"/>
-            <a:ext cx="10080720" cy="5670360"/>
+            <a:ext cx="10080360" cy="5670000"/>
           </a:xfrm>
           <a:prstGeom prst="rect">
             <a:avLst/>
@@ -6522,14 +6563,14 @@
       </p:pic>
       <p:sp>
         <p:nvSpPr>
-          <p:cNvPr id="128" name=""/>
+          <p:cNvPr id="131" name=""/>
           <p:cNvSpPr/>
           <p:nvPr/>
         </p:nvSpPr>
         <p:spPr>
           <a:xfrm>
             <a:off x="504000" y="226080"/>
-            <a:ext cx="9066600" cy="941400"/>
+            <a:ext cx="9066240" cy="941040"/>
           </a:xfrm>
           <a:prstGeom prst="rect">
             <a:avLst/>
@@ -6548,14 +6589,14 @@
       </p:sp>
       <p:sp>
         <p:nvSpPr>
-          <p:cNvPr id="129" name=""/>
+          <p:cNvPr id="132" name=""/>
           <p:cNvSpPr/>
           <p:nvPr/>
         </p:nvSpPr>
         <p:spPr>
           <a:xfrm>
             <a:off x="504000" y="1326600"/>
-            <a:ext cx="9066600" cy="3283200"/>
+            <a:ext cx="9066240" cy="3282840"/>
           </a:xfrm>
           <a:prstGeom prst="rect">
             <a:avLst/>
@@ -6717,7 +6758,7 @@
       </p:grpSpPr>
       <p:pic>
         <p:nvPicPr>
-          <p:cNvPr id="130" name="" descr=""/>
+          <p:cNvPr id="133" name="" descr=""/>
           <p:cNvPicPr/>
           <p:nvPr/>
         </p:nvPicPr>
@@ -6728,7 +6769,7 @@
         <p:spPr>
           <a:xfrm>
             <a:off x="0" y="360"/>
-            <a:ext cx="10080720" cy="5670360"/>
+            <a:ext cx="10080360" cy="5670000"/>
           </a:xfrm>
           <a:prstGeom prst="rect">
             <a:avLst/>
@@ -6740,14 +6781,14 @@
       </p:pic>
       <p:sp>
         <p:nvSpPr>
-          <p:cNvPr id="131" name=""/>
+          <p:cNvPr id="134" name=""/>
           <p:cNvSpPr/>
           <p:nvPr/>
         </p:nvSpPr>
         <p:spPr>
           <a:xfrm>
             <a:off x="504000" y="226080"/>
-            <a:ext cx="9066600" cy="941400"/>
+            <a:ext cx="9066240" cy="941040"/>
           </a:xfrm>
           <a:prstGeom prst="rect">
             <a:avLst/>
@@ -6766,14 +6807,14 @@
       </p:sp>
       <p:sp>
         <p:nvSpPr>
-          <p:cNvPr id="132" name=""/>
+          <p:cNvPr id="135" name=""/>
           <p:cNvSpPr/>
           <p:nvPr/>
         </p:nvSpPr>
         <p:spPr>
           <a:xfrm>
             <a:off x="504000" y="1326600"/>
-            <a:ext cx="9066600" cy="3283200"/>
+            <a:ext cx="9066240" cy="3282840"/>
           </a:xfrm>
           <a:prstGeom prst="rect">
             <a:avLst/>
@@ -6895,7 +6936,7 @@
       </p:sp>
       <p:pic>
         <p:nvPicPr>
-          <p:cNvPr id="133" name="" descr=""/>
+          <p:cNvPr id="136" name="" descr=""/>
           <p:cNvPicPr/>
           <p:nvPr/>
         </p:nvPicPr>
@@ -6906,7 +6947,7 @@
         <p:spPr>
           <a:xfrm>
             <a:off x="1143000" y="2143440"/>
-            <a:ext cx="3657600" cy="1971360"/>
+            <a:ext cx="3657240" cy="1971000"/>
           </a:xfrm>
           <a:prstGeom prst="rect">
             <a:avLst/>
@@ -6918,7 +6959,7 @@
       </p:pic>
       <p:pic>
         <p:nvPicPr>
-          <p:cNvPr id="134" name="" descr=""/>
+          <p:cNvPr id="137" name="" descr=""/>
           <p:cNvPicPr/>
           <p:nvPr/>
         </p:nvPicPr>
@@ -6929,7 +6970,7 @@
         <p:spPr>
           <a:xfrm>
             <a:off x="5257800" y="2143440"/>
-            <a:ext cx="3657600" cy="1971360"/>
+            <a:ext cx="3657240" cy="1971000"/>
           </a:xfrm>
           <a:prstGeom prst="rect">
             <a:avLst/>
@@ -6982,7 +7023,7 @@
         <p:spPr>
           <a:xfrm>
             <a:off x="0" y="0"/>
-            <a:ext cx="10077120" cy="5666760"/>
+            <a:ext cx="10076760" cy="5666400"/>
           </a:xfrm>
           <a:prstGeom prst="rect">
             <a:avLst/>
@@ -7001,7 +7042,7 @@
         <p:spPr>
           <a:xfrm>
             <a:off x="504000" y="226080"/>
-            <a:ext cx="9066600" cy="941400"/>
+            <a:ext cx="9066240" cy="941040"/>
           </a:xfrm>
           <a:prstGeom prst="rect">
             <a:avLst/>
@@ -7027,7 +7068,7 @@
         <p:spPr>
           <a:xfrm>
             <a:off x="504000" y="1326600"/>
-            <a:ext cx="9066600" cy="3283200"/>
+            <a:ext cx="9066240" cy="3282840"/>
           </a:xfrm>
           <a:prstGeom prst="rect">
             <a:avLst/>
@@ -7160,7 +7201,7 @@
         <p:spPr>
           <a:xfrm>
             <a:off x="3109680" y="1409400"/>
-            <a:ext cx="3519720" cy="3200400"/>
+            <a:ext cx="3519360" cy="3200040"/>
           </a:xfrm>
           <a:prstGeom prst="rect">
             <a:avLst/>
@@ -7202,7 +7243,7 @@
       </p:grpSpPr>
       <p:pic>
         <p:nvPicPr>
-          <p:cNvPr id="135" name="" descr=""/>
+          <p:cNvPr id="138" name="" descr=""/>
           <p:cNvPicPr/>
           <p:nvPr/>
         </p:nvPicPr>
@@ -7213,7 +7254,7 @@
         <p:spPr>
           <a:xfrm>
             <a:off x="0" y="360"/>
-            <a:ext cx="10080720" cy="5670360"/>
+            <a:ext cx="10080360" cy="5670000"/>
           </a:xfrm>
           <a:prstGeom prst="rect">
             <a:avLst/>
@@ -7225,14 +7266,14 @@
       </p:pic>
       <p:sp>
         <p:nvSpPr>
-          <p:cNvPr id="136" name=""/>
+          <p:cNvPr id="139" name=""/>
           <p:cNvSpPr/>
           <p:nvPr/>
         </p:nvSpPr>
         <p:spPr>
           <a:xfrm>
             <a:off x="504000" y="226080"/>
-            <a:ext cx="9066600" cy="941400"/>
+            <a:ext cx="9066240" cy="941040"/>
           </a:xfrm>
           <a:prstGeom prst="rect">
             <a:avLst/>
@@ -7251,14 +7292,14 @@
       </p:sp>
       <p:sp>
         <p:nvSpPr>
-          <p:cNvPr id="137" name=""/>
+          <p:cNvPr id="140" name=""/>
           <p:cNvSpPr/>
           <p:nvPr/>
         </p:nvSpPr>
         <p:spPr>
           <a:xfrm>
             <a:off x="504000" y="1326600"/>
-            <a:ext cx="9066600" cy="3283200"/>
+            <a:ext cx="9066240" cy="3282840"/>
           </a:xfrm>
           <a:prstGeom prst="rect">
             <a:avLst/>
@@ -7380,7 +7421,7 @@
       </p:sp>
       <p:pic>
         <p:nvPicPr>
-          <p:cNvPr id="138" name="" descr=""/>
+          <p:cNvPr id="141" name="" descr=""/>
           <p:cNvPicPr/>
           <p:nvPr/>
         </p:nvPicPr>
@@ -7391,7 +7432,7 @@
         <p:spPr>
           <a:xfrm rot="21595800">
             <a:off x="2745000" y="1807200"/>
-            <a:ext cx="4655880" cy="2990520"/>
+            <a:ext cx="4655520" cy="2990160"/>
           </a:xfrm>
           <a:prstGeom prst="rect">
             <a:avLst/>
@@ -7433,7 +7474,7 @@
       </p:grpSpPr>
       <p:pic>
         <p:nvPicPr>
-          <p:cNvPr id="139" name="" descr=""/>
+          <p:cNvPr id="142" name="" descr=""/>
           <p:cNvPicPr/>
           <p:nvPr/>
         </p:nvPicPr>
@@ -7444,7 +7485,7 @@
         <p:spPr>
           <a:xfrm>
             <a:off x="0" y="360"/>
-            <a:ext cx="10080720" cy="5670360"/>
+            <a:ext cx="10080360" cy="5670000"/>
           </a:xfrm>
           <a:prstGeom prst="rect">
             <a:avLst/>
@@ -7456,14 +7497,14 @@
       </p:pic>
       <p:sp>
         <p:nvSpPr>
-          <p:cNvPr id="140" name=""/>
+          <p:cNvPr id="143" name=""/>
           <p:cNvSpPr/>
           <p:nvPr/>
         </p:nvSpPr>
         <p:spPr>
           <a:xfrm>
             <a:off x="504000" y="226080"/>
-            <a:ext cx="9066600" cy="941400"/>
+            <a:ext cx="9066240" cy="941040"/>
           </a:xfrm>
           <a:prstGeom prst="rect">
             <a:avLst/>
@@ -7482,14 +7523,14 @@
       </p:sp>
       <p:sp>
         <p:nvSpPr>
-          <p:cNvPr id="141" name=""/>
+          <p:cNvPr id="144" name=""/>
           <p:cNvSpPr/>
           <p:nvPr/>
         </p:nvSpPr>
         <p:spPr>
           <a:xfrm>
             <a:off x="504000" y="1326600"/>
-            <a:ext cx="9067320" cy="3283920"/>
+            <a:ext cx="9066960" cy="3283560"/>
           </a:xfrm>
           <a:prstGeom prst="rect">
             <a:avLst/>
@@ -7564,7 +7605,7 @@
       </p:sp>
       <p:pic>
         <p:nvPicPr>
-          <p:cNvPr id="142" name="" descr=""/>
+          <p:cNvPr id="145" name="" descr=""/>
           <p:cNvPicPr/>
           <p:nvPr/>
         </p:nvPicPr>
@@ -7575,7 +7616,7 @@
         <p:spPr>
           <a:xfrm>
             <a:off x="3061080" y="1600200"/>
-            <a:ext cx="3796920" cy="3200400"/>
+            <a:ext cx="3796560" cy="3200040"/>
           </a:xfrm>
           <a:prstGeom prst="rect">
             <a:avLst/>
@@ -7617,7 +7658,7 @@
       </p:grpSpPr>
       <p:pic>
         <p:nvPicPr>
-          <p:cNvPr id="143" name="" descr=""/>
+          <p:cNvPr id="146" name="" descr=""/>
           <p:cNvPicPr/>
           <p:nvPr/>
         </p:nvPicPr>
@@ -7628,7 +7669,7 @@
         <p:spPr>
           <a:xfrm>
             <a:off x="0" y="360"/>
-            <a:ext cx="10080720" cy="5670360"/>
+            <a:ext cx="10080360" cy="5670000"/>
           </a:xfrm>
           <a:prstGeom prst="rect">
             <a:avLst/>
@@ -7640,14 +7681,14 @@
       </p:pic>
       <p:sp>
         <p:nvSpPr>
-          <p:cNvPr id="144" name=""/>
+          <p:cNvPr id="147" name=""/>
           <p:cNvSpPr/>
           <p:nvPr/>
         </p:nvSpPr>
         <p:spPr>
           <a:xfrm>
             <a:off x="504000" y="226080"/>
-            <a:ext cx="9066600" cy="941400"/>
+            <a:ext cx="9066240" cy="941040"/>
           </a:xfrm>
           <a:prstGeom prst="rect">
             <a:avLst/>
@@ -7666,14 +7707,14 @@
       </p:sp>
       <p:sp>
         <p:nvSpPr>
-          <p:cNvPr id="145" name=""/>
+          <p:cNvPr id="148" name=""/>
           <p:cNvSpPr/>
           <p:nvPr/>
         </p:nvSpPr>
         <p:spPr>
           <a:xfrm>
             <a:off x="504000" y="1326600"/>
-            <a:ext cx="9066600" cy="3283200"/>
+            <a:ext cx="9066240" cy="3282840"/>
           </a:xfrm>
           <a:prstGeom prst="rect">
             <a:avLst/>
@@ -7739,7 +7780,7 @@
                 <a:latin typeface="Arial"/>
                 <a:ea typeface="Microsoft YaHei"/>
               </a:rPr>
-              <a:t>Query Languages</a:t>
+              <a:t>Query Language</a:t>
             </a:r>
             <a:endParaRPr b="0" lang="en-US" sz="3200" spc="-1" strike="noStrike">
               <a:latin typeface="Arial"/>
@@ -7821,7 +7862,7 @@
       </p:grpSpPr>
       <p:pic>
         <p:nvPicPr>
-          <p:cNvPr id="146" name="" descr=""/>
+          <p:cNvPr id="149" name="" descr=""/>
           <p:cNvPicPr/>
           <p:nvPr/>
         </p:nvPicPr>
@@ -7831,8 +7872,8 @@
         </p:blipFill>
         <p:spPr>
           <a:xfrm>
-            <a:off x="0" y="360"/>
-            <a:ext cx="10080720" cy="5670360"/>
+            <a:off x="0" y="0"/>
+            <a:ext cx="10080360" cy="5670000"/>
           </a:xfrm>
           <a:prstGeom prst="rect">
             <a:avLst/>
@@ -7844,14 +7885,14 @@
       </p:pic>
       <p:sp>
         <p:nvSpPr>
-          <p:cNvPr id="147" name=""/>
+          <p:cNvPr id="150" name=""/>
           <p:cNvSpPr/>
           <p:nvPr/>
         </p:nvSpPr>
         <p:spPr>
           <a:xfrm>
             <a:off x="504000" y="226080"/>
-            <a:ext cx="9066600" cy="941400"/>
+            <a:ext cx="9066240" cy="941040"/>
           </a:xfrm>
           <a:prstGeom prst="rect">
             <a:avLst/>
@@ -7870,14 +7911,14 @@
       </p:sp>
       <p:sp>
         <p:nvSpPr>
-          <p:cNvPr id="148" name=""/>
+          <p:cNvPr id="151" name=""/>
           <p:cNvSpPr/>
           <p:nvPr/>
         </p:nvSpPr>
         <p:spPr>
           <a:xfrm>
             <a:off x="504000" y="1326600"/>
-            <a:ext cx="9066600" cy="3283200"/>
+            <a:ext cx="9066240" cy="3282840"/>
           </a:xfrm>
           <a:prstGeom prst="rect">
             <a:avLst/>
@@ -7915,7 +7956,7 @@
                 <a:latin typeface="Arial"/>
                 <a:ea typeface="Microsoft YaHei"/>
               </a:rPr>
-              <a:t>TODO</a:t>
+              <a:t>JSON</a:t>
             </a:r>
             <a:endParaRPr b="0" lang="en-US" sz="3200" spc="-1" strike="noStrike">
               <a:latin typeface="Arial"/>
@@ -7925,14 +7966,14 @@
       </p:sp>
       <p:sp>
         <p:nvSpPr>
-          <p:cNvPr id="149" name=""/>
+          <p:cNvPr id="152" name=""/>
           <p:cNvSpPr/>
           <p:nvPr/>
         </p:nvSpPr>
         <p:spPr>
           <a:xfrm>
             <a:off x="1647000" y="4343400"/>
-            <a:ext cx="7268040" cy="317160"/>
+            <a:ext cx="7267680" cy="316800"/>
           </a:xfrm>
           <a:prstGeom prst="rect">
             <a:avLst/>
@@ -7958,12 +7999,335 @@
                 <a:spcPct val="100000"/>
               </a:lnSpc>
               <a:buNone/>
+              <a:tabLst>
+                <a:tab algn="l" pos="408240"/>
+              </a:tabLst>
             </a:pPr>
             <a:r>
               <a:rPr b="0" lang="en-US" sz="1600" spc="-1" strike="noStrike">
-                <a:latin typeface="Arial"/>
+                <a:solidFill>
+                  <a:srgbClr val="6a8759"/>
+                </a:solidFill>
+                <a:latin typeface="JetBrains Mono"/>
+                <a:ea typeface="JetBrains Mono"/>
               </a:rPr>
-              <a:t>TODO</a:t>
+              <a:t>{ </a:t>
+            </a:r>
+            <a:endParaRPr b="0" lang="en-US" sz="1600" spc="-1" strike="noStrike">
+              <a:latin typeface="Arial"/>
+            </a:endParaRPr>
+          </a:p>
+          <a:p>
+            <a:pPr>
+              <a:lnSpc>
+                <a:spcPct val="100000"/>
+              </a:lnSpc>
+              <a:buNone/>
+              <a:tabLst>
+                <a:tab algn="l" pos="408240"/>
+              </a:tabLst>
+            </a:pPr>
+            <a:r>
+              <a:rPr b="0" lang="en-US" sz="1600" spc="-1" strike="noStrike">
+                <a:solidFill>
+                  <a:srgbClr val="6a8759"/>
+                </a:solidFill>
+                <a:latin typeface="JetBrains Mono"/>
+                <a:ea typeface="JetBrains Mono"/>
+              </a:rPr>
+              <a:t>     </a:t>
+            </a:r>
+            <a:r>
+              <a:rPr b="0" lang="en-US" sz="1600" spc="-1" strike="noStrike">
+                <a:solidFill>
+                  <a:srgbClr val="6a8759"/>
+                </a:solidFill>
+                <a:latin typeface="JetBrains Mono"/>
+                <a:ea typeface="JetBrains Mono"/>
+              </a:rPr>
+              <a:t>$or: [ </a:t>
+            </a:r>
+            <a:endParaRPr b="0" lang="en-US" sz="1600" spc="-1" strike="noStrike">
+              <a:latin typeface="Arial"/>
+            </a:endParaRPr>
+          </a:p>
+          <a:p>
+            <a:pPr>
+              <a:lnSpc>
+                <a:spcPct val="100000"/>
+              </a:lnSpc>
+              <a:buNone/>
+              <a:tabLst>
+                <a:tab algn="l" pos="408240"/>
+              </a:tabLst>
+            </a:pPr>
+            <a:r>
+              <a:rPr b="0" lang="en-US" sz="1600" spc="-1" strike="noStrike">
+                <a:solidFill>
+                  <a:srgbClr val="6a8759"/>
+                </a:solidFill>
+                <a:latin typeface="JetBrains Mono"/>
+                <a:ea typeface="JetBrains Mono"/>
+              </a:rPr>
+              <a:t>         </a:t>
+            </a:r>
+            <a:r>
+              <a:rPr b="0" lang="en-US" sz="1600" spc="-1" strike="noStrike">
+                <a:solidFill>
+                  <a:srgbClr val="6a8759"/>
+                </a:solidFill>
+                <a:latin typeface="JetBrains Mono"/>
+                <a:ea typeface="JetBrains Mono"/>
+              </a:rPr>
+              <a:t>{ status: "A" }, </a:t>
+            </a:r>
+            <a:endParaRPr b="0" lang="en-US" sz="1600" spc="-1" strike="noStrike">
+              <a:latin typeface="Arial"/>
+            </a:endParaRPr>
+          </a:p>
+          <a:p>
+            <a:pPr>
+              <a:lnSpc>
+                <a:spcPct val="100000"/>
+              </a:lnSpc>
+              <a:buNone/>
+              <a:tabLst>
+                <a:tab algn="l" pos="408240"/>
+              </a:tabLst>
+            </a:pPr>
+            <a:r>
+              <a:rPr b="0" lang="en-US" sz="1600" spc="-1" strike="noStrike">
+                <a:solidFill>
+                  <a:srgbClr val="6a8759"/>
+                </a:solidFill>
+                <a:latin typeface="JetBrains Mono"/>
+                <a:ea typeface="JetBrains Mono"/>
+              </a:rPr>
+              <a:t>         </a:t>
+            </a:r>
+            <a:r>
+              <a:rPr b="0" lang="en-US" sz="1600" spc="-1" strike="noStrike">
+                <a:solidFill>
+                  <a:srgbClr val="6a8759"/>
+                </a:solidFill>
+                <a:latin typeface="JetBrains Mono"/>
+                <a:ea typeface="JetBrains Mono"/>
+              </a:rPr>
+              <a:t>{ qty: { $lt: 30 } } </a:t>
+            </a:r>
+            <a:endParaRPr b="0" lang="en-US" sz="1600" spc="-1" strike="noStrike">
+              <a:latin typeface="Arial"/>
+            </a:endParaRPr>
+          </a:p>
+          <a:p>
+            <a:pPr>
+              <a:lnSpc>
+                <a:spcPct val="100000"/>
+              </a:lnSpc>
+              <a:buNone/>
+              <a:tabLst>
+                <a:tab algn="l" pos="408240"/>
+              </a:tabLst>
+            </a:pPr>
+            <a:r>
+              <a:rPr b="0" lang="en-US" sz="1600" spc="-1" strike="noStrike">
+                <a:solidFill>
+                  <a:srgbClr val="6a8759"/>
+                </a:solidFill>
+                <a:latin typeface="JetBrains Mono"/>
+                <a:ea typeface="JetBrains Mono"/>
+              </a:rPr>
+              <a:t>     </a:t>
+            </a:r>
+            <a:r>
+              <a:rPr b="0" lang="en-US" sz="1600" spc="-1" strike="noStrike">
+                <a:solidFill>
+                  <a:srgbClr val="6a8759"/>
+                </a:solidFill>
+                <a:latin typeface="JetBrains Mono"/>
+                <a:ea typeface="JetBrains Mono"/>
+              </a:rPr>
+              <a:t>] </a:t>
+            </a:r>
+            <a:br>
+              <a:rPr sz="1600"/>
+            </a:br>
+            <a:r>
+              <a:rPr b="0" lang="en-US" sz="1600" spc="-1" strike="noStrike">
+                <a:solidFill>
+                  <a:srgbClr val="6a8759"/>
+                </a:solidFill>
+                <a:latin typeface="JetBrains Mono"/>
+                <a:ea typeface="JetBrains Mono"/>
+              </a:rPr>
+              <a:t>}</a:t>
+            </a:r>
+            <a:endParaRPr b="0" lang="en-US" sz="1600" spc="-1" strike="noStrike">
+              <a:latin typeface="Arial"/>
+            </a:endParaRPr>
+          </a:p>
+          <a:p>
+            <a:pPr>
+              <a:lnSpc>
+                <a:spcPct val="100000"/>
+              </a:lnSpc>
+              <a:buNone/>
+              <a:tabLst>
+                <a:tab algn="l" pos="408240"/>
+              </a:tabLst>
+            </a:pPr>
+            <a:endParaRPr b="0" lang="en-US" sz="1600" spc="-1" strike="noStrike">
+              <a:latin typeface="Arial"/>
+            </a:endParaRPr>
+          </a:p>
+        </p:txBody>
+      </p:sp>
+      <p:sp>
+        <p:nvSpPr>
+          <p:cNvPr id="153" name=""/>
+          <p:cNvSpPr txBox="1"/>
+          <p:nvPr/>
+        </p:nvSpPr>
+        <p:spPr>
+          <a:xfrm>
+            <a:off x="3657600" y="3530160"/>
+            <a:ext cx="2696760" cy="1499040"/>
+          </a:xfrm>
+          <a:prstGeom prst="rect">
+            <a:avLst/>
+          </a:prstGeom>
+          <a:noFill/>
+          <a:ln w="0">
+            <a:noFill/>
+          </a:ln>
+        </p:spPr>
+        <p:txBody>
+          <a:bodyPr lIns="90000" rIns="90000" tIns="45000" bIns="45000" anchor="t">
+            <a:noAutofit/>
+          </a:bodyPr>
+          <a:p>
+            <a:r>
+              <a:rPr b="0" lang="en-US" sz="1600" spc="-1" strike="noStrike">
+                <a:solidFill>
+                  <a:srgbClr val="6a8759"/>
+                </a:solidFill>
+                <a:latin typeface="JetBrains Mono"/>
+                <a:ea typeface="JetBrains Mono"/>
+              </a:rPr>
+              <a:t>{ </a:t>
+            </a:r>
+            <a:endParaRPr b="0" lang="en-US" sz="1600" spc="-1" strike="noStrike">
+              <a:latin typeface="Arial"/>
+            </a:endParaRPr>
+          </a:p>
+          <a:p>
+            <a:r>
+              <a:rPr b="0" lang="en-US" sz="1600" spc="-1" strike="noStrike">
+                <a:solidFill>
+                  <a:srgbClr val="6a8759"/>
+                </a:solidFill>
+                <a:latin typeface="JetBrains Mono"/>
+                <a:ea typeface="JetBrains Mono"/>
+              </a:rPr>
+              <a:t>     </a:t>
+            </a:r>
+            <a:r>
+              <a:rPr b="0" lang="en-US" sz="1600" spc="-1" strike="noStrike">
+                <a:solidFill>
+                  <a:srgbClr val="6a8759"/>
+                </a:solidFill>
+                <a:latin typeface="JetBrains Mono"/>
+                <a:ea typeface="JetBrains Mono"/>
+              </a:rPr>
+              <a:t>$or: [ </a:t>
+            </a:r>
+            <a:endParaRPr b="0" lang="en-US" sz="1600" spc="-1" strike="noStrike">
+              <a:latin typeface="Arial"/>
+            </a:endParaRPr>
+          </a:p>
+          <a:p>
+            <a:r>
+              <a:rPr b="0" lang="en-US" sz="1600" spc="-1" strike="noStrike">
+                <a:solidFill>
+                  <a:srgbClr val="6a8759"/>
+                </a:solidFill>
+                <a:latin typeface="JetBrains Mono"/>
+                <a:ea typeface="JetBrains Mono"/>
+              </a:rPr>
+              <a:t>         </a:t>
+            </a:r>
+            <a:r>
+              <a:rPr b="0" lang="en-US" sz="1600" spc="-1" strike="noStrike">
+                <a:solidFill>
+                  <a:srgbClr val="6a8759"/>
+                </a:solidFill>
+                <a:latin typeface="JetBrains Mono"/>
+                <a:ea typeface="JetBrains Mono"/>
+              </a:rPr>
+              <a:t>{ status: "A" }, </a:t>
+            </a:r>
+            <a:endParaRPr b="0" lang="en-US" sz="1600" spc="-1" strike="noStrike">
+              <a:latin typeface="Arial"/>
+            </a:endParaRPr>
+          </a:p>
+          <a:p>
+            <a:r>
+              <a:rPr b="0" lang="en-US" sz="1600" spc="-1" strike="noStrike">
+                <a:solidFill>
+                  <a:srgbClr val="6a8759"/>
+                </a:solidFill>
+                <a:latin typeface="JetBrains Mono"/>
+                <a:ea typeface="JetBrains Mono"/>
+              </a:rPr>
+              <a:t>         </a:t>
+            </a:r>
+            <a:r>
+              <a:rPr b="0" lang="en-US" sz="1600" spc="-1" strike="noStrike">
+                <a:solidFill>
+                  <a:srgbClr val="6a8759"/>
+                </a:solidFill>
+                <a:latin typeface="JetBrains Mono"/>
+                <a:ea typeface="JetBrains Mono"/>
+              </a:rPr>
+              <a:t>{ qty: { $lt: 30 } } </a:t>
+            </a:r>
+            <a:endParaRPr b="0" lang="en-US" sz="1600" spc="-1" strike="noStrike">
+              <a:latin typeface="Arial"/>
+            </a:endParaRPr>
+          </a:p>
+          <a:p>
+            <a:r>
+              <a:rPr b="0" lang="en-US" sz="1600" spc="-1" strike="noStrike">
+                <a:solidFill>
+                  <a:srgbClr val="6a8759"/>
+                </a:solidFill>
+                <a:latin typeface="JetBrains Mono"/>
+                <a:ea typeface="JetBrains Mono"/>
+              </a:rPr>
+              <a:t>     </a:t>
+            </a:r>
+            <a:r>
+              <a:rPr b="0" lang="en-US" sz="1600" spc="-1" strike="noStrike">
+                <a:solidFill>
+                  <a:srgbClr val="6a8759"/>
+                </a:solidFill>
+                <a:latin typeface="JetBrains Mono"/>
+                <a:ea typeface="JetBrains Mono"/>
+              </a:rPr>
+              <a:t>] </a:t>
+            </a:r>
+            <a:br>
+              <a:rPr sz="1600"/>
+            </a:br>
+            <a:r>
+              <a:rPr b="0" lang="en-US" sz="1600" spc="-1" strike="noStrike">
+                <a:solidFill>
+                  <a:srgbClr val="6a8759"/>
+                </a:solidFill>
+                <a:latin typeface="JetBrains Mono"/>
+                <a:ea typeface="JetBrains Mono"/>
+              </a:rPr>
+              <a:t>}</a:t>
             </a:r>
             <a:endParaRPr b="0" lang="en-US" sz="1600" spc="-1" strike="noStrike">
               <a:latin typeface="Arial"/>
@@ -8003,7 +8367,7 @@
       </p:grpSpPr>
       <p:pic>
         <p:nvPicPr>
-          <p:cNvPr id="150" name="" descr=""/>
+          <p:cNvPr id="154" name="" descr=""/>
           <p:cNvPicPr/>
           <p:nvPr/>
         </p:nvPicPr>
@@ -8014,7 +8378,7 @@
         <p:spPr>
           <a:xfrm>
             <a:off x="0" y="720"/>
-            <a:ext cx="10080720" cy="5670360"/>
+            <a:ext cx="10080360" cy="5670000"/>
           </a:xfrm>
           <a:prstGeom prst="rect">
             <a:avLst/>
@@ -8026,14 +8390,14 @@
       </p:pic>
       <p:sp>
         <p:nvSpPr>
-          <p:cNvPr id="151" name=""/>
+          <p:cNvPr id="155" name=""/>
           <p:cNvSpPr/>
           <p:nvPr/>
         </p:nvSpPr>
         <p:spPr>
           <a:xfrm>
             <a:off x="504000" y="226080"/>
-            <a:ext cx="9066600" cy="941400"/>
+            <a:ext cx="9066240" cy="941040"/>
           </a:xfrm>
           <a:prstGeom prst="rect">
             <a:avLst/>
@@ -8052,14 +8416,14 @@
       </p:sp>
       <p:sp>
         <p:nvSpPr>
-          <p:cNvPr id="152" name=""/>
+          <p:cNvPr id="156" name=""/>
           <p:cNvSpPr/>
           <p:nvPr/>
         </p:nvSpPr>
         <p:spPr>
           <a:xfrm>
             <a:off x="504000" y="1326600"/>
-            <a:ext cx="9067320" cy="3283920"/>
+            <a:ext cx="9066960" cy="3283560"/>
           </a:xfrm>
           <a:prstGeom prst="rect">
             <a:avLst/>
@@ -8165,7 +8529,7 @@
       </p:grpSpPr>
       <p:pic>
         <p:nvPicPr>
-          <p:cNvPr id="153" name="" descr=""/>
+          <p:cNvPr id="157" name="" descr=""/>
           <p:cNvPicPr/>
           <p:nvPr/>
         </p:nvPicPr>
@@ -8176,7 +8540,7 @@
         <p:spPr>
           <a:xfrm>
             <a:off x="0" y="720"/>
-            <a:ext cx="10080720" cy="5670360"/>
+            <a:ext cx="10080360" cy="5670000"/>
           </a:xfrm>
           <a:prstGeom prst="rect">
             <a:avLst/>
@@ -8188,14 +8552,14 @@
       </p:pic>
       <p:sp>
         <p:nvSpPr>
-          <p:cNvPr id="154" name=""/>
+          <p:cNvPr id="158" name=""/>
           <p:cNvSpPr/>
           <p:nvPr/>
         </p:nvSpPr>
         <p:spPr>
           <a:xfrm>
             <a:off x="504000" y="1326600"/>
-            <a:ext cx="9067320" cy="3283920"/>
+            <a:ext cx="9066960" cy="3283560"/>
           </a:xfrm>
           <a:prstGeom prst="rect">
             <a:avLst/>
@@ -8253,7 +8617,7 @@
                 <a:latin typeface="Arial"/>
                 <a:ea typeface="DejaVu Sans"/>
               </a:rPr>
-              <a:t>Todo</a:t>
+              <a:t>Aggregate pipelines</a:t>
             </a:r>
             <a:endParaRPr b="0" lang="en-US" sz="3200" spc="-1" strike="noStrike">
               <a:latin typeface="Arial"/>
@@ -8280,7 +8644,7 @@
                 <a:latin typeface="Arial"/>
                 <a:ea typeface="DejaVu Sans"/>
               </a:rPr>
-              <a:t>Todo</a:t>
+              <a:t>Multi-stage pipelines that transform documents into aggregated results</a:t>
             </a:r>
             <a:endParaRPr b="0" lang="en-US" sz="2000" spc="-1" strike="noStrike">
               <a:latin typeface="Arial"/>
@@ -8324,7 +8688,61 @@
                 <a:latin typeface="Arial"/>
                 <a:ea typeface="DejaVu Sans"/>
               </a:rPr>
-              <a:t>- TODO</a:t>
+              <a:t>- Simplify complex queries</a:t>
+            </a:r>
+            <a:endParaRPr b="0" lang="en-US" sz="1800" spc="-1" strike="noStrike">
+              <a:latin typeface="Arial"/>
+            </a:endParaRPr>
+          </a:p>
+          <a:p>
+            <a:pPr algn="ctr">
+              <a:lnSpc>
+                <a:spcPct val="100000"/>
+              </a:lnSpc>
+              <a:spcBef>
+                <a:spcPts val="850"/>
+              </a:spcBef>
+              <a:buNone/>
+              <a:tabLst>
+                <a:tab algn="l" pos="408240"/>
+              </a:tabLst>
+            </a:pPr>
+            <a:r>
+              <a:rPr b="0" lang="en-US" sz="1800" spc="-1" strike="noStrike">
+                <a:solidFill>
+                  <a:srgbClr val="000000"/>
+                </a:solidFill>
+                <a:latin typeface="Arial"/>
+                <a:ea typeface="DejaVu Sans"/>
+              </a:rPr>
+              <a:t>- Create new documents</a:t>
+            </a:r>
+            <a:endParaRPr b="0" lang="en-US" sz="1800" spc="-1" strike="noStrike">
+              <a:latin typeface="Arial"/>
+            </a:endParaRPr>
+          </a:p>
+          <a:p>
+            <a:pPr algn="ctr">
+              <a:lnSpc>
+                <a:spcPct val="100000"/>
+              </a:lnSpc>
+              <a:spcBef>
+                <a:spcPts val="850"/>
+              </a:spcBef>
+              <a:buNone/>
+              <a:tabLst>
+                <a:tab algn="l" pos="408240"/>
+              </a:tabLst>
+            </a:pPr>
+            <a:r>
+              <a:rPr b="0" lang="en-US" sz="1800" spc="-1" strike="noStrike">
+                <a:solidFill>
+                  <a:srgbClr val="000000"/>
+                </a:solidFill>
+                <a:latin typeface="Arial"/>
+                <a:ea typeface="DejaVu Sans"/>
+              </a:rPr>
+              <a:t>- </a:t>
             </a:r>
             <a:endParaRPr b="0" lang="en-US" sz="1800" spc="-1" strike="noStrike">
               <a:latin typeface="Arial"/>
@@ -8364,7 +8782,7 @@
       </p:grpSpPr>
       <p:pic>
         <p:nvPicPr>
-          <p:cNvPr id="155" name="" descr=""/>
+          <p:cNvPr id="159" name="" descr=""/>
           <p:cNvPicPr/>
           <p:nvPr/>
         </p:nvPicPr>
@@ -8375,7 +8793,7 @@
         <p:spPr>
           <a:xfrm>
             <a:off x="0" y="720"/>
-            <a:ext cx="10080720" cy="5670360"/>
+            <a:ext cx="10080360" cy="5670000"/>
           </a:xfrm>
           <a:prstGeom prst="rect">
             <a:avLst/>
@@ -8387,14 +8805,14 @@
       </p:pic>
       <p:sp>
         <p:nvSpPr>
-          <p:cNvPr id="156" name=""/>
+          <p:cNvPr id="160" name=""/>
           <p:cNvSpPr/>
           <p:nvPr/>
         </p:nvSpPr>
         <p:spPr>
           <a:xfrm>
             <a:off x="504000" y="226080"/>
-            <a:ext cx="9066600" cy="941400"/>
+            <a:ext cx="9066240" cy="941040"/>
           </a:xfrm>
           <a:prstGeom prst="rect">
             <a:avLst/>
@@ -8454,7 +8872,7 @@
         <p:spPr>
           <a:xfrm>
             <a:off x="0" y="0"/>
-            <a:ext cx="10077120" cy="5666760"/>
+            <a:ext cx="10076760" cy="5666400"/>
           </a:xfrm>
           <a:prstGeom prst="rect">
             <a:avLst/>
@@ -8473,7 +8891,7 @@
         <p:spPr>
           <a:xfrm>
             <a:off x="504000" y="226080"/>
-            <a:ext cx="9066600" cy="941400"/>
+            <a:ext cx="9066240" cy="941040"/>
           </a:xfrm>
           <a:prstGeom prst="rect">
             <a:avLst/>
@@ -8499,7 +8917,7 @@
         <p:spPr>
           <a:xfrm>
             <a:off x="504000" y="1326600"/>
-            <a:ext cx="9066600" cy="3283200"/>
+            <a:ext cx="9066240" cy="3282840"/>
           </a:xfrm>
           <a:prstGeom prst="rect">
             <a:avLst/>
@@ -8619,6 +9037,30 @@
           </a:p>
         </p:txBody>
       </p:sp>
+      <p:pic>
+        <p:nvPicPr>
+          <p:cNvPr id="51" name="" descr=""/>
+          <p:cNvPicPr/>
+          <p:nvPr/>
+        </p:nvPicPr>
+        <p:blipFill>
+          <a:blip r:embed="rId2"/>
+          <a:srcRect l="19439" t="0" r="0" b="3167"/>
+          <a:stretch/>
+        </p:blipFill>
+        <p:spPr>
+          <a:xfrm>
+            <a:off x="685800" y="2057400"/>
+            <a:ext cx="8686800" cy="2057040"/>
+          </a:xfrm>
+          <a:prstGeom prst="rect">
+            <a:avLst/>
+          </a:prstGeom>
+          <a:ln w="0">
+            <a:noFill/>
+          </a:ln>
+        </p:spPr>
+      </p:pic>
     </p:spTree>
   </p:cSld>
   <mc:AlternateContent>
@@ -8651,7 +9093,7 @@
       </p:grpSpPr>
       <p:pic>
         <p:nvPicPr>
-          <p:cNvPr id="51" name="" descr=""/>
+          <p:cNvPr id="52" name="" descr=""/>
           <p:cNvPicPr/>
           <p:nvPr/>
         </p:nvPicPr>
@@ -8662,7 +9104,7 @@
         <p:spPr>
           <a:xfrm>
             <a:off x="1440" y="0"/>
-            <a:ext cx="10077120" cy="5666760"/>
+            <a:ext cx="10076760" cy="5666400"/>
           </a:xfrm>
           <a:prstGeom prst="rect">
             <a:avLst/>
@@ -8674,14 +9116,14 @@
       </p:pic>
       <p:sp>
         <p:nvSpPr>
-          <p:cNvPr id="52" name=""/>
+          <p:cNvPr id="53" name=""/>
           <p:cNvSpPr/>
           <p:nvPr/>
         </p:nvSpPr>
         <p:spPr>
           <a:xfrm>
             <a:off x="504000" y="226080"/>
-            <a:ext cx="9066600" cy="941400"/>
+            <a:ext cx="9066240" cy="941040"/>
           </a:xfrm>
           <a:prstGeom prst="rect">
             <a:avLst/>
@@ -8700,14 +9142,14 @@
       </p:sp>
       <p:sp>
         <p:nvSpPr>
-          <p:cNvPr id="53" name=""/>
+          <p:cNvPr id="54" name=""/>
           <p:cNvSpPr/>
           <p:nvPr/>
         </p:nvSpPr>
         <p:spPr>
           <a:xfrm>
             <a:off x="504000" y="1326600"/>
-            <a:ext cx="9067320" cy="3283920"/>
+            <a:ext cx="9066960" cy="3283560"/>
           </a:xfrm>
           <a:prstGeom prst="rect">
             <a:avLst/>
@@ -8782,7 +9224,7 @@
       </p:sp>
       <p:pic>
         <p:nvPicPr>
-          <p:cNvPr id="54" name="" descr=""/>
+          <p:cNvPr id="55" name="" descr=""/>
           <p:cNvPicPr/>
           <p:nvPr/>
         </p:nvPicPr>
@@ -8793,7 +9235,7 @@
         <p:spPr>
           <a:xfrm>
             <a:off x="2971800" y="1371600"/>
-            <a:ext cx="4058280" cy="3509280"/>
+            <a:ext cx="4057920" cy="3508920"/>
           </a:xfrm>
           <a:prstGeom prst="rect">
             <a:avLst/>
@@ -8835,7 +9277,7 @@
       </p:grpSpPr>
       <p:pic>
         <p:nvPicPr>
-          <p:cNvPr id="55" name="" descr=""/>
+          <p:cNvPr id="56" name="" descr=""/>
           <p:cNvPicPr/>
           <p:nvPr/>
         </p:nvPicPr>
@@ -8846,7 +9288,7 @@
         <p:spPr>
           <a:xfrm>
             <a:off x="0" y="360"/>
-            <a:ext cx="10077120" cy="5666760"/>
+            <a:ext cx="10076760" cy="5666400"/>
           </a:xfrm>
           <a:prstGeom prst="rect">
             <a:avLst/>
@@ -8858,14 +9300,14 @@
       </p:pic>
       <p:sp>
         <p:nvSpPr>
-          <p:cNvPr id="56" name=""/>
+          <p:cNvPr id="57" name=""/>
           <p:cNvSpPr/>
           <p:nvPr/>
         </p:nvSpPr>
         <p:spPr>
           <a:xfrm>
             <a:off x="504000" y="226080"/>
-            <a:ext cx="9066600" cy="941400"/>
+            <a:ext cx="9066240" cy="941040"/>
           </a:xfrm>
           <a:prstGeom prst="rect">
             <a:avLst/>
@@ -8884,14 +9326,14 @@
       </p:sp>
       <p:sp>
         <p:nvSpPr>
-          <p:cNvPr id="57" name=""/>
+          <p:cNvPr id="58" name=""/>
           <p:cNvSpPr/>
           <p:nvPr/>
         </p:nvSpPr>
         <p:spPr>
           <a:xfrm>
             <a:off x="504000" y="1326600"/>
-            <a:ext cx="9066600" cy="3283200"/>
+            <a:ext cx="9066240" cy="3282840"/>
           </a:xfrm>
           <a:prstGeom prst="rect">
             <a:avLst/>
@@ -9039,7 +9481,7 @@
       </p:grpSpPr>
       <p:pic>
         <p:nvPicPr>
-          <p:cNvPr id="58" name="" descr=""/>
+          <p:cNvPr id="59" name="" descr=""/>
           <p:cNvPicPr/>
           <p:nvPr/>
         </p:nvPicPr>
@@ -9050,7 +9492,7 @@
         <p:spPr>
           <a:xfrm>
             <a:off x="0" y="0"/>
-            <a:ext cx="10077120" cy="5666760"/>
+            <a:ext cx="10076760" cy="5666400"/>
           </a:xfrm>
           <a:prstGeom prst="rect">
             <a:avLst/>
@@ -9062,14 +9504,14 @@
       </p:pic>
       <p:sp>
         <p:nvSpPr>
-          <p:cNvPr id="59" name=""/>
+          <p:cNvPr id="60" name=""/>
           <p:cNvSpPr/>
           <p:nvPr/>
         </p:nvSpPr>
         <p:spPr>
           <a:xfrm>
             <a:off x="504000" y="226080"/>
-            <a:ext cx="9066600" cy="941400"/>
+            <a:ext cx="9066240" cy="941040"/>
           </a:xfrm>
           <a:prstGeom prst="rect">
             <a:avLst/>
@@ -9088,14 +9530,14 @@
       </p:sp>
       <p:sp>
         <p:nvSpPr>
-          <p:cNvPr id="60" name=""/>
+          <p:cNvPr id="61" name=""/>
           <p:cNvSpPr/>
           <p:nvPr/>
         </p:nvSpPr>
         <p:spPr>
           <a:xfrm>
             <a:off x="504000" y="1326600"/>
-            <a:ext cx="9066600" cy="3283200"/>
+            <a:ext cx="9066240" cy="3282840"/>
           </a:xfrm>
           <a:prstGeom prst="rect">
             <a:avLst/>
@@ -9167,14 +9609,14 @@
       </p:sp>
       <p:sp>
         <p:nvSpPr>
-          <p:cNvPr id="61" name=""/>
+          <p:cNvPr id="62" name=""/>
           <p:cNvSpPr/>
           <p:nvPr/>
         </p:nvSpPr>
         <p:spPr>
           <a:xfrm>
             <a:off x="504000" y="4343400"/>
-            <a:ext cx="9323640" cy="317160"/>
+            <a:ext cx="9323280" cy="316800"/>
           </a:xfrm>
           <a:prstGeom prst="rect">
             <a:avLst/>
@@ -9249,7 +9691,7 @@
       </p:grpSpPr>
       <p:pic>
         <p:nvPicPr>
-          <p:cNvPr id="62" name="" descr=""/>
+          <p:cNvPr id="63" name="" descr=""/>
           <p:cNvPicPr/>
           <p:nvPr/>
         </p:nvPicPr>
@@ -9260,7 +9702,7 @@
         <p:spPr>
           <a:xfrm>
             <a:off x="0" y="0"/>
-            <a:ext cx="10077120" cy="5666760"/>
+            <a:ext cx="10076760" cy="5666400"/>
           </a:xfrm>
           <a:prstGeom prst="rect">
             <a:avLst/>
@@ -9272,14 +9714,14 @@
       </p:pic>
       <p:sp>
         <p:nvSpPr>
-          <p:cNvPr id="63" name=""/>
+          <p:cNvPr id="64" name=""/>
           <p:cNvSpPr/>
           <p:nvPr/>
         </p:nvSpPr>
         <p:spPr>
           <a:xfrm>
             <a:off x="504000" y="226080"/>
-            <a:ext cx="9066600" cy="941400"/>
+            <a:ext cx="9066240" cy="941040"/>
           </a:xfrm>
           <a:prstGeom prst="rect">
             <a:avLst/>
@@ -9298,14 +9740,14 @@
       </p:sp>
       <p:sp>
         <p:nvSpPr>
-          <p:cNvPr id="64" name=""/>
+          <p:cNvPr id="65" name=""/>
           <p:cNvSpPr/>
           <p:nvPr/>
         </p:nvSpPr>
         <p:spPr>
           <a:xfrm>
             <a:off x="504000" y="1326600"/>
-            <a:ext cx="9066600" cy="3283200"/>
+            <a:ext cx="9066240" cy="3282840"/>
           </a:xfrm>
           <a:prstGeom prst="rect">
             <a:avLst/>
@@ -9533,7 +9975,7 @@
       </p:grpSpPr>
       <p:pic>
         <p:nvPicPr>
-          <p:cNvPr id="65" name="" descr=""/>
+          <p:cNvPr id="66" name="" descr=""/>
           <p:cNvPicPr/>
           <p:nvPr/>
         </p:nvPicPr>
@@ -9544,7 +9986,7 @@
         <p:spPr>
           <a:xfrm>
             <a:off x="0" y="360"/>
-            <a:ext cx="10077120" cy="5666760"/>
+            <a:ext cx="10076760" cy="5666400"/>
           </a:xfrm>
           <a:prstGeom prst="rect">
             <a:avLst/>
@@ -9556,14 +9998,14 @@
       </p:pic>
       <p:sp>
         <p:nvSpPr>
-          <p:cNvPr id="66" name=""/>
+          <p:cNvPr id="67" name=""/>
           <p:cNvSpPr/>
           <p:nvPr/>
         </p:nvSpPr>
         <p:spPr>
           <a:xfrm>
             <a:off x="504000" y="226080"/>
-            <a:ext cx="9066600" cy="941400"/>
+            <a:ext cx="9066240" cy="941040"/>
           </a:xfrm>
           <a:prstGeom prst="rect">
             <a:avLst/>
@@ -9582,14 +10024,14 @@
       </p:sp>
       <p:sp>
         <p:nvSpPr>
-          <p:cNvPr id="67" name=""/>
+          <p:cNvPr id="68" name=""/>
           <p:cNvSpPr/>
           <p:nvPr/>
         </p:nvSpPr>
         <p:spPr>
           <a:xfrm>
             <a:off x="504000" y="1326600"/>
-            <a:ext cx="9066600" cy="3283200"/>
+            <a:ext cx="9066240" cy="3282840"/>
           </a:xfrm>
           <a:prstGeom prst="rect">
             <a:avLst/>
@@ -9675,14 +10117,14 @@
       </p:sp>
       <p:sp>
         <p:nvSpPr>
-          <p:cNvPr id="68" name=""/>
+          <p:cNvPr id="69" name=""/>
           <p:cNvSpPr/>
           <p:nvPr/>
         </p:nvSpPr>
         <p:spPr>
           <a:xfrm>
             <a:off x="2057400" y="4021920"/>
-            <a:ext cx="5940360" cy="546840"/>
+            <a:ext cx="5940000" cy="546480"/>
           </a:xfrm>
           <a:prstGeom prst="rect">
             <a:avLst/>

</xml_diff>

<commit_message>
Add more features to MongoDb presentation
</commit_message>
<xml_diff>
--- a/presentation/presentation.pptx
+++ b/presentation/presentation.pptx
@@ -1859,11 +1859,12 @@
         </p:nvPicPr>
         <p:blipFill>
           <a:blip r:embed="rId1"/>
+          <a:stretch/>
         </p:blipFill>
         <p:spPr>
           <a:xfrm>
             <a:off x="0" y="360"/>
-            <a:ext cx="10076760" cy="5666400"/>
+            <a:ext cx="10076400" cy="5666040"/>
           </a:xfrm>
           <a:prstGeom prst="rect">
             <a:avLst/>
@@ -1882,7 +1883,7 @@
         <p:spPr>
           <a:xfrm>
             <a:off x="504000" y="226080"/>
-            <a:ext cx="9066240" cy="941040"/>
+            <a:ext cx="9065880" cy="940680"/>
           </a:xfrm>
           <a:prstGeom prst="rect">
             <a:avLst/>
@@ -1941,7 +1942,7 @@
         <p:spPr>
           <a:xfrm>
             <a:off x="504000" y="1326600"/>
-            <a:ext cx="9066240" cy="3282840"/>
+            <a:ext cx="9065880" cy="3282480"/>
           </a:xfrm>
           <a:prstGeom prst="rect">
             <a:avLst/>
@@ -2108,11 +2109,12 @@
         </p:nvPicPr>
         <p:blipFill>
           <a:blip r:embed="rId1"/>
+          <a:stretch/>
         </p:blipFill>
         <p:spPr>
           <a:xfrm>
             <a:off x="0" y="0"/>
-            <a:ext cx="10076760" cy="5666400"/>
+            <a:ext cx="10076400" cy="5666040"/>
           </a:xfrm>
           <a:prstGeom prst="rect">
             <a:avLst/>
@@ -2131,7 +2133,7 @@
         <p:spPr>
           <a:xfrm>
             <a:off x="504000" y="226080"/>
-            <a:ext cx="9066240" cy="941040"/>
+            <a:ext cx="9065880" cy="940680"/>
           </a:xfrm>
           <a:prstGeom prst="rect">
             <a:avLst/>
@@ -2157,7 +2159,7 @@
         <p:spPr>
           <a:xfrm>
             <a:off x="504000" y="1326600"/>
-            <a:ext cx="9066240" cy="3282840"/>
+            <a:ext cx="9065880" cy="3282480"/>
           </a:xfrm>
           <a:prstGeom prst="rect">
             <a:avLst/>
@@ -2415,11 +2417,12 @@
         </p:nvPicPr>
         <p:blipFill>
           <a:blip r:embed="rId1"/>
+          <a:stretch/>
         </p:blipFill>
         <p:spPr>
           <a:xfrm>
             <a:off x="0" y="720"/>
-            <a:ext cx="10076760" cy="5666400"/>
+            <a:ext cx="10076400" cy="5666040"/>
           </a:xfrm>
           <a:prstGeom prst="rect">
             <a:avLst/>
@@ -2438,7 +2441,7 @@
         <p:spPr>
           <a:xfrm>
             <a:off x="504000" y="226080"/>
-            <a:ext cx="9066240" cy="941040"/>
+            <a:ext cx="9065880" cy="940680"/>
           </a:xfrm>
           <a:prstGeom prst="rect">
             <a:avLst/>
@@ -2464,7 +2467,7 @@
         <p:spPr>
           <a:xfrm>
             <a:off x="504000" y="1326600"/>
-            <a:ext cx="9066960" cy="3283560"/>
+            <a:ext cx="9066600" cy="3283200"/>
           </a:xfrm>
           <a:prstGeom prst="rect">
             <a:avLst/>
@@ -2577,7 +2580,7 @@
         <p:spPr>
           <a:xfrm>
             <a:off x="0" y="720"/>
-            <a:ext cx="10076760" cy="5666400"/>
+            <a:ext cx="10076400" cy="5666040"/>
           </a:xfrm>
           <a:prstGeom prst="rect">
             <a:avLst/>
@@ -2646,7 +2649,7 @@
         <p:spPr>
           <a:xfrm>
             <a:off x="504000" y="1326600"/>
-            <a:ext cx="9066960" cy="3283560"/>
+            <a:ext cx="9066600" cy="3283200"/>
           </a:xfrm>
           <a:prstGeom prst="rect">
             <a:avLst/>
@@ -2903,7 +2906,7 @@
         <p:spPr>
           <a:xfrm>
             <a:off x="0" y="720"/>
-            <a:ext cx="10076760" cy="5666400"/>
+            <a:ext cx="10076400" cy="5666040"/>
           </a:xfrm>
           <a:prstGeom prst="rect">
             <a:avLst/>
@@ -2972,7 +2975,7 @@
         <p:spPr>
           <a:xfrm>
             <a:off x="504000" y="226080"/>
-            <a:ext cx="9066240" cy="941040"/>
+            <a:ext cx="9065880" cy="940680"/>
           </a:xfrm>
           <a:prstGeom prst="rect">
             <a:avLst/>
@@ -2998,7 +3001,7 @@
         <p:spPr>
           <a:xfrm>
             <a:off x="504000" y="1326600"/>
-            <a:ext cx="9066960" cy="3283560"/>
+            <a:ext cx="9066600" cy="3283200"/>
           </a:xfrm>
           <a:prstGeom prst="rect">
             <a:avLst/>
@@ -3255,7 +3258,7 @@
         <p:spPr>
           <a:xfrm>
             <a:off x="0" y="720"/>
-            <a:ext cx="10076760" cy="5666400"/>
+            <a:ext cx="10076400" cy="5666040"/>
           </a:xfrm>
           <a:prstGeom prst="rect">
             <a:avLst/>
@@ -3324,7 +3327,7 @@
         <p:spPr>
           <a:xfrm>
             <a:off x="504000" y="226080"/>
-            <a:ext cx="9066240" cy="941040"/>
+            <a:ext cx="9065880" cy="940680"/>
           </a:xfrm>
           <a:prstGeom prst="rect">
             <a:avLst/>
@@ -3350,7 +3353,7 @@
         <p:spPr>
           <a:xfrm>
             <a:off x="504000" y="1326600"/>
-            <a:ext cx="9066960" cy="3283560"/>
+            <a:ext cx="9066600" cy="3283200"/>
           </a:xfrm>
           <a:prstGeom prst="rect">
             <a:avLst/>
@@ -3634,7 +3637,7 @@
         <p:spPr>
           <a:xfrm>
             <a:off x="0" y="720"/>
-            <a:ext cx="10076760" cy="5666400"/>
+            <a:ext cx="10076400" cy="5666040"/>
           </a:xfrm>
           <a:prstGeom prst="rect">
             <a:avLst/>
@@ -3703,7 +3706,7 @@
         <p:spPr>
           <a:xfrm>
             <a:off x="504000" y="226080"/>
-            <a:ext cx="9066240" cy="941040"/>
+            <a:ext cx="9065880" cy="940680"/>
           </a:xfrm>
           <a:prstGeom prst="rect">
             <a:avLst/>
@@ -3729,7 +3732,7 @@
         <p:spPr>
           <a:xfrm>
             <a:off x="504000" y="1326600"/>
-            <a:ext cx="9066960" cy="3283560"/>
+            <a:ext cx="9066600" cy="3283200"/>
           </a:xfrm>
           <a:prstGeom prst="rect">
             <a:avLst/>
@@ -3860,11 +3863,12 @@
         </p:nvPicPr>
         <p:blipFill>
           <a:blip r:embed="rId1"/>
+          <a:stretch/>
         </p:blipFill>
         <p:spPr>
           <a:xfrm>
             <a:off x="720" y="0"/>
-            <a:ext cx="10079640" cy="5670000"/>
+            <a:ext cx="10079280" cy="5669640"/>
           </a:xfrm>
           <a:prstGeom prst="rect">
             <a:avLst/>
@@ -3883,7 +3887,7 @@
         <p:spPr>
           <a:xfrm>
             <a:off x="504000" y="226080"/>
-            <a:ext cx="9066240" cy="941040"/>
+            <a:ext cx="9065880" cy="940680"/>
           </a:xfrm>
           <a:prstGeom prst="rect">
             <a:avLst/>
@@ -3942,7 +3946,7 @@
         <p:spPr>
           <a:xfrm>
             <a:off x="504000" y="1326600"/>
-            <a:ext cx="9066240" cy="3282840"/>
+            <a:ext cx="9065880" cy="3282480"/>
           </a:xfrm>
           <a:prstGeom prst="rect">
             <a:avLst/>
@@ -4109,11 +4113,12 @@
         </p:nvPicPr>
         <p:blipFill>
           <a:blip r:embed="rId1"/>
+          <a:stretch/>
         </p:blipFill>
         <p:spPr>
           <a:xfrm>
             <a:off x="720" y="0"/>
-            <a:ext cx="10079640" cy="5670000"/>
+            <a:ext cx="10079280" cy="5669640"/>
           </a:xfrm>
           <a:prstGeom prst="rect">
             <a:avLst/>
@@ -4132,7 +4137,7 @@
         <p:spPr>
           <a:xfrm>
             <a:off x="504000" y="226080"/>
-            <a:ext cx="9066240" cy="941040"/>
+            <a:ext cx="9065880" cy="940680"/>
           </a:xfrm>
           <a:prstGeom prst="rect">
             <a:avLst/>
@@ -4158,7 +4163,7 @@
         <p:spPr>
           <a:xfrm>
             <a:off x="504000" y="1326600"/>
-            <a:ext cx="9066240" cy="3282840"/>
+            <a:ext cx="9065880" cy="3282480"/>
           </a:xfrm>
           <a:prstGeom prst="rect">
             <a:avLst/>
@@ -4327,7 +4332,7 @@
         <p:spPr>
           <a:xfrm>
             <a:off x="504000" y="226080"/>
-            <a:ext cx="9066240" cy="941040"/>
+            <a:ext cx="9065880" cy="940680"/>
           </a:xfrm>
           <a:prstGeom prst="rect">
             <a:avLst/>
@@ -4353,7 +4358,7 @@
         <p:spPr>
           <a:xfrm>
             <a:off x="504000" y="1326600"/>
-            <a:ext cx="9066240" cy="3282840"/>
+            <a:ext cx="9065880" cy="3282480"/>
           </a:xfrm>
           <a:prstGeom prst="rect">
             <a:avLst/>
@@ -4481,11 +4486,12 @@
         </p:nvPicPr>
         <p:blipFill>
           <a:blip r:embed="rId1"/>
+          <a:stretch/>
         </p:blipFill>
         <p:spPr>
           <a:xfrm>
             <a:off x="360" y="0"/>
-            <a:ext cx="10079640" cy="5670000"/>
+            <a:ext cx="10079280" cy="5669640"/>
           </a:xfrm>
           <a:prstGeom prst="rect">
             <a:avLst/>
@@ -4503,11 +4509,12 @@
         </p:nvPicPr>
         <p:blipFill>
           <a:blip r:embed="rId2"/>
+          <a:stretch/>
         </p:blipFill>
         <p:spPr>
           <a:xfrm>
             <a:off x="2286000" y="2057400"/>
-            <a:ext cx="2390040" cy="2057040"/>
+            <a:ext cx="2389680" cy="2056680"/>
           </a:xfrm>
           <a:prstGeom prst="rect">
             <a:avLst/>
@@ -4525,11 +4532,12 @@
         </p:nvPicPr>
         <p:blipFill>
           <a:blip r:embed="rId3"/>
+          <a:stretch/>
         </p:blipFill>
         <p:spPr>
           <a:xfrm>
             <a:off x="5382000" y="2057400"/>
-            <a:ext cx="2390040" cy="2057040"/>
+            <a:ext cx="2389680" cy="2056680"/>
           </a:xfrm>
           <a:prstGeom prst="rect">
             <a:avLst/>
@@ -4578,7 +4586,7 @@
         <p:spPr>
           <a:xfrm>
             <a:off x="504000" y="226080"/>
-            <a:ext cx="9066240" cy="941040"/>
+            <a:ext cx="9065880" cy="940680"/>
           </a:xfrm>
           <a:prstGeom prst="rect">
             <a:avLst/>
@@ -4604,7 +4612,7 @@
         <p:spPr>
           <a:xfrm>
             <a:off x="504000" y="1326600"/>
-            <a:ext cx="9066240" cy="3282840"/>
+            <a:ext cx="9065880" cy="3282480"/>
           </a:xfrm>
           <a:prstGeom prst="rect">
             <a:avLst/>
@@ -4732,11 +4740,12 @@
         </p:nvPicPr>
         <p:blipFill>
           <a:blip r:embed="rId1"/>
+          <a:stretch/>
         </p:blipFill>
         <p:spPr>
           <a:xfrm>
             <a:off x="360" y="0"/>
-            <a:ext cx="10079640" cy="5670000"/>
+            <a:ext cx="10079280" cy="5669640"/>
           </a:xfrm>
           <a:prstGeom prst="rect">
             <a:avLst/>
@@ -4754,11 +4763,12 @@
         </p:nvPicPr>
         <p:blipFill>
           <a:blip r:embed="rId2"/>
+          <a:stretch/>
         </p:blipFill>
         <p:spPr>
           <a:xfrm>
             <a:off x="1828800" y="1888920"/>
-            <a:ext cx="6381000" cy="2142360"/>
+            <a:ext cx="6380640" cy="2142000"/>
           </a:xfrm>
           <a:prstGeom prst="rect">
             <a:avLst/>
@@ -4806,11 +4816,12 @@
         </p:nvPicPr>
         <p:blipFill>
           <a:blip r:embed="rId1"/>
+          <a:stretch/>
         </p:blipFill>
         <p:spPr>
           <a:xfrm>
             <a:off x="0" y="360"/>
-            <a:ext cx="10076760" cy="5666400"/>
+            <a:ext cx="10076400" cy="5666040"/>
           </a:xfrm>
           <a:prstGeom prst="rect">
             <a:avLst/>
@@ -4829,7 +4840,7 @@
         <p:spPr>
           <a:xfrm>
             <a:off x="504000" y="226080"/>
-            <a:ext cx="9066240" cy="941040"/>
+            <a:ext cx="9065880" cy="940680"/>
           </a:xfrm>
           <a:prstGeom prst="rect">
             <a:avLst/>
@@ -4855,7 +4866,7 @@
         <p:spPr>
           <a:xfrm>
             <a:off x="504000" y="1326600"/>
-            <a:ext cx="9066240" cy="3282840"/>
+            <a:ext cx="9065880" cy="3282480"/>
           </a:xfrm>
           <a:prstGeom prst="rect">
             <a:avLst/>
@@ -5024,7 +5035,7 @@
         <p:spPr>
           <a:xfrm>
             <a:off x="504000" y="226080"/>
-            <a:ext cx="9066240" cy="941040"/>
+            <a:ext cx="9065880" cy="940680"/>
           </a:xfrm>
           <a:prstGeom prst="rect">
             <a:avLst/>
@@ -5049,11 +5060,12 @@
         </p:nvPicPr>
         <p:blipFill>
           <a:blip r:embed="rId1"/>
+          <a:stretch/>
         </p:blipFill>
         <p:spPr>
           <a:xfrm>
             <a:off x="720" y="0"/>
-            <a:ext cx="10079640" cy="5670000"/>
+            <a:ext cx="10079280" cy="5669640"/>
           </a:xfrm>
           <a:prstGeom prst="rect">
             <a:avLst/>
@@ -5072,7 +5084,7 @@
         <p:spPr>
           <a:xfrm>
             <a:off x="504000" y="1326600"/>
-            <a:ext cx="9066960" cy="3283560"/>
+            <a:ext cx="9066600" cy="3283200"/>
           </a:xfrm>
           <a:prstGeom prst="rect">
             <a:avLst/>
@@ -5153,11 +5165,12 @@
         </p:nvPicPr>
         <p:blipFill>
           <a:blip r:embed="rId2"/>
+          <a:stretch/>
         </p:blipFill>
         <p:spPr>
           <a:xfrm>
             <a:off x="5380920" y="1568880"/>
-            <a:ext cx="3305520" cy="3041280"/>
+            <a:ext cx="3305160" cy="3040920"/>
           </a:xfrm>
           <a:prstGeom prst="rect">
             <a:avLst/>
@@ -5175,11 +5188,12 @@
         </p:nvPicPr>
         <p:blipFill>
           <a:blip r:embed="rId3"/>
+          <a:stretch/>
         </p:blipFill>
         <p:spPr>
           <a:xfrm>
             <a:off x="1371600" y="1600200"/>
-            <a:ext cx="3444480" cy="2992680"/>
+            <a:ext cx="3444120" cy="2992320"/>
           </a:xfrm>
           <a:prstGeom prst="rect">
             <a:avLst/>
@@ -5228,7 +5242,7 @@
         <p:spPr>
           <a:xfrm>
             <a:off x="504000" y="226080"/>
-            <a:ext cx="9066240" cy="941040"/>
+            <a:ext cx="9065880" cy="940680"/>
           </a:xfrm>
           <a:prstGeom prst="rect">
             <a:avLst/>
@@ -5253,11 +5267,12 @@
         </p:nvPicPr>
         <p:blipFill>
           <a:blip r:embed="rId1"/>
+          <a:stretch/>
         </p:blipFill>
         <p:spPr>
           <a:xfrm>
             <a:off x="720" y="0"/>
-            <a:ext cx="10079640" cy="5670000"/>
+            <a:ext cx="10079280" cy="5669640"/>
           </a:xfrm>
           <a:prstGeom prst="rect">
             <a:avLst/>
@@ -5276,7 +5291,7 @@
         <p:spPr>
           <a:xfrm>
             <a:off x="504000" y="1326600"/>
-            <a:ext cx="9066240" cy="3282840"/>
+            <a:ext cx="9065880" cy="3282480"/>
           </a:xfrm>
           <a:prstGeom prst="rect">
             <a:avLst/>
@@ -5430,11 +5445,12 @@
         </p:nvPicPr>
         <p:blipFill>
           <a:blip r:embed="rId1"/>
+          <a:stretch/>
         </p:blipFill>
         <p:spPr>
           <a:xfrm>
             <a:off x="0" y="0"/>
-            <a:ext cx="10079640" cy="5670000"/>
+            <a:ext cx="10079280" cy="5669640"/>
           </a:xfrm>
           <a:prstGeom prst="rect">
             <a:avLst/>
@@ -5453,7 +5469,7 @@
         <p:spPr>
           <a:xfrm>
             <a:off x="504000" y="226080"/>
-            <a:ext cx="9066240" cy="941040"/>
+            <a:ext cx="9065880" cy="940680"/>
           </a:xfrm>
           <a:prstGeom prst="rect">
             <a:avLst/>
@@ -5479,7 +5495,7 @@
         <p:spPr>
           <a:xfrm>
             <a:off x="504000" y="1326600"/>
-            <a:ext cx="9066240" cy="3282840"/>
+            <a:ext cx="9065880" cy="3282480"/>
           </a:xfrm>
           <a:prstGeom prst="rect">
             <a:avLst/>
@@ -5534,7 +5550,7 @@
         <p:spPr>
           <a:xfrm>
             <a:off x="1647720" y="4343400"/>
-            <a:ext cx="7267680" cy="316800"/>
+            <a:ext cx="7267320" cy="316440"/>
           </a:xfrm>
           <a:prstGeom prst="rect">
             <a:avLst/>
@@ -5593,22 +5609,28 @@
       <p:sp>
         <p:nvSpPr>
           <p:cNvPr id="114" name=""/>
-          <p:cNvSpPr txBox="1"/>
+          <p:cNvSpPr/>
           <p:nvPr/>
         </p:nvSpPr>
         <p:spPr>
           <a:xfrm>
             <a:off x="4069800" y="2689920"/>
-            <a:ext cx="1873800" cy="546480"/>
-          </a:xfrm>
-          <a:prstGeom prst="rect">
-            <a:avLst/>
-          </a:prstGeom>
-          <a:noFill/>
-          <a:ln w="0">
-            <a:noFill/>
-          </a:ln>
-        </p:spPr>
+            <a:ext cx="1873440" cy="546120"/>
+          </a:xfrm>
+          <a:prstGeom prst="rect">
+            <a:avLst/>
+          </a:prstGeom>
+          <a:noFill/>
+          <a:ln w="0">
+            <a:noFill/>
+          </a:ln>
+        </p:spPr>
+        <p:style>
+          <a:lnRef idx="0"/>
+          <a:fillRef idx="0"/>
+          <a:effectRef idx="0"/>
+          <a:fontRef idx="minor"/>
+        </p:style>
         <p:txBody>
           <a:bodyPr lIns="90000" rIns="90000" tIns="45000" bIns="45000" anchor="t">
             <a:noAutofit/>
@@ -5677,11 +5699,12 @@
         </p:nvPicPr>
         <p:blipFill>
           <a:blip r:embed="rId1"/>
+          <a:stretch/>
         </p:blipFill>
         <p:spPr>
           <a:xfrm>
             <a:off x="720" y="0"/>
-            <a:ext cx="10079640" cy="5670000"/>
+            <a:ext cx="10079280" cy="5669640"/>
           </a:xfrm>
           <a:prstGeom prst="rect">
             <a:avLst/>
@@ -5700,7 +5723,7 @@
         <p:spPr>
           <a:xfrm>
             <a:off x="504000" y="226080"/>
-            <a:ext cx="9066240" cy="941040"/>
+            <a:ext cx="9065880" cy="940680"/>
           </a:xfrm>
           <a:prstGeom prst="rect">
             <a:avLst/>
@@ -5726,7 +5749,7 @@
         <p:spPr>
           <a:xfrm>
             <a:off x="504000" y="1326600"/>
-            <a:ext cx="9066960" cy="3283560"/>
+            <a:ext cx="9066600" cy="3283200"/>
           </a:xfrm>
           <a:prstGeom prst="rect">
             <a:avLst/>
@@ -5793,27 +5816,39 @@
       <p:sp>
         <p:nvSpPr>
           <p:cNvPr id="118" name=""/>
-          <p:cNvSpPr txBox="1"/>
+          <p:cNvSpPr/>
           <p:nvPr/>
         </p:nvSpPr>
         <p:spPr>
           <a:xfrm>
             <a:off x="4069800" y="2286000"/>
-            <a:ext cx="1873800" cy="546480"/>
-          </a:xfrm>
-          <a:prstGeom prst="rect">
-            <a:avLst/>
-          </a:prstGeom>
-          <a:noFill/>
-          <a:ln w="0">
-            <a:noFill/>
-          </a:ln>
-        </p:spPr>
+            <a:ext cx="1873440" cy="546120"/>
+          </a:xfrm>
+          <a:prstGeom prst="rect">
+            <a:avLst/>
+          </a:prstGeom>
+          <a:noFill/>
+          <a:ln w="0">
+            <a:noFill/>
+          </a:ln>
+        </p:spPr>
+        <p:style>
+          <a:lnRef idx="0"/>
+          <a:fillRef idx="0"/>
+          <a:effectRef idx="0"/>
+          <a:fontRef idx="minor"/>
+        </p:style>
         <p:txBody>
           <a:bodyPr lIns="90000" rIns="90000" tIns="45000" bIns="45000" anchor="t">
             <a:noAutofit/>
           </a:bodyPr>
           <a:p>
+            <a:pPr>
+              <a:lnSpc>
+                <a:spcPct val="100000"/>
+              </a:lnSpc>
+              <a:buNone/>
+            </a:pPr>
             <a:r>
               <a:rPr b="1" lang="en-US" sz="3200" spc="-1" strike="noStrike">
                 <a:solidFill>
@@ -5868,11 +5903,12 @@
         </p:nvPicPr>
         <p:blipFill>
           <a:blip r:embed="rId1"/>
+          <a:stretch/>
         </p:blipFill>
         <p:spPr>
           <a:xfrm>
             <a:off x="720" y="0"/>
-            <a:ext cx="10079640" cy="5670000"/>
+            <a:ext cx="10079280" cy="5669640"/>
           </a:xfrm>
           <a:prstGeom prst="rect">
             <a:avLst/>
@@ -5891,7 +5927,7 @@
         <p:spPr>
           <a:xfrm>
             <a:off x="504000" y="1326600"/>
-            <a:ext cx="9066960" cy="3283560"/>
+            <a:ext cx="9066600" cy="3283200"/>
           </a:xfrm>
           <a:prstGeom prst="rect">
             <a:avLst/>
@@ -6022,11 +6058,12 @@
         </p:nvPicPr>
         <p:blipFill>
           <a:blip r:embed="rId1"/>
+          <a:stretch/>
         </p:blipFill>
         <p:spPr>
           <a:xfrm>
             <a:off x="0" y="0"/>
-            <a:ext cx="10080360" cy="5670000"/>
+            <a:ext cx="10080000" cy="5669640"/>
           </a:xfrm>
           <a:prstGeom prst="rect">
             <a:avLst/>
@@ -6045,7 +6082,7 @@
         <p:spPr>
           <a:xfrm>
             <a:off x="504000" y="226080"/>
-            <a:ext cx="9066240" cy="941040"/>
+            <a:ext cx="9065880" cy="940680"/>
           </a:xfrm>
           <a:prstGeom prst="rect">
             <a:avLst/>
@@ -6104,7 +6141,7 @@
         <p:spPr>
           <a:xfrm>
             <a:off x="504000" y="1326600"/>
-            <a:ext cx="9066240" cy="3282840"/>
+            <a:ext cx="9065880" cy="3282480"/>
           </a:xfrm>
           <a:prstGeom prst="rect">
             <a:avLst/>
@@ -6271,11 +6308,12 @@
         </p:nvPicPr>
         <p:blipFill>
           <a:blip r:embed="rId1"/>
+          <a:stretch/>
         </p:blipFill>
         <p:spPr>
           <a:xfrm>
             <a:off x="0" y="720"/>
-            <a:ext cx="10080360" cy="5670000"/>
+            <a:ext cx="10080000" cy="5669640"/>
           </a:xfrm>
           <a:prstGeom prst="rect">
             <a:avLst/>
@@ -6294,7 +6332,7 @@
         <p:spPr>
           <a:xfrm>
             <a:off x="504000" y="226080"/>
-            <a:ext cx="9066240" cy="941040"/>
+            <a:ext cx="9065880" cy="940680"/>
           </a:xfrm>
           <a:prstGeom prst="rect">
             <a:avLst/>
@@ -6320,7 +6358,7 @@
         <p:spPr>
           <a:xfrm>
             <a:off x="504000" y="1326600"/>
-            <a:ext cx="9066240" cy="3282840"/>
+            <a:ext cx="9065880" cy="3282480"/>
           </a:xfrm>
           <a:prstGeom prst="rect">
             <a:avLst/>
@@ -6488,11 +6526,12 @@
         </p:nvPicPr>
         <p:blipFill>
           <a:blip r:embed="rId1"/>
+          <a:stretch/>
         </p:blipFill>
         <p:spPr>
           <a:xfrm>
             <a:off x="0" y="360"/>
-            <a:ext cx="10080360" cy="5670000"/>
+            <a:ext cx="10080000" cy="5669640"/>
           </a:xfrm>
           <a:prstGeom prst="rect">
             <a:avLst/>
@@ -6511,7 +6550,7 @@
         <p:spPr>
           <a:xfrm>
             <a:off x="504000" y="226080"/>
-            <a:ext cx="9066240" cy="941040"/>
+            <a:ext cx="9065880" cy="940680"/>
           </a:xfrm>
           <a:prstGeom prst="rect">
             <a:avLst/>
@@ -6537,7 +6576,7 @@
         <p:spPr>
           <a:xfrm>
             <a:off x="504000" y="1326600"/>
-            <a:ext cx="9066240" cy="3282840"/>
+            <a:ext cx="9065880" cy="3282480"/>
           </a:xfrm>
           <a:prstGeom prst="rect">
             <a:avLst/>
@@ -6665,11 +6704,12 @@
         </p:nvPicPr>
         <p:blipFill>
           <a:blip r:embed="rId2"/>
+          <a:stretch/>
         </p:blipFill>
         <p:spPr>
           <a:xfrm>
             <a:off x="1143000" y="2143440"/>
-            <a:ext cx="3657240" cy="1971000"/>
+            <a:ext cx="3656880" cy="1970640"/>
           </a:xfrm>
           <a:prstGeom prst="rect">
             <a:avLst/>
@@ -6687,11 +6727,12 @@
         </p:nvPicPr>
         <p:blipFill>
           <a:blip r:embed="rId3"/>
+          <a:stretch/>
         </p:blipFill>
         <p:spPr>
           <a:xfrm>
             <a:off x="5257800" y="2143440"/>
-            <a:ext cx="3657240" cy="1971000"/>
+            <a:ext cx="3656880" cy="1970640"/>
           </a:xfrm>
           <a:prstGeom prst="rect">
             <a:avLst/>
@@ -6739,11 +6780,12 @@
         </p:nvPicPr>
         <p:blipFill>
           <a:blip r:embed="rId1"/>
+          <a:stretch/>
         </p:blipFill>
         <p:spPr>
           <a:xfrm>
             <a:off x="0" y="360"/>
-            <a:ext cx="10080360" cy="5670000"/>
+            <a:ext cx="10080000" cy="5669640"/>
           </a:xfrm>
           <a:prstGeom prst="rect">
             <a:avLst/>
@@ -6762,7 +6804,7 @@
         <p:spPr>
           <a:xfrm>
             <a:off x="504000" y="226080"/>
-            <a:ext cx="9066240" cy="941040"/>
+            <a:ext cx="9065880" cy="940680"/>
           </a:xfrm>
           <a:prstGeom prst="rect">
             <a:avLst/>
@@ -6788,7 +6830,7 @@
         <p:spPr>
           <a:xfrm>
             <a:off x="504000" y="1326600"/>
-            <a:ext cx="9066240" cy="3282840"/>
+            <a:ext cx="9065880" cy="3282480"/>
           </a:xfrm>
           <a:prstGeom prst="rect">
             <a:avLst/>
@@ -6916,11 +6958,12 @@
         </p:nvPicPr>
         <p:blipFill>
           <a:blip r:embed="rId2"/>
+          <a:stretch/>
         </p:blipFill>
         <p:spPr>
           <a:xfrm rot="21595800">
             <a:off x="2745000" y="1807200"/>
-            <a:ext cx="4655520" cy="2990160"/>
+            <a:ext cx="4655160" cy="2989800"/>
           </a:xfrm>
           <a:prstGeom prst="rect">
             <a:avLst/>
@@ -6968,11 +7011,12 @@
         </p:nvPicPr>
         <p:blipFill>
           <a:blip r:embed="rId1"/>
+          <a:stretch/>
         </p:blipFill>
         <p:spPr>
           <a:xfrm>
             <a:off x="0" y="360"/>
-            <a:ext cx="10080360" cy="5670000"/>
+            <a:ext cx="10080000" cy="5669640"/>
           </a:xfrm>
           <a:prstGeom prst="rect">
             <a:avLst/>
@@ -6991,7 +7035,7 @@
         <p:spPr>
           <a:xfrm>
             <a:off x="504000" y="226080"/>
-            <a:ext cx="9066240" cy="941040"/>
+            <a:ext cx="9065880" cy="940680"/>
           </a:xfrm>
           <a:prstGeom prst="rect">
             <a:avLst/>
@@ -7017,7 +7061,7 @@
         <p:spPr>
           <a:xfrm>
             <a:off x="504000" y="1326600"/>
-            <a:ext cx="9066960" cy="3283560"/>
+            <a:ext cx="9066600" cy="3283200"/>
           </a:xfrm>
           <a:prstGeom prst="rect">
             <a:avLst/>
@@ -7098,11 +7142,12 @@
         </p:nvPicPr>
         <p:blipFill>
           <a:blip r:embed="rId2"/>
+          <a:stretch/>
         </p:blipFill>
         <p:spPr>
           <a:xfrm>
             <a:off x="3061080" y="1600200"/>
-            <a:ext cx="3796560" cy="3200040"/>
+            <a:ext cx="3796200" cy="3199680"/>
           </a:xfrm>
           <a:prstGeom prst="rect">
             <a:avLst/>
@@ -7150,11 +7195,12 @@
         </p:nvPicPr>
         <p:blipFill>
           <a:blip r:embed="rId1"/>
+          <a:stretch/>
         </p:blipFill>
         <p:spPr>
           <a:xfrm>
             <a:off x="0" y="0"/>
-            <a:ext cx="10076760" cy="5666400"/>
+            <a:ext cx="10076400" cy="5666040"/>
           </a:xfrm>
           <a:prstGeom prst="rect">
             <a:avLst/>
@@ -7173,7 +7219,7 @@
         <p:spPr>
           <a:xfrm>
             <a:off x="504000" y="226080"/>
-            <a:ext cx="9066240" cy="941040"/>
+            <a:ext cx="9065880" cy="940680"/>
           </a:xfrm>
           <a:prstGeom prst="rect">
             <a:avLst/>
@@ -7199,7 +7245,7 @@
         <p:spPr>
           <a:xfrm>
             <a:off x="504000" y="1326600"/>
-            <a:ext cx="9066240" cy="3282840"/>
+            <a:ext cx="9065880" cy="3282480"/>
           </a:xfrm>
           <a:prstGeom prst="rect">
             <a:avLst/>
@@ -7327,11 +7373,12 @@
         </p:nvPicPr>
         <p:blipFill>
           <a:blip r:embed="rId2"/>
+          <a:stretch/>
         </p:blipFill>
         <p:spPr>
           <a:xfrm>
             <a:off x="3109680" y="1409400"/>
-            <a:ext cx="3519360" cy="3200040"/>
+            <a:ext cx="3519000" cy="3199680"/>
           </a:xfrm>
           <a:prstGeom prst="rect">
             <a:avLst/>
@@ -7379,11 +7426,12 @@
         </p:nvPicPr>
         <p:blipFill>
           <a:blip r:embed="rId1"/>
+          <a:stretch/>
         </p:blipFill>
         <p:spPr>
           <a:xfrm>
             <a:off x="0" y="360"/>
-            <a:ext cx="10080360" cy="5670000"/>
+            <a:ext cx="10080000" cy="5669640"/>
           </a:xfrm>
           <a:prstGeom prst="rect">
             <a:avLst/>
@@ -7402,7 +7450,7 @@
         <p:spPr>
           <a:xfrm>
             <a:off x="504000" y="226080"/>
-            <a:ext cx="9066240" cy="941040"/>
+            <a:ext cx="9065880" cy="940680"/>
           </a:xfrm>
           <a:prstGeom prst="rect">
             <a:avLst/>
@@ -7428,7 +7476,7 @@
         <p:spPr>
           <a:xfrm>
             <a:off x="504000" y="1326600"/>
-            <a:ext cx="9066240" cy="3282840"/>
+            <a:ext cx="9065880" cy="3282480"/>
           </a:xfrm>
           <a:prstGeom prst="rect">
             <a:avLst/>
@@ -7582,11 +7630,12 @@
         </p:nvPicPr>
         <p:blipFill>
           <a:blip r:embed="rId1"/>
+          <a:stretch/>
         </p:blipFill>
         <p:spPr>
           <a:xfrm>
             <a:off x="0" y="0"/>
-            <a:ext cx="10080360" cy="5670000"/>
+            <a:ext cx="10080000" cy="5669640"/>
           </a:xfrm>
           <a:prstGeom prst="rect">
             <a:avLst/>
@@ -7605,7 +7654,7 @@
         <p:spPr>
           <a:xfrm>
             <a:off x="504000" y="226080"/>
-            <a:ext cx="9066240" cy="941040"/>
+            <a:ext cx="9065880" cy="940680"/>
           </a:xfrm>
           <a:prstGeom prst="rect">
             <a:avLst/>
@@ -7631,7 +7680,7 @@
         <p:spPr>
           <a:xfrm>
             <a:off x="504000" y="1326600"/>
-            <a:ext cx="9066240" cy="3282840"/>
+            <a:ext cx="9065880" cy="3282480"/>
           </a:xfrm>
           <a:prstGeom prst="rect">
             <a:avLst/>
@@ -7686,7 +7735,7 @@
         <p:spPr>
           <a:xfrm>
             <a:off x="1647000" y="4343400"/>
-            <a:ext cx="7267680" cy="316800"/>
+            <a:ext cx="7267320" cy="316440"/>
           </a:xfrm>
           <a:prstGeom prst="rect">
             <a:avLst/>
@@ -7715,6 +7764,62 @@
               <a:tabLst>
                 <a:tab algn="l" pos="408240"/>
               </a:tabLst>
+            </a:pPr>
+            <a:endParaRPr b="0" lang="en-US" sz="1600" spc="-1" strike="noStrike">
+              <a:latin typeface="Arial"/>
+            </a:endParaRPr>
+          </a:p>
+          <a:p>
+            <a:pPr>
+              <a:lnSpc>
+                <a:spcPct val="100000"/>
+              </a:lnSpc>
+              <a:buNone/>
+              <a:tabLst>
+                <a:tab algn="l" pos="408240"/>
+              </a:tabLst>
+            </a:pPr>
+            <a:endParaRPr b="0" lang="en-US" sz="1600" spc="-1" strike="noStrike">
+              <a:latin typeface="Arial"/>
+            </a:endParaRPr>
+          </a:p>
+        </p:txBody>
+      </p:sp>
+      <p:sp>
+        <p:nvSpPr>
+          <p:cNvPr id="147" name=""/>
+          <p:cNvSpPr/>
+          <p:nvPr/>
+        </p:nvSpPr>
+        <p:spPr>
+          <a:xfrm>
+            <a:off x="3657600" y="3530160"/>
+            <a:ext cx="2696400" cy="1498680"/>
+          </a:xfrm>
+          <a:prstGeom prst="rect">
+            <a:avLst/>
+          </a:prstGeom>
+          <a:noFill/>
+          <a:ln w="0">
+            <a:noFill/>
+          </a:ln>
+        </p:spPr>
+        <p:style>
+          <a:lnRef idx="0"/>
+          <a:fillRef idx="0"/>
+          <a:effectRef idx="0"/>
+          <a:fontRef idx="minor"/>
+        </p:style>
+        <p:txBody>
+          <a:bodyPr lIns="90000" rIns="90000" tIns="45000" bIns="45000" anchor="t">
+            <a:noAutofit/>
+          </a:bodyPr>
+          <a:p>
+            <a:pPr>
+              <a:lnSpc>
+                <a:spcPct val="100000"/>
+              </a:lnSpc>
+              <a:buNone/>
             </a:pPr>
             <a:r>
               <a:rPr b="0" lang="en-US" sz="1600" spc="-1" strike="noStrike">
@@ -7736,9 +7841,6 @@
                 <a:spcPct val="100000"/>
               </a:lnSpc>
               <a:buNone/>
-              <a:tabLst>
-                <a:tab algn="l" pos="408240"/>
-              </a:tabLst>
             </a:pPr>
             <a:r>
               <a:rPr b="0" lang="en-US" sz="1600" spc="-1" strike="noStrike">
@@ -7770,9 +7872,6 @@
                 <a:spcPct val="100000"/>
               </a:lnSpc>
               <a:buNone/>
-              <a:tabLst>
-                <a:tab algn="l" pos="408240"/>
-              </a:tabLst>
             </a:pPr>
             <a:r>
               <a:rPr b="0" lang="en-US" sz="1600" spc="-1" strike="noStrike">
@@ -7804,9 +7903,6 @@
                 <a:spcPct val="100000"/>
               </a:lnSpc>
               <a:buNone/>
-              <a:tabLst>
-                <a:tab algn="l" pos="408240"/>
-              </a:tabLst>
             </a:pPr>
             <a:r>
               <a:rPr b="0" lang="en-US" sz="1600" spc="-1" strike="noStrike">
@@ -7838,9 +7934,6 @@
                 <a:spcPct val="100000"/>
               </a:lnSpc>
               <a:buNone/>
-              <a:tabLst>
-                <a:tab algn="l" pos="408240"/>
-              </a:tabLst>
             </a:pPr>
             <a:r>
               <a:rPr b="0" lang="en-US" sz="1600" spc="-1" strike="noStrike">
@@ -7879,173 +7972,6 @@
               <a:latin typeface="Arial"/>
             </a:endParaRPr>
           </a:p>
-          <a:p>
-            <a:pPr>
-              <a:lnSpc>
-                <a:spcPct val="100000"/>
-              </a:lnSpc>
-              <a:buNone/>
-              <a:tabLst>
-                <a:tab algn="l" pos="408240"/>
-              </a:tabLst>
-            </a:pPr>
-            <a:endParaRPr b="0" lang="en-US" sz="1600" spc="-1" strike="noStrike">
-              <a:latin typeface="Arial"/>
-            </a:endParaRPr>
-          </a:p>
-        </p:txBody>
-      </p:sp>
-      <p:sp>
-        <p:nvSpPr>
-          <p:cNvPr id="147" name=""/>
-          <p:cNvSpPr txBox="1"/>
-          <p:nvPr/>
-        </p:nvSpPr>
-        <p:spPr>
-          <a:xfrm>
-            <a:off x="3657600" y="3530160"/>
-            <a:ext cx="2696760" cy="1499040"/>
-          </a:xfrm>
-          <a:prstGeom prst="rect">
-            <a:avLst/>
-          </a:prstGeom>
-          <a:noFill/>
-          <a:ln w="0">
-            <a:noFill/>
-          </a:ln>
-        </p:spPr>
-        <p:txBody>
-          <a:bodyPr lIns="90000" rIns="90000" tIns="45000" bIns="45000" anchor="t">
-            <a:noAutofit/>
-          </a:bodyPr>
-          <a:p>
-            <a:r>
-              <a:rPr b="0" lang="en-US" sz="1600" spc="-1" strike="noStrike">
-                <a:solidFill>
-                  <a:srgbClr val="6a8759"/>
-                </a:solidFill>
-                <a:latin typeface="JetBrains Mono"/>
-                <a:ea typeface="JetBrains Mono"/>
-              </a:rPr>
-              <a:t>{ </a:t>
-            </a:r>
-            <a:endParaRPr b="0" lang="en-US" sz="1600" spc="-1" strike="noStrike">
-              <a:latin typeface="Arial"/>
-            </a:endParaRPr>
-          </a:p>
-          <a:p>
-            <a:r>
-              <a:rPr b="0" lang="en-US" sz="1600" spc="-1" strike="noStrike">
-                <a:solidFill>
-                  <a:srgbClr val="6a8759"/>
-                </a:solidFill>
-                <a:latin typeface="JetBrains Mono"/>
-                <a:ea typeface="JetBrains Mono"/>
-              </a:rPr>
-              <a:t>     </a:t>
-            </a:r>
-            <a:r>
-              <a:rPr b="0" lang="en-US" sz="1600" spc="-1" strike="noStrike">
-                <a:solidFill>
-                  <a:srgbClr val="6a8759"/>
-                </a:solidFill>
-                <a:latin typeface="JetBrains Mono"/>
-                <a:ea typeface="JetBrains Mono"/>
-              </a:rPr>
-              <a:t>$or: [ </a:t>
-            </a:r>
-            <a:endParaRPr b="0" lang="en-US" sz="1600" spc="-1" strike="noStrike">
-              <a:latin typeface="Arial"/>
-            </a:endParaRPr>
-          </a:p>
-          <a:p>
-            <a:r>
-              <a:rPr b="0" lang="en-US" sz="1600" spc="-1" strike="noStrike">
-                <a:solidFill>
-                  <a:srgbClr val="6a8759"/>
-                </a:solidFill>
-                <a:latin typeface="JetBrains Mono"/>
-                <a:ea typeface="JetBrains Mono"/>
-              </a:rPr>
-              <a:t>         </a:t>
-            </a:r>
-            <a:r>
-              <a:rPr b="0" lang="en-US" sz="1600" spc="-1" strike="noStrike">
-                <a:solidFill>
-                  <a:srgbClr val="6a8759"/>
-                </a:solidFill>
-                <a:latin typeface="JetBrains Mono"/>
-                <a:ea typeface="JetBrains Mono"/>
-              </a:rPr>
-              <a:t>{ status: "A" }, </a:t>
-            </a:r>
-            <a:endParaRPr b="0" lang="en-US" sz="1600" spc="-1" strike="noStrike">
-              <a:latin typeface="Arial"/>
-            </a:endParaRPr>
-          </a:p>
-          <a:p>
-            <a:r>
-              <a:rPr b="0" lang="en-US" sz="1600" spc="-1" strike="noStrike">
-                <a:solidFill>
-                  <a:srgbClr val="6a8759"/>
-                </a:solidFill>
-                <a:latin typeface="JetBrains Mono"/>
-                <a:ea typeface="JetBrains Mono"/>
-              </a:rPr>
-              <a:t>         </a:t>
-            </a:r>
-            <a:r>
-              <a:rPr b="0" lang="en-US" sz="1600" spc="-1" strike="noStrike">
-                <a:solidFill>
-                  <a:srgbClr val="6a8759"/>
-                </a:solidFill>
-                <a:latin typeface="JetBrains Mono"/>
-                <a:ea typeface="JetBrains Mono"/>
-              </a:rPr>
-              <a:t>{ qty: { $lt: 30 } } </a:t>
-            </a:r>
-            <a:endParaRPr b="0" lang="en-US" sz="1600" spc="-1" strike="noStrike">
-              <a:latin typeface="Arial"/>
-            </a:endParaRPr>
-          </a:p>
-          <a:p>
-            <a:r>
-              <a:rPr b="0" lang="en-US" sz="1600" spc="-1" strike="noStrike">
-                <a:solidFill>
-                  <a:srgbClr val="6a8759"/>
-                </a:solidFill>
-                <a:latin typeface="JetBrains Mono"/>
-                <a:ea typeface="JetBrains Mono"/>
-              </a:rPr>
-              <a:t>     </a:t>
-            </a:r>
-            <a:r>
-              <a:rPr b="0" lang="en-US" sz="1600" spc="-1" strike="noStrike">
-                <a:solidFill>
-                  <a:srgbClr val="6a8759"/>
-                </a:solidFill>
-                <a:latin typeface="JetBrains Mono"/>
-                <a:ea typeface="JetBrains Mono"/>
-              </a:rPr>
-              <a:t>] </a:t>
-            </a:r>
-            <a:br>
-              <a:rPr sz="1600"/>
-            </a:br>
-            <a:r>
-              <a:rPr b="0" lang="en-US" sz="1600" spc="-1" strike="noStrike">
-                <a:solidFill>
-                  <a:srgbClr val="6a8759"/>
-                </a:solidFill>
-                <a:latin typeface="JetBrains Mono"/>
-                <a:ea typeface="JetBrains Mono"/>
-              </a:rPr>
-              <a:t>}</a:t>
-            </a:r>
-            <a:endParaRPr b="0" lang="en-US" sz="1600" spc="-1" strike="noStrike">
-              <a:latin typeface="Arial"/>
-            </a:endParaRPr>
-          </a:p>
         </p:txBody>
       </p:sp>
     </p:spTree>
@@ -8086,11 +8012,12 @@
         </p:nvPicPr>
         <p:blipFill>
           <a:blip r:embed="rId1"/>
+          <a:stretch/>
         </p:blipFill>
         <p:spPr>
           <a:xfrm>
             <a:off x="0" y="720"/>
-            <a:ext cx="10080360" cy="5670000"/>
+            <a:ext cx="10080000" cy="5669640"/>
           </a:xfrm>
           <a:prstGeom prst="rect">
             <a:avLst/>
@@ -8109,7 +8036,7 @@
         <p:spPr>
           <a:xfrm>
             <a:off x="504000" y="226080"/>
-            <a:ext cx="9066240" cy="941040"/>
+            <a:ext cx="9065880" cy="940680"/>
           </a:xfrm>
           <a:prstGeom prst="rect">
             <a:avLst/>
@@ -8135,7 +8062,7 @@
         <p:spPr>
           <a:xfrm>
             <a:off x="504000" y="1326600"/>
-            <a:ext cx="9066960" cy="3283560"/>
+            <a:ext cx="9066600" cy="3283200"/>
           </a:xfrm>
           <a:prstGeom prst="rect">
             <a:avLst/>
@@ -8247,11 +8174,12 @@
         </p:nvPicPr>
         <p:blipFill>
           <a:blip r:embed="rId1"/>
+          <a:stretch/>
         </p:blipFill>
         <p:spPr>
           <a:xfrm>
             <a:off x="0" y="720"/>
-            <a:ext cx="10080360" cy="5670000"/>
+            <a:ext cx="10080000" cy="5669640"/>
           </a:xfrm>
           <a:prstGeom prst="rect">
             <a:avLst/>
@@ -8270,7 +8198,7 @@
         <p:spPr>
           <a:xfrm>
             <a:off x="504000" y="1326600"/>
-            <a:ext cx="9066960" cy="3283560"/>
+            <a:ext cx="9066600" cy="3283200"/>
           </a:xfrm>
           <a:prstGeom prst="rect">
             <a:avLst/>
@@ -8355,17 +8283,7 @@
                 <a:latin typeface="Arial"/>
                 <a:ea typeface="DejaVu Sans"/>
               </a:rPr>
-              <a:t>Multi-stage pipelines that transform documents into </a:t>
-            </a:r>
-            <a:r>
-              <a:rPr b="0" lang="en-US" sz="2000" spc="-1" strike="noStrike">
-                <a:solidFill>
-                  <a:srgbClr val="000000"/>
-                </a:solidFill>
-                <a:latin typeface="Arial"/>
-                <a:ea typeface="DejaVu Sans"/>
-              </a:rPr>
-              <a:t>aggregated results</a:t>
+              <a:t>Multi-stage pipelines that transform documents into aggregated results</a:t>
             </a:r>
             <a:endParaRPr b="0" lang="en-US" sz="2000" spc="-1" strike="noStrike">
               <a:latin typeface="Arial"/>
@@ -8509,11 +8427,12 @@
         </p:nvPicPr>
         <p:blipFill>
           <a:blip r:embed="rId1"/>
+          <a:stretch/>
         </p:blipFill>
         <p:spPr>
           <a:xfrm>
             <a:off x="0" y="720"/>
-            <a:ext cx="10080360" cy="5670000"/>
+            <a:ext cx="10080000" cy="5669640"/>
           </a:xfrm>
           <a:prstGeom prst="rect">
             <a:avLst/>
@@ -8532,7 +8451,7 @@
         <p:spPr>
           <a:xfrm>
             <a:off x="504000" y="1326600"/>
-            <a:ext cx="9066960" cy="3283560"/>
+            <a:ext cx="9066600" cy="3283200"/>
           </a:xfrm>
           <a:prstGeom prst="rect">
             <a:avLst/>
@@ -8788,11 +8707,12 @@
         </p:nvPicPr>
         <p:blipFill>
           <a:blip r:embed="rId1"/>
+          <a:stretch/>
         </p:blipFill>
         <p:spPr>
           <a:xfrm>
             <a:off x="0" y="720"/>
-            <a:ext cx="10080360" cy="5670000"/>
+            <a:ext cx="10080000" cy="5669640"/>
           </a:xfrm>
           <a:prstGeom prst="rect">
             <a:avLst/>
@@ -8811,7 +8731,7 @@
         <p:spPr>
           <a:xfrm>
             <a:off x="504000" y="1326600"/>
-            <a:ext cx="9066960" cy="3283560"/>
+            <a:ext cx="9066600" cy="3283200"/>
           </a:xfrm>
           <a:prstGeom prst="rect">
             <a:avLst/>
@@ -9026,11 +8946,12 @@
         </p:nvPicPr>
         <p:blipFill>
           <a:blip r:embed="rId1"/>
+          <a:stretch/>
         </p:blipFill>
         <p:spPr>
           <a:xfrm>
             <a:off x="0" y="720"/>
-            <a:ext cx="10080360" cy="5670000"/>
+            <a:ext cx="10080000" cy="5669640"/>
           </a:xfrm>
           <a:prstGeom prst="rect">
             <a:avLst/>
@@ -9049,7 +8970,7 @@
         <p:spPr>
           <a:xfrm>
             <a:off x="504000" y="1326600"/>
-            <a:ext cx="9066960" cy="3283560"/>
+            <a:ext cx="9066600" cy="3283200"/>
           </a:xfrm>
           <a:prstGeom prst="rect">
             <a:avLst/>
@@ -9278,11 +9199,12 @@
         </p:nvPicPr>
         <p:blipFill>
           <a:blip r:embed="rId1"/>
+          <a:stretch/>
         </p:blipFill>
         <p:spPr>
           <a:xfrm>
             <a:off x="0" y="0"/>
-            <a:ext cx="10076760" cy="5666400"/>
+            <a:ext cx="10076400" cy="5666040"/>
           </a:xfrm>
           <a:prstGeom prst="rect">
             <a:avLst/>
@@ -9301,7 +9223,7 @@
         <p:spPr>
           <a:xfrm>
             <a:off x="504000" y="226080"/>
-            <a:ext cx="9066240" cy="941040"/>
+            <a:ext cx="9065880" cy="940680"/>
           </a:xfrm>
           <a:prstGeom prst="rect">
             <a:avLst/>
@@ -9327,7 +9249,7 @@
         <p:spPr>
           <a:xfrm>
             <a:off x="504000" y="1326600"/>
-            <a:ext cx="9066240" cy="3282840"/>
+            <a:ext cx="9065880" cy="3282480"/>
           </a:xfrm>
           <a:prstGeom prst="rect">
             <a:avLst/>
@@ -9455,11 +9377,12 @@
         </p:nvPicPr>
         <p:blipFill>
           <a:blip r:embed="rId2"/>
+          <a:stretch/>
         </p:blipFill>
         <p:spPr>
           <a:xfrm>
             <a:off x="685800" y="1906560"/>
-            <a:ext cx="8686800" cy="2070000"/>
+            <a:ext cx="8686440" cy="2069640"/>
           </a:xfrm>
           <a:prstGeom prst="rect">
             <a:avLst/>
@@ -9507,11 +9430,12 @@
         </p:nvPicPr>
         <p:blipFill>
           <a:blip r:embed="rId1"/>
+          <a:stretch/>
         </p:blipFill>
         <p:spPr>
           <a:xfrm>
             <a:off x="1440" y="0"/>
-            <a:ext cx="10076760" cy="5666400"/>
+            <a:ext cx="10076400" cy="5666040"/>
           </a:xfrm>
           <a:prstGeom prst="rect">
             <a:avLst/>
@@ -9530,7 +9454,7 @@
         <p:spPr>
           <a:xfrm>
             <a:off x="504000" y="226080"/>
-            <a:ext cx="9066240" cy="941040"/>
+            <a:ext cx="9065880" cy="940680"/>
           </a:xfrm>
           <a:prstGeom prst="rect">
             <a:avLst/>
@@ -9556,7 +9480,7 @@
         <p:spPr>
           <a:xfrm>
             <a:off x="504000" y="1326600"/>
-            <a:ext cx="9066960" cy="3283560"/>
+            <a:ext cx="9066600" cy="3283200"/>
           </a:xfrm>
           <a:prstGeom prst="rect">
             <a:avLst/>
@@ -9637,11 +9561,12 @@
         </p:nvPicPr>
         <p:blipFill>
           <a:blip r:embed="rId2"/>
+          <a:stretch/>
         </p:blipFill>
         <p:spPr>
           <a:xfrm>
             <a:off x="2971800" y="1371600"/>
-            <a:ext cx="4057920" cy="3508920"/>
+            <a:ext cx="4057560" cy="3508560"/>
           </a:xfrm>
           <a:prstGeom prst="rect">
             <a:avLst/>
@@ -9689,11 +9614,12 @@
         </p:nvPicPr>
         <p:blipFill>
           <a:blip r:embed="rId1"/>
+          <a:stretch/>
         </p:blipFill>
         <p:spPr>
           <a:xfrm>
             <a:off x="0" y="360"/>
-            <a:ext cx="10076760" cy="5666400"/>
+            <a:ext cx="10076400" cy="5666040"/>
           </a:xfrm>
           <a:prstGeom prst="rect">
             <a:avLst/>
@@ -9712,7 +9638,7 @@
         <p:spPr>
           <a:xfrm>
             <a:off x="504000" y="226080"/>
-            <a:ext cx="9066240" cy="941040"/>
+            <a:ext cx="9065880" cy="940680"/>
           </a:xfrm>
           <a:prstGeom prst="rect">
             <a:avLst/>
@@ -9738,7 +9664,7 @@
         <p:spPr>
           <a:xfrm>
             <a:off x="504000" y="1326600"/>
-            <a:ext cx="9066240" cy="3282840"/>
+            <a:ext cx="9065880" cy="3282480"/>
           </a:xfrm>
           <a:prstGeom prst="rect">
             <a:avLst/>
@@ -9892,11 +9818,12 @@
         </p:nvPicPr>
         <p:blipFill>
           <a:blip r:embed="rId1"/>
+          <a:stretch/>
         </p:blipFill>
         <p:spPr>
           <a:xfrm>
             <a:off x="0" y="0"/>
-            <a:ext cx="10076760" cy="5666400"/>
+            <a:ext cx="10076400" cy="5666040"/>
           </a:xfrm>
           <a:prstGeom prst="rect">
             <a:avLst/>
@@ -9915,7 +9842,7 @@
         <p:spPr>
           <a:xfrm>
             <a:off x="504000" y="226080"/>
-            <a:ext cx="9066240" cy="941040"/>
+            <a:ext cx="9065880" cy="940680"/>
           </a:xfrm>
           <a:prstGeom prst="rect">
             <a:avLst/>
@@ -9941,7 +9868,7 @@
         <p:spPr>
           <a:xfrm>
             <a:off x="504000" y="1326600"/>
-            <a:ext cx="9066240" cy="3282840"/>
+            <a:ext cx="9065880" cy="3282480"/>
           </a:xfrm>
           <a:prstGeom prst="rect">
             <a:avLst/>
@@ -10020,7 +9947,7 @@
         <p:spPr>
           <a:xfrm>
             <a:off x="504000" y="4343400"/>
-            <a:ext cx="9323280" cy="316800"/>
+            <a:ext cx="9322920" cy="316440"/>
           </a:xfrm>
           <a:prstGeom prst="rect">
             <a:avLst/>
@@ -10101,11 +10028,12 @@
         </p:nvPicPr>
         <p:blipFill>
           <a:blip r:embed="rId1"/>
+          <a:stretch/>
         </p:blipFill>
         <p:spPr>
           <a:xfrm>
             <a:off x="0" y="0"/>
-            <a:ext cx="10076760" cy="5666400"/>
+            <a:ext cx="10076400" cy="5666040"/>
           </a:xfrm>
           <a:prstGeom prst="rect">
             <a:avLst/>
@@ -10124,7 +10052,7 @@
         <p:spPr>
           <a:xfrm>
             <a:off x="504000" y="226080"/>
-            <a:ext cx="9066240" cy="941040"/>
+            <a:ext cx="9065880" cy="940680"/>
           </a:xfrm>
           <a:prstGeom prst="rect">
             <a:avLst/>
@@ -10150,7 +10078,7 @@
         <p:spPr>
           <a:xfrm>
             <a:off x="504000" y="1326600"/>
-            <a:ext cx="9066240" cy="3282840"/>
+            <a:ext cx="9065880" cy="3282480"/>
           </a:xfrm>
           <a:prstGeom prst="rect">
             <a:avLst/>
@@ -10384,11 +10312,12 @@
         </p:nvPicPr>
         <p:blipFill>
           <a:blip r:embed="rId1"/>
+          <a:stretch/>
         </p:blipFill>
         <p:spPr>
           <a:xfrm>
             <a:off x="0" y="360"/>
-            <a:ext cx="10076760" cy="5666400"/>
+            <a:ext cx="10076400" cy="5666040"/>
           </a:xfrm>
           <a:prstGeom prst="rect">
             <a:avLst/>
@@ -10407,7 +10336,7 @@
         <p:spPr>
           <a:xfrm>
             <a:off x="504000" y="226080"/>
-            <a:ext cx="9066240" cy="941040"/>
+            <a:ext cx="9065880" cy="940680"/>
           </a:xfrm>
           <a:prstGeom prst="rect">
             <a:avLst/>
@@ -10433,7 +10362,7 @@
         <p:spPr>
           <a:xfrm>
             <a:off x="504000" y="1326600"/>
-            <a:ext cx="9066240" cy="3282840"/>
+            <a:ext cx="9065880" cy="3282480"/>
           </a:xfrm>
           <a:prstGeom prst="rect">
             <a:avLst/>
@@ -10526,7 +10455,7 @@
         <p:spPr>
           <a:xfrm>
             <a:off x="2057400" y="4021920"/>
-            <a:ext cx="5940000" cy="546480"/>
+            <a:ext cx="5939640" cy="546120"/>
           </a:xfrm>
           <a:prstGeom prst="rect">
             <a:avLst/>

</xml_diff>

<commit_message>
Finalize InfluxDB and progress on neo4j
</commit_message>
<xml_diff>
--- a/presentation/presentation.pptx
+++ b/presentation/presentation.pptx
@@ -1630,7 +1630,61 @@
               <a:rPr b="0" lang="en-US" sz="4400" spc="-1" strike="noStrike">
                 <a:latin typeface="Arial"/>
               </a:rPr>
-              <a:t>Click to edit the title text format</a:t>
+              <a:t>Cli</a:t>
+            </a:r>
+            <a:r>
+              <a:rPr b="0" lang="en-US" sz="4400" spc="-1" strike="noStrike">
+                <a:latin typeface="Arial"/>
+              </a:rPr>
+              <a:t>ck </a:t>
+            </a:r>
+            <a:r>
+              <a:rPr b="0" lang="en-US" sz="4400" spc="-1" strike="noStrike">
+                <a:latin typeface="Arial"/>
+              </a:rPr>
+              <a:t>to </a:t>
+            </a:r>
+            <a:r>
+              <a:rPr b="0" lang="en-US" sz="4400" spc="-1" strike="noStrike">
+                <a:latin typeface="Arial"/>
+              </a:rPr>
+              <a:t>edit </a:t>
+            </a:r>
+            <a:r>
+              <a:rPr b="0" lang="en-US" sz="4400" spc="-1" strike="noStrike">
+                <a:latin typeface="Arial"/>
+              </a:rPr>
+              <a:t>the </a:t>
+            </a:r>
+            <a:r>
+              <a:rPr b="0" lang="en-US" sz="4400" spc="-1" strike="noStrike">
+                <a:latin typeface="Arial"/>
+              </a:rPr>
+              <a:t>title </a:t>
+            </a:r>
+            <a:r>
+              <a:rPr b="0" lang="en-US" sz="4400" spc="-1" strike="noStrike">
+                <a:latin typeface="Arial"/>
+              </a:rPr>
+              <a:t>text </a:t>
+            </a:r>
+            <a:r>
+              <a:rPr b="0" lang="en-US" sz="4400" spc="-1" strike="noStrike">
+                <a:latin typeface="Arial"/>
+              </a:rPr>
+              <a:t>for</a:t>
+            </a:r>
+            <a:r>
+              <a:rPr b="0" lang="en-US" sz="4400" spc="-1" strike="noStrike">
+                <a:latin typeface="Arial"/>
+              </a:rPr>
+              <a:t>ma</a:t>
+            </a:r>
+            <a:r>
+              <a:rPr b="0" lang="en-US" sz="4400" spc="-1" strike="noStrike">
+                <a:latin typeface="Arial"/>
+              </a:rPr>
+              <a:t>t</a:t>
             </a:r>
             <a:endParaRPr b="0" lang="en-US" sz="4400" spc="-1" strike="noStrike">
               <a:latin typeface="Arial"/>
@@ -1867,7 +1921,7 @@
         <p:spPr>
           <a:xfrm>
             <a:off x="503640" y="225720"/>
-            <a:ext cx="9060120" cy="938160"/>
+            <a:ext cx="9059760" cy="937800"/>
           </a:xfrm>
           <a:prstGeom prst="rect">
             <a:avLst/>
@@ -1926,7 +1980,7 @@
         <p:spPr>
           <a:xfrm>
             <a:off x="503640" y="1326240"/>
-            <a:ext cx="9060120" cy="3279600"/>
+            <a:ext cx="9059760" cy="3279240"/>
           </a:xfrm>
           <a:prstGeom prst="rect">
             <a:avLst/>
@@ -2089,7 +2143,7 @@
         <p:spPr>
           <a:xfrm>
             <a:off x="503640" y="225720"/>
-            <a:ext cx="9060120" cy="938160"/>
+            <a:ext cx="9059760" cy="937800"/>
           </a:xfrm>
           <a:prstGeom prst="rect">
             <a:avLst/>
@@ -2115,7 +2169,7 @@
         <p:spPr>
           <a:xfrm>
             <a:off x="503640" y="1326240"/>
-            <a:ext cx="9060120" cy="3279600"/>
+            <a:ext cx="9059760" cy="3279240"/>
           </a:xfrm>
           <a:prstGeom prst="rect">
             <a:avLst/>
@@ -2244,7 +2298,7 @@
         <p:spPr>
           <a:xfrm>
             <a:off x="503640" y="1326240"/>
-            <a:ext cx="9060840" cy="3280320"/>
+            <a:ext cx="9060480" cy="3279960"/>
           </a:xfrm>
           <a:prstGeom prst="rect">
             <a:avLst/>
@@ -2365,7 +2419,7 @@
         <p:spPr>
           <a:xfrm>
             <a:off x="503640" y="225720"/>
-            <a:ext cx="9060120" cy="938160"/>
+            <a:ext cx="9059760" cy="937800"/>
           </a:xfrm>
           <a:prstGeom prst="rect">
             <a:avLst/>
@@ -2391,7 +2445,7 @@
         <p:spPr>
           <a:xfrm>
             <a:off x="503640" y="1326240"/>
-            <a:ext cx="9060120" cy="3279600"/>
+            <a:ext cx="9059760" cy="3279240"/>
           </a:xfrm>
           <a:prstGeom prst="rect">
             <a:avLst/>
@@ -2417,7 +2471,7 @@
         <p:spPr>
           <a:xfrm>
             <a:off x="1646280" y="4341960"/>
-            <a:ext cx="7262280" cy="314280"/>
+            <a:ext cx="7261920" cy="313920"/>
           </a:xfrm>
           <a:prstGeom prst="rect">
             <a:avLst/>
@@ -2476,7 +2530,7 @@
         <p:spPr>
           <a:xfrm>
             <a:off x="5901840" y="1740600"/>
-            <a:ext cx="3182040" cy="545040"/>
+            <a:ext cx="3181680" cy="544680"/>
           </a:xfrm>
           <a:prstGeom prst="rect">
             <a:avLst/>
@@ -2532,7 +2586,7 @@
         <p:spPr>
           <a:xfrm>
             <a:off x="4741560" y="2611440"/>
-            <a:ext cx="5082480" cy="2913840"/>
+            <a:ext cx="5082120" cy="2913480"/>
           </a:xfrm>
           <a:prstGeom prst="rect">
             <a:avLst/>
@@ -2555,7 +2609,7 @@
         <p:spPr>
           <a:xfrm>
             <a:off x="228240" y="2611440"/>
-            <a:ext cx="4545720" cy="2910960"/>
+            <a:ext cx="4545360" cy="2910600"/>
           </a:xfrm>
           <a:prstGeom prst="rect">
             <a:avLst/>
@@ -2574,7 +2628,7 @@
         <p:spPr>
           <a:xfrm>
             <a:off x="774360" y="1740600"/>
-            <a:ext cx="3340080" cy="545040"/>
+            <a:ext cx="3339720" cy="544680"/>
           </a:xfrm>
           <a:prstGeom prst="rect">
             <a:avLst/>
@@ -2674,7 +2728,7 @@
         <p:spPr>
           <a:xfrm>
             <a:off x="503640" y="1371240"/>
-            <a:ext cx="9060840" cy="3280320"/>
+            <a:ext cx="9060480" cy="3279960"/>
           </a:xfrm>
           <a:prstGeom prst="rect">
             <a:avLst/>
@@ -2916,7 +2970,7 @@
         <p:spPr>
           <a:xfrm>
             <a:off x="685440" y="2056680"/>
-            <a:ext cx="3197880" cy="3426840"/>
+            <a:ext cx="3197520" cy="3426480"/>
           </a:xfrm>
           <a:prstGeom prst="rect">
             <a:avLst/>
@@ -2939,7 +2993,7 @@
         <p:spPr>
           <a:xfrm>
             <a:off x="4114800" y="2056680"/>
-            <a:ext cx="5485680" cy="3429000"/>
+            <a:ext cx="5485320" cy="3428640"/>
           </a:xfrm>
           <a:prstGeom prst="rect">
             <a:avLst/>
@@ -3000,7 +3054,7 @@
         <p:spPr>
           <a:xfrm>
             <a:off x="685440" y="2056680"/>
-            <a:ext cx="3197880" cy="3426840"/>
+            <a:ext cx="3197520" cy="3426480"/>
           </a:xfrm>
           <a:prstGeom prst="rect">
             <a:avLst/>
@@ -3019,7 +3073,7 @@
         <p:spPr>
           <a:xfrm>
             <a:off x="4114800" y="2056680"/>
-            <a:ext cx="5482800" cy="3426840"/>
+            <a:ext cx="5482440" cy="3426480"/>
           </a:xfrm>
           <a:prstGeom prst="rect">
             <a:avLst/>
@@ -3087,7 +3141,7 @@
         <p:spPr>
           <a:xfrm>
             <a:off x="503640" y="1326240"/>
-            <a:ext cx="9060840" cy="3280320"/>
+            <a:ext cx="9060480" cy="3279960"/>
           </a:xfrm>
           <a:prstGeom prst="rect">
             <a:avLst/>
@@ -3311,7 +3365,7 @@
         <p:spPr>
           <a:xfrm>
             <a:off x="510480" y="834120"/>
-            <a:ext cx="9060840" cy="3280320"/>
+            <a:ext cx="9060480" cy="3279960"/>
           </a:xfrm>
           <a:prstGeom prst="rect">
             <a:avLst/>
@@ -3420,7 +3474,7 @@
         <p:spPr>
           <a:xfrm>
             <a:off x="2743200" y="2514600"/>
-            <a:ext cx="4618800" cy="2895840"/>
+            <a:ext cx="4618440" cy="2895480"/>
           </a:xfrm>
           <a:prstGeom prst="rect">
             <a:avLst/>
@@ -3477,7 +3531,7 @@
         <p:spPr>
           <a:xfrm>
             <a:off x="503640" y="1326240"/>
-            <a:ext cx="9060840" cy="3280320"/>
+            <a:ext cx="9060480" cy="3279960"/>
           </a:xfrm>
           <a:prstGeom prst="rect">
             <a:avLst/>
@@ -3742,7 +3796,7 @@
         <p:spPr>
           <a:xfrm>
             <a:off x="503640" y="1326240"/>
-            <a:ext cx="9060840" cy="3280320"/>
+            <a:ext cx="9060480" cy="3279960"/>
           </a:xfrm>
           <a:prstGeom prst="rect">
             <a:avLst/>
@@ -3980,7 +4034,7 @@
         <p:spPr>
           <a:xfrm>
             <a:off x="503640" y="225720"/>
-            <a:ext cx="9060120" cy="938160"/>
+            <a:ext cx="9059760" cy="937800"/>
           </a:xfrm>
           <a:prstGeom prst="rect">
             <a:avLst/>
@@ -4039,7 +4093,7 @@
         <p:spPr>
           <a:xfrm>
             <a:off x="503640" y="1326240"/>
-            <a:ext cx="9060120" cy="3279600"/>
+            <a:ext cx="9059760" cy="3279240"/>
           </a:xfrm>
           <a:prstGeom prst="rect">
             <a:avLst/>
@@ -4207,7 +4261,7 @@
         <p:spPr>
           <a:xfrm>
             <a:off x="503640" y="225720"/>
-            <a:ext cx="9060120" cy="938160"/>
+            <a:ext cx="9059760" cy="937800"/>
           </a:xfrm>
           <a:prstGeom prst="rect">
             <a:avLst/>
@@ -4266,7 +4320,7 @@
         <p:spPr>
           <a:xfrm>
             <a:off x="503640" y="1326240"/>
-            <a:ext cx="9060120" cy="3279600"/>
+            <a:ext cx="9059760" cy="3279240"/>
           </a:xfrm>
           <a:prstGeom prst="rect">
             <a:avLst/>
@@ -4429,7 +4483,7 @@
         <p:spPr>
           <a:xfrm>
             <a:off x="503640" y="225720"/>
-            <a:ext cx="9060120" cy="938160"/>
+            <a:ext cx="9059760" cy="937800"/>
           </a:xfrm>
           <a:prstGeom prst="rect">
             <a:avLst/>
@@ -4455,7 +4509,7 @@
         <p:spPr>
           <a:xfrm>
             <a:off x="503640" y="1326240"/>
-            <a:ext cx="9060120" cy="3279600"/>
+            <a:ext cx="9059760" cy="3279240"/>
           </a:xfrm>
           <a:prstGeom prst="rect">
             <a:avLst/>
@@ -4632,7 +4686,7 @@
         <p:spPr>
           <a:xfrm>
             <a:off x="503640" y="225720"/>
-            <a:ext cx="9060120" cy="938160"/>
+            <a:ext cx="9059760" cy="937800"/>
           </a:xfrm>
           <a:prstGeom prst="rect">
             <a:avLst/>
@@ -4658,7 +4712,7 @@
         <p:spPr>
           <a:xfrm>
             <a:off x="503640" y="1326240"/>
-            <a:ext cx="9060120" cy="3279600"/>
+            <a:ext cx="9059760" cy="3279240"/>
           </a:xfrm>
           <a:prstGeom prst="rect">
             <a:avLst/>
@@ -4791,7 +4845,7 @@
         <p:spPr>
           <a:xfrm>
             <a:off x="3342240" y="1409040"/>
-            <a:ext cx="3515400" cy="3196800"/>
+            <a:ext cx="3515040" cy="3196440"/>
           </a:xfrm>
           <a:prstGeom prst="rect">
             <a:avLst/>
@@ -4848,7 +4902,7 @@
         <p:spPr>
           <a:xfrm>
             <a:off x="503640" y="225720"/>
-            <a:ext cx="9060120" cy="938160"/>
+            <a:ext cx="9059760" cy="937800"/>
           </a:xfrm>
           <a:prstGeom prst="rect">
             <a:avLst/>
@@ -4874,7 +4928,7 @@
         <p:spPr>
           <a:xfrm>
             <a:off x="503640" y="1326240"/>
-            <a:ext cx="9060120" cy="3279600"/>
+            <a:ext cx="9059760" cy="3279240"/>
           </a:xfrm>
           <a:prstGeom prst="rect">
             <a:avLst/>
@@ -5007,7 +5061,7 @@
         <p:spPr>
           <a:xfrm>
             <a:off x="685800" y="1562760"/>
-            <a:ext cx="8666640" cy="3466440"/>
+            <a:ext cx="8666280" cy="3466080"/>
           </a:xfrm>
           <a:prstGeom prst="rect">
             <a:avLst/>
@@ -5068,7 +5122,7 @@
         <p:spPr>
           <a:xfrm>
             <a:off x="685800" y="1563120"/>
-            <a:ext cx="8666640" cy="3466440"/>
+            <a:ext cx="8666280" cy="3466080"/>
           </a:xfrm>
           <a:prstGeom prst="rect">
             <a:avLst/>
@@ -5087,7 +5141,7 @@
         <p:spPr>
           <a:xfrm>
             <a:off x="503640" y="225720"/>
-            <a:ext cx="9060120" cy="938160"/>
+            <a:ext cx="9059760" cy="937800"/>
           </a:xfrm>
           <a:prstGeom prst="rect">
             <a:avLst/>
@@ -5113,7 +5167,7 @@
         <p:spPr>
           <a:xfrm>
             <a:off x="503640" y="1326240"/>
-            <a:ext cx="9060120" cy="3279600"/>
+            <a:ext cx="9059760" cy="3279240"/>
           </a:xfrm>
           <a:prstGeom prst="rect">
             <a:avLst/>
@@ -5242,7 +5296,7 @@
         <p:spPr>
           <a:xfrm>
             <a:off x="7772400" y="1600200"/>
-            <a:ext cx="914040" cy="456840"/>
+            <a:ext cx="913680" cy="456480"/>
           </a:xfrm>
           <a:prstGeom prst="wedgeRoundRectCallout">
             <a:avLst>
@@ -5302,7 +5356,7 @@
         <p:spPr>
           <a:xfrm>
             <a:off x="6400800" y="1600200"/>
-            <a:ext cx="914040" cy="456840"/>
+            <a:ext cx="913680" cy="456480"/>
           </a:xfrm>
           <a:prstGeom prst="wedgeRoundRectCallout">
             <a:avLst>
@@ -5400,7 +5454,7 @@
         <p:spPr>
           <a:xfrm>
             <a:off x="503640" y="225720"/>
-            <a:ext cx="9060120" cy="938160"/>
+            <a:ext cx="9059760" cy="937800"/>
           </a:xfrm>
           <a:prstGeom prst="rect">
             <a:avLst/>
@@ -5426,7 +5480,7 @@
         <p:spPr>
           <a:xfrm>
             <a:off x="503640" y="1326240"/>
-            <a:ext cx="9060120" cy="3279600"/>
+            <a:ext cx="9059760" cy="3279240"/>
           </a:xfrm>
           <a:prstGeom prst="rect">
             <a:avLst/>
@@ -5492,7 +5546,7 @@
                 <a:latin typeface="Arial"/>
                 <a:ea typeface="Microsoft YaHei"/>
               </a:rPr>
-              <a:t>Query Languages</a:t>
+              <a:t>Multiple query languages</a:t>
             </a:r>
             <a:endParaRPr b="0" lang="en-US" sz="3200" spc="-1" strike="noStrike">
               <a:latin typeface="Arial"/>
@@ -5589,7 +5643,7 @@
         <p:spPr>
           <a:xfrm>
             <a:off x="503640" y="225720"/>
-            <a:ext cx="9060120" cy="938160"/>
+            <a:ext cx="9059760" cy="937800"/>
           </a:xfrm>
           <a:prstGeom prst="rect">
             <a:avLst/>
@@ -5615,7 +5669,7 @@
         <p:spPr>
           <a:xfrm>
             <a:off x="457200" y="1600200"/>
-            <a:ext cx="9060120" cy="1176840"/>
+            <a:ext cx="9059760" cy="1176480"/>
           </a:xfrm>
           <a:prstGeom prst="rect">
             <a:avLst/>
@@ -5694,7 +5748,7 @@
         <p:spPr>
           <a:xfrm>
             <a:off x="503640" y="4341960"/>
-            <a:ext cx="9317160" cy="314280"/>
+            <a:ext cx="9316800" cy="313920"/>
           </a:xfrm>
           <a:prstGeom prst="rect">
             <a:avLst/>
@@ -5724,7 +5778,7 @@
         <p:spPr>
           <a:xfrm>
             <a:off x="1508760" y="3016800"/>
-            <a:ext cx="7177680" cy="2012040"/>
+            <a:ext cx="7177320" cy="2011680"/>
           </a:xfrm>
           <a:prstGeom prst="rect">
             <a:avLst/>
@@ -5781,7 +5835,7 @@
         <p:spPr>
           <a:xfrm>
             <a:off x="503640" y="225720"/>
-            <a:ext cx="9060120" cy="938160"/>
+            <a:ext cx="9059760" cy="937800"/>
           </a:xfrm>
           <a:prstGeom prst="rect">
             <a:avLst/>
@@ -5807,7 +5861,7 @@
         <p:spPr>
           <a:xfrm>
             <a:off x="540720" y="1728000"/>
-            <a:ext cx="9060120" cy="1014840"/>
+            <a:ext cx="9059760" cy="1014480"/>
           </a:xfrm>
           <a:prstGeom prst="rect">
             <a:avLst/>
@@ -5903,8 +5957,31 @@
         </p:blipFill>
         <p:spPr>
           <a:xfrm>
-            <a:off x="2071800" y="2743200"/>
-            <a:ext cx="5928840" cy="2540520"/>
+            <a:off x="137160" y="3173040"/>
+            <a:ext cx="4892040" cy="2313360"/>
+          </a:xfrm>
+          <a:prstGeom prst="rect">
+            <a:avLst/>
+          </a:prstGeom>
+          <a:ln w="0">
+            <a:noFill/>
+          </a:ln>
+        </p:spPr>
+      </p:pic>
+      <p:pic>
+        <p:nvPicPr>
+          <p:cNvPr id="109" name="" descr=""/>
+          <p:cNvPicPr/>
+          <p:nvPr/>
+        </p:nvPicPr>
+        <p:blipFill>
+          <a:blip r:embed="rId3"/>
+          <a:stretch/>
+        </p:blipFill>
+        <p:spPr>
+          <a:xfrm>
+            <a:off x="5029200" y="3173040"/>
+            <a:ext cx="4892040" cy="2313360"/>
           </a:xfrm>
           <a:prstGeom prst="rect">
             <a:avLst/>
@@ -5954,14 +6031,14 @@
       </p:grpSpPr>
       <p:sp>
         <p:nvSpPr>
-          <p:cNvPr id="109" name=""/>
+          <p:cNvPr id="110" name=""/>
           <p:cNvSpPr/>
           <p:nvPr/>
         </p:nvSpPr>
         <p:spPr>
           <a:xfrm>
             <a:off x="503640" y="225720"/>
-            <a:ext cx="9060120" cy="938160"/>
+            <a:ext cx="9059760" cy="937800"/>
           </a:xfrm>
           <a:prstGeom prst="rect">
             <a:avLst/>
@@ -5980,14 +6057,14 @@
       </p:sp>
       <p:sp>
         <p:nvSpPr>
-          <p:cNvPr id="110" name=""/>
+          <p:cNvPr id="111" name=""/>
           <p:cNvSpPr/>
           <p:nvPr/>
         </p:nvSpPr>
         <p:spPr>
           <a:xfrm>
             <a:off x="503640" y="1326240"/>
-            <a:ext cx="9060120" cy="3279600"/>
+            <a:ext cx="9059760" cy="3279240"/>
           </a:xfrm>
           <a:prstGeom prst="rect">
             <a:avLst/>
@@ -6018,33 +6095,30 @@
               </a:tabLst>
             </a:pPr>
             <a:r>
-              <a:rPr b="1" lang="en-US" sz="2000" spc="-1" strike="noStrike" u="sng">
+              <a:rPr b="1" lang="en-US" sz="2000" spc="-1" strike="noStrike">
                 <a:solidFill>
                   <a:srgbClr val="000000"/>
                 </a:solidFill>
-                <a:uFillTx/>
                 <a:latin typeface="Arial"/>
                 <a:ea typeface="Microsoft YaHei"/>
               </a:rPr>
               <a:t>Flux </a:t>
             </a:r>
             <a:r>
-              <a:rPr b="0" lang="en-US" sz="2000" spc="-1" strike="noStrike" u="sng">
+              <a:rPr b="0" lang="en-US" sz="2000" spc="-1" strike="noStrike">
                 <a:solidFill>
                   <a:srgbClr val="000000"/>
                 </a:solidFill>
-                <a:uFillTx/>
                 <a:latin typeface="Arial"/>
                 <a:ea typeface="Microsoft YaHei"/>
               </a:rPr>
               <a:t>has more functionality than </a:t>
             </a:r>
             <a:r>
-              <a:rPr b="1" lang="en-US" sz="2000" spc="-1" strike="noStrike" u="sng">
+              <a:rPr b="1" lang="en-US" sz="2000" spc="-1" strike="noStrike">
                 <a:solidFill>
                   <a:srgbClr val="000000"/>
                 </a:solidFill>
-                <a:uFillTx/>
                 <a:latin typeface="Arial"/>
                 <a:ea typeface="Microsoft YaHei"/>
               </a:rPr>
@@ -6177,14 +6251,14 @@
       </p:grpSpPr>
       <p:sp>
         <p:nvSpPr>
-          <p:cNvPr id="111" name=""/>
+          <p:cNvPr id="112" name=""/>
           <p:cNvSpPr/>
           <p:nvPr/>
         </p:nvSpPr>
         <p:spPr>
           <a:xfrm>
             <a:off x="503640" y="225720"/>
-            <a:ext cx="9060120" cy="938160"/>
+            <a:ext cx="9059760" cy="937800"/>
           </a:xfrm>
           <a:prstGeom prst="rect">
             <a:avLst/>
@@ -6203,14 +6277,14 @@
       </p:sp>
       <p:sp>
         <p:nvSpPr>
-          <p:cNvPr id="112" name=""/>
+          <p:cNvPr id="113" name=""/>
           <p:cNvSpPr/>
           <p:nvPr/>
         </p:nvSpPr>
         <p:spPr>
           <a:xfrm>
             <a:off x="503640" y="1326240"/>
-            <a:ext cx="9060840" cy="3280320"/>
+            <a:ext cx="9060480" cy="3279960"/>
           </a:xfrm>
           <a:prstGeom prst="rect">
             <a:avLst/>
@@ -6324,14 +6398,14 @@
       </p:grpSpPr>
       <p:sp>
         <p:nvSpPr>
-          <p:cNvPr id="113" name=""/>
+          <p:cNvPr id="114" name=""/>
           <p:cNvSpPr/>
           <p:nvPr/>
         </p:nvSpPr>
         <p:spPr>
           <a:xfrm>
             <a:off x="503640" y="1326240"/>
-            <a:ext cx="9060840" cy="3280320"/>
+            <a:ext cx="9060480" cy="3279960"/>
           </a:xfrm>
           <a:prstGeom prst="rect">
             <a:avLst/>
@@ -6588,7 +6662,7 @@
         <p:spPr>
           <a:xfrm>
             <a:off x="503640" y="225720"/>
-            <a:ext cx="9060120" cy="938160"/>
+            <a:ext cx="9059760" cy="937800"/>
           </a:xfrm>
           <a:prstGeom prst="rect">
             <a:avLst/>
@@ -6647,7 +6721,7 @@
         <p:spPr>
           <a:xfrm>
             <a:off x="503640" y="1326240"/>
-            <a:ext cx="9060120" cy="3279600"/>
+            <a:ext cx="9059760" cy="3279240"/>
           </a:xfrm>
           <a:prstGeom prst="rect">
             <a:avLst/>
@@ -6827,14 +6901,14 @@
       </p:grpSpPr>
       <p:sp>
         <p:nvSpPr>
-          <p:cNvPr id="114" name=""/>
+          <p:cNvPr id="115" name=""/>
           <p:cNvSpPr/>
           <p:nvPr/>
         </p:nvSpPr>
         <p:spPr>
           <a:xfrm>
             <a:off x="503640" y="1326240"/>
-            <a:ext cx="9060840" cy="3280320"/>
+            <a:ext cx="9060480" cy="3279960"/>
           </a:xfrm>
           <a:prstGeom prst="rect">
             <a:avLst/>
@@ -6892,7 +6966,7 @@
       </p:sp>
       <p:pic>
         <p:nvPicPr>
-          <p:cNvPr id="115" name="" descr=""/>
+          <p:cNvPr id="116" name="" descr=""/>
           <p:cNvPicPr/>
           <p:nvPr/>
         </p:nvPicPr>
@@ -6903,7 +6977,7 @@
         <p:spPr>
           <a:xfrm>
             <a:off x="3200400" y="685800"/>
-            <a:ext cx="3949560" cy="4514040"/>
+            <a:ext cx="3949200" cy="4513680"/>
           </a:xfrm>
           <a:prstGeom prst="rect">
             <a:avLst/>
@@ -6953,14 +7027,14 @@
       </p:grpSpPr>
       <p:sp>
         <p:nvSpPr>
-          <p:cNvPr id="116" name=""/>
+          <p:cNvPr id="117" name=""/>
           <p:cNvSpPr/>
           <p:nvPr/>
         </p:nvSpPr>
         <p:spPr>
           <a:xfrm>
             <a:off x="503640" y="225720"/>
-            <a:ext cx="9060120" cy="938160"/>
+            <a:ext cx="9059760" cy="937800"/>
           </a:xfrm>
           <a:prstGeom prst="rect">
             <a:avLst/>
@@ -6979,14 +7053,14 @@
       </p:sp>
       <p:sp>
         <p:nvSpPr>
-          <p:cNvPr id="117" name=""/>
+          <p:cNvPr id="118" name=""/>
           <p:cNvSpPr/>
           <p:nvPr/>
         </p:nvSpPr>
         <p:spPr>
           <a:xfrm>
             <a:off x="503640" y="1326240"/>
-            <a:ext cx="9060840" cy="3280320"/>
+            <a:ext cx="9060480" cy="3279960"/>
           </a:xfrm>
           <a:prstGeom prst="rect">
             <a:avLst/>
@@ -7271,14 +7345,14 @@
       </p:grpSpPr>
       <p:sp>
         <p:nvSpPr>
-          <p:cNvPr id="118" name=""/>
+          <p:cNvPr id="119" name=""/>
           <p:cNvSpPr/>
           <p:nvPr/>
         </p:nvSpPr>
         <p:spPr>
           <a:xfrm>
             <a:off x="503640" y="225720"/>
-            <a:ext cx="9060120" cy="938160"/>
+            <a:ext cx="9059760" cy="937800"/>
           </a:xfrm>
           <a:prstGeom prst="rect">
             <a:avLst/>
@@ -7297,14 +7371,14 @@
       </p:sp>
       <p:sp>
         <p:nvSpPr>
-          <p:cNvPr id="119" name=""/>
+          <p:cNvPr id="120" name=""/>
           <p:cNvSpPr/>
           <p:nvPr/>
         </p:nvSpPr>
         <p:spPr>
           <a:xfrm>
             <a:off x="503640" y="1326240"/>
-            <a:ext cx="9060840" cy="3280320"/>
+            <a:ext cx="9060480" cy="3279960"/>
           </a:xfrm>
           <a:prstGeom prst="rect">
             <a:avLst/>
@@ -7562,14 +7636,14 @@
       </p:grpSpPr>
       <p:sp>
         <p:nvSpPr>
-          <p:cNvPr id="120" name=""/>
+          <p:cNvPr id="121" name=""/>
           <p:cNvSpPr/>
           <p:nvPr/>
         </p:nvSpPr>
         <p:spPr>
           <a:xfrm>
             <a:off x="503640" y="225720"/>
-            <a:ext cx="9060120" cy="938160"/>
+            <a:ext cx="9059760" cy="937800"/>
           </a:xfrm>
           <a:prstGeom prst="rect">
             <a:avLst/>
@@ -7588,14 +7662,14 @@
       </p:sp>
       <p:sp>
         <p:nvSpPr>
-          <p:cNvPr id="121" name=""/>
+          <p:cNvPr id="122" name=""/>
           <p:cNvSpPr/>
           <p:nvPr/>
         </p:nvSpPr>
         <p:spPr>
           <a:xfrm>
             <a:off x="503640" y="1326240"/>
-            <a:ext cx="9060840" cy="3280320"/>
+            <a:ext cx="9060480" cy="3279960"/>
           </a:xfrm>
           <a:prstGeom prst="rect">
             <a:avLst/>
@@ -7728,14 +7802,14 @@
       </p:grpSpPr>
       <p:sp>
         <p:nvSpPr>
-          <p:cNvPr id="122" name=""/>
+          <p:cNvPr id="123" name=""/>
           <p:cNvSpPr/>
           <p:nvPr/>
         </p:nvSpPr>
         <p:spPr>
           <a:xfrm>
             <a:off x="503640" y="225720"/>
-            <a:ext cx="9060120" cy="938160"/>
+            <a:ext cx="9059760" cy="937800"/>
           </a:xfrm>
           <a:prstGeom prst="rect">
             <a:avLst/>
@@ -7787,14 +7861,14 @@
       </p:sp>
       <p:sp>
         <p:nvSpPr>
-          <p:cNvPr id="123" name=""/>
+          <p:cNvPr id="124" name=""/>
           <p:cNvSpPr/>
           <p:nvPr/>
         </p:nvSpPr>
         <p:spPr>
           <a:xfrm>
             <a:off x="503640" y="1326240"/>
-            <a:ext cx="9060120" cy="3279600"/>
+            <a:ext cx="9059760" cy="3279240"/>
           </a:xfrm>
           <a:prstGeom prst="rect">
             <a:avLst/>
@@ -7963,14 +8037,14 @@
       </p:grpSpPr>
       <p:sp>
         <p:nvSpPr>
-          <p:cNvPr id="124" name=""/>
+          <p:cNvPr id="125" name=""/>
           <p:cNvSpPr/>
           <p:nvPr/>
         </p:nvSpPr>
         <p:spPr>
           <a:xfrm>
             <a:off x="503640" y="225720"/>
-            <a:ext cx="9060120" cy="938160"/>
+            <a:ext cx="9059760" cy="937800"/>
           </a:xfrm>
           <a:prstGeom prst="rect">
             <a:avLst/>
@@ -7989,14 +8063,14 @@
       </p:sp>
       <p:sp>
         <p:nvSpPr>
-          <p:cNvPr id="125" name=""/>
+          <p:cNvPr id="126" name=""/>
           <p:cNvSpPr/>
           <p:nvPr/>
         </p:nvSpPr>
         <p:spPr>
           <a:xfrm>
             <a:off x="503640" y="1326240"/>
-            <a:ext cx="9060120" cy="3279600"/>
+            <a:ext cx="9059760" cy="3279240"/>
           </a:xfrm>
           <a:prstGeom prst="rect">
             <a:avLst/>
@@ -8166,14 +8240,14 @@
       </p:grpSpPr>
       <p:sp>
         <p:nvSpPr>
-          <p:cNvPr id="126" name=""/>
+          <p:cNvPr id="127" name=""/>
           <p:cNvSpPr/>
           <p:nvPr/>
         </p:nvSpPr>
         <p:spPr>
           <a:xfrm>
             <a:off x="503640" y="225720"/>
-            <a:ext cx="9060120" cy="938160"/>
+            <a:ext cx="9059760" cy="937800"/>
           </a:xfrm>
           <a:prstGeom prst="rect">
             <a:avLst/>
@@ -8192,14 +8266,14 @@
       </p:sp>
       <p:sp>
         <p:nvSpPr>
-          <p:cNvPr id="127" name=""/>
+          <p:cNvPr id="128" name=""/>
           <p:cNvSpPr/>
           <p:nvPr/>
         </p:nvSpPr>
         <p:spPr>
           <a:xfrm>
             <a:off x="503640" y="1326240"/>
-            <a:ext cx="9060120" cy="3279600"/>
+            <a:ext cx="9059760" cy="3279240"/>
           </a:xfrm>
           <a:prstGeom prst="rect">
             <a:avLst/>
@@ -8321,7 +8395,7 @@
       </p:sp>
       <p:pic>
         <p:nvPicPr>
-          <p:cNvPr id="128" name="" descr=""/>
+          <p:cNvPr id="129" name="" descr=""/>
           <p:cNvPicPr/>
           <p:nvPr/>
         </p:nvPicPr>
@@ -8332,7 +8406,7 @@
         <p:spPr>
           <a:xfrm>
             <a:off x="2284920" y="2056680"/>
-            <a:ext cx="2386440" cy="2054160"/>
+            <a:ext cx="2386080" cy="2053800"/>
           </a:xfrm>
           <a:prstGeom prst="rect">
             <a:avLst/>
@@ -8344,7 +8418,7 @@
       </p:pic>
       <p:pic>
         <p:nvPicPr>
-          <p:cNvPr id="129" name="" descr=""/>
+          <p:cNvPr id="130" name="" descr=""/>
           <p:cNvPicPr/>
           <p:nvPr/>
         </p:nvPicPr>
@@ -8355,7 +8429,7 @@
         <p:spPr>
           <a:xfrm>
             <a:off x="5379840" y="2056680"/>
-            <a:ext cx="2386440" cy="2054160"/>
+            <a:ext cx="2386080" cy="2053800"/>
           </a:xfrm>
           <a:prstGeom prst="rect">
             <a:avLst/>
@@ -8405,14 +8479,14 @@
       </p:grpSpPr>
       <p:sp>
         <p:nvSpPr>
-          <p:cNvPr id="130" name=""/>
+          <p:cNvPr id="131" name=""/>
           <p:cNvSpPr/>
           <p:nvPr/>
         </p:nvSpPr>
         <p:spPr>
           <a:xfrm>
             <a:off x="503640" y="225720"/>
-            <a:ext cx="9060120" cy="938160"/>
+            <a:ext cx="9059760" cy="937800"/>
           </a:xfrm>
           <a:prstGeom prst="rect">
             <a:avLst/>
@@ -8431,14 +8505,14 @@
       </p:sp>
       <p:sp>
         <p:nvSpPr>
-          <p:cNvPr id="131" name=""/>
+          <p:cNvPr id="132" name=""/>
           <p:cNvSpPr/>
           <p:nvPr/>
         </p:nvSpPr>
         <p:spPr>
           <a:xfrm>
             <a:off x="503640" y="1326240"/>
-            <a:ext cx="9060120" cy="3279600"/>
+            <a:ext cx="9059760" cy="3279240"/>
           </a:xfrm>
           <a:prstGeom prst="rect">
             <a:avLst/>
@@ -8560,7 +8634,7 @@
       </p:sp>
       <p:pic>
         <p:nvPicPr>
-          <p:cNvPr id="132" name="" descr=""/>
+          <p:cNvPr id="133" name="" descr=""/>
           <p:cNvPicPr/>
           <p:nvPr/>
         </p:nvPicPr>
@@ -8570,8 +8644,8 @@
         </p:blipFill>
         <p:spPr>
           <a:xfrm>
-            <a:off x="1828080" y="1888200"/>
-            <a:ext cx="6375960" cy="2139120"/>
+            <a:off x="2971800" y="692280"/>
+            <a:ext cx="4440600" cy="4336920"/>
           </a:xfrm>
           <a:prstGeom prst="rect">
             <a:avLst/>
@@ -8621,14 +8695,14 @@
       </p:grpSpPr>
       <p:sp>
         <p:nvSpPr>
-          <p:cNvPr id="133" name=""/>
+          <p:cNvPr id="134" name=""/>
           <p:cNvSpPr/>
           <p:nvPr/>
         </p:nvSpPr>
         <p:spPr>
           <a:xfrm>
             <a:off x="503640" y="225720"/>
-            <a:ext cx="9060120" cy="938160"/>
+            <a:ext cx="9059760" cy="937800"/>
           </a:xfrm>
           <a:prstGeom prst="rect">
             <a:avLst/>
@@ -8647,14 +8721,14 @@
       </p:sp>
       <p:sp>
         <p:nvSpPr>
-          <p:cNvPr id="134" name=""/>
+          <p:cNvPr id="135" name=""/>
           <p:cNvSpPr/>
           <p:nvPr/>
         </p:nvSpPr>
         <p:spPr>
           <a:xfrm>
-            <a:off x="503640" y="1326240"/>
-            <a:ext cx="9060840" cy="3280320"/>
+            <a:off x="431640" y="685800"/>
+            <a:ext cx="9059760" cy="3279240"/>
           </a:xfrm>
           <a:prstGeom prst="rect">
             <a:avLst/>
@@ -8671,57 +8745,30 @@
           <a:fontRef idx="minor"/>
         </p:style>
         <p:txBody>
-          <a:bodyPr lIns="0" rIns="0" tIns="0" bIns="0" anchor="t">
-            <a:normAutofit/>
+          <a:bodyPr lIns="0" rIns="0" tIns="0" bIns="0" anchor="ctr">
+            <a:noAutofit/>
           </a:bodyPr>
           <a:p>
-            <a:pPr>
-              <a:lnSpc>
-                <a:spcPct val="100000"/>
-              </a:lnSpc>
-              <a:spcBef>
-                <a:spcPts val="1417"/>
-              </a:spcBef>
-              <a:buNone/>
-              <a:tabLst>
-                <a:tab algn="l" pos="408240"/>
-              </a:tabLst>
-            </a:pPr>
-            <a:endParaRPr b="0" lang="en-US" sz="1800" spc="-1" strike="noStrike">
-              <a:latin typeface="Arial"/>
-            </a:endParaRPr>
-          </a:p>
-          <a:p>
-            <a:pPr algn="ctr">
-              <a:lnSpc>
-                <a:spcPct val="100000"/>
-              </a:lnSpc>
-              <a:spcBef>
-                <a:spcPts val="1417"/>
-              </a:spcBef>
-              <a:buNone/>
-              <a:tabLst>
-                <a:tab algn="l" pos="408240"/>
-              </a:tabLst>
-            </a:pPr>
-            <a:endParaRPr b="0" lang="en-US" sz="1800" spc="-1" strike="noStrike">
-              <a:latin typeface="Arial"/>
-            </a:endParaRPr>
-          </a:p>
-          <a:p>
-            <a:pPr algn="ctr">
-              <a:lnSpc>
-                <a:spcPct val="100000"/>
-              </a:lnSpc>
-              <a:spcBef>
-                <a:spcPts val="1417"/>
-              </a:spcBef>
-              <a:buNone/>
-              <a:tabLst>
-                <a:tab algn="l" pos="408240"/>
-              </a:tabLst>
-            </a:pPr>
-            <a:endParaRPr b="0" lang="en-US" sz="1800" spc="-1" strike="noStrike">
+            <a:pPr algn="ctr">
+              <a:lnSpc>
+                <a:spcPct val="100000"/>
+              </a:lnSpc>
+              <a:buNone/>
+              <a:tabLst>
+                <a:tab algn="l" pos="408240"/>
+              </a:tabLst>
+            </a:pPr>
+            <a:r>
+              <a:rPr b="1" lang="en-US" sz="3200" spc="-1" strike="noStrike">
+                <a:solidFill>
+                  <a:srgbClr val="000000"/>
+                </a:solidFill>
+                <a:latin typeface="Arial"/>
+                <a:ea typeface="Microsoft YaHei"/>
+              </a:rPr>
+              <a:t>Cypher </a:t>
+            </a:r>
+            <a:endParaRPr b="0" lang="en-US" sz="3200" spc="-1" strike="noStrike">
               <a:latin typeface="Arial"/>
             </a:endParaRPr>
           </a:p>
@@ -8729,7 +8776,7 @@
       </p:sp>
       <p:pic>
         <p:nvPicPr>
-          <p:cNvPr id="135" name="" descr=""/>
+          <p:cNvPr id="136" name="" descr=""/>
           <p:cNvPicPr/>
           <p:nvPr/>
         </p:nvPicPr>
@@ -8739,31 +8786,8 @@
         </p:blipFill>
         <p:spPr>
           <a:xfrm>
-            <a:off x="5378760" y="1568160"/>
-            <a:ext cx="3301560" cy="3038040"/>
-          </a:xfrm>
-          <a:prstGeom prst="rect">
-            <a:avLst/>
-          </a:prstGeom>
-          <a:ln w="0">
-            <a:noFill/>
-          </a:ln>
-        </p:spPr>
-      </p:pic>
-      <p:pic>
-        <p:nvPicPr>
-          <p:cNvPr id="136" name="" descr=""/>
-          <p:cNvPicPr/>
-          <p:nvPr/>
-        </p:nvPicPr>
-        <p:blipFill>
-          <a:blip r:embed="rId3"/>
-          <a:stretch/>
-        </p:blipFill>
-        <p:spPr>
-          <a:xfrm>
-            <a:off x="1370880" y="1599480"/>
-            <a:ext cx="3440520" cy="2989440"/>
+            <a:off x="1600200" y="2915280"/>
+            <a:ext cx="6629400" cy="2342520"/>
           </a:xfrm>
           <a:prstGeom prst="rect">
             <a:avLst/>
@@ -8820,7 +8844,7 @@
         <p:spPr>
           <a:xfrm>
             <a:off x="503640" y="225720"/>
-            <a:ext cx="9060120" cy="938160"/>
+            <a:ext cx="9059760" cy="937800"/>
           </a:xfrm>
           <a:prstGeom prst="rect">
             <a:avLst/>
@@ -8845,8 +8869,8 @@
         </p:nvSpPr>
         <p:spPr>
           <a:xfrm>
-            <a:off x="503640" y="1326240"/>
-            <a:ext cx="9060120" cy="3279600"/>
+            <a:off x="431640" y="685800"/>
+            <a:ext cx="9059760" cy="3279240"/>
           </a:xfrm>
           <a:prstGeom prst="rect">
             <a:avLst/>
@@ -8876,34 +8900,6 @@
                 <a:tab algn="l" pos="408240"/>
               </a:tabLst>
             </a:pPr>
-            <a:endParaRPr b="0" lang="en-US" sz="1800" spc="-1" strike="noStrike">
-              <a:latin typeface="Arial"/>
-            </a:endParaRPr>
-          </a:p>
-          <a:p>
-            <a:pPr algn="ctr">
-              <a:lnSpc>
-                <a:spcPct val="100000"/>
-              </a:lnSpc>
-              <a:buNone/>
-              <a:tabLst>
-                <a:tab algn="l" pos="408240"/>
-              </a:tabLst>
-            </a:pPr>
-            <a:endParaRPr b="0" lang="en-US" sz="1800" spc="-1" strike="noStrike">
-              <a:latin typeface="Arial"/>
-            </a:endParaRPr>
-          </a:p>
-          <a:p>
-            <a:pPr algn="ctr">
-              <a:lnSpc>
-                <a:spcPct val="100000"/>
-              </a:lnSpc>
-              <a:buNone/>
-              <a:tabLst>
-                <a:tab algn="l" pos="408240"/>
-              </a:tabLst>
-            </a:pPr>
             <a:r>
               <a:rPr b="1" lang="en-US" sz="3200" spc="-1" strike="noStrike">
                 <a:solidFill>
@@ -8912,51 +8908,272 @@
                 <a:latin typeface="Arial"/>
                 <a:ea typeface="Microsoft YaHei"/>
               </a:rPr>
-              <a:t>Query Language</a:t>
+              <a:t>Cypher </a:t>
             </a:r>
             <a:endParaRPr b="0" lang="en-US" sz="3200" spc="-1" strike="noStrike">
               <a:latin typeface="Arial"/>
             </a:endParaRPr>
           </a:p>
-          <a:p>
-            <a:pPr algn="ctr">
-              <a:lnSpc>
-                <a:spcPct val="100000"/>
-              </a:lnSpc>
-              <a:buNone/>
-              <a:tabLst>
-                <a:tab algn="l" pos="408240"/>
-              </a:tabLst>
-            </a:pPr>
-            <a:endParaRPr b="0" lang="en-US" sz="3200" spc="-1" strike="noStrike">
-              <a:latin typeface="Arial"/>
-            </a:endParaRPr>
-          </a:p>
-          <a:p>
-            <a:pPr algn="ctr">
-              <a:lnSpc>
-                <a:spcPct val="100000"/>
-              </a:lnSpc>
-              <a:buNone/>
-              <a:tabLst>
-                <a:tab algn="l" pos="408240"/>
-              </a:tabLst>
-            </a:pPr>
-            <a:endParaRPr b="0" lang="en-US" sz="3200" spc="-1" strike="noStrike">
-              <a:latin typeface="Arial"/>
-            </a:endParaRPr>
-          </a:p>
-          <a:p>
-            <a:pPr algn="ctr">
-              <a:lnSpc>
-                <a:spcPct val="100000"/>
-              </a:lnSpc>
-              <a:buNone/>
-              <a:tabLst>
-                <a:tab algn="l" pos="408240"/>
-              </a:tabLst>
-            </a:pPr>
-            <a:endParaRPr b="0" lang="en-US" sz="3200" spc="-1" strike="noStrike">
+        </p:txBody>
+      </p:sp>
+      <p:pic>
+        <p:nvPicPr>
+          <p:cNvPr id="139" name="" descr=""/>
+          <p:cNvPicPr/>
+          <p:nvPr/>
+        </p:nvPicPr>
+        <p:blipFill>
+          <a:blip r:embed="rId2"/>
+          <a:stretch/>
+        </p:blipFill>
+        <p:spPr>
+          <a:xfrm>
+            <a:off x="1600200" y="2915280"/>
+            <a:ext cx="6629400" cy="2342520"/>
+          </a:xfrm>
+          <a:prstGeom prst="rect">
+            <a:avLst/>
+          </a:prstGeom>
+          <a:ln w="0">
+            <a:noFill/>
+          </a:ln>
+        </p:spPr>
+      </p:pic>
+      <p:sp>
+        <p:nvSpPr>
+          <p:cNvPr id="140" name=""/>
+          <p:cNvSpPr/>
+          <p:nvPr/>
+        </p:nvSpPr>
+        <p:spPr>
+          <a:xfrm>
+            <a:off x="5943600" y="2971800"/>
+            <a:ext cx="1143000" cy="456480"/>
+          </a:xfrm>
+          <a:prstGeom prst="wedgeRoundRectCallout">
+            <a:avLst>
+              <a:gd name="adj1" fmla="val -68702"/>
+              <a:gd name="adj2" fmla="val 171985"/>
+              <a:gd name="adj3" fmla="val 16667"/>
+            </a:avLst>
+          </a:prstGeom>
+          <a:solidFill>
+            <a:srgbClr val="729fcf"/>
+          </a:solidFill>
+          <a:ln w="0">
+            <a:solidFill>
+              <a:srgbClr val="3465a4"/>
+            </a:solidFill>
+          </a:ln>
+        </p:spPr>
+        <p:style>
+          <a:lnRef idx="0"/>
+          <a:fillRef idx="0"/>
+          <a:effectRef idx="0"/>
+          <a:fontRef idx="minor"/>
+        </p:style>
+        <p:txBody>
+          <a:bodyPr lIns="90000" rIns="90000" tIns="45000" bIns="45000" anchor="ctr">
+            <a:noAutofit/>
+          </a:bodyPr>
+          <a:p>
+            <a:pPr algn="ctr">
+              <a:lnSpc>
+                <a:spcPct val="100000"/>
+              </a:lnSpc>
+              <a:buNone/>
+            </a:pPr>
+            <a:r>
+              <a:rPr b="0" lang="en-US" sz="1800" spc="-1" strike="noStrike">
+                <a:solidFill>
+                  <a:srgbClr val="000000"/>
+                </a:solidFill>
+                <a:latin typeface="Arial"/>
+                <a:ea typeface="DejaVu Sans"/>
+              </a:rPr>
+              <a:t>Relation</a:t>
+            </a:r>
+            <a:endParaRPr b="0" lang="en-US" sz="1800" spc="-1" strike="noStrike">
+              <a:latin typeface="Arial"/>
+            </a:endParaRPr>
+          </a:p>
+        </p:txBody>
+      </p:sp>
+      <p:sp>
+        <p:nvSpPr>
+          <p:cNvPr id="141" name=""/>
+          <p:cNvSpPr/>
+          <p:nvPr/>
+        </p:nvSpPr>
+        <p:spPr>
+          <a:xfrm>
+            <a:off x="3429000" y="2971800"/>
+            <a:ext cx="914400" cy="456480"/>
+          </a:xfrm>
+          <a:prstGeom prst="wedgeRoundRectCallout">
+            <a:avLst>
+              <a:gd name="adj1" fmla="val -62829"/>
+              <a:gd name="adj2" fmla="val 176792"/>
+              <a:gd name="adj3" fmla="val 16667"/>
+            </a:avLst>
+          </a:prstGeom>
+          <a:solidFill>
+            <a:srgbClr val="729fcf"/>
+          </a:solidFill>
+          <a:ln w="0">
+            <a:solidFill>
+              <a:srgbClr val="3465a4"/>
+            </a:solidFill>
+          </a:ln>
+        </p:spPr>
+        <p:style>
+          <a:lnRef idx="0"/>
+          <a:fillRef idx="0"/>
+          <a:effectRef idx="0"/>
+          <a:fontRef idx="minor"/>
+        </p:style>
+        <p:txBody>
+          <a:bodyPr lIns="90000" rIns="90000" tIns="45000" bIns="45000" anchor="ctr">
+            <a:noAutofit/>
+          </a:bodyPr>
+          <a:p>
+            <a:pPr algn="ctr">
+              <a:lnSpc>
+                <a:spcPct val="100000"/>
+              </a:lnSpc>
+              <a:buNone/>
+            </a:pPr>
+            <a:r>
+              <a:rPr b="0" lang="en-US" sz="1800" spc="-1" strike="noStrike">
+                <a:solidFill>
+                  <a:srgbClr val="000000"/>
+                </a:solidFill>
+                <a:latin typeface="Arial"/>
+                <a:ea typeface="DejaVu Sans"/>
+              </a:rPr>
+              <a:t>Label</a:t>
+            </a:r>
+            <a:endParaRPr b="0" lang="en-US" sz="1800" spc="-1" strike="noStrike">
+              <a:latin typeface="Arial"/>
+            </a:endParaRPr>
+          </a:p>
+        </p:txBody>
+      </p:sp>
+      <p:sp>
+        <p:nvSpPr>
+          <p:cNvPr id="142" name=""/>
+          <p:cNvSpPr/>
+          <p:nvPr/>
+        </p:nvSpPr>
+        <p:spPr>
+          <a:xfrm>
+            <a:off x="4572000" y="2972520"/>
+            <a:ext cx="1143000" cy="456480"/>
+          </a:xfrm>
+          <a:prstGeom prst="wedgeRoundRectCallout">
+            <a:avLst>
+              <a:gd name="adj1" fmla="val -75598"/>
+              <a:gd name="adj2" fmla="val 178211"/>
+              <a:gd name="adj3" fmla="val 16667"/>
+            </a:avLst>
+          </a:prstGeom>
+          <a:solidFill>
+            <a:srgbClr val="729fcf"/>
+          </a:solidFill>
+          <a:ln w="0">
+            <a:solidFill>
+              <a:srgbClr val="3465a4"/>
+            </a:solidFill>
+          </a:ln>
+        </p:spPr>
+        <p:style>
+          <a:lnRef idx="0"/>
+          <a:fillRef idx="0"/>
+          <a:effectRef idx="0"/>
+          <a:fontRef idx="minor"/>
+        </p:style>
+        <p:txBody>
+          <a:bodyPr lIns="90000" rIns="90000" tIns="45000" bIns="45000" anchor="ctr">
+            <a:noAutofit/>
+          </a:bodyPr>
+          <a:p>
+            <a:pPr algn="ctr">
+              <a:lnSpc>
+                <a:spcPct val="100000"/>
+              </a:lnSpc>
+              <a:buNone/>
+            </a:pPr>
+            <a:r>
+              <a:rPr b="0" lang="en-US" sz="1800" spc="-1" strike="noStrike">
+                <a:solidFill>
+                  <a:srgbClr val="000000"/>
+                </a:solidFill>
+                <a:latin typeface="Arial"/>
+                <a:ea typeface="DejaVu Sans"/>
+              </a:rPr>
+              <a:t>Property</a:t>
+            </a:r>
+            <a:endParaRPr b="0" lang="en-US" sz="1800" spc="-1" strike="noStrike">
+              <a:latin typeface="Arial"/>
+            </a:endParaRPr>
+          </a:p>
+        </p:txBody>
+      </p:sp>
+      <p:sp>
+        <p:nvSpPr>
+          <p:cNvPr id="143" name=""/>
+          <p:cNvSpPr/>
+          <p:nvPr/>
+        </p:nvSpPr>
+        <p:spPr>
+          <a:xfrm>
+            <a:off x="1828800" y="2972520"/>
+            <a:ext cx="1143000" cy="456480"/>
+          </a:xfrm>
+          <a:prstGeom prst="wedgeRoundRectCallout">
+            <a:avLst>
+              <a:gd name="adj1" fmla="val 13727"/>
+              <a:gd name="adj2" fmla="val 173404"/>
+              <a:gd name="adj3" fmla="val 16667"/>
+            </a:avLst>
+          </a:prstGeom>
+          <a:solidFill>
+            <a:srgbClr val="729fcf"/>
+          </a:solidFill>
+          <a:ln w="0">
+            <a:solidFill>
+              <a:srgbClr val="3465a4"/>
+            </a:solidFill>
+          </a:ln>
+        </p:spPr>
+        <p:style>
+          <a:lnRef idx="0"/>
+          <a:fillRef idx="0"/>
+          <a:effectRef idx="0"/>
+          <a:fontRef idx="minor"/>
+        </p:style>
+        <p:txBody>
+          <a:bodyPr lIns="90000" rIns="90000" tIns="45000" bIns="45000" anchor="ctr">
+            <a:noAutofit/>
+          </a:bodyPr>
+          <a:p>
+            <a:pPr algn="ctr">
+              <a:lnSpc>
+                <a:spcPct val="100000"/>
+              </a:lnSpc>
+              <a:buNone/>
+            </a:pPr>
+            <a:r>
+              <a:rPr b="0" lang="en-US" sz="1800" spc="-1" strike="noStrike">
+                <a:solidFill>
+                  <a:srgbClr val="000000"/>
+                </a:solidFill>
+                <a:latin typeface="Arial"/>
+                <a:ea typeface="DejaVu Sans"/>
+              </a:rPr>
+              <a:t>Clause</a:t>
+            </a:r>
+            <a:endParaRPr b="0" lang="en-US" sz="1800" spc="-1" strike="noStrike">
               <a:latin typeface="Arial"/>
             </a:endParaRPr>
           </a:p>
@@ -9009,7 +9226,7 @@
         <p:spPr>
           <a:xfrm>
             <a:off x="503640" y="225720"/>
-            <a:ext cx="9060120" cy="938160"/>
+            <a:ext cx="9059760" cy="937800"/>
           </a:xfrm>
           <a:prstGeom prst="rect">
             <a:avLst/>
@@ -9068,7 +9285,7 @@
         <p:spPr>
           <a:xfrm>
             <a:off x="503640" y="1326240"/>
-            <a:ext cx="9060120" cy="3279600"/>
+            <a:ext cx="9059760" cy="3279240"/>
           </a:xfrm>
           <a:prstGeom prst="rect">
             <a:avLst/>
@@ -9237,14 +9454,14 @@
       </p:grpSpPr>
       <p:sp>
         <p:nvSpPr>
-          <p:cNvPr id="139" name=""/>
+          <p:cNvPr id="144" name=""/>
           <p:cNvSpPr/>
           <p:nvPr/>
         </p:nvSpPr>
         <p:spPr>
           <a:xfrm>
-            <a:off x="503640" y="225720"/>
-            <a:ext cx="9060120" cy="938160"/>
+            <a:off x="541440" y="1064160"/>
+            <a:ext cx="9059760" cy="249120"/>
           </a:xfrm>
           <a:prstGeom prst="rect">
             <a:avLst/>
@@ -9263,14 +9480,14 @@
       </p:sp>
       <p:sp>
         <p:nvSpPr>
-          <p:cNvPr id="140" name=""/>
+          <p:cNvPr id="145" name=""/>
           <p:cNvSpPr/>
           <p:nvPr/>
         </p:nvSpPr>
         <p:spPr>
           <a:xfrm>
-            <a:off x="503640" y="1326240"/>
-            <a:ext cx="9060120" cy="3279600"/>
+            <a:off x="469440" y="1186200"/>
+            <a:ext cx="9059760" cy="871200"/>
           </a:xfrm>
           <a:prstGeom prst="rect">
             <a:avLst/>
@@ -9308,7 +9525,37 @@
                 <a:latin typeface="Arial"/>
                 <a:ea typeface="Microsoft YaHei"/>
               </a:rPr>
-              <a:t>Cypher </a:t>
+              <a:t>Dire</a:t>
+            </a:r>
+            <a:r>
+              <a:rPr b="1" lang="en-US" sz="3200" spc="-1" strike="noStrike">
+                <a:solidFill>
+                  <a:srgbClr val="000000"/>
+                </a:solidFill>
+                <a:latin typeface="Arial"/>
+                <a:ea typeface="Microsoft YaHei"/>
+              </a:rPr>
+              <a:t>ctio</a:t>
+            </a:r>
+            <a:r>
+              <a:rPr b="1" lang="en-US" sz="3200" spc="-1" strike="noStrike">
+                <a:solidFill>
+                  <a:srgbClr val="000000"/>
+                </a:solidFill>
+                <a:latin typeface="Arial"/>
+                <a:ea typeface="Microsoft YaHei"/>
+              </a:rPr>
+              <a:t>nalit</a:t>
+            </a:r>
+            <a:r>
+              <a:rPr b="1" lang="en-US" sz="3200" spc="-1" strike="noStrike">
+                <a:solidFill>
+                  <a:srgbClr val="000000"/>
+                </a:solidFill>
+                <a:latin typeface="Arial"/>
+                <a:ea typeface="Microsoft YaHei"/>
+              </a:rPr>
+              <a:t>y </a:t>
             </a:r>
             <a:endParaRPr b="0" lang="en-US" sz="3200" spc="-1" strike="noStrike">
               <a:latin typeface="Arial"/>
@@ -9316,71 +9563,29 @@
           </a:p>
         </p:txBody>
       </p:sp>
-      <p:sp>
-        <p:nvSpPr>
-          <p:cNvPr id="141" name=""/>
-          <p:cNvSpPr/>
+      <p:pic>
+        <p:nvPicPr>
+          <p:cNvPr id="146" name="" descr=""/>
+          <p:cNvPicPr/>
           <p:nvPr/>
-        </p:nvSpPr>
-        <p:spPr>
-          <a:xfrm>
-            <a:off x="1647000" y="4341960"/>
-            <a:ext cx="7262280" cy="314280"/>
-          </a:xfrm>
-          <a:prstGeom prst="rect">
-            <a:avLst/>
-          </a:prstGeom>
-          <a:noFill/>
-          <a:ln w="0">
-            <a:noFill/>
-          </a:ln>
-        </p:spPr>
-        <p:style>
-          <a:lnRef idx="0"/>
-          <a:fillRef idx="0"/>
-          <a:effectRef idx="0"/>
-          <a:fontRef idx="minor"/>
-        </p:style>
-        <p:txBody>
-          <a:bodyPr lIns="90000" rIns="90000" tIns="45000" bIns="45000" anchor="t">
-            <a:noAutofit/>
-          </a:bodyPr>
-          <a:p>
-            <a:pPr>
-              <a:lnSpc>
-                <a:spcPct val="100000"/>
-              </a:lnSpc>
-              <a:buNone/>
-            </a:pPr>
-            <a:r>
-              <a:rPr b="0" lang="en-US" sz="1600" spc="-1" strike="noStrike">
-                <a:solidFill>
-                  <a:srgbClr val="6a8759"/>
-                </a:solidFill>
-                <a:latin typeface="JetBrains Mono"/>
-                <a:ea typeface="JetBrains Mono"/>
-              </a:rPr>
-              <a:t>MATCH (:Person {name: 'Tom Hanks'})-[:DIRECTED]→(movie:Movie)</a:t>
-            </a:r>
-            <a:br>
-              <a:rPr sz="1600"/>
-            </a:br>
-            <a:r>
-              <a:rPr b="0" lang="en-US" sz="1600" spc="-1" strike="noStrike">
-                <a:solidFill>
-                  <a:srgbClr val="6a8759"/>
-                </a:solidFill>
-                <a:latin typeface="JetBrains Mono"/>
-                <a:ea typeface="JetBrains Mono"/>
-              </a:rPr>
-              <a:t>RETURN movie</a:t>
-            </a:r>
-            <a:endParaRPr b="0" lang="en-US" sz="1600" spc="-1" strike="noStrike">
-              <a:latin typeface="Arial"/>
-            </a:endParaRPr>
-          </a:p>
-        </p:txBody>
-      </p:sp>
+        </p:nvPicPr>
+        <p:blipFill>
+          <a:blip r:embed="rId2"/>
+          <a:stretch/>
+        </p:blipFill>
+        <p:spPr>
+          <a:xfrm>
+            <a:off x="2743200" y="2230920"/>
+            <a:ext cx="4554360" cy="3026880"/>
+          </a:xfrm>
+          <a:prstGeom prst="rect">
+            <a:avLst/>
+          </a:prstGeom>
+          <a:ln w="0">
+            <a:noFill/>
+          </a:ln>
+        </p:spPr>
+      </p:pic>
     </p:spTree>
   </p:cSld>
   <mc:AlternateContent>
@@ -9421,14 +9626,14 @@
       </p:grpSpPr>
       <p:sp>
         <p:nvSpPr>
-          <p:cNvPr id="142" name=""/>
+          <p:cNvPr id="147" name=""/>
           <p:cNvSpPr/>
           <p:nvPr/>
         </p:nvSpPr>
         <p:spPr>
           <a:xfrm>
             <a:off x="503640" y="225720"/>
-            <a:ext cx="9060120" cy="938160"/>
+            <a:ext cx="9059760" cy="937800"/>
           </a:xfrm>
           <a:prstGeom prst="rect">
             <a:avLst/>
@@ -9447,14 +9652,14 @@
       </p:sp>
       <p:sp>
         <p:nvSpPr>
-          <p:cNvPr id="143" name=""/>
+          <p:cNvPr id="148" name=""/>
           <p:cNvSpPr/>
           <p:nvPr/>
         </p:nvSpPr>
         <p:spPr>
           <a:xfrm>
             <a:off x="503640" y="1326240"/>
-            <a:ext cx="9060840" cy="3280320"/>
+            <a:ext cx="9060480" cy="3279960"/>
           </a:xfrm>
           <a:prstGeom prst="rect">
             <a:avLst/>
@@ -9520,14 +9725,14 @@
       </p:sp>
       <p:sp>
         <p:nvSpPr>
-          <p:cNvPr id="144" name=""/>
+          <p:cNvPr id="149" name=""/>
           <p:cNvSpPr/>
           <p:nvPr/>
         </p:nvSpPr>
         <p:spPr>
           <a:xfrm>
             <a:off x="3886200" y="2285280"/>
-            <a:ext cx="2103480" cy="543960"/>
+            <a:ext cx="2103120" cy="543600"/>
           </a:xfrm>
           <a:prstGeom prst="rect">
             <a:avLst/>
@@ -9610,14 +9815,14 @@
       </p:grpSpPr>
       <p:sp>
         <p:nvSpPr>
-          <p:cNvPr id="145" name=""/>
+          <p:cNvPr id="150" name=""/>
           <p:cNvSpPr/>
           <p:nvPr/>
         </p:nvSpPr>
         <p:spPr>
           <a:xfrm>
             <a:off x="503640" y="1326240"/>
-            <a:ext cx="9060840" cy="3280320"/>
+            <a:ext cx="9060480" cy="3279960"/>
           </a:xfrm>
           <a:prstGeom prst="rect">
             <a:avLst/>
@@ -9742,14 +9947,14 @@
       </p:grpSpPr>
       <p:sp>
         <p:nvSpPr>
-          <p:cNvPr id="146" name=""/>
+          <p:cNvPr id="151" name=""/>
           <p:cNvSpPr/>
           <p:nvPr/>
         </p:nvSpPr>
         <p:spPr>
           <a:xfrm>
             <a:off x="4113000" y="2279520"/>
-            <a:ext cx="2244960" cy="999720"/>
+            <a:ext cx="2244600" cy="999360"/>
           </a:xfrm>
           <a:prstGeom prst="rect">
             <a:avLst/>
@@ -9839,7 +10044,7 @@
         <p:spPr>
           <a:xfrm>
             <a:off x="503640" y="225720"/>
-            <a:ext cx="9060120" cy="938160"/>
+            <a:ext cx="9059760" cy="937800"/>
           </a:xfrm>
           <a:prstGeom prst="rect">
             <a:avLst/>
@@ -9865,7 +10070,7 @@
         <p:spPr>
           <a:xfrm>
             <a:off x="503640" y="1326240"/>
-            <a:ext cx="9060120" cy="3279600"/>
+            <a:ext cx="9059760" cy="3279240"/>
           </a:xfrm>
           <a:prstGeom prst="rect">
             <a:avLst/>
@@ -10042,7 +10247,7 @@
         <p:spPr>
           <a:xfrm>
             <a:off x="503640" y="225720"/>
-            <a:ext cx="9060120" cy="938160"/>
+            <a:ext cx="9059760" cy="937800"/>
           </a:xfrm>
           <a:prstGeom prst="rect">
             <a:avLst/>
@@ -10068,7 +10273,7 @@
         <p:spPr>
           <a:xfrm>
             <a:off x="503640" y="1326240"/>
-            <a:ext cx="9060120" cy="3279600"/>
+            <a:ext cx="9059760" cy="3279240"/>
           </a:xfrm>
           <a:prstGeom prst="rect">
             <a:avLst/>
@@ -10201,7 +10406,7 @@
         <p:spPr>
           <a:xfrm>
             <a:off x="1142280" y="2142720"/>
-            <a:ext cx="3653280" cy="1968120"/>
+            <a:ext cx="3652920" cy="1967760"/>
           </a:xfrm>
           <a:prstGeom prst="rect">
             <a:avLst/>
@@ -10224,7 +10429,7 @@
         <p:spPr>
           <a:xfrm>
             <a:off x="5255640" y="2142720"/>
-            <a:ext cx="3653280" cy="1968120"/>
+            <a:ext cx="3652920" cy="1967760"/>
           </a:xfrm>
           <a:prstGeom prst="rect">
             <a:avLst/>
@@ -10281,7 +10486,7 @@
         <p:spPr>
           <a:xfrm>
             <a:off x="503640" y="225720"/>
-            <a:ext cx="9060120" cy="938160"/>
+            <a:ext cx="9059760" cy="937800"/>
           </a:xfrm>
           <a:prstGeom prst="rect">
             <a:avLst/>
@@ -10307,7 +10512,7 @@
         <p:spPr>
           <a:xfrm>
             <a:off x="503640" y="1326240"/>
-            <a:ext cx="9060120" cy="3279600"/>
+            <a:ext cx="9059760" cy="3279240"/>
           </a:xfrm>
           <a:prstGeom prst="rect">
             <a:avLst/>
@@ -10440,7 +10645,7 @@
         <p:spPr>
           <a:xfrm>
             <a:off x="2970360" y="1117080"/>
-            <a:ext cx="3883320" cy="4316040"/>
+            <a:ext cx="3882960" cy="4315680"/>
           </a:xfrm>
           <a:prstGeom prst="rect">
             <a:avLst/>
@@ -10497,7 +10702,7 @@
         <p:spPr>
           <a:xfrm>
             <a:off x="503640" y="225720"/>
-            <a:ext cx="9060120" cy="938160"/>
+            <a:ext cx="9059760" cy="937800"/>
           </a:xfrm>
           <a:prstGeom prst="rect">
             <a:avLst/>
@@ -10523,7 +10728,7 @@
         <p:spPr>
           <a:xfrm>
             <a:off x="503640" y="1326240"/>
-            <a:ext cx="9060120" cy="3279600"/>
+            <a:ext cx="9059760" cy="3279240"/>
           </a:xfrm>
           <a:prstGeom prst="rect">
             <a:avLst/>
@@ -10652,7 +10857,7 @@
         <p:spPr>
           <a:xfrm>
             <a:off x="503640" y="1326240"/>
-            <a:ext cx="9060840" cy="3280320"/>
+            <a:ext cx="9060480" cy="3279960"/>
           </a:xfrm>
           <a:prstGeom prst="rect">
             <a:avLst/>
@@ -10773,7 +10978,7 @@
         <p:spPr>
           <a:xfrm>
             <a:off x="503640" y="225720"/>
-            <a:ext cx="9060120" cy="938160"/>
+            <a:ext cx="9059760" cy="937800"/>
           </a:xfrm>
           <a:prstGeom prst="rect">
             <a:avLst/>
@@ -10799,7 +11004,7 @@
         <p:spPr>
           <a:xfrm>
             <a:off x="503640" y="1326240"/>
-            <a:ext cx="9060120" cy="3279600"/>
+            <a:ext cx="9059760" cy="3279240"/>
           </a:xfrm>
           <a:prstGeom prst="rect">
             <a:avLst/>
@@ -10854,7 +11059,7 @@
         <p:spPr>
           <a:xfrm>
             <a:off x="1646280" y="4341960"/>
-            <a:ext cx="7262280" cy="314280"/>
+            <a:ext cx="7261920" cy="313920"/>
           </a:xfrm>
           <a:prstGeom prst="rect">
             <a:avLst/>
@@ -10918,7 +11123,7 @@
         <p:spPr>
           <a:xfrm>
             <a:off x="228240" y="2395080"/>
-            <a:ext cx="4751640" cy="3088440"/>
+            <a:ext cx="4751280" cy="3088080"/>
           </a:xfrm>
           <a:prstGeom prst="rect">
             <a:avLst/>
@@ -10937,7 +11142,7 @@
         <p:spPr>
           <a:xfrm>
             <a:off x="914400" y="1512000"/>
-            <a:ext cx="3340080" cy="545040"/>
+            <a:ext cx="3339720" cy="544680"/>
           </a:xfrm>
           <a:prstGeom prst="rect">
             <a:avLst/>
@@ -10993,7 +11198,7 @@
         <p:spPr>
           <a:xfrm>
             <a:off x="4869000" y="2395080"/>
-            <a:ext cx="4971240" cy="3088440"/>
+            <a:ext cx="4970880" cy="3088080"/>
           </a:xfrm>
           <a:prstGeom prst="rect">
             <a:avLst/>
@@ -11012,7 +11217,7 @@
         <p:spPr>
           <a:xfrm>
             <a:off x="5961600" y="1512000"/>
-            <a:ext cx="3182040" cy="545040"/>
+            <a:ext cx="3181680" cy="544680"/>
           </a:xfrm>
           <a:prstGeom prst="rect">
             <a:avLst/>

</xml_diff>

<commit_message>
Progress on Neo4j presentation
</commit_message>
<xml_diff>
--- a/presentation/presentation.pptx
+++ b/presentation/presentation.pptx
@@ -48,6 +48,10 @@
     <p:sldId id="296" r:id="rId43"/>
     <p:sldId id="297" r:id="rId44"/>
     <p:sldId id="298" r:id="rId45"/>
+    <p:sldId id="299" r:id="rId46"/>
+    <p:sldId id="300" r:id="rId47"/>
+    <p:sldId id="301" r:id="rId48"/>
+    <p:sldId id="302" r:id="rId49"/>
   </p:sldIdLst>
   <p:sldSz cx="10077450" cy="5668963"/>
   <p:notesSz cx="7559675" cy="10691813"/>
@@ -1630,61 +1634,7 @@
               <a:rPr b="0" lang="en-US" sz="4400" spc="-1" strike="noStrike">
                 <a:latin typeface="Arial"/>
               </a:rPr>
-              <a:t>Cli</a:t>
-            </a:r>
-            <a:r>
-              <a:rPr b="0" lang="en-US" sz="4400" spc="-1" strike="noStrike">
-                <a:latin typeface="Arial"/>
-              </a:rPr>
-              <a:t>ck </a:t>
-            </a:r>
-            <a:r>
-              <a:rPr b="0" lang="en-US" sz="4400" spc="-1" strike="noStrike">
-                <a:latin typeface="Arial"/>
-              </a:rPr>
-              <a:t>to </a:t>
-            </a:r>
-            <a:r>
-              <a:rPr b="0" lang="en-US" sz="4400" spc="-1" strike="noStrike">
-                <a:latin typeface="Arial"/>
-              </a:rPr>
-              <a:t>edit </a:t>
-            </a:r>
-            <a:r>
-              <a:rPr b="0" lang="en-US" sz="4400" spc="-1" strike="noStrike">
-                <a:latin typeface="Arial"/>
-              </a:rPr>
-              <a:t>the </a:t>
-            </a:r>
-            <a:r>
-              <a:rPr b="0" lang="en-US" sz="4400" spc="-1" strike="noStrike">
-                <a:latin typeface="Arial"/>
-              </a:rPr>
-              <a:t>title </a:t>
-            </a:r>
-            <a:r>
-              <a:rPr b="0" lang="en-US" sz="4400" spc="-1" strike="noStrike">
-                <a:latin typeface="Arial"/>
-              </a:rPr>
-              <a:t>text </a:t>
-            </a:r>
-            <a:r>
-              <a:rPr b="0" lang="en-US" sz="4400" spc="-1" strike="noStrike">
-                <a:latin typeface="Arial"/>
-              </a:rPr>
-              <a:t>for</a:t>
-            </a:r>
-            <a:r>
-              <a:rPr b="0" lang="en-US" sz="4400" spc="-1" strike="noStrike">
-                <a:latin typeface="Arial"/>
-              </a:rPr>
-              <a:t>ma</a:t>
-            </a:r>
-            <a:r>
-              <a:rPr b="0" lang="en-US" sz="4400" spc="-1" strike="noStrike">
-                <a:latin typeface="Arial"/>
-              </a:rPr>
-              <a:t>t</a:t>
+              <a:t>Click to edit the title text format</a:t>
             </a:r>
             <a:endParaRPr b="0" lang="en-US" sz="4400" spc="-1" strike="noStrike">
               <a:latin typeface="Arial"/>
@@ -9632,8 +9582,8 @@
         </p:nvSpPr>
         <p:spPr>
           <a:xfrm>
-            <a:off x="503640" y="225720"/>
-            <a:ext cx="9059760" cy="937800"/>
+            <a:off x="541440" y="1064160"/>
+            <a:ext cx="9059760" cy="249120"/>
           </a:xfrm>
           <a:prstGeom prst="rect">
             <a:avLst/>
@@ -9658,8 +9608,8 @@
         </p:nvSpPr>
         <p:spPr>
           <a:xfrm>
-            <a:off x="503640" y="1326240"/>
-            <a:ext cx="9060480" cy="3279960"/>
+            <a:off x="469440" y="1186200"/>
+            <a:ext cx="9059760" cy="871200"/>
           </a:xfrm>
           <a:prstGeom prst="rect">
             <a:avLst/>
@@ -9676,88 +9626,18 @@
           <a:fontRef idx="minor"/>
         </p:style>
         <p:txBody>
-          <a:bodyPr lIns="0" rIns="0" tIns="0" bIns="0" anchor="t">
-            <a:normAutofit/>
-          </a:bodyPr>
-          <a:p>
-            <a:pPr algn="ctr">
-              <a:lnSpc>
-                <a:spcPct val="100000"/>
-              </a:lnSpc>
-              <a:buNone/>
-              <a:tabLst>
-                <a:tab algn="l" pos="408240"/>
-              </a:tabLst>
-            </a:pPr>
-            <a:endParaRPr b="0" lang="en-US" sz="1800" spc="-1" strike="noStrike">
-              <a:latin typeface="Arial"/>
-            </a:endParaRPr>
-          </a:p>
-          <a:p>
-            <a:pPr algn="ctr">
-              <a:lnSpc>
-                <a:spcPct val="100000"/>
-              </a:lnSpc>
-              <a:buNone/>
-              <a:tabLst>
-                <a:tab algn="l" pos="408240"/>
-              </a:tabLst>
-            </a:pPr>
-            <a:endParaRPr b="0" lang="en-US" sz="1800" spc="-1" strike="noStrike">
-              <a:latin typeface="Arial"/>
-            </a:endParaRPr>
-          </a:p>
-          <a:p>
-            <a:pPr algn="ctr">
-              <a:lnSpc>
-                <a:spcPct val="100000"/>
-              </a:lnSpc>
-              <a:buNone/>
-              <a:tabLst>
-                <a:tab algn="l" pos="408240"/>
-              </a:tabLst>
-            </a:pPr>
-            <a:endParaRPr b="0" lang="en-US" sz="3200" spc="-1" strike="noStrike">
-              <a:latin typeface="Arial"/>
-            </a:endParaRPr>
-          </a:p>
-        </p:txBody>
-      </p:sp>
-      <p:sp>
-        <p:nvSpPr>
-          <p:cNvPr id="149" name=""/>
-          <p:cNvSpPr/>
-          <p:nvPr/>
-        </p:nvSpPr>
-        <p:spPr>
-          <a:xfrm>
-            <a:off x="3886200" y="2285280"/>
-            <a:ext cx="2103120" cy="543600"/>
-          </a:xfrm>
-          <a:prstGeom prst="rect">
-            <a:avLst/>
-          </a:prstGeom>
-          <a:noFill/>
-          <a:ln w="0">
-            <a:noFill/>
-          </a:ln>
-        </p:spPr>
-        <p:style>
-          <a:lnRef idx="0"/>
-          <a:fillRef idx="0"/>
-          <a:effectRef idx="0"/>
-          <a:fontRef idx="minor"/>
-        </p:style>
-        <p:txBody>
-          <a:bodyPr lIns="90000" rIns="90000" tIns="45000" bIns="45000" anchor="t">
+          <a:bodyPr lIns="0" rIns="0" tIns="0" bIns="0" anchor="ctr">
             <a:noAutofit/>
           </a:bodyPr>
           <a:p>
-            <a:pPr>
-              <a:lnSpc>
-                <a:spcPct val="100000"/>
-              </a:lnSpc>
-              <a:buNone/>
+            <a:pPr algn="ctr">
+              <a:lnSpc>
+                <a:spcPct val="100000"/>
+              </a:lnSpc>
+              <a:buNone/>
+              <a:tabLst>
+                <a:tab algn="l" pos="408240"/>
+              </a:tabLst>
             </a:pPr>
             <a:r>
               <a:rPr b="1" lang="en-US" sz="3200" spc="-1" strike="noStrike">
@@ -9767,7 +9647,7 @@
                 <a:latin typeface="Arial"/>
                 <a:ea typeface="Microsoft YaHei"/>
               </a:rPr>
-              <a:t>Features</a:t>
+              <a:t>Joins</a:t>
             </a:r>
             <a:endParaRPr b="0" lang="en-US" sz="3200" spc="-1" strike="noStrike">
               <a:latin typeface="Arial"/>
@@ -9775,6 +9655,29 @@
           </a:p>
         </p:txBody>
       </p:sp>
+      <p:pic>
+        <p:nvPicPr>
+          <p:cNvPr id="149" name="" descr=""/>
+          <p:cNvPicPr/>
+          <p:nvPr/>
+        </p:nvPicPr>
+        <p:blipFill>
+          <a:blip r:embed="rId2"/>
+          <a:stretch/>
+        </p:blipFill>
+        <p:spPr>
+          <a:xfrm>
+            <a:off x="685800" y="2443680"/>
+            <a:ext cx="8686800" cy="2239200"/>
+          </a:xfrm>
+          <a:prstGeom prst="rect">
+            <a:avLst/>
+          </a:prstGeom>
+          <a:ln w="0">
+            <a:noFill/>
+          </a:ln>
+        </p:spPr>
+      </p:pic>
     </p:spTree>
   </p:cSld>
   <mc:AlternateContent>
@@ -9821,8 +9724,34 @@
         </p:nvSpPr>
         <p:spPr>
           <a:xfrm>
-            <a:off x="503640" y="1326240"/>
-            <a:ext cx="9060480" cy="3279960"/>
+            <a:off x="541440" y="1064160"/>
+            <a:ext cx="9059760" cy="249120"/>
+          </a:xfrm>
+          <a:prstGeom prst="rect">
+            <a:avLst/>
+          </a:prstGeom>
+          <a:noFill/>
+          <a:ln w="0">
+            <a:noFill/>
+          </a:ln>
+        </p:spPr>
+        <p:style>
+          <a:lnRef idx="0"/>
+          <a:fillRef idx="0"/>
+          <a:effectRef idx="0"/>
+          <a:fontRef idx="minor"/>
+        </p:style>
+      </p:sp>
+      <p:sp>
+        <p:nvSpPr>
+          <p:cNvPr id="151" name=""/>
+          <p:cNvSpPr/>
+          <p:nvPr/>
+        </p:nvSpPr>
+        <p:spPr>
+          <a:xfrm>
+            <a:off x="469440" y="1186200"/>
+            <a:ext cx="9059760" cy="871200"/>
           </a:xfrm>
           <a:prstGeom prst="rect">
             <a:avLst/>
@@ -9839,82 +9768,88 @@
           <a:fontRef idx="minor"/>
         </p:style>
         <p:txBody>
-          <a:bodyPr lIns="0" rIns="0" tIns="0" bIns="0" anchor="t">
-            <a:normAutofit/>
+          <a:bodyPr lIns="0" rIns="0" tIns="0" bIns="0" anchor="ctr">
+            <a:noAutofit/>
           </a:bodyPr>
           <a:p>
-            <a:pPr>
-              <a:lnSpc>
-                <a:spcPct val="100000"/>
-              </a:lnSpc>
-              <a:spcBef>
-                <a:spcPts val="1417"/>
-              </a:spcBef>
-              <a:buNone/>
-              <a:tabLst>
-                <a:tab algn="l" pos="408240"/>
-              </a:tabLst>
-            </a:pPr>
-            <a:endParaRPr b="0" lang="en-US" sz="1800" spc="-1" strike="noStrike">
-              <a:latin typeface="Arial"/>
-            </a:endParaRPr>
-          </a:p>
-          <a:p>
-            <a:pPr algn="ctr">
-              <a:lnSpc>
-                <a:spcPct val="100000"/>
-              </a:lnSpc>
-              <a:spcBef>
-                <a:spcPts val="1417"/>
-              </a:spcBef>
+            <a:pPr algn="ctr">
+              <a:lnSpc>
+                <a:spcPct val="100000"/>
+              </a:lnSpc>
               <a:buNone/>
               <a:tabLst>
                 <a:tab algn="l" pos="408240"/>
               </a:tabLst>
             </a:pPr>
             <a:r>
-              <a:rPr b="0" lang="en-US" sz="3200" spc="-1" strike="noStrike">
+              <a:rPr b="1" lang="en-US" sz="3200" spc="-1" strike="noStrike">
                 <a:solidFill>
                   <a:srgbClr val="000000"/>
                 </a:solidFill>
                 <a:latin typeface="Arial"/>
-                <a:ea typeface="DejaVu Sans"/>
+                <a:ea typeface="Microsoft YaHei"/>
               </a:rPr>
-              <a:t>Visualize</a:t>
+              <a:t>De</a:t>
             </a:r>
-            <a:endParaRPr b="0" lang="en-US" sz="3200" spc="-1" strike="noStrike">
-              <a:latin typeface="Arial"/>
-            </a:endParaRPr>
-          </a:p>
-          <a:p>
-            <a:pPr algn="ctr">
-              <a:lnSpc>
-                <a:spcPct val="100000"/>
-              </a:lnSpc>
-              <a:spcBef>
-                <a:spcPts val="850"/>
-              </a:spcBef>
-              <a:buNone/>
-              <a:tabLst>
-                <a:tab algn="l" pos="408240"/>
-              </a:tabLst>
-            </a:pPr>
             <a:r>
-              <a:rPr b="0" lang="en-US" sz="2000" spc="-1" strike="noStrike">
+              <a:rPr b="1" lang="en-US" sz="3200" spc="-1" strike="noStrike">
                 <a:solidFill>
                   <a:srgbClr val="000000"/>
                 </a:solidFill>
                 <a:latin typeface="Arial"/>
-                <a:ea typeface="DejaVu Sans"/>
+                <a:ea typeface="Microsoft YaHei"/>
               </a:rPr>
-              <a:t>Visualize nodes and relations</a:t>
+              <a:t>pth </a:t>
             </a:r>
-            <a:endParaRPr b="0" lang="en-US" sz="2000" spc="-1" strike="noStrike">
+            <a:r>
+              <a:rPr b="1" lang="en-US" sz="3200" spc="-1" strike="noStrike">
+                <a:solidFill>
+                  <a:srgbClr val="000000"/>
+                </a:solidFill>
+                <a:latin typeface="Arial"/>
+                <a:ea typeface="Microsoft YaHei"/>
+              </a:rPr>
+              <a:t>sea</a:t>
+            </a:r>
+            <a:r>
+              <a:rPr b="1" lang="en-US" sz="3200" spc="-1" strike="noStrike">
+                <a:solidFill>
+                  <a:srgbClr val="000000"/>
+                </a:solidFill>
+                <a:latin typeface="Arial"/>
+                <a:ea typeface="Microsoft YaHei"/>
+              </a:rPr>
+              <a:t>rch </a:t>
+            </a:r>
+            <a:endParaRPr b="0" lang="en-US" sz="3200" spc="-1" strike="noStrike">
               <a:latin typeface="Arial"/>
             </a:endParaRPr>
           </a:p>
         </p:txBody>
       </p:sp>
+      <p:pic>
+        <p:nvPicPr>
+          <p:cNvPr id="152" name="" descr=""/>
+          <p:cNvPicPr/>
+          <p:nvPr/>
+        </p:nvPicPr>
+        <p:blipFill>
+          <a:blip r:embed="rId2"/>
+          <a:stretch/>
+        </p:blipFill>
+        <p:spPr>
+          <a:xfrm>
+            <a:off x="914400" y="2462400"/>
+            <a:ext cx="8458200" cy="2192760"/>
+          </a:xfrm>
+          <a:prstGeom prst="rect">
+            <a:avLst/>
+          </a:prstGeom>
+          <a:ln w="0">
+            <a:noFill/>
+          </a:ln>
+        </p:spPr>
+      </p:pic>
     </p:spTree>
   </p:cSld>
   <mc:AlternateContent>
@@ -9931,6 +9866,14 @@
 <file path=ppt/slides/slide43.xml><?xml version="1.0" encoding="utf-8"?>
 <p:sld xmlns:a="http://schemas.openxmlformats.org/drawingml/2006/main" xmlns:p="http://schemas.openxmlformats.org/presentationml/2006/main" xmlns:r="http://schemas.openxmlformats.org/officeDocument/2006/relationships" xmlns:p14="http://schemas.microsoft.com/office/powerpoint/2010/main" xmlns:p15="http://schemas.microsoft.com/office/powerpoint/2012/main" xmlns:mc="http://schemas.openxmlformats.org/markup-compatibility/2006">
   <p:cSld>
+    <p:bg>
+      <p:bgPr>
+        <a:blipFill rotWithShape="0">
+          <a:blip r:embed="rId1"/>
+          <a:stretch/>
+        </a:blipFill>
+      </p:bgPr>
+    </p:bg>
     <p:spTree>
       <p:nvGrpSpPr>
         <p:cNvPr id="1" name=""/>
@@ -9947,7 +9890,718 @@
       </p:grpSpPr>
       <p:sp>
         <p:nvSpPr>
-          <p:cNvPr id="151" name=""/>
+          <p:cNvPr id="153" name=""/>
+          <p:cNvSpPr/>
+          <p:nvPr/>
+        </p:nvSpPr>
+        <p:spPr>
+          <a:xfrm>
+            <a:off x="541440" y="1064160"/>
+            <a:ext cx="9059760" cy="249120"/>
+          </a:xfrm>
+          <a:prstGeom prst="rect">
+            <a:avLst/>
+          </a:prstGeom>
+          <a:noFill/>
+          <a:ln w="0">
+            <a:noFill/>
+          </a:ln>
+        </p:spPr>
+        <p:style>
+          <a:lnRef idx="0"/>
+          <a:fillRef idx="0"/>
+          <a:effectRef idx="0"/>
+          <a:fontRef idx="minor"/>
+        </p:style>
+      </p:sp>
+      <p:sp>
+        <p:nvSpPr>
+          <p:cNvPr id="154" name=""/>
+          <p:cNvSpPr/>
+          <p:nvPr/>
+        </p:nvSpPr>
+        <p:spPr>
+          <a:xfrm>
+            <a:off x="469440" y="1186200"/>
+            <a:ext cx="9059760" cy="871200"/>
+          </a:xfrm>
+          <a:prstGeom prst="rect">
+            <a:avLst/>
+          </a:prstGeom>
+          <a:noFill/>
+          <a:ln w="0">
+            <a:noFill/>
+          </a:ln>
+        </p:spPr>
+        <p:style>
+          <a:lnRef idx="0"/>
+          <a:fillRef idx="0"/>
+          <a:effectRef idx="0"/>
+          <a:fontRef idx="minor"/>
+        </p:style>
+        <p:txBody>
+          <a:bodyPr lIns="0" rIns="0" tIns="0" bIns="0" anchor="ctr">
+            <a:noAutofit/>
+          </a:bodyPr>
+          <a:p>
+            <a:pPr algn="ctr">
+              <a:lnSpc>
+                <a:spcPct val="100000"/>
+              </a:lnSpc>
+              <a:buNone/>
+              <a:tabLst>
+                <a:tab algn="l" pos="408240"/>
+              </a:tabLst>
+            </a:pPr>
+            <a:r>
+              <a:rPr b="1" lang="en-US" sz="3200" spc="-1" strike="noStrike">
+                <a:solidFill>
+                  <a:srgbClr val="000000"/>
+                </a:solidFill>
+                <a:latin typeface="Arial"/>
+                <a:ea typeface="Microsoft YaHei"/>
+              </a:rPr>
+              <a:t>Indices </a:t>
+            </a:r>
+            <a:endParaRPr b="0" lang="en-US" sz="3200" spc="-1" strike="noStrike">
+              <a:latin typeface="Arial"/>
+            </a:endParaRPr>
+          </a:p>
+        </p:txBody>
+      </p:sp>
+      <p:pic>
+        <p:nvPicPr>
+          <p:cNvPr id="155" name="" descr=""/>
+          <p:cNvPicPr/>
+          <p:nvPr/>
+        </p:nvPicPr>
+        <p:blipFill>
+          <a:blip r:embed="rId2"/>
+          <a:stretch/>
+        </p:blipFill>
+        <p:spPr>
+          <a:xfrm>
+            <a:off x="2286000" y="2165400"/>
+            <a:ext cx="5715000" cy="2863800"/>
+          </a:xfrm>
+          <a:prstGeom prst="rect">
+            <a:avLst/>
+          </a:prstGeom>
+          <a:ln w="0">
+            <a:noFill/>
+          </a:ln>
+        </p:spPr>
+      </p:pic>
+    </p:spTree>
+  </p:cSld>
+  <mc:AlternateContent>
+    <mc:Choice Requires="p14">
+      <p:transition spd="slow" p14:dur="2000"/>
+    </mc:Choice>
+    <mc:Fallback>
+      <p:transition spd="slow"/>
+    </mc:Fallback>
+  </mc:AlternateContent>
+</p:sld>
+</file>
+
+<file path=ppt/slides/slide44.xml><?xml version="1.0" encoding="utf-8"?>
+<p:sld xmlns:a="http://schemas.openxmlformats.org/drawingml/2006/main" xmlns:p="http://schemas.openxmlformats.org/presentationml/2006/main" xmlns:r="http://schemas.openxmlformats.org/officeDocument/2006/relationships" xmlns:p14="http://schemas.microsoft.com/office/powerpoint/2010/main" xmlns:p15="http://schemas.microsoft.com/office/powerpoint/2012/main" xmlns:mc="http://schemas.openxmlformats.org/markup-compatibility/2006">
+  <p:cSld>
+    <p:bg>
+      <p:bgPr>
+        <a:blipFill rotWithShape="0">
+          <a:blip r:embed="rId1"/>
+          <a:stretch/>
+        </a:blipFill>
+      </p:bgPr>
+    </p:bg>
+    <p:spTree>
+      <p:nvGrpSpPr>
+        <p:cNvPr id="1" name=""/>
+        <p:cNvGrpSpPr/>
+        <p:nvPr/>
+      </p:nvGrpSpPr>
+      <p:grpSpPr>
+        <a:xfrm>
+          <a:off x="0" y="0"/>
+          <a:ext cx="0" cy="0"/>
+          <a:chOff x="0" y="0"/>
+          <a:chExt cx="0" cy="0"/>
+        </a:xfrm>
+      </p:grpSpPr>
+      <p:sp>
+        <p:nvSpPr>
+          <p:cNvPr id="156" name=""/>
+          <p:cNvSpPr/>
+          <p:nvPr/>
+        </p:nvSpPr>
+        <p:spPr>
+          <a:xfrm>
+            <a:off x="503640" y="225720"/>
+            <a:ext cx="9059760" cy="937800"/>
+          </a:xfrm>
+          <a:prstGeom prst="rect">
+            <a:avLst/>
+          </a:prstGeom>
+          <a:noFill/>
+          <a:ln w="0">
+            <a:noFill/>
+          </a:ln>
+        </p:spPr>
+        <p:style>
+          <a:lnRef idx="0"/>
+          <a:fillRef idx="0"/>
+          <a:effectRef idx="0"/>
+          <a:fontRef idx="minor"/>
+        </p:style>
+      </p:sp>
+      <p:sp>
+        <p:nvSpPr>
+          <p:cNvPr id="157" name=""/>
+          <p:cNvSpPr/>
+          <p:nvPr/>
+        </p:nvSpPr>
+        <p:spPr>
+          <a:xfrm>
+            <a:off x="503640" y="1326240"/>
+            <a:ext cx="9060480" cy="3279960"/>
+          </a:xfrm>
+          <a:prstGeom prst="rect">
+            <a:avLst/>
+          </a:prstGeom>
+          <a:noFill/>
+          <a:ln w="0">
+            <a:noFill/>
+          </a:ln>
+        </p:spPr>
+        <p:style>
+          <a:lnRef idx="0"/>
+          <a:fillRef idx="0"/>
+          <a:effectRef idx="0"/>
+          <a:fontRef idx="minor"/>
+        </p:style>
+        <p:txBody>
+          <a:bodyPr lIns="0" rIns="0" tIns="0" bIns="0" anchor="t">
+            <a:normAutofit/>
+          </a:bodyPr>
+          <a:p>
+            <a:pPr algn="ctr">
+              <a:lnSpc>
+                <a:spcPct val="100000"/>
+              </a:lnSpc>
+              <a:buNone/>
+              <a:tabLst>
+                <a:tab algn="l" pos="408240"/>
+              </a:tabLst>
+            </a:pPr>
+            <a:endParaRPr b="0" lang="en-US" sz="1800" spc="-1" strike="noStrike">
+              <a:latin typeface="Arial"/>
+            </a:endParaRPr>
+          </a:p>
+          <a:p>
+            <a:pPr algn="ctr">
+              <a:lnSpc>
+                <a:spcPct val="100000"/>
+              </a:lnSpc>
+              <a:buNone/>
+              <a:tabLst>
+                <a:tab algn="l" pos="408240"/>
+              </a:tabLst>
+            </a:pPr>
+            <a:endParaRPr b="0" lang="en-US" sz="1800" spc="-1" strike="noStrike">
+              <a:latin typeface="Arial"/>
+            </a:endParaRPr>
+          </a:p>
+          <a:p>
+            <a:pPr algn="ctr">
+              <a:lnSpc>
+                <a:spcPct val="100000"/>
+              </a:lnSpc>
+              <a:buNone/>
+              <a:tabLst>
+                <a:tab algn="l" pos="408240"/>
+              </a:tabLst>
+            </a:pPr>
+            <a:endParaRPr b="0" lang="en-US" sz="3200" spc="-1" strike="noStrike">
+              <a:latin typeface="Arial"/>
+            </a:endParaRPr>
+          </a:p>
+        </p:txBody>
+      </p:sp>
+      <p:sp>
+        <p:nvSpPr>
+          <p:cNvPr id="158" name=""/>
+          <p:cNvSpPr/>
+          <p:nvPr/>
+        </p:nvSpPr>
+        <p:spPr>
+          <a:xfrm>
+            <a:off x="4069080" y="2285280"/>
+            <a:ext cx="2103120" cy="543600"/>
+          </a:xfrm>
+          <a:prstGeom prst="rect">
+            <a:avLst/>
+          </a:prstGeom>
+          <a:noFill/>
+          <a:ln w="0">
+            <a:noFill/>
+          </a:ln>
+        </p:spPr>
+        <p:style>
+          <a:lnRef idx="0"/>
+          <a:fillRef idx="0"/>
+          <a:effectRef idx="0"/>
+          <a:fontRef idx="minor"/>
+        </p:style>
+        <p:txBody>
+          <a:bodyPr lIns="90000" rIns="90000" tIns="45000" bIns="45000" anchor="t">
+            <a:noAutofit/>
+          </a:bodyPr>
+          <a:p>
+            <a:pPr>
+              <a:lnSpc>
+                <a:spcPct val="100000"/>
+              </a:lnSpc>
+              <a:buNone/>
+            </a:pPr>
+            <a:r>
+              <a:rPr b="1" lang="en-US" sz="3200" spc="-1" strike="noStrike">
+                <a:solidFill>
+                  <a:srgbClr val="000000"/>
+                </a:solidFill>
+                <a:latin typeface="Arial"/>
+                <a:ea typeface="Microsoft YaHei"/>
+              </a:rPr>
+              <a:t>Features</a:t>
+            </a:r>
+            <a:endParaRPr b="0" lang="en-US" sz="3200" spc="-1" strike="noStrike">
+              <a:latin typeface="Arial"/>
+            </a:endParaRPr>
+          </a:p>
+        </p:txBody>
+      </p:sp>
+    </p:spTree>
+  </p:cSld>
+  <mc:AlternateContent>
+    <mc:Choice Requires="p14">
+      <p:transition spd="slow" p14:dur="2000"/>
+    </mc:Choice>
+    <mc:Fallback>
+      <p:transition spd="slow"/>
+    </mc:Fallback>
+  </mc:AlternateContent>
+</p:sld>
+</file>
+
+<file path=ppt/slides/slide45.xml><?xml version="1.0" encoding="utf-8"?>
+<p:sld xmlns:a="http://schemas.openxmlformats.org/drawingml/2006/main" xmlns:p="http://schemas.openxmlformats.org/presentationml/2006/main" xmlns:r="http://schemas.openxmlformats.org/officeDocument/2006/relationships" xmlns:p14="http://schemas.microsoft.com/office/powerpoint/2010/main" xmlns:p15="http://schemas.microsoft.com/office/powerpoint/2012/main" xmlns:mc="http://schemas.openxmlformats.org/markup-compatibility/2006">
+  <p:cSld>
+    <p:bg>
+      <p:bgPr>
+        <a:blipFill rotWithShape="0">
+          <a:blip r:embed="rId1"/>
+          <a:stretch/>
+        </a:blipFill>
+      </p:bgPr>
+    </p:bg>
+    <p:spTree>
+      <p:nvGrpSpPr>
+        <p:cNvPr id="1" name=""/>
+        <p:cNvGrpSpPr/>
+        <p:nvPr/>
+      </p:nvGrpSpPr>
+      <p:grpSpPr>
+        <a:xfrm>
+          <a:off x="0" y="0"/>
+          <a:ext cx="0" cy="0"/>
+          <a:chOff x="0" y="0"/>
+          <a:chExt cx="0" cy="0"/>
+        </a:xfrm>
+      </p:grpSpPr>
+      <p:sp>
+        <p:nvSpPr>
+          <p:cNvPr id="159" name=""/>
+          <p:cNvSpPr/>
+          <p:nvPr/>
+        </p:nvSpPr>
+        <p:spPr>
+          <a:xfrm>
+            <a:off x="503640" y="1326240"/>
+            <a:ext cx="9060480" cy="3279960"/>
+          </a:xfrm>
+          <a:prstGeom prst="rect">
+            <a:avLst/>
+          </a:prstGeom>
+          <a:noFill/>
+          <a:ln w="0">
+            <a:noFill/>
+          </a:ln>
+        </p:spPr>
+        <p:style>
+          <a:lnRef idx="0"/>
+          <a:fillRef idx="0"/>
+          <a:effectRef idx="0"/>
+          <a:fontRef idx="minor"/>
+        </p:style>
+        <p:txBody>
+          <a:bodyPr lIns="0" rIns="0" tIns="0" bIns="0" anchor="t">
+            <a:normAutofit/>
+          </a:bodyPr>
+          <a:p>
+            <a:pPr>
+              <a:lnSpc>
+                <a:spcPct val="100000"/>
+              </a:lnSpc>
+              <a:spcBef>
+                <a:spcPts val="1417"/>
+              </a:spcBef>
+              <a:buNone/>
+              <a:tabLst>
+                <a:tab algn="l" pos="408240"/>
+              </a:tabLst>
+            </a:pPr>
+            <a:endParaRPr b="0" lang="en-US" sz="1800" spc="-1" strike="noStrike">
+              <a:latin typeface="Arial"/>
+            </a:endParaRPr>
+          </a:p>
+          <a:p>
+            <a:pPr algn="ctr">
+              <a:lnSpc>
+                <a:spcPct val="100000"/>
+              </a:lnSpc>
+              <a:spcBef>
+                <a:spcPts val="1417"/>
+              </a:spcBef>
+              <a:buNone/>
+              <a:tabLst>
+                <a:tab algn="l" pos="408240"/>
+              </a:tabLst>
+            </a:pPr>
+            <a:r>
+              <a:rPr b="0" lang="en-US" sz="3200" spc="-1" strike="noStrike">
+                <a:solidFill>
+                  <a:srgbClr val="000000"/>
+                </a:solidFill>
+                <a:latin typeface="Arial"/>
+                <a:ea typeface="DejaVu Sans"/>
+              </a:rPr>
+              <a:t>Visualize</a:t>
+            </a:r>
+            <a:endParaRPr b="0" lang="en-US" sz="3200" spc="-1" strike="noStrike">
+              <a:latin typeface="Arial"/>
+            </a:endParaRPr>
+          </a:p>
+          <a:p>
+            <a:pPr algn="ctr">
+              <a:lnSpc>
+                <a:spcPct val="100000"/>
+              </a:lnSpc>
+              <a:spcBef>
+                <a:spcPts val="850"/>
+              </a:spcBef>
+              <a:buNone/>
+              <a:tabLst>
+                <a:tab algn="l" pos="408240"/>
+              </a:tabLst>
+            </a:pPr>
+            <a:r>
+              <a:rPr b="0" lang="en-US" sz="2000" spc="-1" strike="noStrike">
+                <a:solidFill>
+                  <a:srgbClr val="000000"/>
+                </a:solidFill>
+                <a:latin typeface="Arial"/>
+                <a:ea typeface="DejaVu Sans"/>
+              </a:rPr>
+              <a:t>Visualize nodes and relations</a:t>
+            </a:r>
+            <a:endParaRPr b="0" lang="en-US" sz="2000" spc="-1" strike="noStrike">
+              <a:latin typeface="Arial"/>
+            </a:endParaRPr>
+          </a:p>
+        </p:txBody>
+      </p:sp>
+    </p:spTree>
+  </p:cSld>
+  <mc:AlternateContent>
+    <mc:Choice Requires="p14">
+      <p:transition spd="slow" p14:dur="2000"/>
+    </mc:Choice>
+    <mc:Fallback>
+      <p:transition spd="slow"/>
+    </mc:Fallback>
+  </mc:AlternateContent>
+</p:sld>
+</file>
+
+<file path=ppt/slides/slide46.xml><?xml version="1.0" encoding="utf-8"?>
+<p:sld xmlns:a="http://schemas.openxmlformats.org/drawingml/2006/main" xmlns:p="http://schemas.openxmlformats.org/presentationml/2006/main" xmlns:r="http://schemas.openxmlformats.org/officeDocument/2006/relationships" xmlns:p14="http://schemas.microsoft.com/office/powerpoint/2010/main" xmlns:p15="http://schemas.microsoft.com/office/powerpoint/2012/main" xmlns:mc="http://schemas.openxmlformats.org/markup-compatibility/2006">
+  <p:cSld>
+    <p:bg>
+      <p:bgPr>
+        <a:blipFill rotWithShape="0">
+          <a:blip r:embed="rId1"/>
+          <a:stretch/>
+        </a:blipFill>
+      </p:bgPr>
+    </p:bg>
+    <p:spTree>
+      <p:nvGrpSpPr>
+        <p:cNvPr id="1" name=""/>
+        <p:cNvGrpSpPr/>
+        <p:nvPr/>
+      </p:nvGrpSpPr>
+      <p:grpSpPr>
+        <a:xfrm>
+          <a:off x="0" y="0"/>
+          <a:ext cx="0" cy="0"/>
+          <a:chOff x="0" y="0"/>
+          <a:chExt cx="0" cy="0"/>
+        </a:xfrm>
+      </p:grpSpPr>
+      <p:sp>
+        <p:nvSpPr>
+          <p:cNvPr id="160" name=""/>
+          <p:cNvSpPr/>
+          <p:nvPr/>
+        </p:nvSpPr>
+        <p:spPr>
+          <a:xfrm>
+            <a:off x="503640" y="1326240"/>
+            <a:ext cx="9060480" cy="3279960"/>
+          </a:xfrm>
+          <a:prstGeom prst="rect">
+            <a:avLst/>
+          </a:prstGeom>
+          <a:noFill/>
+          <a:ln w="0">
+            <a:noFill/>
+          </a:ln>
+        </p:spPr>
+        <p:style>
+          <a:lnRef idx="0"/>
+          <a:fillRef idx="0"/>
+          <a:effectRef idx="0"/>
+          <a:fontRef idx="minor"/>
+        </p:style>
+        <p:txBody>
+          <a:bodyPr lIns="0" rIns="0" tIns="0" bIns="0" anchor="t">
+            <a:normAutofit/>
+          </a:bodyPr>
+          <a:p>
+            <a:pPr>
+              <a:lnSpc>
+                <a:spcPct val="100000"/>
+              </a:lnSpc>
+              <a:spcBef>
+                <a:spcPts val="1417"/>
+              </a:spcBef>
+              <a:buNone/>
+              <a:tabLst>
+                <a:tab algn="l" pos="408240"/>
+              </a:tabLst>
+            </a:pPr>
+            <a:endParaRPr b="0" lang="en-US" sz="1800" spc="-1" strike="noStrike">
+              <a:latin typeface="Arial"/>
+            </a:endParaRPr>
+          </a:p>
+          <a:p>
+            <a:pPr algn="ctr">
+              <a:lnSpc>
+                <a:spcPct val="100000"/>
+              </a:lnSpc>
+              <a:spcBef>
+                <a:spcPts val="1417"/>
+              </a:spcBef>
+              <a:buNone/>
+              <a:tabLst>
+                <a:tab algn="l" pos="408240"/>
+              </a:tabLst>
+            </a:pPr>
+            <a:r>
+              <a:rPr b="0" lang="en-US" sz="3200" spc="-1" strike="noStrike">
+                <a:solidFill>
+                  <a:srgbClr val="000000"/>
+                </a:solidFill>
+                <a:latin typeface="Arial"/>
+                <a:ea typeface="DejaVu Sans"/>
+              </a:rPr>
+              <a:t>Constraints</a:t>
+            </a:r>
+            <a:endParaRPr b="0" lang="en-US" sz="3200" spc="-1" strike="noStrike">
+              <a:latin typeface="Arial"/>
+            </a:endParaRPr>
+          </a:p>
+          <a:p>
+            <a:pPr algn="ctr">
+              <a:lnSpc>
+                <a:spcPct val="100000"/>
+              </a:lnSpc>
+              <a:spcBef>
+                <a:spcPts val="850"/>
+              </a:spcBef>
+              <a:buNone/>
+              <a:tabLst>
+                <a:tab algn="l" pos="408240"/>
+              </a:tabLst>
+            </a:pPr>
+            <a:r>
+              <a:rPr b="0" lang="en-US" sz="2000" spc="-1" strike="noStrike">
+                <a:solidFill>
+                  <a:srgbClr val="000000"/>
+                </a:solidFill>
+                <a:latin typeface="Arial"/>
+                <a:ea typeface="DejaVu Sans"/>
+              </a:rPr>
+              <a:t>- Unique node property</a:t>
+            </a:r>
+            <a:endParaRPr b="0" lang="en-US" sz="2000" spc="-1" strike="noStrike">
+              <a:latin typeface="Arial"/>
+            </a:endParaRPr>
+          </a:p>
+          <a:p>
+            <a:pPr algn="ctr">
+              <a:lnSpc>
+                <a:spcPct val="100000"/>
+              </a:lnSpc>
+              <a:spcBef>
+                <a:spcPts val="850"/>
+              </a:spcBef>
+              <a:buNone/>
+              <a:tabLst>
+                <a:tab algn="l" pos="408240"/>
+              </a:tabLst>
+            </a:pPr>
+            <a:r>
+              <a:rPr b="0" lang="en-US" sz="2000" spc="-1" strike="noStrike">
+                <a:solidFill>
+                  <a:srgbClr val="000000"/>
+                </a:solidFill>
+                <a:latin typeface="Arial"/>
+                <a:ea typeface="DejaVu Sans"/>
+              </a:rPr>
+              <a:t>- Unique relationship property</a:t>
+            </a:r>
+            <a:endParaRPr b="0" lang="en-US" sz="2000" spc="-1" strike="noStrike">
+              <a:latin typeface="Arial"/>
+            </a:endParaRPr>
+          </a:p>
+          <a:p>
+            <a:pPr algn="ctr">
+              <a:lnSpc>
+                <a:spcPct val="100000"/>
+              </a:lnSpc>
+              <a:spcBef>
+                <a:spcPts val="850"/>
+              </a:spcBef>
+              <a:buNone/>
+              <a:tabLst>
+                <a:tab algn="l" pos="408240"/>
+              </a:tabLst>
+            </a:pPr>
+            <a:r>
+              <a:rPr b="0" lang="en-US" sz="2000" spc="-1" strike="noStrike">
+                <a:solidFill>
+                  <a:srgbClr val="000000"/>
+                </a:solidFill>
+                <a:latin typeface="Arial"/>
+                <a:ea typeface="DejaVu Sans"/>
+              </a:rPr>
+              <a:t>- Node property existence (enterprise)</a:t>
+            </a:r>
+            <a:endParaRPr b="0" lang="en-US" sz="2000" spc="-1" strike="noStrike">
+              <a:latin typeface="Arial"/>
+            </a:endParaRPr>
+          </a:p>
+          <a:p>
+            <a:pPr algn="ctr">
+              <a:lnSpc>
+                <a:spcPct val="100000"/>
+              </a:lnSpc>
+              <a:spcBef>
+                <a:spcPts val="850"/>
+              </a:spcBef>
+              <a:buNone/>
+              <a:tabLst>
+                <a:tab algn="l" pos="408240"/>
+              </a:tabLst>
+            </a:pPr>
+            <a:r>
+              <a:rPr b="0" lang="en-US" sz="2000" spc="-1" strike="noStrike">
+                <a:solidFill>
+                  <a:srgbClr val="000000"/>
+                </a:solidFill>
+                <a:latin typeface="Arial"/>
+                <a:ea typeface="DejaVu Sans"/>
+              </a:rPr>
+              <a:t>- Relationship property existence (enterprise)</a:t>
+            </a:r>
+            <a:endParaRPr b="0" lang="en-US" sz="2000" spc="-1" strike="noStrike">
+              <a:latin typeface="Arial"/>
+            </a:endParaRPr>
+          </a:p>
+          <a:p>
+            <a:pPr algn="ctr">
+              <a:lnSpc>
+                <a:spcPct val="100000"/>
+              </a:lnSpc>
+              <a:spcBef>
+                <a:spcPts val="850"/>
+              </a:spcBef>
+              <a:buNone/>
+              <a:tabLst>
+                <a:tab algn="l" pos="408240"/>
+              </a:tabLst>
+            </a:pPr>
+            <a:r>
+              <a:rPr b="0" lang="en-US" sz="2000" spc="-1" strike="noStrike">
+                <a:solidFill>
+                  <a:srgbClr val="000000"/>
+                </a:solidFill>
+                <a:latin typeface="Arial"/>
+                <a:ea typeface="DejaVu Sans"/>
+              </a:rPr>
+              <a:t>- And more</a:t>
+            </a:r>
+            <a:endParaRPr b="0" lang="en-US" sz="2000" spc="-1" strike="noStrike">
+              <a:latin typeface="Arial"/>
+            </a:endParaRPr>
+          </a:p>
+        </p:txBody>
+      </p:sp>
+    </p:spTree>
+  </p:cSld>
+  <mc:AlternateContent>
+    <mc:Choice Requires="p14">
+      <p:transition spd="slow" p14:dur="2000"/>
+    </mc:Choice>
+    <mc:Fallback>
+      <p:transition spd="slow"/>
+    </mc:Fallback>
+  </mc:AlternateContent>
+</p:sld>
+</file>
+
+<file path=ppt/slides/slide47.xml><?xml version="1.0" encoding="utf-8"?>
+<p:sld xmlns:a="http://schemas.openxmlformats.org/drawingml/2006/main" xmlns:p="http://schemas.openxmlformats.org/presentationml/2006/main" xmlns:r="http://schemas.openxmlformats.org/officeDocument/2006/relationships" xmlns:p14="http://schemas.microsoft.com/office/powerpoint/2010/main" xmlns:p15="http://schemas.microsoft.com/office/powerpoint/2012/main" xmlns:mc="http://schemas.openxmlformats.org/markup-compatibility/2006">
+  <p:cSld>
+    <p:spTree>
+      <p:nvGrpSpPr>
+        <p:cNvPr id="1" name=""/>
+        <p:cNvGrpSpPr/>
+        <p:nvPr/>
+      </p:nvGrpSpPr>
+      <p:grpSpPr>
+        <a:xfrm>
+          <a:off x="0" y="0"/>
+          <a:ext cx="0" cy="0"/>
+          <a:chOff x="0" y="0"/>
+          <a:chExt cx="0" cy="0"/>
+        </a:xfrm>
+      </p:grpSpPr>
+      <p:sp>
+        <p:nvSpPr>
+          <p:cNvPr id="161" name=""/>
           <p:cNvSpPr/>
           <p:nvPr/>
         </p:nvSpPr>

</xml_diff>

<commit_message>
Add conclusion to presentation
</commit_message>
<xml_diff>
--- a/presentation/presentation.pptx
+++ b/presentation/presentation.pptx
@@ -1634,19 +1634,85 @@
               <a:rPr b="0" lang="en-US" sz="4400" spc="-1" strike="noStrike">
                 <a:latin typeface="Arial"/>
               </a:rPr>
-              <a:t>Click to edit </a:t>
+              <a:t>Cli</a:t>
             </a:r>
             <a:r>
               <a:rPr b="0" lang="en-US" sz="4400" spc="-1" strike="noStrike">
                 <a:latin typeface="Arial"/>
               </a:rPr>
-              <a:t>the title text </a:t>
+              <a:t>ck </a:t>
             </a:r>
             <a:r>
               <a:rPr b="0" lang="en-US" sz="4400" spc="-1" strike="noStrike">
                 <a:latin typeface="Arial"/>
               </a:rPr>
-              <a:t>format</a:t>
+              <a:t>to </a:t>
+            </a:r>
+            <a:r>
+              <a:rPr b="0" lang="en-US" sz="4400" spc="-1" strike="noStrike">
+                <a:latin typeface="Arial"/>
+              </a:rPr>
+              <a:t>ed</a:t>
+            </a:r>
+            <a:r>
+              <a:rPr b="0" lang="en-US" sz="4400" spc="-1" strike="noStrike">
+                <a:latin typeface="Arial"/>
+              </a:rPr>
+              <a:t>it </a:t>
+            </a:r>
+            <a:r>
+              <a:rPr b="0" lang="en-US" sz="4400" spc="-1" strike="noStrike">
+                <a:latin typeface="Arial"/>
+              </a:rPr>
+              <a:t>th</a:t>
+            </a:r>
+            <a:r>
+              <a:rPr b="0" lang="en-US" sz="4400" spc="-1" strike="noStrike">
+                <a:latin typeface="Arial"/>
+              </a:rPr>
+              <a:t>e </a:t>
+            </a:r>
+            <a:r>
+              <a:rPr b="0" lang="en-US" sz="4400" spc="-1" strike="noStrike">
+                <a:latin typeface="Arial"/>
+              </a:rPr>
+              <a:t>titl</a:t>
+            </a:r>
+            <a:r>
+              <a:rPr b="0" lang="en-US" sz="4400" spc="-1" strike="noStrike">
+                <a:latin typeface="Arial"/>
+              </a:rPr>
+              <a:t>e </a:t>
+            </a:r>
+            <a:r>
+              <a:rPr b="0" lang="en-US" sz="4400" spc="-1" strike="noStrike">
+                <a:latin typeface="Arial"/>
+              </a:rPr>
+              <a:t>te</a:t>
+            </a:r>
+            <a:r>
+              <a:rPr b="0" lang="en-US" sz="4400" spc="-1" strike="noStrike">
+                <a:latin typeface="Arial"/>
+              </a:rPr>
+              <a:t>xt </a:t>
+            </a:r>
+            <a:r>
+              <a:rPr b="0" lang="en-US" sz="4400" spc="-1" strike="noStrike">
+                <a:latin typeface="Arial"/>
+              </a:rPr>
+              <a:t>for</a:t>
+            </a:r>
+            <a:r>
+              <a:rPr b="0" lang="en-US" sz="4400" spc="-1" strike="noStrike">
+                <a:latin typeface="Arial"/>
+              </a:rPr>
+              <a:t>m</a:t>
+            </a:r>
+            <a:r>
+              <a:rPr b="0" lang="en-US" sz="4400" spc="-1" strike="noStrike">
+                <a:latin typeface="Arial"/>
+              </a:rPr>
+              <a:t>at</a:t>
             </a:r>
             <a:endParaRPr b="0" lang="en-US" sz="4400" spc="-1" strike="noStrike">
               <a:latin typeface="Arial"/>
@@ -3435,7 +3501,7 @@
         </p:blipFill>
         <p:spPr>
           <a:xfrm>
-            <a:off x="2743200" y="2514600"/>
+            <a:off x="2743200" y="2362320"/>
             <a:ext cx="4618440" cy="2895480"/>
           </a:xfrm>
           <a:prstGeom prst="rect">
@@ -6064,45 +6130,8 @@
                 <a:latin typeface="Arial"/>
                 <a:ea typeface="Microsoft YaHei"/>
               </a:rPr>
-              <a:t>Flux </a:t>
-            </a:r>
-            <a:r>
-              <a:rPr b="0" lang="en-US" sz="2000" spc="-1" strike="noStrike">
-                <a:solidFill>
-                  <a:srgbClr val="000000"/>
-                </a:solidFill>
-                <a:latin typeface="Arial"/>
-                <a:ea typeface="Microsoft YaHei"/>
-              </a:rPr>
-              <a:t>has more functionality than </a:t>
-            </a:r>
-            <a:r>
-              <a:rPr b="1" lang="en-US" sz="2000" spc="-1" strike="noStrike">
-                <a:solidFill>
-                  <a:srgbClr val="000000"/>
-                </a:solidFill>
-                <a:latin typeface="Arial"/>
-                <a:ea typeface="Microsoft YaHei"/>
-              </a:rPr>
-              <a:t>InfluxQL</a:t>
-            </a:r>
-            <a:br>
-              <a:rPr sz="2000"/>
-            </a:br>
-            <a:endParaRPr b="0" lang="en-US" sz="2000" spc="-1" strike="noStrike">
-              <a:latin typeface="Arial"/>
-            </a:endParaRPr>
-          </a:p>
-          <a:p>
-            <a:pPr algn="ctr">
-              <a:lnSpc>
-                <a:spcPct val="100000"/>
-              </a:lnSpc>
-              <a:buNone/>
-              <a:tabLst>
-                <a:tab algn="l" pos="408240"/>
-              </a:tabLst>
-            </a:pPr>
+              <a:t>Flux has more functionality than InfluxQL</a:t>
+            </a:r>
             <a:br>
               <a:rPr sz="2000"/>
             </a:br>
@@ -10644,37 +10673,28 @@
       <p:sp>
         <p:nvSpPr>
           <p:cNvPr id="161" name=""/>
-          <p:cNvSpPr/>
+          <p:cNvSpPr txBox="1"/>
           <p:nvPr/>
         </p:nvSpPr>
         <p:spPr>
           <a:xfrm>
-            <a:off x="4113000" y="2279520"/>
-            <a:ext cx="2244600" cy="999360"/>
-          </a:xfrm>
-          <a:prstGeom prst="rect">
-            <a:avLst/>
-          </a:prstGeom>
-          <a:noFill/>
-          <a:ln w="0">
-            <a:noFill/>
-          </a:ln>
-        </p:spPr>
-        <p:style>
-          <a:lnRef idx="0"/>
-          <a:fillRef idx="0"/>
-          <a:effectRef idx="0"/>
-          <a:fontRef idx="minor"/>
-        </p:style>
+            <a:off x="1600200" y="1814040"/>
+            <a:ext cx="6738480" cy="2529360"/>
+          </a:xfrm>
+          <a:prstGeom prst="rect">
+            <a:avLst/>
+          </a:prstGeom>
+          <a:noFill/>
+          <a:ln w="0">
+            <a:noFill/>
+          </a:ln>
+        </p:spPr>
         <p:txBody>
           <a:bodyPr lIns="90000" rIns="90000" tIns="45000" bIns="45000" anchor="t">
             <a:noAutofit/>
           </a:bodyPr>
           <a:p>
-            <a:pPr>
-              <a:lnSpc>
-                <a:spcPct val="100000"/>
-              </a:lnSpc>
+            <a:pPr algn="ctr">
               <a:buNone/>
             </a:pPr>
             <a:r>
@@ -10685,9 +10705,105 @@
                 <a:latin typeface="Arial"/>
                 <a:ea typeface="DejaVu Sans"/>
               </a:rPr>
-              <a:t>Conclusie</a:t>
+              <a:t>Conclusion</a:t>
             </a:r>
             <a:endParaRPr b="0" lang="en-US" sz="3200" spc="-1" strike="noStrike">
+              <a:latin typeface="Arial"/>
+            </a:endParaRPr>
+          </a:p>
+          <a:p>
+            <a:pPr algn="ctr">
+              <a:buNone/>
+            </a:pPr>
+            <a:endParaRPr b="0" lang="en-US" sz="3200" spc="-1" strike="noStrike">
+              <a:latin typeface="Arial"/>
+            </a:endParaRPr>
+          </a:p>
+          <a:p>
+            <a:pPr algn="ctr">
+              <a:lnSpc>
+                <a:spcPct val="100000"/>
+              </a:lnSpc>
+              <a:buNone/>
+            </a:pPr>
+            <a:r>
+              <a:rPr b="0" lang="en-US" sz="2000" spc="-1" strike="noStrike">
+                <a:solidFill>
+                  <a:srgbClr val="000000"/>
+                </a:solidFill>
+                <a:latin typeface="Arial"/>
+                <a:ea typeface="DejaVu Sans"/>
+              </a:rPr>
+              <a:t>- Do proper research prior to usage</a:t>
+            </a:r>
+            <a:br>
+              <a:rPr sz="2000"/>
+            </a:br>
+            <a:r>
+              <a:rPr b="0" lang="en-US" sz="2000" spc="-1" strike="noStrike">
+                <a:solidFill>
+                  <a:srgbClr val="000000"/>
+                </a:solidFill>
+                <a:latin typeface="Arial"/>
+                <a:ea typeface="DejaVu Sans"/>
+              </a:rPr>
+              <a:t>-The basics are not that hard, t</a:t>
+            </a:r>
+            <a:r>
+              <a:rPr b="0" lang="en-US" sz="2000" spc="-1" strike="noStrike">
+                <a:solidFill>
+                  <a:srgbClr val="000000"/>
+                </a:solidFill>
+                <a:latin typeface="Arial"/>
+                <a:ea typeface="DejaVu Sans"/>
+              </a:rPr>
+              <a:t>he devil is in the details</a:t>
+            </a:r>
+            <a:endParaRPr b="0" lang="en-US" sz="2000" spc="-1" strike="noStrike">
+              <a:latin typeface="Arial"/>
+            </a:endParaRPr>
+          </a:p>
+          <a:p>
+            <a:pPr algn="ctr">
+              <a:buNone/>
+            </a:pPr>
+            <a:r>
+              <a:rPr b="0" lang="en-US" sz="2000" spc="-1" strike="noStrike">
+                <a:solidFill>
+                  <a:srgbClr val="000000"/>
+                </a:solidFill>
+                <a:latin typeface="Arial"/>
+                <a:ea typeface="DejaVu Sans"/>
+              </a:rPr>
+              <a:t>- Choose a database that fits the model</a:t>
+            </a:r>
+            <a:endParaRPr b="0" lang="en-US" sz="2000" spc="-1" strike="noStrike">
+              <a:latin typeface="Arial"/>
+            </a:endParaRPr>
+          </a:p>
+          <a:p>
+            <a:pPr algn="ctr">
+              <a:buNone/>
+            </a:pPr>
+            <a:r>
+              <a:rPr b="0" lang="en-US" sz="2000" spc="-1" strike="noStrike">
+                <a:solidFill>
+                  <a:srgbClr val="000000"/>
+                </a:solidFill>
+                <a:latin typeface="Arial"/>
+                <a:ea typeface="DejaVu Sans"/>
+              </a:rPr>
+              <a:t>- Choose a database that fits the throughput</a:t>
+            </a:r>
+            <a:endParaRPr b="0" lang="en-US" sz="2000" spc="-1" strike="noStrike">
+              <a:latin typeface="Arial"/>
+            </a:endParaRPr>
+          </a:p>
+          <a:p>
+            <a:pPr algn="ctr">
+              <a:buNone/>
+            </a:pPr>
+            <a:endParaRPr b="0" lang="en-US" sz="2000" spc="-1" strike="noStrike">
               <a:latin typeface="Arial"/>
             </a:endParaRPr>
           </a:p>

</xml_diff>

<commit_message>
First part of the intro
</commit_message>
<xml_diff>
--- a/presentation/presentation.pptx
+++ b/presentation/presentation.pptx
@@ -1949,7 +1949,7 @@
         <p:spPr>
           <a:xfrm>
             <a:off x="503640" y="225720"/>
-            <a:ext cx="9059760" cy="937800"/>
+            <a:ext cx="9059400" cy="937440"/>
           </a:xfrm>
           <a:prstGeom prst="rect">
             <a:avLst/>
@@ -2008,7 +2008,7 @@
         <p:spPr>
           <a:xfrm>
             <a:off x="503640" y="1326240"/>
-            <a:ext cx="9059760" cy="3279240"/>
+            <a:ext cx="9059400" cy="3278880"/>
           </a:xfrm>
           <a:prstGeom prst="rect">
             <a:avLst/>
@@ -2171,7 +2171,7 @@
         <p:spPr>
           <a:xfrm>
             <a:off x="503640" y="225720"/>
-            <a:ext cx="9059760" cy="937800"/>
+            <a:ext cx="9059400" cy="937440"/>
           </a:xfrm>
           <a:prstGeom prst="rect">
             <a:avLst/>
@@ -2197,7 +2197,7 @@
         <p:spPr>
           <a:xfrm>
             <a:off x="503640" y="1326240"/>
-            <a:ext cx="9059760" cy="3279240"/>
+            <a:ext cx="9059400" cy="3278880"/>
           </a:xfrm>
           <a:prstGeom prst="rect">
             <a:avLst/>
@@ -2326,7 +2326,7 @@
         <p:spPr>
           <a:xfrm>
             <a:off x="503640" y="1326240"/>
-            <a:ext cx="9060480" cy="3279960"/>
+            <a:ext cx="9060120" cy="3279600"/>
           </a:xfrm>
           <a:prstGeom prst="rect">
             <a:avLst/>
@@ -2447,7 +2447,7 @@
         <p:spPr>
           <a:xfrm>
             <a:off x="503640" y="225720"/>
-            <a:ext cx="9059760" cy="937800"/>
+            <a:ext cx="9059400" cy="937440"/>
           </a:xfrm>
           <a:prstGeom prst="rect">
             <a:avLst/>
@@ -2473,7 +2473,7 @@
         <p:spPr>
           <a:xfrm>
             <a:off x="503640" y="1326240"/>
-            <a:ext cx="9059760" cy="3279240"/>
+            <a:ext cx="9059400" cy="3278880"/>
           </a:xfrm>
           <a:prstGeom prst="rect">
             <a:avLst/>
@@ -2499,7 +2499,7 @@
         <p:spPr>
           <a:xfrm>
             <a:off x="1646280" y="4341960"/>
-            <a:ext cx="7261920" cy="313920"/>
+            <a:ext cx="7261560" cy="313560"/>
           </a:xfrm>
           <a:prstGeom prst="rect">
             <a:avLst/>
@@ -2558,7 +2558,7 @@
         <p:spPr>
           <a:xfrm>
             <a:off x="5901840" y="1740600"/>
-            <a:ext cx="3181680" cy="544680"/>
+            <a:ext cx="3181320" cy="544320"/>
           </a:xfrm>
           <a:prstGeom prst="rect">
             <a:avLst/>
@@ -2614,7 +2614,7 @@
         <p:spPr>
           <a:xfrm>
             <a:off x="4741560" y="2611440"/>
-            <a:ext cx="5082120" cy="2913480"/>
+            <a:ext cx="5081760" cy="2913120"/>
           </a:xfrm>
           <a:prstGeom prst="rect">
             <a:avLst/>
@@ -2637,7 +2637,7 @@
         <p:spPr>
           <a:xfrm>
             <a:off x="228240" y="2611440"/>
-            <a:ext cx="4545360" cy="2910600"/>
+            <a:ext cx="4545000" cy="2910240"/>
           </a:xfrm>
           <a:prstGeom prst="rect">
             <a:avLst/>
@@ -2656,7 +2656,7 @@
         <p:spPr>
           <a:xfrm>
             <a:off x="914400" y="1740600"/>
-            <a:ext cx="3339720" cy="544680"/>
+            <a:ext cx="3339360" cy="544320"/>
           </a:xfrm>
           <a:prstGeom prst="rect">
             <a:avLst/>
@@ -2756,7 +2756,7 @@
         <p:spPr>
           <a:xfrm>
             <a:off x="503640" y="1371240"/>
-            <a:ext cx="9060480" cy="3279960"/>
+            <a:ext cx="9060120" cy="3279600"/>
           </a:xfrm>
           <a:prstGeom prst="rect">
             <a:avLst/>
@@ -2998,7 +2998,7 @@
         <p:spPr>
           <a:xfrm>
             <a:off x="685440" y="2056680"/>
-            <a:ext cx="3197520" cy="3426480"/>
+            <a:ext cx="3197160" cy="3426120"/>
           </a:xfrm>
           <a:prstGeom prst="rect">
             <a:avLst/>
@@ -3021,7 +3021,7 @@
         <p:spPr>
           <a:xfrm>
             <a:off x="4114800" y="2056680"/>
-            <a:ext cx="5485320" cy="3428640"/>
+            <a:ext cx="5484960" cy="3428280"/>
           </a:xfrm>
           <a:prstGeom prst="rect">
             <a:avLst/>
@@ -3082,7 +3082,7 @@
         <p:spPr>
           <a:xfrm>
             <a:off x="685440" y="2056680"/>
-            <a:ext cx="3197520" cy="3426480"/>
+            <a:ext cx="3197160" cy="3426120"/>
           </a:xfrm>
           <a:prstGeom prst="rect">
             <a:avLst/>
@@ -3101,7 +3101,7 @@
         <p:spPr>
           <a:xfrm>
             <a:off x="4114800" y="2056680"/>
-            <a:ext cx="5482440" cy="3426480"/>
+            <a:ext cx="5482080" cy="3426120"/>
           </a:xfrm>
           <a:prstGeom prst="rect">
             <a:avLst/>
@@ -3169,7 +3169,7 @@
         <p:spPr>
           <a:xfrm>
             <a:off x="503640" y="1326240"/>
-            <a:ext cx="9060480" cy="3279960"/>
+            <a:ext cx="9060120" cy="3279600"/>
           </a:xfrm>
           <a:prstGeom prst="rect">
             <a:avLst/>
@@ -3393,7 +3393,7 @@
         <p:spPr>
           <a:xfrm>
             <a:off x="510480" y="834120"/>
-            <a:ext cx="9060480" cy="3279960"/>
+            <a:ext cx="9060120" cy="3279600"/>
           </a:xfrm>
           <a:prstGeom prst="rect">
             <a:avLst/>
@@ -3502,7 +3502,7 @@
         <p:spPr>
           <a:xfrm>
             <a:off x="2743200" y="2362320"/>
-            <a:ext cx="4618440" cy="2895480"/>
+            <a:ext cx="4618080" cy="2895120"/>
           </a:xfrm>
           <a:prstGeom prst="rect">
             <a:avLst/>
@@ -3559,7 +3559,7 @@
         <p:spPr>
           <a:xfrm>
             <a:off x="503640" y="1326240"/>
-            <a:ext cx="9060480" cy="3279960"/>
+            <a:ext cx="9060120" cy="3279600"/>
           </a:xfrm>
           <a:prstGeom prst="rect">
             <a:avLst/>
@@ -3824,7 +3824,7 @@
         <p:spPr>
           <a:xfrm>
             <a:off x="503640" y="1326240"/>
-            <a:ext cx="9060480" cy="3279960"/>
+            <a:ext cx="9060120" cy="3279600"/>
           </a:xfrm>
           <a:prstGeom prst="rect">
             <a:avLst/>
@@ -4062,7 +4062,7 @@
         <p:spPr>
           <a:xfrm>
             <a:off x="503640" y="225720"/>
-            <a:ext cx="9059760" cy="937800"/>
+            <a:ext cx="9059400" cy="937440"/>
           </a:xfrm>
           <a:prstGeom prst="rect">
             <a:avLst/>
@@ -4121,7 +4121,7 @@
         <p:spPr>
           <a:xfrm>
             <a:off x="503640" y="1326240"/>
-            <a:ext cx="9059760" cy="3279240"/>
+            <a:ext cx="9059400" cy="3278880"/>
           </a:xfrm>
           <a:prstGeom prst="rect">
             <a:avLst/>
@@ -4289,7 +4289,7 @@
         <p:spPr>
           <a:xfrm>
             <a:off x="503640" y="225720"/>
-            <a:ext cx="9059760" cy="937800"/>
+            <a:ext cx="9059400" cy="937440"/>
           </a:xfrm>
           <a:prstGeom prst="rect">
             <a:avLst/>
@@ -4348,7 +4348,7 @@
         <p:spPr>
           <a:xfrm>
             <a:off x="503640" y="1326240"/>
-            <a:ext cx="9059760" cy="3279240"/>
+            <a:ext cx="9059400" cy="3278880"/>
           </a:xfrm>
           <a:prstGeom prst="rect">
             <a:avLst/>
@@ -4511,7 +4511,7 @@
         <p:spPr>
           <a:xfrm>
             <a:off x="503640" y="225720"/>
-            <a:ext cx="9059760" cy="937800"/>
+            <a:ext cx="9059400" cy="937440"/>
           </a:xfrm>
           <a:prstGeom prst="rect">
             <a:avLst/>
@@ -4537,7 +4537,7 @@
         <p:spPr>
           <a:xfrm>
             <a:off x="503640" y="1326240"/>
-            <a:ext cx="9059760" cy="3279240"/>
+            <a:ext cx="9059400" cy="3278880"/>
           </a:xfrm>
           <a:prstGeom prst="rect">
             <a:avLst/>
@@ -4714,7 +4714,7 @@
         <p:spPr>
           <a:xfrm>
             <a:off x="503640" y="225720"/>
-            <a:ext cx="9059760" cy="937800"/>
+            <a:ext cx="9059400" cy="937440"/>
           </a:xfrm>
           <a:prstGeom prst="rect">
             <a:avLst/>
@@ -4740,7 +4740,7 @@
         <p:spPr>
           <a:xfrm>
             <a:off x="503640" y="1326240"/>
-            <a:ext cx="9059760" cy="3279240"/>
+            <a:ext cx="9059400" cy="3278880"/>
           </a:xfrm>
           <a:prstGeom prst="rect">
             <a:avLst/>
@@ -4873,7 +4873,7 @@
         <p:spPr>
           <a:xfrm>
             <a:off x="3342240" y="1409040"/>
-            <a:ext cx="3515040" cy="3196440"/>
+            <a:ext cx="3514680" cy="3196080"/>
           </a:xfrm>
           <a:prstGeom prst="rect">
             <a:avLst/>
@@ -4930,7 +4930,7 @@
         <p:spPr>
           <a:xfrm>
             <a:off x="503640" y="225720"/>
-            <a:ext cx="9059760" cy="937800"/>
+            <a:ext cx="9059400" cy="937440"/>
           </a:xfrm>
           <a:prstGeom prst="rect">
             <a:avLst/>
@@ -4956,7 +4956,7 @@
         <p:spPr>
           <a:xfrm>
             <a:off x="503640" y="1326240"/>
-            <a:ext cx="9059760" cy="3279240"/>
+            <a:ext cx="9059400" cy="3278880"/>
           </a:xfrm>
           <a:prstGeom prst="rect">
             <a:avLst/>
@@ -5089,7 +5089,7 @@
         <p:spPr>
           <a:xfrm>
             <a:off x="685800" y="1562760"/>
-            <a:ext cx="8666280" cy="3466080"/>
+            <a:ext cx="8665920" cy="3465720"/>
           </a:xfrm>
           <a:prstGeom prst="rect">
             <a:avLst/>
@@ -5150,7 +5150,7 @@
         <p:spPr>
           <a:xfrm>
             <a:off x="685800" y="1563120"/>
-            <a:ext cx="8666280" cy="3466080"/>
+            <a:ext cx="8665920" cy="3465720"/>
           </a:xfrm>
           <a:prstGeom prst="rect">
             <a:avLst/>
@@ -5169,7 +5169,7 @@
         <p:spPr>
           <a:xfrm>
             <a:off x="503640" y="225720"/>
-            <a:ext cx="9059760" cy="937800"/>
+            <a:ext cx="9059400" cy="937440"/>
           </a:xfrm>
           <a:prstGeom prst="rect">
             <a:avLst/>
@@ -5195,7 +5195,7 @@
         <p:spPr>
           <a:xfrm>
             <a:off x="503640" y="1326240"/>
-            <a:ext cx="9059760" cy="3279240"/>
+            <a:ext cx="9059400" cy="3278880"/>
           </a:xfrm>
           <a:prstGeom prst="rect">
             <a:avLst/>
@@ -5324,7 +5324,7 @@
         <p:spPr>
           <a:xfrm>
             <a:off x="7772400" y="1600200"/>
-            <a:ext cx="913680" cy="456480"/>
+            <a:ext cx="913320" cy="456120"/>
           </a:xfrm>
           <a:prstGeom prst="wedgeRoundRectCallout">
             <a:avLst>
@@ -5384,7 +5384,7 @@
         <p:spPr>
           <a:xfrm>
             <a:off x="6400800" y="1600200"/>
-            <a:ext cx="913680" cy="456480"/>
+            <a:ext cx="913320" cy="456120"/>
           </a:xfrm>
           <a:prstGeom prst="wedgeRoundRectCallout">
             <a:avLst>
@@ -5482,7 +5482,7 @@
         <p:spPr>
           <a:xfrm>
             <a:off x="503640" y="225720"/>
-            <a:ext cx="9059760" cy="937800"/>
+            <a:ext cx="9059400" cy="937440"/>
           </a:xfrm>
           <a:prstGeom prst="rect">
             <a:avLst/>
@@ -5508,7 +5508,7 @@
         <p:spPr>
           <a:xfrm>
             <a:off x="503640" y="1326240"/>
-            <a:ext cx="9059760" cy="3279240"/>
+            <a:ext cx="9059400" cy="3278880"/>
           </a:xfrm>
           <a:prstGeom prst="rect">
             <a:avLst/>
@@ -5671,7 +5671,7 @@
         <p:spPr>
           <a:xfrm>
             <a:off x="503640" y="225720"/>
-            <a:ext cx="9059760" cy="937800"/>
+            <a:ext cx="9059400" cy="937440"/>
           </a:xfrm>
           <a:prstGeom prst="rect">
             <a:avLst/>
@@ -5697,7 +5697,7 @@
         <p:spPr>
           <a:xfrm>
             <a:off x="457200" y="1600200"/>
-            <a:ext cx="9059760" cy="1176480"/>
+            <a:ext cx="9059400" cy="1176120"/>
           </a:xfrm>
           <a:prstGeom prst="rect">
             <a:avLst/>
@@ -5776,7 +5776,7 @@
         <p:spPr>
           <a:xfrm>
             <a:off x="503640" y="4341960"/>
-            <a:ext cx="9316800" cy="313920"/>
+            <a:ext cx="9316440" cy="313560"/>
           </a:xfrm>
           <a:prstGeom prst="rect">
             <a:avLst/>
@@ -5806,7 +5806,7 @@
         <p:spPr>
           <a:xfrm>
             <a:off x="1508760" y="3016800"/>
-            <a:ext cx="7177320" cy="2011680"/>
+            <a:ext cx="7176960" cy="2011320"/>
           </a:xfrm>
           <a:prstGeom prst="rect">
             <a:avLst/>
@@ -5863,7 +5863,7 @@
         <p:spPr>
           <a:xfrm>
             <a:off x="503640" y="225720"/>
-            <a:ext cx="9059760" cy="937800"/>
+            <a:ext cx="9059400" cy="937440"/>
           </a:xfrm>
           <a:prstGeom prst="rect">
             <a:avLst/>
@@ -5889,7 +5889,7 @@
         <p:spPr>
           <a:xfrm>
             <a:off x="540720" y="1728000"/>
-            <a:ext cx="9059760" cy="1014480"/>
+            <a:ext cx="9059400" cy="1014120"/>
           </a:xfrm>
           <a:prstGeom prst="rect">
             <a:avLst/>
@@ -5986,7 +5986,7 @@
         <p:spPr>
           <a:xfrm>
             <a:off x="137160" y="3173040"/>
-            <a:ext cx="4892040" cy="2313360"/>
+            <a:ext cx="4891680" cy="2313000"/>
           </a:xfrm>
           <a:prstGeom prst="rect">
             <a:avLst/>
@@ -6009,7 +6009,7 @@
         <p:spPr>
           <a:xfrm>
             <a:off x="5029200" y="3173040"/>
-            <a:ext cx="4892040" cy="2313360"/>
+            <a:ext cx="4891680" cy="2313000"/>
           </a:xfrm>
           <a:prstGeom prst="rect">
             <a:avLst/>
@@ -6066,7 +6066,7 @@
         <p:spPr>
           <a:xfrm>
             <a:off x="503640" y="225720"/>
-            <a:ext cx="9059760" cy="937800"/>
+            <a:ext cx="9059400" cy="937440"/>
           </a:xfrm>
           <a:prstGeom prst="rect">
             <a:avLst/>
@@ -6092,7 +6092,7 @@
         <p:spPr>
           <a:xfrm>
             <a:off x="503640" y="1326240"/>
-            <a:ext cx="9059760" cy="3279240"/>
+            <a:ext cx="9059400" cy="3278880"/>
           </a:xfrm>
           <a:prstGeom prst="rect">
             <a:avLst/>
@@ -6249,7 +6249,7 @@
         <p:spPr>
           <a:xfrm>
             <a:off x="503640" y="225720"/>
-            <a:ext cx="9059760" cy="937800"/>
+            <a:ext cx="9059400" cy="937440"/>
           </a:xfrm>
           <a:prstGeom prst="rect">
             <a:avLst/>
@@ -6275,7 +6275,7 @@
         <p:spPr>
           <a:xfrm>
             <a:off x="503640" y="1326240"/>
-            <a:ext cx="9060480" cy="3279960"/>
+            <a:ext cx="9060120" cy="3279600"/>
           </a:xfrm>
           <a:prstGeom prst="rect">
             <a:avLst/>
@@ -6396,7 +6396,7 @@
         <p:spPr>
           <a:xfrm>
             <a:off x="503640" y="1326240"/>
-            <a:ext cx="9060480" cy="3279960"/>
+            <a:ext cx="9060120" cy="3279600"/>
           </a:xfrm>
           <a:prstGeom prst="rect">
             <a:avLst/>
@@ -6653,7 +6653,7 @@
         <p:spPr>
           <a:xfrm>
             <a:off x="503640" y="225720"/>
-            <a:ext cx="9059760" cy="937800"/>
+            <a:ext cx="9059400" cy="937440"/>
           </a:xfrm>
           <a:prstGeom prst="rect">
             <a:avLst/>
@@ -6712,7 +6712,7 @@
         <p:spPr>
           <a:xfrm>
             <a:off x="503640" y="1326240"/>
-            <a:ext cx="9059760" cy="3279240"/>
+            <a:ext cx="9059400" cy="3278880"/>
           </a:xfrm>
           <a:prstGeom prst="rect">
             <a:avLst/>
@@ -6795,14 +6795,100 @@
               </a:tabLst>
             </a:pPr>
             <a:r>
-              <a:rPr b="1" lang="en-US" sz="1800" spc="-1" strike="noStrike">
+              <a:rPr b="0" lang="en-US" sz="1800" spc="-1" strike="noStrike">
                 <a:solidFill>
                   <a:srgbClr val="000000"/>
                 </a:solidFill>
                 <a:latin typeface="Arial"/>
                 <a:ea typeface="Microsoft YaHei"/>
               </a:rPr>
-              <a:t>- Waarom deze dbs</a:t>
+              <a:t>Three distinct models</a:t>
+            </a:r>
+            <a:endParaRPr b="0" lang="en-US" sz="1800" spc="-1" strike="noStrike">
+              <a:latin typeface="Arial"/>
+            </a:endParaRPr>
+          </a:p>
+          <a:p>
+            <a:pPr algn="ctr">
+              <a:lnSpc>
+                <a:spcPct val="100000"/>
+              </a:lnSpc>
+              <a:buNone/>
+              <a:tabLst>
+                <a:tab algn="l" pos="408240"/>
+              </a:tabLst>
+            </a:pPr>
+            <a:endParaRPr b="0" lang="en-US" sz="1800" spc="-1" strike="noStrike">
+              <a:latin typeface="Arial"/>
+            </a:endParaRPr>
+          </a:p>
+          <a:p>
+            <a:pPr algn="ctr">
+              <a:lnSpc>
+                <a:spcPct val="100000"/>
+              </a:lnSpc>
+              <a:buNone/>
+              <a:tabLst>
+                <a:tab algn="l" pos="408240"/>
+              </a:tabLst>
+            </a:pPr>
+            <a:r>
+              <a:rPr b="0" lang="en-US" sz="1800" spc="-1" strike="noStrike">
+                <a:solidFill>
+                  <a:srgbClr val="000000"/>
+                </a:solidFill>
+                <a:latin typeface="Arial"/>
+                <a:ea typeface="Microsoft YaHei"/>
+              </a:rPr>
+              <a:t>- Document store</a:t>
+            </a:r>
+            <a:endParaRPr b="0" lang="en-US" sz="1800" spc="-1" strike="noStrike">
+              <a:latin typeface="Arial"/>
+            </a:endParaRPr>
+          </a:p>
+          <a:p>
+            <a:pPr algn="ctr">
+              <a:lnSpc>
+                <a:spcPct val="100000"/>
+              </a:lnSpc>
+              <a:buNone/>
+              <a:tabLst>
+                <a:tab algn="l" pos="408240"/>
+              </a:tabLst>
+            </a:pPr>
+            <a:r>
+              <a:rPr b="0" lang="en-US" sz="1800" spc="-1" strike="noStrike">
+                <a:solidFill>
+                  <a:srgbClr val="000000"/>
+                </a:solidFill>
+                <a:latin typeface="Arial"/>
+                <a:ea typeface="Microsoft YaHei"/>
+              </a:rPr>
+              <a:t>- Timeseries database</a:t>
+            </a:r>
+            <a:endParaRPr b="0" lang="en-US" sz="1800" spc="-1" strike="noStrike">
+              <a:latin typeface="Arial"/>
+            </a:endParaRPr>
+          </a:p>
+          <a:p>
+            <a:pPr algn="ctr">
+              <a:lnSpc>
+                <a:spcPct val="100000"/>
+              </a:lnSpc>
+              <a:buNone/>
+              <a:tabLst>
+                <a:tab algn="l" pos="408240"/>
+              </a:tabLst>
+            </a:pPr>
+            <a:r>
+              <a:rPr b="0" lang="en-US" sz="1800" spc="-1" strike="noStrike">
+                <a:solidFill>
+                  <a:srgbClr val="000000"/>
+                </a:solidFill>
+                <a:latin typeface="Arial"/>
+                <a:ea typeface="Microsoft YaHei"/>
+              </a:rPr>
+              <a:t>- Graph database</a:t>
             </a:r>
             <a:endParaRPr b="0" lang="en-US" sz="1800" spc="-1" strike="noStrike">
               <a:latin typeface="Arial"/>
@@ -6899,7 +6985,7 @@
         <p:spPr>
           <a:xfrm>
             <a:off x="503640" y="1326240"/>
-            <a:ext cx="9060480" cy="3279960"/>
+            <a:ext cx="9060120" cy="3279600"/>
           </a:xfrm>
           <a:prstGeom prst="rect">
             <a:avLst/>
@@ -6968,7 +7054,7 @@
         <p:spPr>
           <a:xfrm>
             <a:off x="3200400" y="685800"/>
-            <a:ext cx="3949200" cy="4513680"/>
+            <a:ext cx="3948840" cy="4513320"/>
           </a:xfrm>
           <a:prstGeom prst="rect">
             <a:avLst/>
@@ -7025,7 +7111,7 @@
         <p:spPr>
           <a:xfrm>
             <a:off x="503640" y="225720"/>
-            <a:ext cx="9059760" cy="937800"/>
+            <a:ext cx="9059400" cy="937440"/>
           </a:xfrm>
           <a:prstGeom prst="rect">
             <a:avLst/>
@@ -7051,7 +7137,7 @@
         <p:spPr>
           <a:xfrm>
             <a:off x="503640" y="1326240"/>
-            <a:ext cx="9060480" cy="3279960"/>
+            <a:ext cx="9060120" cy="3279600"/>
           </a:xfrm>
           <a:prstGeom prst="rect">
             <a:avLst/>
@@ -7343,7 +7429,7 @@
         <p:spPr>
           <a:xfrm>
             <a:off x="503640" y="225720"/>
-            <a:ext cx="9059760" cy="937800"/>
+            <a:ext cx="9059400" cy="937440"/>
           </a:xfrm>
           <a:prstGeom prst="rect">
             <a:avLst/>
@@ -7369,7 +7455,7 @@
         <p:spPr>
           <a:xfrm>
             <a:off x="503640" y="1326240"/>
-            <a:ext cx="9060480" cy="3279960"/>
+            <a:ext cx="9060120" cy="3279600"/>
           </a:xfrm>
           <a:prstGeom prst="rect">
             <a:avLst/>
@@ -7634,7 +7720,7 @@
         <p:spPr>
           <a:xfrm>
             <a:off x="503640" y="225720"/>
-            <a:ext cx="9059760" cy="937800"/>
+            <a:ext cx="9059400" cy="937440"/>
           </a:xfrm>
           <a:prstGeom prst="rect">
             <a:avLst/>
@@ -7660,7 +7746,7 @@
         <p:spPr>
           <a:xfrm>
             <a:off x="503640" y="1326240"/>
-            <a:ext cx="9060480" cy="3279960"/>
+            <a:ext cx="9060120" cy="3279600"/>
           </a:xfrm>
           <a:prstGeom prst="rect">
             <a:avLst/>
@@ -7800,7 +7886,7 @@
         <p:spPr>
           <a:xfrm>
             <a:off x="503640" y="225720"/>
-            <a:ext cx="9059760" cy="937800"/>
+            <a:ext cx="9059400" cy="937440"/>
           </a:xfrm>
           <a:prstGeom prst="rect">
             <a:avLst/>
@@ -7859,7 +7945,7 @@
         <p:spPr>
           <a:xfrm>
             <a:off x="503640" y="1326240"/>
-            <a:ext cx="9059760" cy="3279240"/>
+            <a:ext cx="9059400" cy="3278880"/>
           </a:xfrm>
           <a:prstGeom prst="rect">
             <a:avLst/>
@@ -8035,7 +8121,7 @@
         <p:spPr>
           <a:xfrm>
             <a:off x="503640" y="225720"/>
-            <a:ext cx="9059760" cy="937800"/>
+            <a:ext cx="9059400" cy="937440"/>
           </a:xfrm>
           <a:prstGeom prst="rect">
             <a:avLst/>
@@ -8061,7 +8147,7 @@
         <p:spPr>
           <a:xfrm>
             <a:off x="503640" y="1326240"/>
-            <a:ext cx="9059760" cy="3279240"/>
+            <a:ext cx="9059400" cy="3278880"/>
           </a:xfrm>
           <a:prstGeom prst="rect">
             <a:avLst/>
@@ -8238,7 +8324,7 @@
         <p:spPr>
           <a:xfrm>
             <a:off x="503640" y="225720"/>
-            <a:ext cx="9059760" cy="937800"/>
+            <a:ext cx="9059400" cy="937440"/>
           </a:xfrm>
           <a:prstGeom prst="rect">
             <a:avLst/>
@@ -8264,7 +8350,7 @@
         <p:spPr>
           <a:xfrm>
             <a:off x="503640" y="1326240"/>
-            <a:ext cx="9059760" cy="3279240"/>
+            <a:ext cx="9059400" cy="3278880"/>
           </a:xfrm>
           <a:prstGeom prst="rect">
             <a:avLst/>
@@ -8397,7 +8483,7 @@
         <p:spPr>
           <a:xfrm>
             <a:off x="2284920" y="2056680"/>
-            <a:ext cx="2386080" cy="2053800"/>
+            <a:ext cx="2385720" cy="2053440"/>
           </a:xfrm>
           <a:prstGeom prst="rect">
             <a:avLst/>
@@ -8420,7 +8506,7 @@
         <p:spPr>
           <a:xfrm>
             <a:off x="5379840" y="2056680"/>
-            <a:ext cx="2386080" cy="2053800"/>
+            <a:ext cx="2385720" cy="2053440"/>
           </a:xfrm>
           <a:prstGeom prst="rect">
             <a:avLst/>
@@ -8477,7 +8563,7 @@
         <p:spPr>
           <a:xfrm>
             <a:off x="503640" y="225720"/>
-            <a:ext cx="9059760" cy="937800"/>
+            <a:ext cx="9059400" cy="937440"/>
           </a:xfrm>
           <a:prstGeom prst="rect">
             <a:avLst/>
@@ -8503,7 +8589,7 @@
         <p:spPr>
           <a:xfrm>
             <a:off x="503640" y="1326240"/>
-            <a:ext cx="9059760" cy="3279240"/>
+            <a:ext cx="9059400" cy="3278880"/>
           </a:xfrm>
           <a:prstGeom prst="rect">
             <a:avLst/>
@@ -8636,7 +8722,7 @@
         <p:spPr>
           <a:xfrm>
             <a:off x="2971800" y="692280"/>
-            <a:ext cx="4440600" cy="4336920"/>
+            <a:ext cx="4440240" cy="4336560"/>
           </a:xfrm>
           <a:prstGeom prst="rect">
             <a:avLst/>
@@ -8693,7 +8779,7 @@
         <p:spPr>
           <a:xfrm>
             <a:off x="503640" y="225720"/>
-            <a:ext cx="9059760" cy="937800"/>
+            <a:ext cx="9059400" cy="937440"/>
           </a:xfrm>
           <a:prstGeom prst="rect">
             <a:avLst/>
@@ -8723,7 +8809,7 @@
         <p:spPr>
           <a:xfrm>
             <a:off x="1828800" y="2915280"/>
-            <a:ext cx="6629400" cy="2342520"/>
+            <a:ext cx="6629040" cy="2342160"/>
           </a:xfrm>
           <a:prstGeom prst="rect">
             <a:avLst/>
@@ -8742,7 +8828,7 @@
         <p:spPr>
           <a:xfrm>
             <a:off x="457200" y="1978560"/>
-            <a:ext cx="9059760" cy="536040"/>
+            <a:ext cx="9059400" cy="535680"/>
           </a:xfrm>
           <a:prstGeom prst="rect">
             <a:avLst/>
@@ -8835,7 +8921,7 @@
         <p:spPr>
           <a:xfrm>
             <a:off x="503640" y="225720"/>
-            <a:ext cx="9059760" cy="937800"/>
+            <a:ext cx="9059400" cy="937440"/>
           </a:xfrm>
           <a:prstGeom prst="rect">
             <a:avLst/>
@@ -8861,7 +8947,7 @@
         <p:spPr>
           <a:xfrm>
             <a:off x="457200" y="1978560"/>
-            <a:ext cx="9059760" cy="536040"/>
+            <a:ext cx="9059400" cy="535680"/>
           </a:xfrm>
           <a:prstGeom prst="rect">
             <a:avLst/>
@@ -8920,7 +9006,7 @@
         <p:spPr>
           <a:xfrm>
             <a:off x="1828800" y="2915280"/>
-            <a:ext cx="6629400" cy="2342520"/>
+            <a:ext cx="6629040" cy="2342160"/>
           </a:xfrm>
           <a:prstGeom prst="rect">
             <a:avLst/>
@@ -8939,7 +9025,7 @@
         <p:spPr>
           <a:xfrm>
             <a:off x="6172200" y="2972520"/>
-            <a:ext cx="1143000" cy="456480"/>
+            <a:ext cx="1142640" cy="456120"/>
           </a:xfrm>
           <a:prstGeom prst="wedgeRoundRectCallout">
             <a:avLst>
@@ -8999,7 +9085,7 @@
         <p:spPr>
           <a:xfrm>
             <a:off x="3657600" y="2971800"/>
-            <a:ext cx="914400" cy="456480"/>
+            <a:ext cx="914040" cy="456120"/>
           </a:xfrm>
           <a:prstGeom prst="wedgeRoundRectCallout">
             <a:avLst>
@@ -9059,7 +9145,7 @@
         <p:spPr>
           <a:xfrm>
             <a:off x="4800600" y="2972520"/>
-            <a:ext cx="1143000" cy="456480"/>
+            <a:ext cx="1142640" cy="456120"/>
           </a:xfrm>
           <a:prstGeom prst="wedgeRoundRectCallout">
             <a:avLst>
@@ -9119,7 +9205,7 @@
         <p:spPr>
           <a:xfrm>
             <a:off x="2057400" y="2971800"/>
-            <a:ext cx="1143000" cy="456480"/>
+            <a:ext cx="1142640" cy="456120"/>
           </a:xfrm>
           <a:prstGeom prst="wedgeRoundRectCallout">
             <a:avLst>
@@ -9217,7 +9303,7 @@
         <p:spPr>
           <a:xfrm>
             <a:off x="503640" y="225720"/>
-            <a:ext cx="9059760" cy="937800"/>
+            <a:ext cx="9059400" cy="937440"/>
           </a:xfrm>
           <a:prstGeom prst="rect">
             <a:avLst/>
@@ -9276,7 +9362,7 @@
         <p:spPr>
           <a:xfrm>
             <a:off x="503640" y="1326240"/>
-            <a:ext cx="9059760" cy="3279240"/>
+            <a:ext cx="9059400" cy="3278880"/>
           </a:xfrm>
           <a:prstGeom prst="rect">
             <a:avLst/>
@@ -9452,7 +9538,7 @@
         <p:spPr>
           <a:xfrm>
             <a:off x="541440" y="1064160"/>
-            <a:ext cx="9059760" cy="249120"/>
+            <a:ext cx="9059400" cy="248760"/>
           </a:xfrm>
           <a:prstGeom prst="rect">
             <a:avLst/>
@@ -9478,7 +9564,7 @@
         <p:spPr>
           <a:xfrm>
             <a:off x="469440" y="1186200"/>
-            <a:ext cx="9059760" cy="871200"/>
+            <a:ext cx="9059400" cy="870840"/>
           </a:xfrm>
           <a:prstGeom prst="rect">
             <a:avLst/>
@@ -9516,27 +9602,7 @@
                 <a:latin typeface="Arial"/>
                 <a:ea typeface="Microsoft YaHei"/>
               </a:rPr>
-              <a:t>Dire</a:t>
-            </a:r>
-            <a:r>
-              <a:rPr b="0" lang="en-US" sz="3200" spc="-1" strike="noStrike">
-                <a:solidFill>
-                  <a:srgbClr val="000000"/>
-                </a:solidFill>
-                <a:latin typeface="Arial"/>
-                <a:ea typeface="Microsoft YaHei"/>
-              </a:rPr>
-              <a:t>ction</a:t>
-            </a:r>
-            <a:r>
-              <a:rPr b="0" lang="en-US" sz="3200" spc="-1" strike="noStrike">
-                <a:solidFill>
-                  <a:srgbClr val="000000"/>
-                </a:solidFill>
-                <a:latin typeface="Arial"/>
-                <a:ea typeface="Microsoft YaHei"/>
-              </a:rPr>
-              <a:t>ality</a:t>
+              <a:t>Directionality</a:t>
             </a:r>
             <a:r>
               <a:rPr b="1" lang="en-US" sz="3200" spc="-1" strike="noStrike">
@@ -9567,7 +9633,7 @@
         <p:spPr>
           <a:xfrm>
             <a:off x="2743200" y="2230920"/>
-            <a:ext cx="4554360" cy="3026880"/>
+            <a:ext cx="4554000" cy="3026520"/>
           </a:xfrm>
           <a:prstGeom prst="rect">
             <a:avLst/>
@@ -9624,7 +9690,7 @@
         <p:spPr>
           <a:xfrm>
             <a:off x="541440" y="1064160"/>
-            <a:ext cx="9059760" cy="249120"/>
+            <a:ext cx="9059400" cy="248760"/>
           </a:xfrm>
           <a:prstGeom prst="rect">
             <a:avLst/>
@@ -9650,7 +9716,7 @@
         <p:spPr>
           <a:xfrm>
             <a:off x="469440" y="1186200"/>
-            <a:ext cx="9059760" cy="871200"/>
+            <a:ext cx="9059400" cy="870840"/>
           </a:xfrm>
           <a:prstGeom prst="rect">
             <a:avLst/>
@@ -9709,7 +9775,7 @@
         <p:spPr>
           <a:xfrm>
             <a:off x="685800" y="2443680"/>
-            <a:ext cx="8686800" cy="2239200"/>
+            <a:ext cx="8686440" cy="2238840"/>
           </a:xfrm>
           <a:prstGeom prst="rect">
             <a:avLst/>
@@ -9766,7 +9832,7 @@
         <p:spPr>
           <a:xfrm>
             <a:off x="541440" y="1064160"/>
-            <a:ext cx="9059760" cy="249120"/>
+            <a:ext cx="9059400" cy="248760"/>
           </a:xfrm>
           <a:prstGeom prst="rect">
             <a:avLst/>
@@ -9792,7 +9858,7 @@
         <p:spPr>
           <a:xfrm>
             <a:off x="469440" y="1186200"/>
-            <a:ext cx="9059760" cy="871200"/>
+            <a:ext cx="9059400" cy="870840"/>
           </a:xfrm>
           <a:prstGeom prst="rect">
             <a:avLst/>
@@ -9830,7 +9896,17 @@
                 <a:latin typeface="Arial"/>
                 <a:ea typeface="Microsoft YaHei"/>
               </a:rPr>
-              <a:t>De</a:t>
+              <a:t>Depth</a:t>
+            </a:r>
+            <a:r>
+              <a:rPr b="1" lang="en-US" sz="3200" spc="-1" strike="noStrike">
+                <a:solidFill>
+                  <a:srgbClr val="000000"/>
+                </a:solidFill>
+                <a:latin typeface="Arial"/>
+                <a:ea typeface="Microsoft YaHei"/>
+              </a:rPr>
+              <a:t> </a:t>
             </a:r>
             <a:r>
               <a:rPr b="0" lang="en-US" sz="3200" spc="-1" strike="noStrike">
@@ -9840,37 +9916,7 @@
                 <a:latin typeface="Arial"/>
                 <a:ea typeface="Microsoft YaHei"/>
               </a:rPr>
-              <a:t>pth</a:t>
-            </a:r>
-            <a:r>
-              <a:rPr b="1" lang="en-US" sz="3200" spc="-1" strike="noStrike">
-                <a:solidFill>
-                  <a:srgbClr val="000000"/>
-                </a:solidFill>
-                <a:latin typeface="Arial"/>
-                <a:ea typeface="Microsoft YaHei"/>
-              </a:rPr>
-              <a:t> </a:t>
-            </a:r>
-            <a:r>
-              <a:rPr b="0" lang="en-US" sz="3200" spc="-1" strike="noStrike">
-                <a:solidFill>
-                  <a:srgbClr val="000000"/>
-                </a:solidFill>
-                <a:latin typeface="Arial"/>
-                <a:ea typeface="Microsoft YaHei"/>
-              </a:rPr>
-              <a:t>sea</a:t>
-            </a:r>
-            <a:r>
-              <a:rPr b="0" lang="en-US" sz="3200" spc="-1" strike="noStrike">
-                <a:solidFill>
-                  <a:srgbClr val="000000"/>
-                </a:solidFill>
-                <a:latin typeface="Arial"/>
-                <a:ea typeface="Microsoft YaHei"/>
-              </a:rPr>
-              <a:t>rch</a:t>
+              <a:t>search</a:t>
             </a:r>
             <a:r>
               <a:rPr b="1" lang="en-US" sz="3200" spc="-1" strike="noStrike">
@@ -9901,7 +9947,7 @@
         <p:spPr>
           <a:xfrm>
             <a:off x="685800" y="2462400"/>
-            <a:ext cx="8686800" cy="2252160"/>
+            <a:ext cx="8686440" cy="2251800"/>
           </a:xfrm>
           <a:prstGeom prst="rect">
             <a:avLst/>
@@ -9958,7 +10004,7 @@
         <p:spPr>
           <a:xfrm>
             <a:off x="541440" y="1064160"/>
-            <a:ext cx="9059760" cy="249120"/>
+            <a:ext cx="9059400" cy="248760"/>
           </a:xfrm>
           <a:prstGeom prst="rect">
             <a:avLst/>
@@ -9984,7 +10030,7 @@
         <p:spPr>
           <a:xfrm>
             <a:off x="469440" y="1186200"/>
-            <a:ext cx="9059760" cy="871200"/>
+            <a:ext cx="9059400" cy="870840"/>
           </a:xfrm>
           <a:prstGeom prst="rect">
             <a:avLst/>
@@ -10053,7 +10099,7 @@
         <p:spPr>
           <a:xfrm>
             <a:off x="2286000" y="2165400"/>
-            <a:ext cx="5715000" cy="2863800"/>
+            <a:ext cx="5714640" cy="2863440"/>
           </a:xfrm>
           <a:prstGeom prst="rect">
             <a:avLst/>
@@ -10110,7 +10156,7 @@
         <p:spPr>
           <a:xfrm>
             <a:off x="503640" y="225720"/>
-            <a:ext cx="9059760" cy="937800"/>
+            <a:ext cx="9059400" cy="937440"/>
           </a:xfrm>
           <a:prstGeom prst="rect">
             <a:avLst/>
@@ -10136,7 +10182,7 @@
         <p:spPr>
           <a:xfrm>
             <a:off x="503640" y="1326240"/>
-            <a:ext cx="9060480" cy="3279960"/>
+            <a:ext cx="9060120" cy="3279600"/>
           </a:xfrm>
           <a:prstGeom prst="rect">
             <a:avLst/>
@@ -10209,7 +10255,7 @@
         <p:spPr>
           <a:xfrm>
             <a:off x="4069080" y="2285280"/>
-            <a:ext cx="2103120" cy="543600"/>
+            <a:ext cx="2102760" cy="543240"/>
           </a:xfrm>
           <a:prstGeom prst="rect">
             <a:avLst/>
@@ -10299,7 +10345,7 @@
         <p:spPr>
           <a:xfrm>
             <a:off x="503640" y="1326240"/>
-            <a:ext cx="9060480" cy="3279960"/>
+            <a:ext cx="9060120" cy="3279600"/>
           </a:xfrm>
           <a:prstGeom prst="rect">
             <a:avLst/>
@@ -10439,7 +10485,7 @@
         <p:spPr>
           <a:xfrm>
             <a:off x="503640" y="1326240"/>
-            <a:ext cx="9060480" cy="3279960"/>
+            <a:ext cx="9060120" cy="3279600"/>
           </a:xfrm>
           <a:prstGeom prst="rect">
             <a:avLst/>
@@ -10673,28 +10719,37 @@
       <p:sp>
         <p:nvSpPr>
           <p:cNvPr id="161" name=""/>
-          <p:cNvSpPr txBox="1"/>
+          <p:cNvSpPr/>
           <p:nvPr/>
         </p:nvSpPr>
         <p:spPr>
           <a:xfrm>
             <a:off x="1600200" y="1814040"/>
-            <a:ext cx="6738480" cy="2529360"/>
-          </a:xfrm>
-          <a:prstGeom prst="rect">
-            <a:avLst/>
-          </a:prstGeom>
-          <a:noFill/>
-          <a:ln w="0">
-            <a:noFill/>
-          </a:ln>
-        </p:spPr>
+            <a:ext cx="6738120" cy="2529000"/>
+          </a:xfrm>
+          <a:prstGeom prst="rect">
+            <a:avLst/>
+          </a:prstGeom>
+          <a:noFill/>
+          <a:ln w="0">
+            <a:noFill/>
+          </a:ln>
+        </p:spPr>
+        <p:style>
+          <a:lnRef idx="0"/>
+          <a:fillRef idx="0"/>
+          <a:effectRef idx="0"/>
+          <a:fontRef idx="minor"/>
+        </p:style>
         <p:txBody>
           <a:bodyPr lIns="90000" rIns="90000" tIns="45000" bIns="45000" anchor="t">
             <a:noAutofit/>
           </a:bodyPr>
           <a:p>
             <a:pPr algn="ctr">
+              <a:lnSpc>
+                <a:spcPct val="100000"/>
+              </a:lnSpc>
               <a:buNone/>
             </a:pPr>
             <a:r>
@@ -10713,6 +10768,9 @@
           </a:p>
           <a:p>
             <a:pPr algn="ctr">
+              <a:lnSpc>
+                <a:spcPct val="100000"/>
+              </a:lnSpc>
               <a:buNone/>
             </a:pPr>
             <a:endParaRPr b="0" lang="en-US" sz="3200" spc="-1" strike="noStrike">
@@ -10747,8 +10805,19 @@
                 <a:latin typeface="Arial"/>
                 <a:ea typeface="DejaVu Sans"/>
               </a:rPr>
-              <a:t>-The basics are not that hard, t</a:t>
-            </a:r>
+              <a:t>-The basics are not that hard, the devil is in the details</a:t>
+            </a:r>
+            <a:endParaRPr b="0" lang="en-US" sz="2000" spc="-1" strike="noStrike">
+              <a:latin typeface="Arial"/>
+            </a:endParaRPr>
+          </a:p>
+          <a:p>
+            <a:pPr algn="ctr">
+              <a:lnSpc>
+                <a:spcPct val="100000"/>
+              </a:lnSpc>
+              <a:buNone/>
+            </a:pPr>
             <a:r>
               <a:rPr b="0" lang="en-US" sz="2000" spc="-1" strike="noStrike">
                 <a:solidFill>
@@ -10757,7 +10826,7 @@
                 <a:latin typeface="Arial"/>
                 <a:ea typeface="DejaVu Sans"/>
               </a:rPr>
-              <a:t>he devil is in the details</a:t>
+              <a:t>- Choose a database that fits the model</a:t>
             </a:r>
             <a:endParaRPr b="0" lang="en-US" sz="2000" spc="-1" strike="noStrike">
               <a:latin typeface="Arial"/>
@@ -10765,6 +10834,9 @@
           </a:p>
           <a:p>
             <a:pPr algn="ctr">
+              <a:lnSpc>
+                <a:spcPct val="100000"/>
+              </a:lnSpc>
               <a:buNone/>
             </a:pPr>
             <a:r>
@@ -10775,7 +10847,7 @@
                 <a:latin typeface="Arial"/>
                 <a:ea typeface="DejaVu Sans"/>
               </a:rPr>
-              <a:t>- Choose a database that fits the model</a:t>
+              <a:t>- Choose a database that fits the throughput</a:t>
             </a:r>
             <a:endParaRPr b="0" lang="en-US" sz="2000" spc="-1" strike="noStrike">
               <a:latin typeface="Arial"/>
@@ -10783,24 +10855,9 @@
           </a:p>
           <a:p>
             <a:pPr algn="ctr">
-              <a:buNone/>
-            </a:pPr>
-            <a:r>
-              <a:rPr b="0" lang="en-US" sz="2000" spc="-1" strike="noStrike">
-                <a:solidFill>
-                  <a:srgbClr val="000000"/>
-                </a:solidFill>
-                <a:latin typeface="Arial"/>
-                <a:ea typeface="DejaVu Sans"/>
-              </a:rPr>
-              <a:t>- Choose a database that fits the throughput</a:t>
-            </a:r>
-            <a:endParaRPr b="0" lang="en-US" sz="2000" spc="-1" strike="noStrike">
-              <a:latin typeface="Arial"/>
-            </a:endParaRPr>
-          </a:p>
-          <a:p>
-            <a:pPr algn="ctr">
+              <a:lnSpc>
+                <a:spcPct val="100000"/>
+              </a:lnSpc>
               <a:buNone/>
             </a:pPr>
             <a:endParaRPr b="0" lang="en-US" sz="2000" spc="-1" strike="noStrike">
@@ -10856,7 +10913,7 @@
         <p:spPr>
           <a:xfrm>
             <a:off x="503640" y="225720"/>
-            <a:ext cx="9059760" cy="937800"/>
+            <a:ext cx="9059400" cy="937440"/>
           </a:xfrm>
           <a:prstGeom prst="rect">
             <a:avLst/>
@@ -10882,7 +10939,7 @@
         <p:spPr>
           <a:xfrm>
             <a:off x="503640" y="1326240"/>
-            <a:ext cx="9059760" cy="3279240"/>
+            <a:ext cx="9059400" cy="3278880"/>
           </a:xfrm>
           <a:prstGeom prst="rect">
             <a:avLst/>
@@ -11059,7 +11116,7 @@
         <p:spPr>
           <a:xfrm>
             <a:off x="503640" y="225720"/>
-            <a:ext cx="9059760" cy="937800"/>
+            <a:ext cx="9059400" cy="937440"/>
           </a:xfrm>
           <a:prstGeom prst="rect">
             <a:avLst/>
@@ -11085,7 +11142,7 @@
         <p:spPr>
           <a:xfrm>
             <a:off x="503640" y="1326240"/>
-            <a:ext cx="9059760" cy="3279240"/>
+            <a:ext cx="9059400" cy="3278880"/>
           </a:xfrm>
           <a:prstGeom prst="rect">
             <a:avLst/>
@@ -11218,7 +11275,7 @@
         <p:spPr>
           <a:xfrm>
             <a:off x="1142280" y="2142720"/>
-            <a:ext cx="3652920" cy="1967760"/>
+            <a:ext cx="3652560" cy="1967400"/>
           </a:xfrm>
           <a:prstGeom prst="rect">
             <a:avLst/>
@@ -11241,7 +11298,7 @@
         <p:spPr>
           <a:xfrm>
             <a:off x="5255640" y="2142720"/>
-            <a:ext cx="3652920" cy="1967760"/>
+            <a:ext cx="3652560" cy="1967400"/>
           </a:xfrm>
           <a:prstGeom prst="rect">
             <a:avLst/>
@@ -11298,7 +11355,7 @@
         <p:spPr>
           <a:xfrm>
             <a:off x="503640" y="225720"/>
-            <a:ext cx="9059760" cy="937800"/>
+            <a:ext cx="9059400" cy="937440"/>
           </a:xfrm>
           <a:prstGeom prst="rect">
             <a:avLst/>
@@ -11324,7 +11381,7 @@
         <p:spPr>
           <a:xfrm>
             <a:off x="503640" y="1326240"/>
-            <a:ext cx="9059760" cy="3279240"/>
+            <a:ext cx="9059400" cy="3278880"/>
           </a:xfrm>
           <a:prstGeom prst="rect">
             <a:avLst/>
@@ -11457,7 +11514,7 @@
         <p:spPr>
           <a:xfrm>
             <a:off x="2970360" y="1117080"/>
-            <a:ext cx="3882960" cy="4315680"/>
+            <a:ext cx="3882600" cy="4315320"/>
           </a:xfrm>
           <a:prstGeom prst="rect">
             <a:avLst/>
@@ -11514,7 +11571,7 @@
         <p:spPr>
           <a:xfrm>
             <a:off x="503640" y="225720"/>
-            <a:ext cx="9059760" cy="937800"/>
+            <a:ext cx="9059400" cy="937440"/>
           </a:xfrm>
           <a:prstGeom prst="rect">
             <a:avLst/>
@@ -11540,7 +11597,7 @@
         <p:spPr>
           <a:xfrm>
             <a:off x="503640" y="1326240"/>
-            <a:ext cx="9059760" cy="3279240"/>
+            <a:ext cx="9059400" cy="3278880"/>
           </a:xfrm>
           <a:prstGeom prst="rect">
             <a:avLst/>
@@ -11669,7 +11726,7 @@
         <p:spPr>
           <a:xfrm>
             <a:off x="503640" y="1326240"/>
-            <a:ext cx="9060480" cy="3279960"/>
+            <a:ext cx="9060120" cy="3279600"/>
           </a:xfrm>
           <a:prstGeom prst="rect">
             <a:avLst/>
@@ -11790,7 +11847,7 @@
         <p:spPr>
           <a:xfrm>
             <a:off x="503640" y="225720"/>
-            <a:ext cx="9059760" cy="937800"/>
+            <a:ext cx="9059400" cy="937440"/>
           </a:xfrm>
           <a:prstGeom prst="rect">
             <a:avLst/>
@@ -11816,7 +11873,7 @@
         <p:spPr>
           <a:xfrm>
             <a:off x="503640" y="1326240"/>
-            <a:ext cx="9059760" cy="3279240"/>
+            <a:ext cx="9059400" cy="3278880"/>
           </a:xfrm>
           <a:prstGeom prst="rect">
             <a:avLst/>
@@ -11871,7 +11928,7 @@
         <p:spPr>
           <a:xfrm>
             <a:off x="1646280" y="4341960"/>
-            <a:ext cx="7261920" cy="313920"/>
+            <a:ext cx="7261560" cy="313560"/>
           </a:xfrm>
           <a:prstGeom prst="rect">
             <a:avLst/>
@@ -11935,7 +11992,7 @@
         <p:spPr>
           <a:xfrm>
             <a:off x="228240" y="2395080"/>
-            <a:ext cx="4751280" cy="3088080"/>
+            <a:ext cx="4750920" cy="3087720"/>
           </a:xfrm>
           <a:prstGeom prst="rect">
             <a:avLst/>
@@ -11954,7 +12011,7 @@
         <p:spPr>
           <a:xfrm>
             <a:off x="1143000" y="1512720"/>
-            <a:ext cx="3111120" cy="544680"/>
+            <a:ext cx="3110760" cy="544320"/>
           </a:xfrm>
           <a:prstGeom prst="rect">
             <a:avLst/>
@@ -12010,7 +12067,7 @@
         <p:spPr>
           <a:xfrm>
             <a:off x="4869000" y="2395080"/>
-            <a:ext cx="4970880" cy="3088080"/>
+            <a:ext cx="4970520" cy="3087720"/>
           </a:xfrm>
           <a:prstGeom prst="rect">
             <a:avLst/>
@@ -12029,7 +12086,7 @@
         <p:spPr>
           <a:xfrm>
             <a:off x="6172200" y="1512000"/>
-            <a:ext cx="2743200" cy="544680"/>
+            <a:ext cx="2742840" cy="544320"/>
           </a:xfrm>
           <a:prstGeom prst="rect">
             <a:avLst/>

</xml_diff>

<commit_message>
Fix Neo4j join slide
</commit_message>
<xml_diff>
--- a/presentation/presentation.pptx
+++ b/presentation/presentation.pptx
@@ -1652,67 +1652,43 @@
               <a:rPr b="0" lang="en-US" sz="4400" spc="-1" strike="noStrike">
                 <a:latin typeface="Arial"/>
               </a:rPr>
-              <a:t>ed</a:t>
+              <a:t>edit </a:t>
             </a:r>
             <a:r>
               <a:rPr b="0" lang="en-US" sz="4400" spc="-1" strike="noStrike">
                 <a:latin typeface="Arial"/>
               </a:rPr>
-              <a:t>it </a:t>
+              <a:t>the </a:t>
             </a:r>
             <a:r>
               <a:rPr b="0" lang="en-US" sz="4400" spc="-1" strike="noStrike">
                 <a:latin typeface="Arial"/>
               </a:rPr>
-              <a:t>th</a:t>
+              <a:t>title </a:t>
             </a:r>
             <a:r>
               <a:rPr b="0" lang="en-US" sz="4400" spc="-1" strike="noStrike">
                 <a:latin typeface="Arial"/>
               </a:rPr>
-              <a:t>e </a:t>
+              <a:t>text </a:t>
             </a:r>
             <a:r>
               <a:rPr b="0" lang="en-US" sz="4400" spc="-1" strike="noStrike">
                 <a:latin typeface="Arial"/>
               </a:rPr>
-              <a:t>titl</a:t>
+              <a:t>for</a:t>
             </a:r>
             <a:r>
               <a:rPr b="0" lang="en-US" sz="4400" spc="-1" strike="noStrike">
                 <a:latin typeface="Arial"/>
               </a:rPr>
-              <a:t>e </a:t>
+              <a:t>ma</a:t>
             </a:r>
             <a:r>
               <a:rPr b="0" lang="en-US" sz="4400" spc="-1" strike="noStrike">
                 <a:latin typeface="Arial"/>
               </a:rPr>
-              <a:t>te</a:t>
-            </a:r>
-            <a:r>
-              <a:rPr b="0" lang="en-US" sz="4400" spc="-1" strike="noStrike">
-                <a:latin typeface="Arial"/>
-              </a:rPr>
-              <a:t>xt </a:t>
-            </a:r>
-            <a:r>
-              <a:rPr b="0" lang="en-US" sz="4400" spc="-1" strike="noStrike">
-                <a:latin typeface="Arial"/>
-              </a:rPr>
-              <a:t>for</a:t>
-            </a:r>
-            <a:r>
-              <a:rPr b="0" lang="en-US" sz="4400" spc="-1" strike="noStrike">
-                <a:latin typeface="Arial"/>
-              </a:rPr>
-              <a:t>m</a:t>
-            </a:r>
-            <a:r>
-              <a:rPr b="0" lang="en-US" sz="4400" spc="-1" strike="noStrike">
-                <a:latin typeface="Arial"/>
-              </a:rPr>
-              <a:t>at</a:t>
+              <a:t>t</a:t>
             </a:r>
             <a:endParaRPr b="0" lang="en-US" sz="4400" spc="-1" strike="noStrike">
               <a:latin typeface="Arial"/>
@@ -1949,7 +1925,7 @@
         <p:spPr>
           <a:xfrm>
             <a:off x="503640" y="225720"/>
-            <a:ext cx="9059400" cy="937440"/>
+            <a:ext cx="9059040" cy="937080"/>
           </a:xfrm>
           <a:prstGeom prst="rect">
             <a:avLst/>
@@ -2008,7 +1984,7 @@
         <p:spPr>
           <a:xfrm>
             <a:off x="503640" y="1326240"/>
-            <a:ext cx="9059400" cy="3278880"/>
+            <a:ext cx="9059040" cy="3278520"/>
           </a:xfrm>
           <a:prstGeom prst="rect">
             <a:avLst/>
@@ -2171,7 +2147,7 @@
         <p:spPr>
           <a:xfrm>
             <a:off x="503640" y="225720"/>
-            <a:ext cx="9059400" cy="937440"/>
+            <a:ext cx="9059040" cy="937080"/>
           </a:xfrm>
           <a:prstGeom prst="rect">
             <a:avLst/>
@@ -2197,7 +2173,7 @@
         <p:spPr>
           <a:xfrm>
             <a:off x="503640" y="1326240"/>
-            <a:ext cx="9059400" cy="3278880"/>
+            <a:ext cx="9059040" cy="3278520"/>
           </a:xfrm>
           <a:prstGeom prst="rect">
             <a:avLst/>
@@ -2326,7 +2302,7 @@
         <p:spPr>
           <a:xfrm>
             <a:off x="503640" y="1326240"/>
-            <a:ext cx="9060120" cy="3279600"/>
+            <a:ext cx="9059760" cy="3279240"/>
           </a:xfrm>
           <a:prstGeom prst="rect">
             <a:avLst/>
@@ -2447,7 +2423,7 @@
         <p:spPr>
           <a:xfrm>
             <a:off x="503640" y="225720"/>
-            <a:ext cx="9059400" cy="937440"/>
+            <a:ext cx="9059040" cy="937080"/>
           </a:xfrm>
           <a:prstGeom prst="rect">
             <a:avLst/>
@@ -2473,7 +2449,7 @@
         <p:spPr>
           <a:xfrm>
             <a:off x="503640" y="1326240"/>
-            <a:ext cx="9059400" cy="3278880"/>
+            <a:ext cx="9059040" cy="3278520"/>
           </a:xfrm>
           <a:prstGeom prst="rect">
             <a:avLst/>
@@ -2499,7 +2475,7 @@
         <p:spPr>
           <a:xfrm>
             <a:off x="1646280" y="4341960"/>
-            <a:ext cx="7261560" cy="313560"/>
+            <a:ext cx="7261200" cy="313200"/>
           </a:xfrm>
           <a:prstGeom prst="rect">
             <a:avLst/>
@@ -2558,7 +2534,7 @@
         <p:spPr>
           <a:xfrm>
             <a:off x="5901840" y="1740600"/>
-            <a:ext cx="3181320" cy="544320"/>
+            <a:ext cx="3180960" cy="543960"/>
           </a:xfrm>
           <a:prstGeom prst="rect">
             <a:avLst/>
@@ -2614,7 +2590,7 @@
         <p:spPr>
           <a:xfrm>
             <a:off x="4741560" y="2611440"/>
-            <a:ext cx="5081760" cy="2913120"/>
+            <a:ext cx="5081400" cy="2912760"/>
           </a:xfrm>
           <a:prstGeom prst="rect">
             <a:avLst/>
@@ -2637,7 +2613,7 @@
         <p:spPr>
           <a:xfrm>
             <a:off x="228240" y="2611440"/>
-            <a:ext cx="4545000" cy="2910240"/>
+            <a:ext cx="4544640" cy="2909880"/>
           </a:xfrm>
           <a:prstGeom prst="rect">
             <a:avLst/>
@@ -2656,7 +2632,7 @@
         <p:spPr>
           <a:xfrm>
             <a:off x="914400" y="1740600"/>
-            <a:ext cx="3339360" cy="544320"/>
+            <a:ext cx="3339000" cy="543960"/>
           </a:xfrm>
           <a:prstGeom prst="rect">
             <a:avLst/>
@@ -2756,7 +2732,7 @@
         <p:spPr>
           <a:xfrm>
             <a:off x="503640" y="1371240"/>
-            <a:ext cx="9060120" cy="3279600"/>
+            <a:ext cx="9059760" cy="3279240"/>
           </a:xfrm>
           <a:prstGeom prst="rect">
             <a:avLst/>
@@ -2998,7 +2974,7 @@
         <p:spPr>
           <a:xfrm>
             <a:off x="685440" y="2056680"/>
-            <a:ext cx="3197160" cy="3426120"/>
+            <a:ext cx="3196800" cy="3425760"/>
           </a:xfrm>
           <a:prstGeom prst="rect">
             <a:avLst/>
@@ -3021,7 +2997,7 @@
         <p:spPr>
           <a:xfrm>
             <a:off x="4114800" y="2056680"/>
-            <a:ext cx="5484960" cy="3428280"/>
+            <a:ext cx="5484600" cy="3427920"/>
           </a:xfrm>
           <a:prstGeom prst="rect">
             <a:avLst/>
@@ -3082,7 +3058,7 @@
         <p:spPr>
           <a:xfrm>
             <a:off x="685440" y="2056680"/>
-            <a:ext cx="3197160" cy="3426120"/>
+            <a:ext cx="3196800" cy="3425760"/>
           </a:xfrm>
           <a:prstGeom prst="rect">
             <a:avLst/>
@@ -3101,7 +3077,7 @@
         <p:spPr>
           <a:xfrm>
             <a:off x="4114800" y="2056680"/>
-            <a:ext cx="5482080" cy="3426120"/>
+            <a:ext cx="5481720" cy="3425760"/>
           </a:xfrm>
           <a:prstGeom prst="rect">
             <a:avLst/>
@@ -3169,7 +3145,7 @@
         <p:spPr>
           <a:xfrm>
             <a:off x="503640" y="1326240"/>
-            <a:ext cx="9060120" cy="3279600"/>
+            <a:ext cx="9059760" cy="3279240"/>
           </a:xfrm>
           <a:prstGeom prst="rect">
             <a:avLst/>
@@ -3393,7 +3369,7 @@
         <p:spPr>
           <a:xfrm>
             <a:off x="510480" y="834120"/>
-            <a:ext cx="9060120" cy="3279600"/>
+            <a:ext cx="9059760" cy="3279240"/>
           </a:xfrm>
           <a:prstGeom prst="rect">
             <a:avLst/>
@@ -3502,7 +3478,7 @@
         <p:spPr>
           <a:xfrm>
             <a:off x="2743200" y="2362320"/>
-            <a:ext cx="4618080" cy="2895120"/>
+            <a:ext cx="4617720" cy="2894760"/>
           </a:xfrm>
           <a:prstGeom prst="rect">
             <a:avLst/>
@@ -3559,7 +3535,7 @@
         <p:spPr>
           <a:xfrm>
             <a:off x="503640" y="1326240"/>
-            <a:ext cx="9060120" cy="3279600"/>
+            <a:ext cx="9059760" cy="3279240"/>
           </a:xfrm>
           <a:prstGeom prst="rect">
             <a:avLst/>
@@ -3824,7 +3800,7 @@
         <p:spPr>
           <a:xfrm>
             <a:off x="503640" y="1326240"/>
-            <a:ext cx="9060120" cy="3279600"/>
+            <a:ext cx="9059760" cy="3279240"/>
           </a:xfrm>
           <a:prstGeom prst="rect">
             <a:avLst/>
@@ -4062,7 +4038,7 @@
         <p:spPr>
           <a:xfrm>
             <a:off x="503640" y="225720"/>
-            <a:ext cx="9059400" cy="937440"/>
+            <a:ext cx="9059040" cy="937080"/>
           </a:xfrm>
           <a:prstGeom prst="rect">
             <a:avLst/>
@@ -4121,7 +4097,7 @@
         <p:spPr>
           <a:xfrm>
             <a:off x="503640" y="1326240"/>
-            <a:ext cx="9059400" cy="3278880"/>
+            <a:ext cx="9059040" cy="3278520"/>
           </a:xfrm>
           <a:prstGeom prst="rect">
             <a:avLst/>
@@ -4289,7 +4265,7 @@
         <p:spPr>
           <a:xfrm>
             <a:off x="503640" y="225720"/>
-            <a:ext cx="9059400" cy="937440"/>
+            <a:ext cx="9059040" cy="937080"/>
           </a:xfrm>
           <a:prstGeom prst="rect">
             <a:avLst/>
@@ -4348,7 +4324,7 @@
         <p:spPr>
           <a:xfrm>
             <a:off x="503640" y="1326240"/>
-            <a:ext cx="9059400" cy="3278880"/>
+            <a:ext cx="9059040" cy="3278520"/>
           </a:xfrm>
           <a:prstGeom prst="rect">
             <a:avLst/>
@@ -4511,7 +4487,7 @@
         <p:spPr>
           <a:xfrm>
             <a:off x="503640" y="225720"/>
-            <a:ext cx="9059400" cy="937440"/>
+            <a:ext cx="9059040" cy="937080"/>
           </a:xfrm>
           <a:prstGeom prst="rect">
             <a:avLst/>
@@ -4537,7 +4513,7 @@
         <p:spPr>
           <a:xfrm>
             <a:off x="503640" y="1326240"/>
-            <a:ext cx="9059400" cy="3278880"/>
+            <a:ext cx="9059040" cy="3278520"/>
           </a:xfrm>
           <a:prstGeom prst="rect">
             <a:avLst/>
@@ -4714,7 +4690,7 @@
         <p:spPr>
           <a:xfrm>
             <a:off x="503640" y="225720"/>
-            <a:ext cx="9059400" cy="937440"/>
+            <a:ext cx="9059040" cy="937080"/>
           </a:xfrm>
           <a:prstGeom prst="rect">
             <a:avLst/>
@@ -4740,7 +4716,7 @@
         <p:spPr>
           <a:xfrm>
             <a:off x="503640" y="1326240"/>
-            <a:ext cx="9059400" cy="3278880"/>
+            <a:ext cx="9059040" cy="3278520"/>
           </a:xfrm>
           <a:prstGeom prst="rect">
             <a:avLst/>
@@ -4873,7 +4849,7 @@
         <p:spPr>
           <a:xfrm>
             <a:off x="3342240" y="1409040"/>
-            <a:ext cx="3514680" cy="3196080"/>
+            <a:ext cx="3514320" cy="3195720"/>
           </a:xfrm>
           <a:prstGeom prst="rect">
             <a:avLst/>
@@ -4930,7 +4906,7 @@
         <p:spPr>
           <a:xfrm>
             <a:off x="503640" y="225720"/>
-            <a:ext cx="9059400" cy="937440"/>
+            <a:ext cx="9059040" cy="937080"/>
           </a:xfrm>
           <a:prstGeom prst="rect">
             <a:avLst/>
@@ -4956,7 +4932,7 @@
         <p:spPr>
           <a:xfrm>
             <a:off x="503640" y="1326240"/>
-            <a:ext cx="9059400" cy="3278880"/>
+            <a:ext cx="9059040" cy="3278520"/>
           </a:xfrm>
           <a:prstGeom prst="rect">
             <a:avLst/>
@@ -5089,7 +5065,7 @@
         <p:spPr>
           <a:xfrm>
             <a:off x="685800" y="1562760"/>
-            <a:ext cx="8665920" cy="3465720"/>
+            <a:ext cx="8665560" cy="3465360"/>
           </a:xfrm>
           <a:prstGeom prst="rect">
             <a:avLst/>
@@ -5150,7 +5126,7 @@
         <p:spPr>
           <a:xfrm>
             <a:off x="685800" y="1563120"/>
-            <a:ext cx="8665920" cy="3465720"/>
+            <a:ext cx="8665560" cy="3465360"/>
           </a:xfrm>
           <a:prstGeom prst="rect">
             <a:avLst/>
@@ -5169,7 +5145,7 @@
         <p:spPr>
           <a:xfrm>
             <a:off x="503640" y="225720"/>
-            <a:ext cx="9059400" cy="937440"/>
+            <a:ext cx="9059040" cy="937080"/>
           </a:xfrm>
           <a:prstGeom prst="rect">
             <a:avLst/>
@@ -5195,7 +5171,7 @@
         <p:spPr>
           <a:xfrm>
             <a:off x="503640" y="1326240"/>
-            <a:ext cx="9059400" cy="3278880"/>
+            <a:ext cx="9059040" cy="3278520"/>
           </a:xfrm>
           <a:prstGeom prst="rect">
             <a:avLst/>
@@ -5324,7 +5300,7 @@
         <p:spPr>
           <a:xfrm>
             <a:off x="7772400" y="1600200"/>
-            <a:ext cx="913320" cy="456120"/>
+            <a:ext cx="912960" cy="455760"/>
           </a:xfrm>
           <a:prstGeom prst="wedgeRoundRectCallout">
             <a:avLst>
@@ -5384,7 +5360,7 @@
         <p:spPr>
           <a:xfrm>
             <a:off x="6400800" y="1600200"/>
-            <a:ext cx="913320" cy="456120"/>
+            <a:ext cx="912960" cy="455760"/>
           </a:xfrm>
           <a:prstGeom prst="wedgeRoundRectCallout">
             <a:avLst>
@@ -5428,6 +5404,126 @@
                 <a:ea typeface="DejaVu Sans"/>
               </a:rPr>
               <a:t>Type</a:t>
+            </a:r>
+            <a:endParaRPr b="0" lang="en-US" sz="1800" spc="-1" strike="noStrike">
+              <a:latin typeface="Arial"/>
+            </a:endParaRPr>
+          </a:p>
+        </p:txBody>
+      </p:sp>
+      <p:sp>
+        <p:nvSpPr>
+          <p:cNvPr id="100" name=""/>
+          <p:cNvSpPr/>
+          <p:nvPr/>
+        </p:nvSpPr>
+        <p:spPr>
+          <a:xfrm>
+            <a:off x="1828800" y="1601640"/>
+            <a:ext cx="1598760" cy="455760"/>
+          </a:xfrm>
+          <a:prstGeom prst="wedgeRoundRectCallout">
+            <a:avLst>
+              <a:gd name="adj1" fmla="val -30324"/>
+              <a:gd name="adj2" fmla="val 158333"/>
+              <a:gd name="adj3" fmla="val 16667"/>
+            </a:avLst>
+          </a:prstGeom>
+          <a:solidFill>
+            <a:srgbClr val="729fcf"/>
+          </a:solidFill>
+          <a:ln w="0">
+            <a:solidFill>
+              <a:srgbClr val="3465a4"/>
+            </a:solidFill>
+          </a:ln>
+        </p:spPr>
+        <p:style>
+          <a:lnRef idx="0"/>
+          <a:fillRef idx="0"/>
+          <a:effectRef idx="0"/>
+          <a:fontRef idx="minor"/>
+        </p:style>
+        <p:txBody>
+          <a:bodyPr lIns="90000" rIns="90000" tIns="45000" bIns="45000" anchor="ctr">
+            <a:noAutofit/>
+          </a:bodyPr>
+          <a:p>
+            <a:pPr algn="ctr">
+              <a:lnSpc>
+                <a:spcPct val="100000"/>
+              </a:lnSpc>
+              <a:buNone/>
+            </a:pPr>
+            <a:r>
+              <a:rPr b="0" lang="en-US" sz="1800" spc="-1" strike="noStrike">
+                <a:solidFill>
+                  <a:srgbClr val="000000"/>
+                </a:solidFill>
+                <a:latin typeface="Arial"/>
+                <a:ea typeface="DejaVu Sans"/>
+              </a:rPr>
+              <a:t>Timestamp</a:t>
+            </a:r>
+            <a:endParaRPr b="0" lang="en-US" sz="1800" spc="-1" strike="noStrike">
+              <a:latin typeface="Arial"/>
+            </a:endParaRPr>
+          </a:p>
+        </p:txBody>
+      </p:sp>
+      <p:sp>
+        <p:nvSpPr>
+          <p:cNvPr id="101" name=""/>
+          <p:cNvSpPr/>
+          <p:nvPr/>
+        </p:nvSpPr>
+        <p:spPr>
+          <a:xfrm>
+            <a:off x="4572000" y="1600200"/>
+            <a:ext cx="1371600" cy="455760"/>
+          </a:xfrm>
+          <a:prstGeom prst="wedgeRoundRectCallout">
+            <a:avLst>
+              <a:gd name="adj1" fmla="val -20532"/>
+              <a:gd name="adj2" fmla="val 151815"/>
+              <a:gd name="adj3" fmla="val 16667"/>
+            </a:avLst>
+          </a:prstGeom>
+          <a:solidFill>
+            <a:srgbClr val="729fcf"/>
+          </a:solidFill>
+          <a:ln w="0">
+            <a:solidFill>
+              <a:srgbClr val="3465a4"/>
+            </a:solidFill>
+          </a:ln>
+        </p:spPr>
+        <p:style>
+          <a:lnRef idx="0"/>
+          <a:fillRef idx="0"/>
+          <a:effectRef idx="0"/>
+          <a:fontRef idx="minor"/>
+        </p:style>
+        <p:txBody>
+          <a:bodyPr lIns="90000" rIns="90000" tIns="45000" bIns="45000" anchor="ctr">
+            <a:noAutofit/>
+          </a:bodyPr>
+          <a:p>
+            <a:pPr algn="ctr">
+              <a:lnSpc>
+                <a:spcPct val="100000"/>
+              </a:lnSpc>
+              <a:buNone/>
+            </a:pPr>
+            <a:r>
+              <a:rPr b="0" lang="en-US" sz="1800" spc="-1" strike="noStrike">
+                <a:solidFill>
+                  <a:srgbClr val="000000"/>
+                </a:solidFill>
+                <a:latin typeface="Arial"/>
+                <a:ea typeface="DejaVu Sans"/>
+              </a:rPr>
+              <a:t>Key/Value</a:t>
             </a:r>
             <a:endParaRPr b="0" lang="en-US" sz="1800" spc="-1" strike="noStrike">
               <a:latin typeface="Arial"/>
@@ -5475,14 +5571,14 @@
       </p:grpSpPr>
       <p:sp>
         <p:nvSpPr>
-          <p:cNvPr id="100" name=""/>
+          <p:cNvPr id="102" name=""/>
           <p:cNvSpPr/>
           <p:nvPr/>
         </p:nvSpPr>
         <p:spPr>
           <a:xfrm>
             <a:off x="503640" y="225720"/>
-            <a:ext cx="9059400" cy="937440"/>
+            <a:ext cx="9059040" cy="937080"/>
           </a:xfrm>
           <a:prstGeom prst="rect">
             <a:avLst/>
@@ -5501,14 +5597,14 @@
       </p:sp>
       <p:sp>
         <p:nvSpPr>
-          <p:cNvPr id="101" name=""/>
+          <p:cNvPr id="103" name=""/>
           <p:cNvSpPr/>
           <p:nvPr/>
         </p:nvSpPr>
         <p:spPr>
           <a:xfrm>
             <a:off x="503640" y="1326240"/>
-            <a:ext cx="9059400" cy="3278880"/>
+            <a:ext cx="9059040" cy="3278520"/>
           </a:xfrm>
           <a:prstGeom prst="rect">
             <a:avLst/>
@@ -5664,14 +5760,14 @@
       </p:grpSpPr>
       <p:sp>
         <p:nvSpPr>
-          <p:cNvPr id="102" name=""/>
+          <p:cNvPr id="104" name=""/>
           <p:cNvSpPr/>
           <p:nvPr/>
         </p:nvSpPr>
         <p:spPr>
           <a:xfrm>
             <a:off x="503640" y="225720"/>
-            <a:ext cx="9059400" cy="937440"/>
+            <a:ext cx="9059040" cy="937080"/>
           </a:xfrm>
           <a:prstGeom prst="rect">
             <a:avLst/>
@@ -5690,14 +5786,14 @@
       </p:sp>
       <p:sp>
         <p:nvSpPr>
-          <p:cNvPr id="103" name=""/>
+          <p:cNvPr id="105" name=""/>
           <p:cNvSpPr/>
           <p:nvPr/>
         </p:nvSpPr>
         <p:spPr>
           <a:xfrm>
             <a:off x="457200" y="1600200"/>
-            <a:ext cx="9059400" cy="1176120"/>
+            <a:ext cx="9059040" cy="1175760"/>
           </a:xfrm>
           <a:prstGeom prst="rect">
             <a:avLst/>
@@ -5769,14 +5865,14 @@
       </p:sp>
       <p:sp>
         <p:nvSpPr>
-          <p:cNvPr id="104" name=""/>
+          <p:cNvPr id="106" name=""/>
           <p:cNvSpPr/>
           <p:nvPr/>
         </p:nvSpPr>
         <p:spPr>
           <a:xfrm>
             <a:off x="503640" y="4341960"/>
-            <a:ext cx="9316440" cy="313560"/>
+            <a:ext cx="9316080" cy="313200"/>
           </a:xfrm>
           <a:prstGeom prst="rect">
             <a:avLst/>
@@ -5795,7 +5891,7 @@
       </p:sp>
       <p:pic>
         <p:nvPicPr>
-          <p:cNvPr id="105" name="" descr=""/>
+          <p:cNvPr id="107" name="" descr=""/>
           <p:cNvPicPr/>
           <p:nvPr/>
         </p:nvPicPr>
@@ -5806,7 +5902,7 @@
         <p:spPr>
           <a:xfrm>
             <a:off x="1508760" y="3016800"/>
-            <a:ext cx="7176960" cy="2011320"/>
+            <a:ext cx="7176600" cy="2010960"/>
           </a:xfrm>
           <a:prstGeom prst="rect">
             <a:avLst/>
@@ -5856,14 +5952,14 @@
       </p:grpSpPr>
       <p:sp>
         <p:nvSpPr>
-          <p:cNvPr id="106" name=""/>
+          <p:cNvPr id="108" name=""/>
           <p:cNvSpPr/>
           <p:nvPr/>
         </p:nvSpPr>
         <p:spPr>
           <a:xfrm>
             <a:off x="503640" y="225720"/>
-            <a:ext cx="9059400" cy="937440"/>
+            <a:ext cx="9059040" cy="937080"/>
           </a:xfrm>
           <a:prstGeom prst="rect">
             <a:avLst/>
@@ -5882,14 +5978,14 @@
       </p:sp>
       <p:sp>
         <p:nvSpPr>
-          <p:cNvPr id="107" name=""/>
+          <p:cNvPr id="109" name=""/>
           <p:cNvSpPr/>
           <p:nvPr/>
         </p:nvSpPr>
         <p:spPr>
           <a:xfrm>
             <a:off x="540720" y="1728000"/>
-            <a:ext cx="9059400" cy="1014120"/>
+            <a:ext cx="9059040" cy="1013760"/>
           </a:xfrm>
           <a:prstGeom prst="rect">
             <a:avLst/>
@@ -5975,7 +6071,7 @@
       </p:sp>
       <p:pic>
         <p:nvPicPr>
-          <p:cNvPr id="108" name="" descr=""/>
+          <p:cNvPr id="110" name="" descr=""/>
           <p:cNvPicPr/>
           <p:nvPr/>
         </p:nvPicPr>
@@ -5986,7 +6082,7 @@
         <p:spPr>
           <a:xfrm>
             <a:off x="137160" y="3173040"/>
-            <a:ext cx="4891680" cy="2313000"/>
+            <a:ext cx="4891320" cy="2312640"/>
           </a:xfrm>
           <a:prstGeom prst="rect">
             <a:avLst/>
@@ -5998,7 +6094,7 @@
       </p:pic>
       <p:pic>
         <p:nvPicPr>
-          <p:cNvPr id="109" name="" descr=""/>
+          <p:cNvPr id="111" name="" descr=""/>
           <p:cNvPicPr/>
           <p:nvPr/>
         </p:nvPicPr>
@@ -6009,7 +6105,7 @@
         <p:spPr>
           <a:xfrm>
             <a:off x="5029200" y="3173040"/>
-            <a:ext cx="4891680" cy="2313000"/>
+            <a:ext cx="4891320" cy="2312640"/>
           </a:xfrm>
           <a:prstGeom prst="rect">
             <a:avLst/>
@@ -6059,14 +6155,14 @@
       </p:grpSpPr>
       <p:sp>
         <p:nvSpPr>
-          <p:cNvPr id="110" name=""/>
+          <p:cNvPr id="112" name=""/>
           <p:cNvSpPr/>
           <p:nvPr/>
         </p:nvSpPr>
         <p:spPr>
           <a:xfrm>
             <a:off x="503640" y="225720"/>
-            <a:ext cx="9059400" cy="937440"/>
+            <a:ext cx="9059040" cy="937080"/>
           </a:xfrm>
           <a:prstGeom prst="rect">
             <a:avLst/>
@@ -6085,14 +6181,14 @@
       </p:sp>
       <p:sp>
         <p:nvSpPr>
-          <p:cNvPr id="111" name=""/>
+          <p:cNvPr id="113" name=""/>
           <p:cNvSpPr/>
           <p:nvPr/>
         </p:nvSpPr>
         <p:spPr>
           <a:xfrm>
             <a:off x="503640" y="1326240"/>
-            <a:ext cx="9059400" cy="3278880"/>
+            <a:ext cx="9059040" cy="3278520"/>
           </a:xfrm>
           <a:prstGeom prst="rect">
             <a:avLst/>
@@ -6242,14 +6338,14 @@
       </p:grpSpPr>
       <p:sp>
         <p:nvSpPr>
-          <p:cNvPr id="112" name=""/>
+          <p:cNvPr id="114" name=""/>
           <p:cNvSpPr/>
           <p:nvPr/>
         </p:nvSpPr>
         <p:spPr>
           <a:xfrm>
             <a:off x="503640" y="225720"/>
-            <a:ext cx="9059400" cy="937440"/>
+            <a:ext cx="9059040" cy="937080"/>
           </a:xfrm>
           <a:prstGeom prst="rect">
             <a:avLst/>
@@ -6268,14 +6364,14 @@
       </p:sp>
       <p:sp>
         <p:nvSpPr>
-          <p:cNvPr id="113" name=""/>
+          <p:cNvPr id="115" name=""/>
           <p:cNvSpPr/>
           <p:nvPr/>
         </p:nvSpPr>
         <p:spPr>
           <a:xfrm>
             <a:off x="503640" y="1326240"/>
-            <a:ext cx="9060120" cy="3279600"/>
+            <a:ext cx="9059760" cy="3279240"/>
           </a:xfrm>
           <a:prstGeom prst="rect">
             <a:avLst/>
@@ -6389,14 +6485,14 @@
       </p:grpSpPr>
       <p:sp>
         <p:nvSpPr>
-          <p:cNvPr id="114" name=""/>
+          <p:cNvPr id="116" name=""/>
           <p:cNvSpPr/>
           <p:nvPr/>
         </p:nvSpPr>
         <p:spPr>
           <a:xfrm>
             <a:off x="503640" y="1326240"/>
-            <a:ext cx="9060120" cy="3279600"/>
+            <a:ext cx="9059760" cy="3279240"/>
           </a:xfrm>
           <a:prstGeom prst="rect">
             <a:avLst/>
@@ -6653,7 +6749,7 @@
         <p:spPr>
           <a:xfrm>
             <a:off x="503640" y="225720"/>
-            <a:ext cx="9059400" cy="937440"/>
+            <a:ext cx="9059040" cy="937080"/>
           </a:xfrm>
           <a:prstGeom prst="rect">
             <a:avLst/>
@@ -6712,7 +6808,7 @@
         <p:spPr>
           <a:xfrm>
             <a:off x="503640" y="1326240"/>
-            <a:ext cx="9059400" cy="3278880"/>
+            <a:ext cx="9059040" cy="3278520"/>
           </a:xfrm>
           <a:prstGeom prst="rect">
             <a:avLst/>
@@ -6978,14 +7074,14 @@
       </p:grpSpPr>
       <p:sp>
         <p:nvSpPr>
-          <p:cNvPr id="115" name=""/>
+          <p:cNvPr id="117" name=""/>
           <p:cNvSpPr/>
           <p:nvPr/>
         </p:nvSpPr>
         <p:spPr>
           <a:xfrm>
             <a:off x="503640" y="1326240"/>
-            <a:ext cx="9060120" cy="3279600"/>
+            <a:ext cx="9059760" cy="3279240"/>
           </a:xfrm>
           <a:prstGeom prst="rect">
             <a:avLst/>
@@ -7043,7 +7139,7 @@
       </p:sp>
       <p:pic>
         <p:nvPicPr>
-          <p:cNvPr id="116" name="" descr=""/>
+          <p:cNvPr id="118" name="" descr=""/>
           <p:cNvPicPr/>
           <p:nvPr/>
         </p:nvPicPr>
@@ -7053,8 +7149,8 @@
         </p:blipFill>
         <p:spPr>
           <a:xfrm>
-            <a:off x="3200400" y="685800"/>
-            <a:ext cx="3948840" cy="4513320"/>
+            <a:off x="3115080" y="457200"/>
+            <a:ext cx="4200120" cy="4800600"/>
           </a:xfrm>
           <a:prstGeom prst="rect">
             <a:avLst/>
@@ -7104,14 +7200,14 @@
       </p:grpSpPr>
       <p:sp>
         <p:nvSpPr>
-          <p:cNvPr id="117" name=""/>
+          <p:cNvPr id="119" name=""/>
           <p:cNvSpPr/>
           <p:nvPr/>
         </p:nvSpPr>
         <p:spPr>
           <a:xfrm>
             <a:off x="503640" y="225720"/>
-            <a:ext cx="9059400" cy="937440"/>
+            <a:ext cx="9059040" cy="937080"/>
           </a:xfrm>
           <a:prstGeom prst="rect">
             <a:avLst/>
@@ -7130,14 +7226,14 @@
       </p:sp>
       <p:sp>
         <p:nvSpPr>
-          <p:cNvPr id="118" name=""/>
+          <p:cNvPr id="120" name=""/>
           <p:cNvSpPr/>
           <p:nvPr/>
         </p:nvSpPr>
         <p:spPr>
           <a:xfrm>
             <a:off x="503640" y="1326240"/>
-            <a:ext cx="9060120" cy="3279600"/>
+            <a:ext cx="9059760" cy="3279240"/>
           </a:xfrm>
           <a:prstGeom prst="rect">
             <a:avLst/>
@@ -7422,14 +7518,14 @@
       </p:grpSpPr>
       <p:sp>
         <p:nvSpPr>
-          <p:cNvPr id="119" name=""/>
+          <p:cNvPr id="121" name=""/>
           <p:cNvSpPr/>
           <p:nvPr/>
         </p:nvSpPr>
         <p:spPr>
           <a:xfrm>
             <a:off x="503640" y="225720"/>
-            <a:ext cx="9059400" cy="937440"/>
+            <a:ext cx="9059040" cy="937080"/>
           </a:xfrm>
           <a:prstGeom prst="rect">
             <a:avLst/>
@@ -7448,14 +7544,14 @@
       </p:sp>
       <p:sp>
         <p:nvSpPr>
-          <p:cNvPr id="120" name=""/>
+          <p:cNvPr id="122" name=""/>
           <p:cNvSpPr/>
           <p:nvPr/>
         </p:nvSpPr>
         <p:spPr>
           <a:xfrm>
             <a:off x="503640" y="1326240"/>
-            <a:ext cx="9060120" cy="3279600"/>
+            <a:ext cx="9059760" cy="3279240"/>
           </a:xfrm>
           <a:prstGeom prst="rect">
             <a:avLst/>
@@ -7713,14 +7809,14 @@
       </p:grpSpPr>
       <p:sp>
         <p:nvSpPr>
-          <p:cNvPr id="121" name=""/>
+          <p:cNvPr id="123" name=""/>
           <p:cNvSpPr/>
           <p:nvPr/>
         </p:nvSpPr>
         <p:spPr>
           <a:xfrm>
             <a:off x="503640" y="225720"/>
-            <a:ext cx="9059400" cy="937440"/>
+            <a:ext cx="9059040" cy="937080"/>
           </a:xfrm>
           <a:prstGeom prst="rect">
             <a:avLst/>
@@ -7739,14 +7835,14 @@
       </p:sp>
       <p:sp>
         <p:nvSpPr>
-          <p:cNvPr id="122" name=""/>
+          <p:cNvPr id="124" name=""/>
           <p:cNvSpPr/>
           <p:nvPr/>
         </p:nvSpPr>
         <p:spPr>
           <a:xfrm>
             <a:off x="503640" y="1326240"/>
-            <a:ext cx="9060120" cy="3279600"/>
+            <a:ext cx="9059760" cy="3279240"/>
           </a:xfrm>
           <a:prstGeom prst="rect">
             <a:avLst/>
@@ -7879,14 +7975,14 @@
       </p:grpSpPr>
       <p:sp>
         <p:nvSpPr>
-          <p:cNvPr id="123" name=""/>
+          <p:cNvPr id="125" name=""/>
           <p:cNvSpPr/>
           <p:nvPr/>
         </p:nvSpPr>
         <p:spPr>
           <a:xfrm>
             <a:off x="503640" y="225720"/>
-            <a:ext cx="9059400" cy="937440"/>
+            <a:ext cx="9059040" cy="937080"/>
           </a:xfrm>
           <a:prstGeom prst="rect">
             <a:avLst/>
@@ -7938,14 +8034,14 @@
       </p:sp>
       <p:sp>
         <p:nvSpPr>
-          <p:cNvPr id="124" name=""/>
+          <p:cNvPr id="126" name=""/>
           <p:cNvSpPr/>
           <p:nvPr/>
         </p:nvSpPr>
         <p:spPr>
           <a:xfrm>
             <a:off x="503640" y="1326240"/>
-            <a:ext cx="9059400" cy="3278880"/>
+            <a:ext cx="9059040" cy="3278520"/>
           </a:xfrm>
           <a:prstGeom prst="rect">
             <a:avLst/>
@@ -8114,14 +8210,14 @@
       </p:grpSpPr>
       <p:sp>
         <p:nvSpPr>
-          <p:cNvPr id="125" name=""/>
+          <p:cNvPr id="127" name=""/>
           <p:cNvSpPr/>
           <p:nvPr/>
         </p:nvSpPr>
         <p:spPr>
           <a:xfrm>
             <a:off x="503640" y="225720"/>
-            <a:ext cx="9059400" cy="937440"/>
+            <a:ext cx="9059040" cy="937080"/>
           </a:xfrm>
           <a:prstGeom prst="rect">
             <a:avLst/>
@@ -8140,14 +8236,14 @@
       </p:sp>
       <p:sp>
         <p:nvSpPr>
-          <p:cNvPr id="126" name=""/>
+          <p:cNvPr id="128" name=""/>
           <p:cNvSpPr/>
           <p:nvPr/>
         </p:nvSpPr>
         <p:spPr>
           <a:xfrm>
             <a:off x="503640" y="1326240"/>
-            <a:ext cx="9059400" cy="3278880"/>
+            <a:ext cx="9059040" cy="3278520"/>
           </a:xfrm>
           <a:prstGeom prst="rect">
             <a:avLst/>
@@ -8317,14 +8413,14 @@
       </p:grpSpPr>
       <p:sp>
         <p:nvSpPr>
-          <p:cNvPr id="127" name=""/>
+          <p:cNvPr id="129" name=""/>
           <p:cNvSpPr/>
           <p:nvPr/>
         </p:nvSpPr>
         <p:spPr>
           <a:xfrm>
             <a:off x="503640" y="225720"/>
-            <a:ext cx="9059400" cy="937440"/>
+            <a:ext cx="9059040" cy="937080"/>
           </a:xfrm>
           <a:prstGeom prst="rect">
             <a:avLst/>
@@ -8343,14 +8439,14 @@
       </p:sp>
       <p:sp>
         <p:nvSpPr>
-          <p:cNvPr id="128" name=""/>
+          <p:cNvPr id="130" name=""/>
           <p:cNvSpPr/>
           <p:nvPr/>
         </p:nvSpPr>
         <p:spPr>
           <a:xfrm>
             <a:off x="503640" y="1326240"/>
-            <a:ext cx="9059400" cy="3278880"/>
+            <a:ext cx="9059040" cy="3278520"/>
           </a:xfrm>
           <a:prstGeom prst="rect">
             <a:avLst/>
@@ -8472,7 +8568,7 @@
       </p:sp>
       <p:pic>
         <p:nvPicPr>
-          <p:cNvPr id="129" name="" descr=""/>
+          <p:cNvPr id="131" name="" descr=""/>
           <p:cNvPicPr/>
           <p:nvPr/>
         </p:nvPicPr>
@@ -8483,7 +8579,7 @@
         <p:spPr>
           <a:xfrm>
             <a:off x="2284920" y="2056680"/>
-            <a:ext cx="2385720" cy="2053440"/>
+            <a:ext cx="2385360" cy="2053080"/>
           </a:xfrm>
           <a:prstGeom prst="rect">
             <a:avLst/>
@@ -8495,7 +8591,7 @@
       </p:pic>
       <p:pic>
         <p:nvPicPr>
-          <p:cNvPr id="130" name="" descr=""/>
+          <p:cNvPr id="132" name="" descr=""/>
           <p:cNvPicPr/>
           <p:nvPr/>
         </p:nvPicPr>
@@ -8506,7 +8602,7 @@
         <p:spPr>
           <a:xfrm>
             <a:off x="5379840" y="2056680"/>
-            <a:ext cx="2385720" cy="2053440"/>
+            <a:ext cx="2385360" cy="2053080"/>
           </a:xfrm>
           <a:prstGeom prst="rect">
             <a:avLst/>
@@ -8556,14 +8652,14 @@
       </p:grpSpPr>
       <p:sp>
         <p:nvSpPr>
-          <p:cNvPr id="131" name=""/>
+          <p:cNvPr id="133" name=""/>
           <p:cNvSpPr/>
           <p:nvPr/>
         </p:nvSpPr>
         <p:spPr>
           <a:xfrm>
             <a:off x="503640" y="225720"/>
-            <a:ext cx="9059400" cy="937440"/>
+            <a:ext cx="9059040" cy="937080"/>
           </a:xfrm>
           <a:prstGeom prst="rect">
             <a:avLst/>
@@ -8582,14 +8678,14 @@
       </p:sp>
       <p:sp>
         <p:nvSpPr>
-          <p:cNvPr id="132" name=""/>
+          <p:cNvPr id="134" name=""/>
           <p:cNvSpPr/>
           <p:nvPr/>
         </p:nvSpPr>
         <p:spPr>
           <a:xfrm>
             <a:off x="503640" y="1326240"/>
-            <a:ext cx="9059400" cy="3278880"/>
+            <a:ext cx="9059040" cy="3278520"/>
           </a:xfrm>
           <a:prstGeom prst="rect">
             <a:avLst/>
@@ -8711,7 +8807,7 @@
       </p:sp>
       <p:pic>
         <p:nvPicPr>
-          <p:cNvPr id="133" name="" descr=""/>
+          <p:cNvPr id="135" name="" descr=""/>
           <p:cNvPicPr/>
           <p:nvPr/>
         </p:nvPicPr>
@@ -8722,7 +8818,7 @@
         <p:spPr>
           <a:xfrm>
             <a:off x="2971800" y="692280"/>
-            <a:ext cx="4440240" cy="4336560"/>
+            <a:ext cx="4439880" cy="4336200"/>
           </a:xfrm>
           <a:prstGeom prst="rect">
             <a:avLst/>
@@ -8772,14 +8868,14 @@
       </p:grpSpPr>
       <p:sp>
         <p:nvSpPr>
-          <p:cNvPr id="134" name=""/>
+          <p:cNvPr id="136" name=""/>
           <p:cNvSpPr/>
           <p:nvPr/>
         </p:nvSpPr>
         <p:spPr>
           <a:xfrm>
             <a:off x="503640" y="225720"/>
-            <a:ext cx="9059400" cy="937440"/>
+            <a:ext cx="9059040" cy="937080"/>
           </a:xfrm>
           <a:prstGeom prst="rect">
             <a:avLst/>
@@ -8798,7 +8894,7 @@
       </p:sp>
       <p:pic>
         <p:nvPicPr>
-          <p:cNvPr id="135" name="" descr=""/>
+          <p:cNvPr id="137" name="" descr=""/>
           <p:cNvPicPr/>
           <p:nvPr/>
         </p:nvPicPr>
@@ -8809,7 +8905,7 @@
         <p:spPr>
           <a:xfrm>
             <a:off x="1828800" y="2915280"/>
-            <a:ext cx="6629040" cy="2342160"/>
+            <a:ext cx="6628680" cy="2341800"/>
           </a:xfrm>
           <a:prstGeom prst="rect">
             <a:avLst/>
@@ -8821,14 +8917,14 @@
       </p:pic>
       <p:sp>
         <p:nvSpPr>
-          <p:cNvPr id="136" name=""/>
+          <p:cNvPr id="138" name=""/>
           <p:cNvSpPr/>
           <p:nvPr/>
         </p:nvSpPr>
         <p:spPr>
           <a:xfrm>
             <a:off x="457200" y="1978560"/>
-            <a:ext cx="9059400" cy="535680"/>
+            <a:ext cx="9059040" cy="535320"/>
           </a:xfrm>
           <a:prstGeom prst="rect">
             <a:avLst/>
@@ -8914,14 +9010,14 @@
       </p:grpSpPr>
       <p:sp>
         <p:nvSpPr>
-          <p:cNvPr id="137" name=""/>
+          <p:cNvPr id="139" name=""/>
           <p:cNvSpPr/>
           <p:nvPr/>
         </p:nvSpPr>
         <p:spPr>
           <a:xfrm>
             <a:off x="503640" y="225720"/>
-            <a:ext cx="9059400" cy="937440"/>
+            <a:ext cx="9059040" cy="937080"/>
           </a:xfrm>
           <a:prstGeom prst="rect">
             <a:avLst/>
@@ -8940,14 +9036,14 @@
       </p:sp>
       <p:sp>
         <p:nvSpPr>
-          <p:cNvPr id="138" name=""/>
+          <p:cNvPr id="140" name=""/>
           <p:cNvSpPr/>
           <p:nvPr/>
         </p:nvSpPr>
         <p:spPr>
           <a:xfrm>
             <a:off x="457200" y="1978560"/>
-            <a:ext cx="9059400" cy="535680"/>
+            <a:ext cx="9059040" cy="535320"/>
           </a:xfrm>
           <a:prstGeom prst="rect">
             <a:avLst/>
@@ -8995,7 +9091,7 @@
       </p:sp>
       <p:pic>
         <p:nvPicPr>
-          <p:cNvPr id="139" name="" descr=""/>
+          <p:cNvPr id="141" name="" descr=""/>
           <p:cNvPicPr/>
           <p:nvPr/>
         </p:nvPicPr>
@@ -9006,7 +9102,7 @@
         <p:spPr>
           <a:xfrm>
             <a:off x="1828800" y="2915280"/>
-            <a:ext cx="6629040" cy="2342160"/>
+            <a:ext cx="6628680" cy="2341800"/>
           </a:xfrm>
           <a:prstGeom prst="rect">
             <a:avLst/>
@@ -9018,14 +9114,14 @@
       </p:pic>
       <p:sp>
         <p:nvSpPr>
-          <p:cNvPr id="140" name=""/>
+          <p:cNvPr id="142" name=""/>
           <p:cNvSpPr/>
           <p:nvPr/>
         </p:nvSpPr>
         <p:spPr>
           <a:xfrm>
             <a:off x="6172200" y="2972520"/>
-            <a:ext cx="1142640" cy="456120"/>
+            <a:ext cx="1142280" cy="455760"/>
           </a:xfrm>
           <a:prstGeom prst="wedgeRoundRectCallout">
             <a:avLst>
@@ -9078,14 +9174,14 @@
       </p:sp>
       <p:sp>
         <p:nvSpPr>
-          <p:cNvPr id="141" name=""/>
+          <p:cNvPr id="143" name=""/>
           <p:cNvSpPr/>
           <p:nvPr/>
         </p:nvSpPr>
         <p:spPr>
           <a:xfrm>
             <a:off x="3657600" y="2971800"/>
-            <a:ext cx="914040" cy="456120"/>
+            <a:ext cx="913680" cy="455760"/>
           </a:xfrm>
           <a:prstGeom prst="wedgeRoundRectCallout">
             <a:avLst>
@@ -9138,14 +9234,14 @@
       </p:sp>
       <p:sp>
         <p:nvSpPr>
-          <p:cNvPr id="142" name=""/>
+          <p:cNvPr id="144" name=""/>
           <p:cNvSpPr/>
           <p:nvPr/>
         </p:nvSpPr>
         <p:spPr>
           <a:xfrm>
             <a:off x="4800600" y="2972520"/>
-            <a:ext cx="1142640" cy="456120"/>
+            <a:ext cx="1142280" cy="455760"/>
           </a:xfrm>
           <a:prstGeom prst="wedgeRoundRectCallout">
             <a:avLst>
@@ -9198,14 +9294,14 @@
       </p:sp>
       <p:sp>
         <p:nvSpPr>
-          <p:cNvPr id="143" name=""/>
+          <p:cNvPr id="145" name=""/>
           <p:cNvSpPr/>
           <p:nvPr/>
         </p:nvSpPr>
         <p:spPr>
           <a:xfrm>
             <a:off x="2057400" y="2971800"/>
-            <a:ext cx="1142640" cy="456120"/>
+            <a:ext cx="1142280" cy="455760"/>
           </a:xfrm>
           <a:prstGeom prst="wedgeRoundRectCallout">
             <a:avLst>
@@ -9303,7 +9399,7 @@
         <p:spPr>
           <a:xfrm>
             <a:off x="503640" y="225720"/>
-            <a:ext cx="9059400" cy="937440"/>
+            <a:ext cx="9059040" cy="937080"/>
           </a:xfrm>
           <a:prstGeom prst="rect">
             <a:avLst/>
@@ -9362,7 +9458,7 @@
         <p:spPr>
           <a:xfrm>
             <a:off x="503640" y="1326240"/>
-            <a:ext cx="9059400" cy="3278880"/>
+            <a:ext cx="9059040" cy="3278520"/>
           </a:xfrm>
           <a:prstGeom prst="rect">
             <a:avLst/>
@@ -9531,14 +9627,14 @@
       </p:grpSpPr>
       <p:sp>
         <p:nvSpPr>
-          <p:cNvPr id="144" name=""/>
+          <p:cNvPr id="146" name=""/>
           <p:cNvSpPr/>
           <p:nvPr/>
         </p:nvSpPr>
         <p:spPr>
           <a:xfrm>
             <a:off x="541440" y="1064160"/>
-            <a:ext cx="9059400" cy="248760"/>
+            <a:ext cx="9059040" cy="248400"/>
           </a:xfrm>
           <a:prstGeom prst="rect">
             <a:avLst/>
@@ -9557,14 +9653,14 @@
       </p:sp>
       <p:sp>
         <p:nvSpPr>
-          <p:cNvPr id="145" name=""/>
+          <p:cNvPr id="147" name=""/>
           <p:cNvSpPr/>
           <p:nvPr/>
         </p:nvSpPr>
         <p:spPr>
           <a:xfrm>
-            <a:off x="469440" y="1186200"/>
-            <a:ext cx="9059400" cy="870840"/>
+            <a:off x="4114800" y="1828800"/>
+            <a:ext cx="1600200" cy="413280"/>
           </a:xfrm>
           <a:prstGeom prst="rect">
             <a:avLst/>
@@ -9602,17 +9698,7 @@
                 <a:latin typeface="Arial"/>
                 <a:ea typeface="Microsoft YaHei"/>
               </a:rPr>
-              <a:t>Directionality</a:t>
-            </a:r>
-            <a:r>
-              <a:rPr b="1" lang="en-US" sz="3200" spc="-1" strike="noStrike">
-                <a:solidFill>
-                  <a:srgbClr val="000000"/>
-                </a:solidFill>
-                <a:latin typeface="Arial"/>
-                <a:ea typeface="Microsoft YaHei"/>
-              </a:rPr>
-              <a:t> </a:t>
+              <a:t>Joins</a:t>
             </a:r>
             <a:endParaRPr b="0" lang="en-US" sz="3200" spc="-1" strike="noStrike">
               <a:latin typeface="Arial"/>
@@ -9622,7 +9708,7 @@
       </p:sp>
       <p:pic>
         <p:nvPicPr>
-          <p:cNvPr id="146" name="" descr=""/>
+          <p:cNvPr id="148" name="" descr=""/>
           <p:cNvPicPr/>
           <p:nvPr/>
         </p:nvPicPr>
@@ -9632,8 +9718,31 @@
         </p:blipFill>
         <p:spPr>
           <a:xfrm>
-            <a:off x="2743200" y="2230920"/>
-            <a:ext cx="4554000" cy="3026520"/>
+            <a:off x="685800" y="2936160"/>
+            <a:ext cx="8705520" cy="2093040"/>
+          </a:xfrm>
+          <a:prstGeom prst="rect">
+            <a:avLst/>
+          </a:prstGeom>
+          <a:ln w="0">
+            <a:noFill/>
+          </a:ln>
+        </p:spPr>
+      </p:pic>
+      <p:pic>
+        <p:nvPicPr>
+          <p:cNvPr id="149" name="" descr=""/>
+          <p:cNvPicPr/>
+          <p:nvPr/>
+        </p:nvPicPr>
+        <p:blipFill>
+          <a:blip r:embed="rId3"/>
+          <a:stretch/>
+        </p:blipFill>
+        <p:spPr>
+          <a:xfrm>
+            <a:off x="7124040" y="258480"/>
+            <a:ext cx="1791360" cy="2484720"/>
           </a:xfrm>
           <a:prstGeom prst="rect">
             <a:avLst/>
@@ -9683,14 +9792,14 @@
       </p:grpSpPr>
       <p:sp>
         <p:nvSpPr>
-          <p:cNvPr id="147" name=""/>
+          <p:cNvPr id="150" name=""/>
           <p:cNvSpPr/>
           <p:nvPr/>
         </p:nvSpPr>
         <p:spPr>
           <a:xfrm>
             <a:off x="541440" y="1064160"/>
-            <a:ext cx="9059400" cy="248760"/>
+            <a:ext cx="9059040" cy="248400"/>
           </a:xfrm>
           <a:prstGeom prst="rect">
             <a:avLst/>
@@ -9709,14 +9818,14 @@
       </p:sp>
       <p:sp>
         <p:nvSpPr>
-          <p:cNvPr id="148" name=""/>
+          <p:cNvPr id="151" name=""/>
           <p:cNvSpPr/>
           <p:nvPr/>
         </p:nvSpPr>
         <p:spPr>
           <a:xfrm>
             <a:off x="469440" y="1186200"/>
-            <a:ext cx="9059400" cy="870840"/>
+            <a:ext cx="9059040" cy="870480"/>
           </a:xfrm>
           <a:prstGeom prst="rect">
             <a:avLst/>
@@ -9754,7 +9863,37 @@
                 <a:latin typeface="Arial"/>
                 <a:ea typeface="Microsoft YaHei"/>
               </a:rPr>
-              <a:t>Joins</a:t>
+              <a:t>Depth</a:t>
+            </a:r>
+            <a:r>
+              <a:rPr b="1" lang="en-US" sz="3200" spc="-1" strike="noStrike">
+                <a:solidFill>
+                  <a:srgbClr val="000000"/>
+                </a:solidFill>
+                <a:latin typeface="Arial"/>
+                <a:ea typeface="Microsoft YaHei"/>
+              </a:rPr>
+              <a:t> </a:t>
+            </a:r>
+            <a:r>
+              <a:rPr b="0" lang="en-US" sz="3200" spc="-1" strike="noStrike">
+                <a:solidFill>
+                  <a:srgbClr val="000000"/>
+                </a:solidFill>
+                <a:latin typeface="Arial"/>
+                <a:ea typeface="Microsoft YaHei"/>
+              </a:rPr>
+              <a:t>search (FIX)</a:t>
+            </a:r>
+            <a:r>
+              <a:rPr b="1" lang="en-US" sz="3200" spc="-1" strike="noStrike">
+                <a:solidFill>
+                  <a:srgbClr val="000000"/>
+                </a:solidFill>
+                <a:latin typeface="Arial"/>
+                <a:ea typeface="Microsoft YaHei"/>
+              </a:rPr>
+              <a:t> </a:t>
             </a:r>
             <a:endParaRPr b="0" lang="en-US" sz="3200" spc="-1" strike="noStrike">
               <a:latin typeface="Arial"/>
@@ -9764,7 +9903,7 @@
       </p:sp>
       <p:pic>
         <p:nvPicPr>
-          <p:cNvPr id="149" name="" descr=""/>
+          <p:cNvPr id="152" name="" descr=""/>
           <p:cNvPicPr/>
           <p:nvPr/>
         </p:nvPicPr>
@@ -9774,8 +9913,8 @@
         </p:blipFill>
         <p:spPr>
           <a:xfrm>
-            <a:off x="685800" y="2443680"/>
-            <a:ext cx="8686440" cy="2238840"/>
+            <a:off x="685800" y="2462400"/>
+            <a:ext cx="8686080" cy="2251440"/>
           </a:xfrm>
           <a:prstGeom prst="rect">
             <a:avLst/>
@@ -9825,14 +9964,14 @@
       </p:grpSpPr>
       <p:sp>
         <p:nvSpPr>
-          <p:cNvPr id="150" name=""/>
+          <p:cNvPr id="153" name=""/>
           <p:cNvSpPr/>
           <p:nvPr/>
         </p:nvSpPr>
         <p:spPr>
           <a:xfrm>
             <a:off x="541440" y="1064160"/>
-            <a:ext cx="9059400" cy="248760"/>
+            <a:ext cx="9059040" cy="248400"/>
           </a:xfrm>
           <a:prstGeom prst="rect">
             <a:avLst/>
@@ -9851,14 +9990,14 @@
       </p:sp>
       <p:sp>
         <p:nvSpPr>
-          <p:cNvPr id="151" name=""/>
+          <p:cNvPr id="154" name=""/>
           <p:cNvSpPr/>
           <p:nvPr/>
         </p:nvSpPr>
         <p:spPr>
           <a:xfrm>
             <a:off x="469440" y="1186200"/>
-            <a:ext cx="9059400" cy="870840"/>
+            <a:ext cx="9059040" cy="870480"/>
           </a:xfrm>
           <a:prstGeom prst="rect">
             <a:avLst/>
@@ -9896,7 +10035,7 @@
                 <a:latin typeface="Arial"/>
                 <a:ea typeface="Microsoft YaHei"/>
               </a:rPr>
-              <a:t>Depth</a:t>
+              <a:t>Directionality</a:t>
             </a:r>
             <a:r>
               <a:rPr b="1" lang="en-US" sz="3200" spc="-1" strike="noStrike">
@@ -9908,26 +10047,6 @@
               </a:rPr>
               <a:t> </a:t>
             </a:r>
-            <a:r>
-              <a:rPr b="0" lang="en-US" sz="3200" spc="-1" strike="noStrike">
-                <a:solidFill>
-                  <a:srgbClr val="000000"/>
-                </a:solidFill>
-                <a:latin typeface="Arial"/>
-                <a:ea typeface="Microsoft YaHei"/>
-              </a:rPr>
-              <a:t>search</a:t>
-            </a:r>
-            <a:r>
-              <a:rPr b="1" lang="en-US" sz="3200" spc="-1" strike="noStrike">
-                <a:solidFill>
-                  <a:srgbClr val="000000"/>
-                </a:solidFill>
-                <a:latin typeface="Arial"/>
-                <a:ea typeface="Microsoft YaHei"/>
-              </a:rPr>
-              <a:t> </a:t>
-            </a:r>
             <a:endParaRPr b="0" lang="en-US" sz="3200" spc="-1" strike="noStrike">
               <a:latin typeface="Arial"/>
             </a:endParaRPr>
@@ -9936,7 +10055,7 @@
       </p:sp>
       <p:pic>
         <p:nvPicPr>
-          <p:cNvPr id="152" name="" descr=""/>
+          <p:cNvPr id="155" name="" descr=""/>
           <p:cNvPicPr/>
           <p:nvPr/>
         </p:nvPicPr>
@@ -9946,8 +10065,8 @@
         </p:blipFill>
         <p:spPr>
           <a:xfrm>
-            <a:off x="685800" y="2462400"/>
-            <a:ext cx="8686440" cy="2251800"/>
+            <a:off x="2743200" y="2230920"/>
+            <a:ext cx="4553640" cy="3026160"/>
           </a:xfrm>
           <a:prstGeom prst="rect">
             <a:avLst/>
@@ -9997,14 +10116,14 @@
       </p:grpSpPr>
       <p:sp>
         <p:nvSpPr>
-          <p:cNvPr id="153" name=""/>
+          <p:cNvPr id="156" name=""/>
           <p:cNvSpPr/>
           <p:nvPr/>
         </p:nvSpPr>
         <p:spPr>
           <a:xfrm>
             <a:off x="541440" y="1064160"/>
-            <a:ext cx="9059400" cy="248760"/>
+            <a:ext cx="9059040" cy="248400"/>
           </a:xfrm>
           <a:prstGeom prst="rect">
             <a:avLst/>
@@ -10023,14 +10142,14 @@
       </p:sp>
       <p:sp>
         <p:nvSpPr>
-          <p:cNvPr id="154" name=""/>
+          <p:cNvPr id="157" name=""/>
           <p:cNvSpPr/>
           <p:nvPr/>
         </p:nvSpPr>
         <p:spPr>
           <a:xfrm>
             <a:off x="469440" y="1186200"/>
-            <a:ext cx="9059400" cy="870840"/>
+            <a:ext cx="9059040" cy="870480"/>
           </a:xfrm>
           <a:prstGeom prst="rect">
             <a:avLst/>
@@ -10088,7 +10207,7 @@
       </p:sp>
       <p:pic>
         <p:nvPicPr>
-          <p:cNvPr id="155" name="" descr=""/>
+          <p:cNvPr id="158" name="" descr=""/>
           <p:cNvPicPr/>
           <p:nvPr/>
         </p:nvPicPr>
@@ -10099,7 +10218,7 @@
         <p:spPr>
           <a:xfrm>
             <a:off x="2286000" y="2165400"/>
-            <a:ext cx="5714640" cy="2863440"/>
+            <a:ext cx="5714280" cy="2863080"/>
           </a:xfrm>
           <a:prstGeom prst="rect">
             <a:avLst/>
@@ -10149,14 +10268,14 @@
       </p:grpSpPr>
       <p:sp>
         <p:nvSpPr>
-          <p:cNvPr id="156" name=""/>
+          <p:cNvPr id="159" name=""/>
           <p:cNvSpPr/>
           <p:nvPr/>
         </p:nvSpPr>
         <p:spPr>
           <a:xfrm>
             <a:off x="503640" y="225720"/>
-            <a:ext cx="9059400" cy="937440"/>
+            <a:ext cx="9059040" cy="937080"/>
           </a:xfrm>
           <a:prstGeom prst="rect">
             <a:avLst/>
@@ -10175,14 +10294,14 @@
       </p:sp>
       <p:sp>
         <p:nvSpPr>
-          <p:cNvPr id="157" name=""/>
+          <p:cNvPr id="160" name=""/>
           <p:cNvSpPr/>
           <p:nvPr/>
         </p:nvSpPr>
         <p:spPr>
           <a:xfrm>
             <a:off x="503640" y="1326240"/>
-            <a:ext cx="9060120" cy="3279600"/>
+            <a:ext cx="9059760" cy="3279240"/>
           </a:xfrm>
           <a:prstGeom prst="rect">
             <a:avLst/>
@@ -10248,14 +10367,14 @@
       </p:sp>
       <p:sp>
         <p:nvSpPr>
-          <p:cNvPr id="158" name=""/>
+          <p:cNvPr id="161" name=""/>
           <p:cNvSpPr/>
           <p:nvPr/>
         </p:nvSpPr>
         <p:spPr>
           <a:xfrm>
             <a:off x="4069080" y="2285280"/>
-            <a:ext cx="2102760" cy="543240"/>
+            <a:ext cx="2102400" cy="542880"/>
           </a:xfrm>
           <a:prstGeom prst="rect">
             <a:avLst/>
@@ -10338,14 +10457,14 @@
       </p:grpSpPr>
       <p:sp>
         <p:nvSpPr>
-          <p:cNvPr id="159" name=""/>
+          <p:cNvPr id="162" name=""/>
           <p:cNvSpPr/>
           <p:nvPr/>
         </p:nvSpPr>
         <p:spPr>
           <a:xfrm>
             <a:off x="503640" y="1326240"/>
-            <a:ext cx="9060120" cy="3279600"/>
+            <a:ext cx="9059760" cy="3279240"/>
           </a:xfrm>
           <a:prstGeom prst="rect">
             <a:avLst/>
@@ -10478,14 +10597,14 @@
       </p:grpSpPr>
       <p:sp>
         <p:nvSpPr>
-          <p:cNvPr id="160" name=""/>
+          <p:cNvPr id="163" name=""/>
           <p:cNvSpPr/>
           <p:nvPr/>
         </p:nvSpPr>
         <p:spPr>
           <a:xfrm>
             <a:off x="503640" y="1326240"/>
-            <a:ext cx="9060120" cy="3279600"/>
+            <a:ext cx="9059760" cy="3279240"/>
           </a:xfrm>
           <a:prstGeom prst="rect">
             <a:avLst/>
@@ -10718,14 +10837,14 @@
       </p:grpSpPr>
       <p:sp>
         <p:nvSpPr>
-          <p:cNvPr id="161" name=""/>
+          <p:cNvPr id="164" name=""/>
           <p:cNvSpPr/>
           <p:nvPr/>
         </p:nvSpPr>
         <p:spPr>
           <a:xfrm>
             <a:off x="1600200" y="1814040"/>
-            <a:ext cx="6738120" cy="2529000"/>
+            <a:ext cx="6737760" cy="2528640"/>
           </a:xfrm>
           <a:prstGeom prst="rect">
             <a:avLst/>
@@ -10913,7 +11032,7 @@
         <p:spPr>
           <a:xfrm>
             <a:off x="503640" y="225720"/>
-            <a:ext cx="9059400" cy="937440"/>
+            <a:ext cx="9059040" cy="937080"/>
           </a:xfrm>
           <a:prstGeom prst="rect">
             <a:avLst/>
@@ -10939,7 +11058,7 @@
         <p:spPr>
           <a:xfrm>
             <a:off x="503640" y="1326240"/>
-            <a:ext cx="9059400" cy="3278880"/>
+            <a:ext cx="9059040" cy="3278520"/>
           </a:xfrm>
           <a:prstGeom prst="rect">
             <a:avLst/>
@@ -11116,7 +11235,7 @@
         <p:spPr>
           <a:xfrm>
             <a:off x="503640" y="225720"/>
-            <a:ext cx="9059400" cy="937440"/>
+            <a:ext cx="9059040" cy="937080"/>
           </a:xfrm>
           <a:prstGeom prst="rect">
             <a:avLst/>
@@ -11142,7 +11261,7 @@
         <p:spPr>
           <a:xfrm>
             <a:off x="503640" y="1326240"/>
-            <a:ext cx="9059400" cy="3278880"/>
+            <a:ext cx="9059040" cy="3278520"/>
           </a:xfrm>
           <a:prstGeom prst="rect">
             <a:avLst/>
@@ -11275,7 +11394,7 @@
         <p:spPr>
           <a:xfrm>
             <a:off x="1142280" y="2142720"/>
-            <a:ext cx="3652560" cy="1967400"/>
+            <a:ext cx="3652200" cy="1967040"/>
           </a:xfrm>
           <a:prstGeom prst="rect">
             <a:avLst/>
@@ -11298,7 +11417,7 @@
         <p:spPr>
           <a:xfrm>
             <a:off x="5255640" y="2142720"/>
-            <a:ext cx="3652560" cy="1967400"/>
+            <a:ext cx="3652200" cy="1967040"/>
           </a:xfrm>
           <a:prstGeom prst="rect">
             <a:avLst/>
@@ -11355,7 +11474,7 @@
         <p:spPr>
           <a:xfrm>
             <a:off x="503640" y="225720"/>
-            <a:ext cx="9059400" cy="937440"/>
+            <a:ext cx="9059040" cy="937080"/>
           </a:xfrm>
           <a:prstGeom prst="rect">
             <a:avLst/>
@@ -11381,7 +11500,7 @@
         <p:spPr>
           <a:xfrm>
             <a:off x="503640" y="1326240"/>
-            <a:ext cx="9059400" cy="3278880"/>
+            <a:ext cx="9059040" cy="3278520"/>
           </a:xfrm>
           <a:prstGeom prst="rect">
             <a:avLst/>
@@ -11514,7 +11633,7 @@
         <p:spPr>
           <a:xfrm>
             <a:off x="2970360" y="1117080"/>
-            <a:ext cx="3882600" cy="4315320"/>
+            <a:ext cx="3882240" cy="4314960"/>
           </a:xfrm>
           <a:prstGeom prst="rect">
             <a:avLst/>
@@ -11571,7 +11690,7 @@
         <p:spPr>
           <a:xfrm>
             <a:off x="503640" y="225720"/>
-            <a:ext cx="9059400" cy="937440"/>
+            <a:ext cx="9059040" cy="937080"/>
           </a:xfrm>
           <a:prstGeom prst="rect">
             <a:avLst/>
@@ -11597,7 +11716,7 @@
         <p:spPr>
           <a:xfrm>
             <a:off x="503640" y="1326240"/>
-            <a:ext cx="9059400" cy="3278880"/>
+            <a:ext cx="9059040" cy="3278520"/>
           </a:xfrm>
           <a:prstGeom prst="rect">
             <a:avLst/>
@@ -11726,7 +11845,7 @@
         <p:spPr>
           <a:xfrm>
             <a:off x="503640" y="1326240"/>
-            <a:ext cx="9060120" cy="3279600"/>
+            <a:ext cx="9059760" cy="3279240"/>
           </a:xfrm>
           <a:prstGeom prst="rect">
             <a:avLst/>
@@ -11847,7 +11966,7 @@
         <p:spPr>
           <a:xfrm>
             <a:off x="503640" y="225720"/>
-            <a:ext cx="9059400" cy="937440"/>
+            <a:ext cx="9059040" cy="937080"/>
           </a:xfrm>
           <a:prstGeom prst="rect">
             <a:avLst/>
@@ -11873,7 +11992,7 @@
         <p:spPr>
           <a:xfrm>
             <a:off x="503640" y="1326240"/>
-            <a:ext cx="9059400" cy="3278880"/>
+            <a:ext cx="9059040" cy="3278520"/>
           </a:xfrm>
           <a:prstGeom prst="rect">
             <a:avLst/>
@@ -11928,7 +12047,7 @@
         <p:spPr>
           <a:xfrm>
             <a:off x="1646280" y="4341960"/>
-            <a:ext cx="7261560" cy="313560"/>
+            <a:ext cx="7261200" cy="313200"/>
           </a:xfrm>
           <a:prstGeom prst="rect">
             <a:avLst/>
@@ -11992,7 +12111,7 @@
         <p:spPr>
           <a:xfrm>
             <a:off x="228240" y="2395080"/>
-            <a:ext cx="4750920" cy="3087720"/>
+            <a:ext cx="4750560" cy="3087360"/>
           </a:xfrm>
           <a:prstGeom prst="rect">
             <a:avLst/>
@@ -12011,7 +12130,7 @@
         <p:spPr>
           <a:xfrm>
             <a:off x="1143000" y="1512720"/>
-            <a:ext cx="3110760" cy="544320"/>
+            <a:ext cx="3110400" cy="543960"/>
           </a:xfrm>
           <a:prstGeom prst="rect">
             <a:avLst/>
@@ -12067,7 +12186,7 @@
         <p:spPr>
           <a:xfrm>
             <a:off x="4869000" y="2395080"/>
-            <a:ext cx="4970520" cy="3087720"/>
+            <a:ext cx="4970160" cy="3087360"/>
           </a:xfrm>
           <a:prstGeom prst="rect">
             <a:avLst/>
@@ -12086,7 +12205,7 @@
         <p:spPr>
           <a:xfrm>
             <a:off x="6172200" y="1512000"/>
-            <a:ext cx="2742840" cy="544320"/>
+            <a:ext cx="2742480" cy="543960"/>
           </a:xfrm>
           <a:prstGeom prst="rect">
             <a:avLst/>

</xml_diff>